<commit_message>
NES commented first draft figure captions
</commit_message>
<xml_diff>
--- a/paper/HWavinessGraphs_Figs_Capt.pptx
+++ b/paper/HWavinessGraphs_Figs_Capt.pptx
@@ -6,20 +6,20 @@
   </p:sldMasterIdLst>
   <p:sldIdLst>
     <p:sldId id="256" r:id="rId2"/>
-    <p:sldId id="261" r:id="rId3"/>
-    <p:sldId id="259" r:id="rId4"/>
+    <p:sldId id="270" r:id="rId3"/>
+    <p:sldId id="261" r:id="rId4"/>
     <p:sldId id="260" r:id="rId5"/>
     <p:sldId id="257" r:id="rId6"/>
-    <p:sldId id="262" r:id="rId7"/>
-    <p:sldId id="264" r:id="rId8"/>
-    <p:sldId id="263" r:id="rId9"/>
-    <p:sldId id="265" r:id="rId10"/>
-    <p:sldId id="266" r:id="rId11"/>
-    <p:sldId id="267" r:id="rId12"/>
-    <p:sldId id="268" r:id="rId13"/>
-    <p:sldId id="269" r:id="rId14"/>
-    <p:sldId id="271" r:id="rId15"/>
-    <p:sldId id="270" r:id="rId16"/>
+    <p:sldId id="259" r:id="rId7"/>
+    <p:sldId id="262" r:id="rId8"/>
+    <p:sldId id="264" r:id="rId9"/>
+    <p:sldId id="263" r:id="rId10"/>
+    <p:sldId id="265" r:id="rId11"/>
+    <p:sldId id="266" r:id="rId12"/>
+    <p:sldId id="267" r:id="rId13"/>
+    <p:sldId id="268" r:id="rId14"/>
+    <p:sldId id="269" r:id="rId15"/>
+    <p:sldId id="271" r:id="rId16"/>
   </p:sldIdLst>
   <p:sldSz cx="12192000" cy="6858000"/>
   <p:notesSz cx="6858000" cy="9144000"/>
@@ -120,7 +120,7 @@
   </p:defaultTextStyle>
   <p:extLst>
     <p:ext uri="{EFAFB233-063F-42B5-8137-9DF3F51BA10A}">
-      <p15:sldGuideLst xmlns:p15="http://schemas.microsoft.com/office/powerpoint/2012/main"/>
+      <p15:sldGuideLst xmlns:p15="http://schemas.microsoft.com/office/powerpoint/2012/main" xmlns=""/>
     </p:ext>
   </p:extLst>
 </p:presentation>
@@ -129,12 +129,9 @@
 <file path=ppt/commentAuthors.xml><?xml version="1.0" encoding="utf-8"?>
 <p:cmAuthorLst xmlns:a="http://schemas.openxmlformats.org/drawingml/2006/main" xmlns:r="http://schemas.openxmlformats.org/officeDocument/2006/relationships" xmlns:p="http://schemas.openxmlformats.org/presentationml/2006/main">
   <p:cmAuthor id="1" name="Josue Vega" initials="JV" lastIdx="1" clrIdx="0">
-    <p:extLst>
-      <p:ext uri="{19B8F6BF-5375-455C-9EA6-DF929625EA0E}">
-        <p15:presenceInfo xmlns:p15="http://schemas.microsoft.com/office/powerpoint/2012/main" userId="c8d0efd82a5f1dba" providerId="Windows Live"/>
-      </p:ext>
-    </p:extLst>
+    <p:extLst/>
   </p:cmAuthor>
+  <p:cmAuthor id="2" name="Nicole Soltis" initials="NS" lastIdx="17" clrIdx="1"/>
 </p:cmAuthorLst>
 </file>
 
@@ -144,6 +141,76 @@
 
 <file path=ppt/comments/comment1.xml><?xml version="1.0" encoding="utf-8"?>
 <p:cmLst xmlns:a="http://schemas.openxmlformats.org/drawingml/2006/main" xmlns:r="http://schemas.openxmlformats.org/officeDocument/2006/relationships" xmlns:p="http://schemas.openxmlformats.org/presentationml/2006/main">
+  <p:cm authorId="2" dt="2018-01-19T11:16:40.127" idx="1">
+    <p:pos x="3404" y="2356"/>
+    <p:text>keep in methods, not in table caption</p:text>
+  </p:cm>
+  <p:cm authorId="2" dt="2018-01-19T11:17:00.273" idx="2">
+    <p:pos x="3258" y="3052"/>
+    <p:text>this is confusing, rephrase</p:text>
+  </p:cm>
+  <p:cm authorId="2" dt="2018-01-19T11:17:18.222" idx="3">
+    <p:pos x="3172" y="3224"/>
+    <p:text>date of phenotyping</p:text>
+  </p:cm>
+</p:cmLst>
+</file>
+
+<file path=ppt/comments/comment10.xml><?xml version="1.0" encoding="utf-8"?>
+<p:cmLst xmlns:a="http://schemas.openxmlformats.org/drawingml/2006/main" xmlns:r="http://schemas.openxmlformats.org/officeDocument/2006/relationships" xmlns:p="http://schemas.openxmlformats.org/presentationml/2006/main">
+  <p:cm authorId="2" dt="2018-01-19T11:24:33.911" idx="15">
+    <p:pos x="6517" y="335"/>
+    <p:text>continue table from previous slide</p:text>
+  </p:cm>
+</p:cmLst>
+</file>
+
+<file path=ppt/comments/comment11.xml><?xml version="1.0" encoding="utf-8"?>
+<p:cmLst xmlns:a="http://schemas.openxmlformats.org/drawingml/2006/main" xmlns:r="http://schemas.openxmlformats.org/officeDocument/2006/relationships" xmlns:p="http://schemas.openxmlformats.org/presentationml/2006/main">
+  <p:cm authorId="2" dt="2018-01-19T11:24:39.583" idx="16">
+    <p:pos x="2270" y="3508"/>
+    <p:text>continue table from previous slide</p:text>
+  </p:cm>
+</p:cmLst>
+</file>
+
+<file path=ppt/comments/comment12.xml><?xml version="1.0" encoding="utf-8"?>
+<p:cmLst xmlns:a="http://schemas.openxmlformats.org/drawingml/2006/main" xmlns:r="http://schemas.openxmlformats.org/officeDocument/2006/relationships" xmlns:p="http://schemas.openxmlformats.org/presentationml/2006/main">
+  <p:cm authorId="2" dt="2018-01-19T11:24:43.798" idx="17">
+    <p:pos x="2295" y="3628"/>
+    <p:text>continue table from previous slide</p:text>
+  </p:cm>
+</p:cmLst>
+</file>
+
+<file path=ppt/comments/comment2.xml><?xml version="1.0" encoding="utf-8"?>
+<p:cmLst xmlns:a="http://schemas.openxmlformats.org/drawingml/2006/main" xmlns:r="http://schemas.openxmlformats.org/officeDocument/2006/relationships" xmlns:p="http://schemas.openxmlformats.org/presentationml/2006/main">
+  <p:cm authorId="2" dt="2018-01-19T11:20:06.776" idx="5">
+    <p:pos x="2871" y="361"/>
+    <p:text>only need title in figure caption</p:text>
+  </p:cm>
+  <p:cm authorId="2" dt="2018-01-19T11:20:30.944" idx="6">
+    <p:pos x="5665" y="3078"/>
+    <p:text>print higher resolution so fonts are clear. Increase y axis font and label size</p:text>
+  </p:cm>
+  <p:cm authorId="2" dt="2018-01-19T11:21:16.434" idx="7">
+    <p:pos x="7282" y="3250"/>
+    <p:text>clarify. does this mean 12.5% to 87.5% range?</p:text>
+  </p:cm>
+</p:cmLst>
+</file>
+
+<file path=ppt/comments/comment3.xml><?xml version="1.0" encoding="utf-8"?>
+<p:cmLst xmlns:a="http://schemas.openxmlformats.org/drawingml/2006/main" xmlns:r="http://schemas.openxmlformats.org/officeDocument/2006/relationships" xmlns:p="http://schemas.openxmlformats.org/presentationml/2006/main">
+  <p:cm authorId="2" dt="2018-01-19T11:22:06.271" idx="9">
+    <p:pos x="1178" y="3078"/>
+    <p:text>will include this OR the previous figure (violin plot)</p:text>
+  </p:cm>
+</p:cmLst>
+</file>
+
+<file path=ppt/comments/comment4.xml><?xml version="1.0" encoding="utf-8"?>
+<p:cmLst xmlns:a="http://schemas.openxmlformats.org/drawingml/2006/main" xmlns:r="http://schemas.openxmlformats.org/officeDocument/2006/relationships" xmlns:p="http://schemas.openxmlformats.org/presentationml/2006/main">
   <p:cm authorId="1" dt="2018-01-19T08:38:24.816" idx="1">
     <p:pos x="7638" y="2630"/>
     <p:text>Need to differentiate more from BCSIGWAS Figure 6</p:text>
@@ -152,6 +219,62 @@
         <p15:threadingInfo xmlns:p15="http://schemas.microsoft.com/office/powerpoint/2012/main" timeZoneBias="480"/>
       </p:ext>
     </p:extLst>
+  </p:cm>
+  <p:cm authorId="2" dt="2018-01-19T11:19:19.844" idx="4">
+    <p:pos x="7548" y="533"/>
+    <p:text>this figure is low resolution, print a higher resolution copy for final version. Also increase font size on axis labels and axis titles. You can drop the figure title (the caption will serve as the title)</p:text>
+  </p:cm>
+  <p:cm authorId="2" dt="2018-01-19T11:21:36.259" idx="8">
+    <p:pos x="7127" y="2261"/>
+    <p:text>from permutation analysis</p:text>
+  </p:cm>
+</p:cmLst>
+</file>
+
+<file path=ppt/comments/comment5.xml><?xml version="1.0" encoding="utf-8"?>
+<p:cmLst xmlns:a="http://schemas.openxmlformats.org/drawingml/2006/main" xmlns:r="http://schemas.openxmlformats.org/officeDocument/2006/relationships" xmlns:p="http://schemas.openxmlformats.org/presentationml/2006/main">
+  <p:cm authorId="2" dt="2018-01-19T11:23:55.828" idx="10">
+    <p:pos x="6241" y="1350"/>
+    <p:text>probably going to omit these figures since the correlation is so weak. Make a new table instead:
+column 1 = trait you are correlating to hyphal waviness
+column 2 = slope of trend line 
+column 3 = R2 value</p:text>
+  </p:cm>
+</p:cmLst>
+</file>
+
+<file path=ppt/comments/comment6.xml><?xml version="1.0" encoding="utf-8"?>
+<p:cmLst xmlns:a="http://schemas.openxmlformats.org/drawingml/2006/main" xmlns:r="http://schemas.openxmlformats.org/officeDocument/2006/relationships" xmlns:p="http://schemas.openxmlformats.org/presentationml/2006/main">
+  <p:cm authorId="2" dt="2018-01-19T11:24:11.978" idx="11">
+    <p:pos x="6259" y="619"/>
+    <p:text>continue table from previous slide</p:text>
+  </p:cm>
+</p:cmLst>
+</file>
+
+<file path=ppt/comments/comment7.xml><?xml version="1.0" encoding="utf-8"?>
+<p:cmLst xmlns:a="http://schemas.openxmlformats.org/drawingml/2006/main" xmlns:r="http://schemas.openxmlformats.org/officeDocument/2006/relationships" xmlns:p="http://schemas.openxmlformats.org/presentationml/2006/main">
+  <p:cm authorId="2" dt="2018-01-19T11:24:16.211" idx="12">
+    <p:pos x="6044" y="189"/>
+    <p:text>continue table from previous slide</p:text>
+  </p:cm>
+</p:cmLst>
+</file>
+
+<file path=ppt/comments/comment8.xml><?xml version="1.0" encoding="utf-8"?>
+<p:cmLst xmlns:a="http://schemas.openxmlformats.org/drawingml/2006/main" xmlns:r="http://schemas.openxmlformats.org/officeDocument/2006/relationships" xmlns:p="http://schemas.openxmlformats.org/presentationml/2006/main">
+  <p:cm authorId="2" dt="2018-01-19T11:24:24.068" idx="13">
+    <p:pos x="7617" y="26"/>
+    <p:text>continue table from previous slide</p:text>
+  </p:cm>
+</p:cmLst>
+</file>
+
+<file path=ppt/comments/comment9.xml><?xml version="1.0" encoding="utf-8"?>
+<p:cmLst xmlns:a="http://schemas.openxmlformats.org/drawingml/2006/main" xmlns:r="http://schemas.openxmlformats.org/officeDocument/2006/relationships" xmlns:p="http://schemas.openxmlformats.org/presentationml/2006/main">
+  <p:cm authorId="2" dt="2018-01-19T11:24:29.735" idx="14">
+    <p:pos x="7101" y="507"/>
+    <p:text>continue table from previous slide</p:text>
   </p:cm>
 </p:cmLst>
 </file>
@@ -178,7 +301,7 @@
           <p:cNvPr id="2" name="Title 1">
             <a:extLst>
               <a:ext uri="{FF2B5EF4-FFF2-40B4-BE49-F238E27FC236}">
-                <a16:creationId xmlns:a16="http://schemas.microsoft.com/office/drawing/2014/main" id="{37516F1D-07F5-4715-B8F8-9DA7F4C5836C}"/>
+                <a16:creationId xmlns:a16="http://schemas.microsoft.com/office/drawing/2014/main" xmlns="" id="{37516F1D-07F5-4715-B8F8-9DA7F4C5836C}"/>
               </a:ext>
             </a:extLst>
           </p:cNvPr>
@@ -215,7 +338,7 @@
           <p:cNvPr id="3" name="Subtitle 2">
             <a:extLst>
               <a:ext uri="{FF2B5EF4-FFF2-40B4-BE49-F238E27FC236}">
-                <a16:creationId xmlns:a16="http://schemas.microsoft.com/office/drawing/2014/main" id="{86557B65-FA8D-4C7A-958D-0CE15E6C9EDB}"/>
+                <a16:creationId xmlns:a16="http://schemas.microsoft.com/office/drawing/2014/main" xmlns="" id="{86557B65-FA8D-4C7A-958D-0CE15E6C9EDB}"/>
               </a:ext>
             </a:extLst>
           </p:cNvPr>
@@ -285,7 +408,7 @@
           <p:cNvPr id="4" name="Date Placeholder 3">
             <a:extLst>
               <a:ext uri="{FF2B5EF4-FFF2-40B4-BE49-F238E27FC236}">
-                <a16:creationId xmlns:a16="http://schemas.microsoft.com/office/drawing/2014/main" id="{DE8B427A-86E4-4A98-8705-840C64396E8A}"/>
+                <a16:creationId xmlns:a16="http://schemas.microsoft.com/office/drawing/2014/main" xmlns="" id="{DE8B427A-86E4-4A98-8705-840C64396E8A}"/>
               </a:ext>
             </a:extLst>
           </p:cNvPr>
@@ -314,7 +437,7 @@
           <p:cNvPr id="5" name="Footer Placeholder 4">
             <a:extLst>
               <a:ext uri="{FF2B5EF4-FFF2-40B4-BE49-F238E27FC236}">
-                <a16:creationId xmlns:a16="http://schemas.microsoft.com/office/drawing/2014/main" id="{FBE5A878-C29A-41C5-9320-4E1020FB8FE7}"/>
+                <a16:creationId xmlns:a16="http://schemas.microsoft.com/office/drawing/2014/main" xmlns="" id="{FBE5A878-C29A-41C5-9320-4E1020FB8FE7}"/>
               </a:ext>
             </a:extLst>
           </p:cNvPr>
@@ -339,7 +462,7 @@
           <p:cNvPr id="6" name="Slide Number Placeholder 5">
             <a:extLst>
               <a:ext uri="{FF2B5EF4-FFF2-40B4-BE49-F238E27FC236}">
-                <a16:creationId xmlns:a16="http://schemas.microsoft.com/office/drawing/2014/main" id="{063B40FB-29EE-4C47-8132-CFF9C0F3C3E8}"/>
+                <a16:creationId xmlns:a16="http://schemas.microsoft.com/office/drawing/2014/main" xmlns="" id="{063B40FB-29EE-4C47-8132-CFF9C0F3C3E8}"/>
               </a:ext>
             </a:extLst>
           </p:cNvPr>
@@ -398,7 +521,7 @@
           <p:cNvPr id="2" name="Title 1">
             <a:extLst>
               <a:ext uri="{FF2B5EF4-FFF2-40B4-BE49-F238E27FC236}">
-                <a16:creationId xmlns:a16="http://schemas.microsoft.com/office/drawing/2014/main" id="{62FE7D1D-CD84-4162-918B-FAC0C718E2F8}"/>
+                <a16:creationId xmlns:a16="http://schemas.microsoft.com/office/drawing/2014/main" xmlns="" id="{62FE7D1D-CD84-4162-918B-FAC0C718E2F8}"/>
               </a:ext>
             </a:extLst>
           </p:cNvPr>
@@ -426,7 +549,7 @@
           <p:cNvPr id="3" name="Vertical Text Placeholder 2">
             <a:extLst>
               <a:ext uri="{FF2B5EF4-FFF2-40B4-BE49-F238E27FC236}">
-                <a16:creationId xmlns:a16="http://schemas.microsoft.com/office/drawing/2014/main" id="{70073AE0-0E1C-41DA-9F6C-335D1C4343D0}"/>
+                <a16:creationId xmlns:a16="http://schemas.microsoft.com/office/drawing/2014/main" xmlns="" id="{70073AE0-0E1C-41DA-9F6C-335D1C4343D0}"/>
               </a:ext>
             </a:extLst>
           </p:cNvPr>
@@ -483,7 +606,7 @@
           <p:cNvPr id="4" name="Date Placeholder 3">
             <a:extLst>
               <a:ext uri="{FF2B5EF4-FFF2-40B4-BE49-F238E27FC236}">
-                <a16:creationId xmlns:a16="http://schemas.microsoft.com/office/drawing/2014/main" id="{64DD606A-0EED-4C63-A37E-917131BA4D42}"/>
+                <a16:creationId xmlns:a16="http://schemas.microsoft.com/office/drawing/2014/main" xmlns="" id="{64DD606A-0EED-4C63-A37E-917131BA4D42}"/>
               </a:ext>
             </a:extLst>
           </p:cNvPr>
@@ -512,7 +635,7 @@
           <p:cNvPr id="5" name="Footer Placeholder 4">
             <a:extLst>
               <a:ext uri="{FF2B5EF4-FFF2-40B4-BE49-F238E27FC236}">
-                <a16:creationId xmlns:a16="http://schemas.microsoft.com/office/drawing/2014/main" id="{F87991EB-4BFA-4A7B-86E9-DF64A8C848CF}"/>
+                <a16:creationId xmlns:a16="http://schemas.microsoft.com/office/drawing/2014/main" xmlns="" id="{F87991EB-4BFA-4A7B-86E9-DF64A8C848CF}"/>
               </a:ext>
             </a:extLst>
           </p:cNvPr>
@@ -537,7 +660,7 @@
           <p:cNvPr id="6" name="Slide Number Placeholder 5">
             <a:extLst>
               <a:ext uri="{FF2B5EF4-FFF2-40B4-BE49-F238E27FC236}">
-                <a16:creationId xmlns:a16="http://schemas.microsoft.com/office/drawing/2014/main" id="{576B7152-5A02-47AD-8E30-72E6285715FF}"/>
+                <a16:creationId xmlns:a16="http://schemas.microsoft.com/office/drawing/2014/main" xmlns="" id="{576B7152-5A02-47AD-8E30-72E6285715FF}"/>
               </a:ext>
             </a:extLst>
           </p:cNvPr>
@@ -596,7 +719,7 @@
           <p:cNvPr id="2" name="Vertical Title 1">
             <a:extLst>
               <a:ext uri="{FF2B5EF4-FFF2-40B4-BE49-F238E27FC236}">
-                <a16:creationId xmlns:a16="http://schemas.microsoft.com/office/drawing/2014/main" id="{521773DF-9141-4E04-85F2-A272311EAEA5}"/>
+                <a16:creationId xmlns:a16="http://schemas.microsoft.com/office/drawing/2014/main" xmlns="" id="{521773DF-9141-4E04-85F2-A272311EAEA5}"/>
               </a:ext>
             </a:extLst>
           </p:cNvPr>
@@ -629,7 +752,7 @@
           <p:cNvPr id="3" name="Vertical Text Placeholder 2">
             <a:extLst>
               <a:ext uri="{FF2B5EF4-FFF2-40B4-BE49-F238E27FC236}">
-                <a16:creationId xmlns:a16="http://schemas.microsoft.com/office/drawing/2014/main" id="{1D4A4CEA-9243-456B-8089-0E7C50DFD737}"/>
+                <a16:creationId xmlns:a16="http://schemas.microsoft.com/office/drawing/2014/main" xmlns="" id="{1D4A4CEA-9243-456B-8089-0E7C50DFD737}"/>
               </a:ext>
             </a:extLst>
           </p:cNvPr>
@@ -691,7 +814,7 @@
           <p:cNvPr id="4" name="Date Placeholder 3">
             <a:extLst>
               <a:ext uri="{FF2B5EF4-FFF2-40B4-BE49-F238E27FC236}">
-                <a16:creationId xmlns:a16="http://schemas.microsoft.com/office/drawing/2014/main" id="{1C727C38-F536-40DC-8B3E-E04ECE9E4676}"/>
+                <a16:creationId xmlns:a16="http://schemas.microsoft.com/office/drawing/2014/main" xmlns="" id="{1C727C38-F536-40DC-8B3E-E04ECE9E4676}"/>
               </a:ext>
             </a:extLst>
           </p:cNvPr>
@@ -720,7 +843,7 @@
           <p:cNvPr id="5" name="Footer Placeholder 4">
             <a:extLst>
               <a:ext uri="{FF2B5EF4-FFF2-40B4-BE49-F238E27FC236}">
-                <a16:creationId xmlns:a16="http://schemas.microsoft.com/office/drawing/2014/main" id="{2A9E49DA-8B57-4556-B5F7-8CAAB37804AB}"/>
+                <a16:creationId xmlns:a16="http://schemas.microsoft.com/office/drawing/2014/main" xmlns="" id="{2A9E49DA-8B57-4556-B5F7-8CAAB37804AB}"/>
               </a:ext>
             </a:extLst>
           </p:cNvPr>
@@ -745,7 +868,7 @@
           <p:cNvPr id="6" name="Slide Number Placeholder 5">
             <a:extLst>
               <a:ext uri="{FF2B5EF4-FFF2-40B4-BE49-F238E27FC236}">
-                <a16:creationId xmlns:a16="http://schemas.microsoft.com/office/drawing/2014/main" id="{6B13E5BC-C5FE-470D-BD1D-CDC5D518D643}"/>
+                <a16:creationId xmlns:a16="http://schemas.microsoft.com/office/drawing/2014/main" xmlns="" id="{6B13E5BC-C5FE-470D-BD1D-CDC5D518D643}"/>
               </a:ext>
             </a:extLst>
           </p:cNvPr>
@@ -804,7 +927,7 @@
           <p:cNvPr id="2" name="Title 1">
             <a:extLst>
               <a:ext uri="{FF2B5EF4-FFF2-40B4-BE49-F238E27FC236}">
-                <a16:creationId xmlns:a16="http://schemas.microsoft.com/office/drawing/2014/main" id="{2810C811-37E4-47DC-9EDC-10C408BB8F96}"/>
+                <a16:creationId xmlns:a16="http://schemas.microsoft.com/office/drawing/2014/main" xmlns="" id="{2810C811-37E4-47DC-9EDC-10C408BB8F96}"/>
               </a:ext>
             </a:extLst>
           </p:cNvPr>
@@ -832,7 +955,7 @@
           <p:cNvPr id="3" name="Content Placeholder 2">
             <a:extLst>
               <a:ext uri="{FF2B5EF4-FFF2-40B4-BE49-F238E27FC236}">
-                <a16:creationId xmlns:a16="http://schemas.microsoft.com/office/drawing/2014/main" id="{5349F720-B4DA-483A-B119-D2731EA1E188}"/>
+                <a16:creationId xmlns:a16="http://schemas.microsoft.com/office/drawing/2014/main" xmlns="" id="{5349F720-B4DA-483A-B119-D2731EA1E188}"/>
               </a:ext>
             </a:extLst>
           </p:cNvPr>
@@ -889,7 +1012,7 @@
           <p:cNvPr id="4" name="Date Placeholder 3">
             <a:extLst>
               <a:ext uri="{FF2B5EF4-FFF2-40B4-BE49-F238E27FC236}">
-                <a16:creationId xmlns:a16="http://schemas.microsoft.com/office/drawing/2014/main" id="{B37E8B1B-2A03-4AEA-8EE3-CFC3FE6D30ED}"/>
+                <a16:creationId xmlns:a16="http://schemas.microsoft.com/office/drawing/2014/main" xmlns="" id="{B37E8B1B-2A03-4AEA-8EE3-CFC3FE6D30ED}"/>
               </a:ext>
             </a:extLst>
           </p:cNvPr>
@@ -918,7 +1041,7 @@
           <p:cNvPr id="5" name="Footer Placeholder 4">
             <a:extLst>
               <a:ext uri="{FF2B5EF4-FFF2-40B4-BE49-F238E27FC236}">
-                <a16:creationId xmlns:a16="http://schemas.microsoft.com/office/drawing/2014/main" id="{90E70C86-ECC5-4784-B9D5-29C6EAEDE8F4}"/>
+                <a16:creationId xmlns:a16="http://schemas.microsoft.com/office/drawing/2014/main" xmlns="" id="{90E70C86-ECC5-4784-B9D5-29C6EAEDE8F4}"/>
               </a:ext>
             </a:extLst>
           </p:cNvPr>
@@ -943,7 +1066,7 @@
           <p:cNvPr id="6" name="Slide Number Placeholder 5">
             <a:extLst>
               <a:ext uri="{FF2B5EF4-FFF2-40B4-BE49-F238E27FC236}">
-                <a16:creationId xmlns:a16="http://schemas.microsoft.com/office/drawing/2014/main" id="{2B7A94FF-BDE1-449A-A890-731A111B3194}"/>
+                <a16:creationId xmlns:a16="http://schemas.microsoft.com/office/drawing/2014/main" xmlns="" id="{2B7A94FF-BDE1-449A-A890-731A111B3194}"/>
               </a:ext>
             </a:extLst>
           </p:cNvPr>
@@ -1002,7 +1125,7 @@
           <p:cNvPr id="2" name="Title 1">
             <a:extLst>
               <a:ext uri="{FF2B5EF4-FFF2-40B4-BE49-F238E27FC236}">
-                <a16:creationId xmlns:a16="http://schemas.microsoft.com/office/drawing/2014/main" id="{C39D395F-6E0E-4E37-A13B-BBF0F27C6974}"/>
+                <a16:creationId xmlns:a16="http://schemas.microsoft.com/office/drawing/2014/main" xmlns="" id="{C39D395F-6E0E-4E37-A13B-BBF0F27C6974}"/>
               </a:ext>
             </a:extLst>
           </p:cNvPr>
@@ -1039,7 +1162,7 @@
           <p:cNvPr id="3" name="Text Placeholder 2">
             <a:extLst>
               <a:ext uri="{FF2B5EF4-FFF2-40B4-BE49-F238E27FC236}">
-                <a16:creationId xmlns:a16="http://schemas.microsoft.com/office/drawing/2014/main" id="{5DFB2D5A-4DF8-48C0-B9C0-2366DDA4817E}"/>
+                <a16:creationId xmlns:a16="http://schemas.microsoft.com/office/drawing/2014/main" xmlns="" id="{5DFB2D5A-4DF8-48C0-B9C0-2366DDA4817E}"/>
               </a:ext>
             </a:extLst>
           </p:cNvPr>
@@ -1164,7 +1287,7 @@
           <p:cNvPr id="4" name="Date Placeholder 3">
             <a:extLst>
               <a:ext uri="{FF2B5EF4-FFF2-40B4-BE49-F238E27FC236}">
-                <a16:creationId xmlns:a16="http://schemas.microsoft.com/office/drawing/2014/main" id="{9635F9B5-76E7-4D6A-8E6A-43D4A4ABAFDD}"/>
+                <a16:creationId xmlns:a16="http://schemas.microsoft.com/office/drawing/2014/main" xmlns="" id="{9635F9B5-76E7-4D6A-8E6A-43D4A4ABAFDD}"/>
               </a:ext>
             </a:extLst>
           </p:cNvPr>
@@ -1193,7 +1316,7 @@
           <p:cNvPr id="5" name="Footer Placeholder 4">
             <a:extLst>
               <a:ext uri="{FF2B5EF4-FFF2-40B4-BE49-F238E27FC236}">
-                <a16:creationId xmlns:a16="http://schemas.microsoft.com/office/drawing/2014/main" id="{B9DD2247-C97B-4DFA-B0F6-4263E45BCA30}"/>
+                <a16:creationId xmlns:a16="http://schemas.microsoft.com/office/drawing/2014/main" xmlns="" id="{B9DD2247-C97B-4DFA-B0F6-4263E45BCA30}"/>
               </a:ext>
             </a:extLst>
           </p:cNvPr>
@@ -1218,7 +1341,7 @@
           <p:cNvPr id="6" name="Slide Number Placeholder 5">
             <a:extLst>
               <a:ext uri="{FF2B5EF4-FFF2-40B4-BE49-F238E27FC236}">
-                <a16:creationId xmlns:a16="http://schemas.microsoft.com/office/drawing/2014/main" id="{4D804E18-3D01-4711-B76C-DC2DA8D59C9A}"/>
+                <a16:creationId xmlns:a16="http://schemas.microsoft.com/office/drawing/2014/main" xmlns="" id="{4D804E18-3D01-4711-B76C-DC2DA8D59C9A}"/>
               </a:ext>
             </a:extLst>
           </p:cNvPr>
@@ -1277,7 +1400,7 @@
           <p:cNvPr id="2" name="Title 1">
             <a:extLst>
               <a:ext uri="{FF2B5EF4-FFF2-40B4-BE49-F238E27FC236}">
-                <a16:creationId xmlns:a16="http://schemas.microsoft.com/office/drawing/2014/main" id="{46A82387-E25D-49B3-A0BB-B677DF1E02E6}"/>
+                <a16:creationId xmlns:a16="http://schemas.microsoft.com/office/drawing/2014/main" xmlns="" id="{46A82387-E25D-49B3-A0BB-B677DF1E02E6}"/>
               </a:ext>
             </a:extLst>
           </p:cNvPr>
@@ -1305,7 +1428,7 @@
           <p:cNvPr id="3" name="Content Placeholder 2">
             <a:extLst>
               <a:ext uri="{FF2B5EF4-FFF2-40B4-BE49-F238E27FC236}">
-                <a16:creationId xmlns:a16="http://schemas.microsoft.com/office/drawing/2014/main" id="{652009B8-9FD7-4E15-BF02-59301433F0F8}"/>
+                <a16:creationId xmlns:a16="http://schemas.microsoft.com/office/drawing/2014/main" xmlns="" id="{652009B8-9FD7-4E15-BF02-59301433F0F8}"/>
               </a:ext>
             </a:extLst>
           </p:cNvPr>
@@ -1367,7 +1490,7 @@
           <p:cNvPr id="4" name="Content Placeholder 3">
             <a:extLst>
               <a:ext uri="{FF2B5EF4-FFF2-40B4-BE49-F238E27FC236}">
-                <a16:creationId xmlns:a16="http://schemas.microsoft.com/office/drawing/2014/main" id="{4ACF3570-33C6-4E10-988A-BD11B0BDF96A}"/>
+                <a16:creationId xmlns:a16="http://schemas.microsoft.com/office/drawing/2014/main" xmlns="" id="{4ACF3570-33C6-4E10-988A-BD11B0BDF96A}"/>
               </a:ext>
             </a:extLst>
           </p:cNvPr>
@@ -1429,7 +1552,7 @@
           <p:cNvPr id="5" name="Date Placeholder 4">
             <a:extLst>
               <a:ext uri="{FF2B5EF4-FFF2-40B4-BE49-F238E27FC236}">
-                <a16:creationId xmlns:a16="http://schemas.microsoft.com/office/drawing/2014/main" id="{44FE14E5-203D-4AEB-BBD4-777191AB4C7E}"/>
+                <a16:creationId xmlns:a16="http://schemas.microsoft.com/office/drawing/2014/main" xmlns="" id="{44FE14E5-203D-4AEB-BBD4-777191AB4C7E}"/>
               </a:ext>
             </a:extLst>
           </p:cNvPr>
@@ -1458,7 +1581,7 @@
           <p:cNvPr id="6" name="Footer Placeholder 5">
             <a:extLst>
               <a:ext uri="{FF2B5EF4-FFF2-40B4-BE49-F238E27FC236}">
-                <a16:creationId xmlns:a16="http://schemas.microsoft.com/office/drawing/2014/main" id="{453E0A67-887B-4397-9449-47F763A44A5A}"/>
+                <a16:creationId xmlns:a16="http://schemas.microsoft.com/office/drawing/2014/main" xmlns="" id="{453E0A67-887B-4397-9449-47F763A44A5A}"/>
               </a:ext>
             </a:extLst>
           </p:cNvPr>
@@ -1483,7 +1606,7 @@
           <p:cNvPr id="7" name="Slide Number Placeholder 6">
             <a:extLst>
               <a:ext uri="{FF2B5EF4-FFF2-40B4-BE49-F238E27FC236}">
-                <a16:creationId xmlns:a16="http://schemas.microsoft.com/office/drawing/2014/main" id="{7741BFB4-A257-41C4-A0AF-EBD41AA6BEF3}"/>
+                <a16:creationId xmlns:a16="http://schemas.microsoft.com/office/drawing/2014/main" xmlns="" id="{7741BFB4-A257-41C4-A0AF-EBD41AA6BEF3}"/>
               </a:ext>
             </a:extLst>
           </p:cNvPr>
@@ -1542,7 +1665,7 @@
           <p:cNvPr id="2" name="Title 1">
             <a:extLst>
               <a:ext uri="{FF2B5EF4-FFF2-40B4-BE49-F238E27FC236}">
-                <a16:creationId xmlns:a16="http://schemas.microsoft.com/office/drawing/2014/main" id="{EC5E4052-1871-48F4-88FC-9DD38C78C35A}"/>
+                <a16:creationId xmlns:a16="http://schemas.microsoft.com/office/drawing/2014/main" xmlns="" id="{EC5E4052-1871-48F4-88FC-9DD38C78C35A}"/>
               </a:ext>
             </a:extLst>
           </p:cNvPr>
@@ -1575,7 +1698,7 @@
           <p:cNvPr id="3" name="Text Placeholder 2">
             <a:extLst>
               <a:ext uri="{FF2B5EF4-FFF2-40B4-BE49-F238E27FC236}">
-                <a16:creationId xmlns:a16="http://schemas.microsoft.com/office/drawing/2014/main" id="{09E675D1-6BAE-4D3F-B4BB-A8D7749E9A77}"/>
+                <a16:creationId xmlns:a16="http://schemas.microsoft.com/office/drawing/2014/main" xmlns="" id="{09E675D1-6BAE-4D3F-B4BB-A8D7749E9A77}"/>
               </a:ext>
             </a:extLst>
           </p:cNvPr>
@@ -1646,7 +1769,7 @@
           <p:cNvPr id="4" name="Content Placeholder 3">
             <a:extLst>
               <a:ext uri="{FF2B5EF4-FFF2-40B4-BE49-F238E27FC236}">
-                <a16:creationId xmlns:a16="http://schemas.microsoft.com/office/drawing/2014/main" id="{A3A25EDC-E7DC-4093-A101-53C4140B8EC9}"/>
+                <a16:creationId xmlns:a16="http://schemas.microsoft.com/office/drawing/2014/main" xmlns="" id="{A3A25EDC-E7DC-4093-A101-53C4140B8EC9}"/>
               </a:ext>
             </a:extLst>
           </p:cNvPr>
@@ -1708,7 +1831,7 @@
           <p:cNvPr id="5" name="Text Placeholder 4">
             <a:extLst>
               <a:ext uri="{FF2B5EF4-FFF2-40B4-BE49-F238E27FC236}">
-                <a16:creationId xmlns:a16="http://schemas.microsoft.com/office/drawing/2014/main" id="{E63163FF-9FAB-46A2-A5BE-643E5D352D01}"/>
+                <a16:creationId xmlns:a16="http://schemas.microsoft.com/office/drawing/2014/main" xmlns="" id="{E63163FF-9FAB-46A2-A5BE-643E5D352D01}"/>
               </a:ext>
             </a:extLst>
           </p:cNvPr>
@@ -1779,7 +1902,7 @@
           <p:cNvPr id="6" name="Content Placeholder 5">
             <a:extLst>
               <a:ext uri="{FF2B5EF4-FFF2-40B4-BE49-F238E27FC236}">
-                <a16:creationId xmlns:a16="http://schemas.microsoft.com/office/drawing/2014/main" id="{C00606A8-282F-4CC0-9014-FE74E524910F}"/>
+                <a16:creationId xmlns:a16="http://schemas.microsoft.com/office/drawing/2014/main" xmlns="" id="{C00606A8-282F-4CC0-9014-FE74E524910F}"/>
               </a:ext>
             </a:extLst>
           </p:cNvPr>
@@ -1841,7 +1964,7 @@
           <p:cNvPr id="7" name="Date Placeholder 6">
             <a:extLst>
               <a:ext uri="{FF2B5EF4-FFF2-40B4-BE49-F238E27FC236}">
-                <a16:creationId xmlns:a16="http://schemas.microsoft.com/office/drawing/2014/main" id="{39A0A262-F4B9-46E5-AC3B-92FEC0A9B4B7}"/>
+                <a16:creationId xmlns:a16="http://schemas.microsoft.com/office/drawing/2014/main" xmlns="" id="{39A0A262-F4B9-46E5-AC3B-92FEC0A9B4B7}"/>
               </a:ext>
             </a:extLst>
           </p:cNvPr>
@@ -1870,7 +1993,7 @@
           <p:cNvPr id="8" name="Footer Placeholder 7">
             <a:extLst>
               <a:ext uri="{FF2B5EF4-FFF2-40B4-BE49-F238E27FC236}">
-                <a16:creationId xmlns:a16="http://schemas.microsoft.com/office/drawing/2014/main" id="{435018FF-C15E-43DB-9A59-FDBE56BF2D55}"/>
+                <a16:creationId xmlns:a16="http://schemas.microsoft.com/office/drawing/2014/main" xmlns="" id="{435018FF-C15E-43DB-9A59-FDBE56BF2D55}"/>
               </a:ext>
             </a:extLst>
           </p:cNvPr>
@@ -1895,7 +2018,7 @@
           <p:cNvPr id="9" name="Slide Number Placeholder 8">
             <a:extLst>
               <a:ext uri="{FF2B5EF4-FFF2-40B4-BE49-F238E27FC236}">
-                <a16:creationId xmlns:a16="http://schemas.microsoft.com/office/drawing/2014/main" id="{971B4EF0-2D2A-4B0F-8C6F-5D253BC1E3DB}"/>
+                <a16:creationId xmlns:a16="http://schemas.microsoft.com/office/drawing/2014/main" xmlns="" id="{971B4EF0-2D2A-4B0F-8C6F-5D253BC1E3DB}"/>
               </a:ext>
             </a:extLst>
           </p:cNvPr>
@@ -1954,7 +2077,7 @@
           <p:cNvPr id="2" name="Title 1">
             <a:extLst>
               <a:ext uri="{FF2B5EF4-FFF2-40B4-BE49-F238E27FC236}">
-                <a16:creationId xmlns:a16="http://schemas.microsoft.com/office/drawing/2014/main" id="{B884BB06-3EE7-44B5-8E74-4FBC81AC2D61}"/>
+                <a16:creationId xmlns:a16="http://schemas.microsoft.com/office/drawing/2014/main" xmlns="" id="{B884BB06-3EE7-44B5-8E74-4FBC81AC2D61}"/>
               </a:ext>
             </a:extLst>
           </p:cNvPr>
@@ -1982,7 +2105,7 @@
           <p:cNvPr id="3" name="Date Placeholder 2">
             <a:extLst>
               <a:ext uri="{FF2B5EF4-FFF2-40B4-BE49-F238E27FC236}">
-                <a16:creationId xmlns:a16="http://schemas.microsoft.com/office/drawing/2014/main" id="{87D6008D-DF81-475F-9BEE-C6060A95C75C}"/>
+                <a16:creationId xmlns:a16="http://schemas.microsoft.com/office/drawing/2014/main" xmlns="" id="{87D6008D-DF81-475F-9BEE-C6060A95C75C}"/>
               </a:ext>
             </a:extLst>
           </p:cNvPr>
@@ -2011,7 +2134,7 @@
           <p:cNvPr id="4" name="Footer Placeholder 3">
             <a:extLst>
               <a:ext uri="{FF2B5EF4-FFF2-40B4-BE49-F238E27FC236}">
-                <a16:creationId xmlns:a16="http://schemas.microsoft.com/office/drawing/2014/main" id="{1F121838-DC41-4835-B2DC-EBC4807A84B7}"/>
+                <a16:creationId xmlns:a16="http://schemas.microsoft.com/office/drawing/2014/main" xmlns="" id="{1F121838-DC41-4835-B2DC-EBC4807A84B7}"/>
               </a:ext>
             </a:extLst>
           </p:cNvPr>
@@ -2036,7 +2159,7 @@
           <p:cNvPr id="5" name="Slide Number Placeholder 4">
             <a:extLst>
               <a:ext uri="{FF2B5EF4-FFF2-40B4-BE49-F238E27FC236}">
-                <a16:creationId xmlns:a16="http://schemas.microsoft.com/office/drawing/2014/main" id="{A7B93D33-D202-4925-871A-2632259264C8}"/>
+                <a16:creationId xmlns:a16="http://schemas.microsoft.com/office/drawing/2014/main" xmlns="" id="{A7B93D33-D202-4925-871A-2632259264C8}"/>
               </a:ext>
             </a:extLst>
           </p:cNvPr>
@@ -2095,7 +2218,7 @@
           <p:cNvPr id="2" name="Date Placeholder 1">
             <a:extLst>
               <a:ext uri="{FF2B5EF4-FFF2-40B4-BE49-F238E27FC236}">
-                <a16:creationId xmlns:a16="http://schemas.microsoft.com/office/drawing/2014/main" id="{15127FB3-3608-406C-ADA5-7D5AF3E22B4B}"/>
+                <a16:creationId xmlns:a16="http://schemas.microsoft.com/office/drawing/2014/main" xmlns="" id="{15127FB3-3608-406C-ADA5-7D5AF3E22B4B}"/>
               </a:ext>
             </a:extLst>
           </p:cNvPr>
@@ -2124,7 +2247,7 @@
           <p:cNvPr id="3" name="Footer Placeholder 2">
             <a:extLst>
               <a:ext uri="{FF2B5EF4-FFF2-40B4-BE49-F238E27FC236}">
-                <a16:creationId xmlns:a16="http://schemas.microsoft.com/office/drawing/2014/main" id="{05A6DEF6-20A4-47B5-A4E7-7B6769899115}"/>
+                <a16:creationId xmlns:a16="http://schemas.microsoft.com/office/drawing/2014/main" xmlns="" id="{05A6DEF6-20A4-47B5-A4E7-7B6769899115}"/>
               </a:ext>
             </a:extLst>
           </p:cNvPr>
@@ -2149,7 +2272,7 @@
           <p:cNvPr id="4" name="Slide Number Placeholder 3">
             <a:extLst>
               <a:ext uri="{FF2B5EF4-FFF2-40B4-BE49-F238E27FC236}">
-                <a16:creationId xmlns:a16="http://schemas.microsoft.com/office/drawing/2014/main" id="{A5BBC24C-3A01-4860-8727-E143AD4F57A8}"/>
+                <a16:creationId xmlns:a16="http://schemas.microsoft.com/office/drawing/2014/main" xmlns="" id="{A5BBC24C-3A01-4860-8727-E143AD4F57A8}"/>
               </a:ext>
             </a:extLst>
           </p:cNvPr>
@@ -2208,7 +2331,7 @@
           <p:cNvPr id="2" name="Title 1">
             <a:extLst>
               <a:ext uri="{FF2B5EF4-FFF2-40B4-BE49-F238E27FC236}">
-                <a16:creationId xmlns:a16="http://schemas.microsoft.com/office/drawing/2014/main" id="{3F7F76A6-A3A4-40B7-B615-94C6B6D93D55}"/>
+                <a16:creationId xmlns:a16="http://schemas.microsoft.com/office/drawing/2014/main" xmlns="" id="{3F7F76A6-A3A4-40B7-B615-94C6B6D93D55}"/>
               </a:ext>
             </a:extLst>
           </p:cNvPr>
@@ -2245,7 +2368,7 @@
           <p:cNvPr id="3" name="Content Placeholder 2">
             <a:extLst>
               <a:ext uri="{FF2B5EF4-FFF2-40B4-BE49-F238E27FC236}">
-                <a16:creationId xmlns:a16="http://schemas.microsoft.com/office/drawing/2014/main" id="{EA5391E4-069B-4935-AE1B-4A2DFDAA25D2}"/>
+                <a16:creationId xmlns:a16="http://schemas.microsoft.com/office/drawing/2014/main" xmlns="" id="{EA5391E4-069B-4935-AE1B-4A2DFDAA25D2}"/>
               </a:ext>
             </a:extLst>
           </p:cNvPr>
@@ -2335,7 +2458,7 @@
           <p:cNvPr id="4" name="Text Placeholder 3">
             <a:extLst>
               <a:ext uri="{FF2B5EF4-FFF2-40B4-BE49-F238E27FC236}">
-                <a16:creationId xmlns:a16="http://schemas.microsoft.com/office/drawing/2014/main" id="{D082484A-A7B8-492D-AF70-976C8F15462F}"/>
+                <a16:creationId xmlns:a16="http://schemas.microsoft.com/office/drawing/2014/main" xmlns="" id="{D082484A-A7B8-492D-AF70-976C8F15462F}"/>
               </a:ext>
             </a:extLst>
           </p:cNvPr>
@@ -2406,7 +2529,7 @@
           <p:cNvPr id="5" name="Date Placeholder 4">
             <a:extLst>
               <a:ext uri="{FF2B5EF4-FFF2-40B4-BE49-F238E27FC236}">
-                <a16:creationId xmlns:a16="http://schemas.microsoft.com/office/drawing/2014/main" id="{6D23E5CE-DA5B-4DFC-BADD-842D292122D5}"/>
+                <a16:creationId xmlns:a16="http://schemas.microsoft.com/office/drawing/2014/main" xmlns="" id="{6D23E5CE-DA5B-4DFC-BADD-842D292122D5}"/>
               </a:ext>
             </a:extLst>
           </p:cNvPr>
@@ -2435,7 +2558,7 @@
           <p:cNvPr id="6" name="Footer Placeholder 5">
             <a:extLst>
               <a:ext uri="{FF2B5EF4-FFF2-40B4-BE49-F238E27FC236}">
-                <a16:creationId xmlns:a16="http://schemas.microsoft.com/office/drawing/2014/main" id="{4ACC3EB7-B340-4AF4-970D-829429BB5D37}"/>
+                <a16:creationId xmlns:a16="http://schemas.microsoft.com/office/drawing/2014/main" xmlns="" id="{4ACC3EB7-B340-4AF4-970D-829429BB5D37}"/>
               </a:ext>
             </a:extLst>
           </p:cNvPr>
@@ -2460,7 +2583,7 @@
           <p:cNvPr id="7" name="Slide Number Placeholder 6">
             <a:extLst>
               <a:ext uri="{FF2B5EF4-FFF2-40B4-BE49-F238E27FC236}">
-                <a16:creationId xmlns:a16="http://schemas.microsoft.com/office/drawing/2014/main" id="{DD4E94A0-96D0-48A8-BADA-7C1E21FDE566}"/>
+                <a16:creationId xmlns:a16="http://schemas.microsoft.com/office/drawing/2014/main" xmlns="" id="{DD4E94A0-96D0-48A8-BADA-7C1E21FDE566}"/>
               </a:ext>
             </a:extLst>
           </p:cNvPr>
@@ -2519,7 +2642,7 @@
           <p:cNvPr id="2" name="Title 1">
             <a:extLst>
               <a:ext uri="{FF2B5EF4-FFF2-40B4-BE49-F238E27FC236}">
-                <a16:creationId xmlns:a16="http://schemas.microsoft.com/office/drawing/2014/main" id="{31008755-3E94-4E32-9FB6-56E5CD146CE2}"/>
+                <a16:creationId xmlns:a16="http://schemas.microsoft.com/office/drawing/2014/main" xmlns="" id="{31008755-3E94-4E32-9FB6-56E5CD146CE2}"/>
               </a:ext>
             </a:extLst>
           </p:cNvPr>
@@ -2556,7 +2679,7 @@
           <p:cNvPr id="3" name="Picture Placeholder 2">
             <a:extLst>
               <a:ext uri="{FF2B5EF4-FFF2-40B4-BE49-F238E27FC236}">
-                <a16:creationId xmlns:a16="http://schemas.microsoft.com/office/drawing/2014/main" id="{C87F6ABB-F838-4C1C-990D-4BA44D1E7D61}"/>
+                <a16:creationId xmlns:a16="http://schemas.microsoft.com/office/drawing/2014/main" xmlns="" id="{C87F6ABB-F838-4C1C-990D-4BA44D1E7D61}"/>
               </a:ext>
             </a:extLst>
           </p:cNvPr>
@@ -2623,7 +2746,7 @@
           <p:cNvPr id="4" name="Text Placeholder 3">
             <a:extLst>
               <a:ext uri="{FF2B5EF4-FFF2-40B4-BE49-F238E27FC236}">
-                <a16:creationId xmlns:a16="http://schemas.microsoft.com/office/drawing/2014/main" id="{C69A499D-333B-48B3-BD22-4AC53CF2BDBA}"/>
+                <a16:creationId xmlns:a16="http://schemas.microsoft.com/office/drawing/2014/main" xmlns="" id="{C69A499D-333B-48B3-BD22-4AC53CF2BDBA}"/>
               </a:ext>
             </a:extLst>
           </p:cNvPr>
@@ -2694,7 +2817,7 @@
           <p:cNvPr id="5" name="Date Placeholder 4">
             <a:extLst>
               <a:ext uri="{FF2B5EF4-FFF2-40B4-BE49-F238E27FC236}">
-                <a16:creationId xmlns:a16="http://schemas.microsoft.com/office/drawing/2014/main" id="{0599CA9A-023C-4978-BAC5-DED00483021B}"/>
+                <a16:creationId xmlns:a16="http://schemas.microsoft.com/office/drawing/2014/main" xmlns="" id="{0599CA9A-023C-4978-BAC5-DED00483021B}"/>
               </a:ext>
             </a:extLst>
           </p:cNvPr>
@@ -2723,7 +2846,7 @@
           <p:cNvPr id="6" name="Footer Placeholder 5">
             <a:extLst>
               <a:ext uri="{FF2B5EF4-FFF2-40B4-BE49-F238E27FC236}">
-                <a16:creationId xmlns:a16="http://schemas.microsoft.com/office/drawing/2014/main" id="{26DCDC1D-35EB-4E09-A15A-3AA6DD9B2807}"/>
+                <a16:creationId xmlns:a16="http://schemas.microsoft.com/office/drawing/2014/main" xmlns="" id="{26DCDC1D-35EB-4E09-A15A-3AA6DD9B2807}"/>
               </a:ext>
             </a:extLst>
           </p:cNvPr>
@@ -2748,7 +2871,7 @@
           <p:cNvPr id="7" name="Slide Number Placeholder 6">
             <a:extLst>
               <a:ext uri="{FF2B5EF4-FFF2-40B4-BE49-F238E27FC236}">
-                <a16:creationId xmlns:a16="http://schemas.microsoft.com/office/drawing/2014/main" id="{DC616D05-EC2A-48A7-9932-7D888E771911}"/>
+                <a16:creationId xmlns:a16="http://schemas.microsoft.com/office/drawing/2014/main" xmlns="" id="{DC616D05-EC2A-48A7-9932-7D888E771911}"/>
               </a:ext>
             </a:extLst>
           </p:cNvPr>
@@ -2812,7 +2935,7 @@
           <p:cNvPr id="2" name="Title Placeholder 1">
             <a:extLst>
               <a:ext uri="{FF2B5EF4-FFF2-40B4-BE49-F238E27FC236}">
-                <a16:creationId xmlns:a16="http://schemas.microsoft.com/office/drawing/2014/main" id="{982F4BDC-07BB-49CD-9A98-D7311782EEAC}"/>
+                <a16:creationId xmlns:a16="http://schemas.microsoft.com/office/drawing/2014/main" xmlns="" id="{982F4BDC-07BB-49CD-9A98-D7311782EEAC}"/>
               </a:ext>
             </a:extLst>
           </p:cNvPr>
@@ -2850,7 +2973,7 @@
           <p:cNvPr id="3" name="Text Placeholder 2">
             <a:extLst>
               <a:ext uri="{FF2B5EF4-FFF2-40B4-BE49-F238E27FC236}">
-                <a16:creationId xmlns:a16="http://schemas.microsoft.com/office/drawing/2014/main" id="{C2AA1F42-42C9-43C3-96C0-4152A9E72766}"/>
+                <a16:creationId xmlns:a16="http://schemas.microsoft.com/office/drawing/2014/main" xmlns="" id="{C2AA1F42-42C9-43C3-96C0-4152A9E72766}"/>
               </a:ext>
             </a:extLst>
           </p:cNvPr>
@@ -2917,7 +3040,7 @@
           <p:cNvPr id="4" name="Date Placeholder 3">
             <a:extLst>
               <a:ext uri="{FF2B5EF4-FFF2-40B4-BE49-F238E27FC236}">
-                <a16:creationId xmlns:a16="http://schemas.microsoft.com/office/drawing/2014/main" id="{B3CCE42C-87E4-4E5C-B24C-E59098FDEF3C}"/>
+                <a16:creationId xmlns:a16="http://schemas.microsoft.com/office/drawing/2014/main" xmlns="" id="{B3CCE42C-87E4-4E5C-B24C-E59098FDEF3C}"/>
               </a:ext>
             </a:extLst>
           </p:cNvPr>
@@ -2964,7 +3087,7 @@
           <p:cNvPr id="5" name="Footer Placeholder 4">
             <a:extLst>
               <a:ext uri="{FF2B5EF4-FFF2-40B4-BE49-F238E27FC236}">
-                <a16:creationId xmlns:a16="http://schemas.microsoft.com/office/drawing/2014/main" id="{62E909A9-1ED3-468E-980B-AFEEF25F5F22}"/>
+                <a16:creationId xmlns:a16="http://schemas.microsoft.com/office/drawing/2014/main" xmlns="" id="{62E909A9-1ED3-468E-980B-AFEEF25F5F22}"/>
               </a:ext>
             </a:extLst>
           </p:cNvPr>
@@ -3007,7 +3130,7 @@
           <p:cNvPr id="6" name="Slide Number Placeholder 5">
             <a:extLst>
               <a:ext uri="{FF2B5EF4-FFF2-40B4-BE49-F238E27FC236}">
-                <a16:creationId xmlns:a16="http://schemas.microsoft.com/office/drawing/2014/main" id="{4816C08F-5AA6-4FA5-B14A-93D008846248}"/>
+                <a16:creationId xmlns:a16="http://schemas.microsoft.com/office/drawing/2014/main" xmlns="" id="{4816C08F-5AA6-4FA5-B14A-93D008846248}"/>
               </a:ext>
             </a:extLst>
           </p:cNvPr>
@@ -3375,7 +3498,7 @@
           <p:cNvPr id="2" name="Title 1">
             <a:extLst>
               <a:ext uri="{FF2B5EF4-FFF2-40B4-BE49-F238E27FC236}">
-                <a16:creationId xmlns:a16="http://schemas.microsoft.com/office/drawing/2014/main" id="{9640AB11-77EF-479A-8B03-20E6EE1DEF78}"/>
+                <a16:creationId xmlns:a16="http://schemas.microsoft.com/office/drawing/2014/main" xmlns="" id="{9640AB11-77EF-479A-8B03-20E6EE1DEF78}"/>
               </a:ext>
             </a:extLst>
           </p:cNvPr>
@@ -3403,7 +3526,7 @@
           <p:cNvPr id="3" name="Subtitle 2">
             <a:extLst>
               <a:ext uri="{FF2B5EF4-FFF2-40B4-BE49-F238E27FC236}">
-                <a16:creationId xmlns:a16="http://schemas.microsoft.com/office/drawing/2014/main" id="{85EBDFF8-8957-4F1A-BA7C-D1532410C204}"/>
+                <a16:creationId xmlns:a16="http://schemas.microsoft.com/office/drawing/2014/main" xmlns="" id="{85EBDFF8-8957-4F1A-BA7C-D1532410C204}"/>
               </a:ext>
             </a:extLst>
           </p:cNvPr>
@@ -3461,7 +3584,7 @@
           <p:cNvPr id="4" name="Picture 3">
             <a:extLst>
               <a:ext uri="{FF2B5EF4-FFF2-40B4-BE49-F238E27FC236}">
-                <a16:creationId xmlns:a16="http://schemas.microsoft.com/office/drawing/2014/main" id="{AD35E458-039B-4600-9C30-83F1B4F1FE07}"/>
+                <a16:creationId xmlns:a16="http://schemas.microsoft.com/office/drawing/2014/main" xmlns="" id="{5CFA029F-5C37-4A3D-A83E-D8C65C6BDE0C}"/>
               </a:ext>
             </a:extLst>
           </p:cNvPr>
@@ -3478,8 +3601,8 @@
         </p:blipFill>
         <p:spPr>
           <a:xfrm>
-            <a:off x="221356" y="921147"/>
-            <a:ext cx="10171470" cy="5367685"/>
+            <a:off x="0" y="0"/>
+            <a:ext cx="8448234" cy="4479235"/>
           </a:xfrm>
           <a:prstGeom prst="rect">
             <a:avLst/>
@@ -3491,7 +3614,7 @@
           <p:cNvPr id="5" name="TextBox 4">
             <a:extLst>
               <a:ext uri="{FF2B5EF4-FFF2-40B4-BE49-F238E27FC236}">
-                <a16:creationId xmlns:a16="http://schemas.microsoft.com/office/drawing/2014/main" id="{CAB32E96-9BBE-4C19-83A2-B652A5B89F03}"/>
+                <a16:creationId xmlns:a16="http://schemas.microsoft.com/office/drawing/2014/main" xmlns="" id="{C05F688A-3013-44AE-9657-1536DAD1E3B7}"/>
               </a:ext>
             </a:extLst>
           </p:cNvPr>
@@ -3500,8 +3623,8 @@
         </p:nvSpPr>
         <p:spPr>
           <a:xfrm>
-            <a:off x="9470146" y="486561"/>
-            <a:ext cx="3181739" cy="7017306"/>
+            <a:off x="8448235" y="0"/>
+            <a:ext cx="3743766" cy="12834283"/>
           </a:xfrm>
           <a:prstGeom prst="rect">
             <a:avLst/>
@@ -3515,22 +3638,108 @@
           <a:lstStyle/>
           <a:p>
             <a:r>
+              <a:rPr lang="en-US" b="1" dirty="0"/>
+              <a:t>Figure #. Various interactions of B. cinerea lesions sizes on Eudicots with hyphal waviness of B. cinerea. </a:t>
+            </a:r>
+          </a:p>
+          <a:p>
+            <a:r>
               <a:rPr lang="en-US" dirty="0"/>
-              <a:t>Figure #</a:t>
+              <a:t>Scatter plots of various eudicot lesion sizes due to B. cinerea isolates compared against B. cinerea hyphal waviness based on 97 individual isolates. Each point is an isolate interaction of the marginal means of lesion size with marginal means of hyphal waviness. </a:t>
             </a:r>
           </a:p>
           <a:p>
             <a:r>
               <a:rPr lang="en-US" dirty="0"/>
-              <a:t>Mean Eccentricity measured against </a:t>
-            </a:r>
-            <a:r>
-              <a:rPr lang="en-US" dirty="0" err="1"/>
-              <a:t>LsMeans</a:t>
-            </a:r>
+              <a:t>A) Least Square Mean lesion size on </a:t>
+            </a:r>
+            <a:r>
+              <a:rPr lang="en-US" i="1" dirty="0" err="1"/>
+              <a:t>Cichorium</a:t>
+            </a:r>
+            <a:r>
+              <a:rPr lang="en-US" i="1" dirty="0"/>
+              <a:t> </a:t>
+            </a:r>
+            <a:r>
+              <a:rPr lang="en-US" i="1" dirty="0" err="1"/>
+              <a:t>endivia</a:t>
+            </a:r>
+            <a:endParaRPr lang="en-US" i="1" dirty="0"/>
+          </a:p>
+          <a:p>
             <a:r>
               <a:rPr lang="en-US" dirty="0"/>
-              <a:t> Hyphal Waviness</a:t>
+              <a:t>B) Least Square Mean lesion size on </a:t>
+            </a:r>
+            <a:r>
+              <a:rPr lang="en-US" i="1" dirty="0"/>
+              <a:t>Brassica </a:t>
+            </a:r>
+            <a:r>
+              <a:rPr lang="en-US" i="1" dirty="0" err="1"/>
+              <a:t>rapa</a:t>
+            </a:r>
+            <a:endParaRPr lang="en-US" i="1" dirty="0"/>
+          </a:p>
+          <a:p>
+            <a:r>
+              <a:rPr lang="en-US" dirty="0"/>
+              <a:t>C) Least Square Mean lesion size on </a:t>
+            </a:r>
+            <a:r>
+              <a:rPr lang="en-US" i="1" dirty="0" err="1"/>
+              <a:t>Cichorium</a:t>
+            </a:r>
+            <a:r>
+              <a:rPr lang="en-US" i="1" dirty="0"/>
+              <a:t> </a:t>
+            </a:r>
+            <a:r>
+              <a:rPr lang="en-US" i="1" dirty="0" err="1"/>
+              <a:t>intybus</a:t>
+            </a:r>
+            <a:endParaRPr lang="en-US" b="1" i="1" dirty="0"/>
+          </a:p>
+          <a:p>
+            <a:r>
+              <a:rPr lang="en-US" dirty="0"/>
+              <a:t>D) Least Square Mean lesion size on </a:t>
+            </a:r>
+            <a:r>
+              <a:rPr lang="en-US" i="1" dirty="0"/>
+              <a:t>Glycine max</a:t>
+            </a:r>
+            <a:r>
+              <a:rPr lang="en-US" dirty="0"/>
+              <a:t> (soy bean)</a:t>
+            </a:r>
+          </a:p>
+          <a:p>
+            <a:r>
+              <a:rPr lang="en-US" dirty="0"/>
+              <a:t>E) Least Square Mean lesion size on </a:t>
+            </a:r>
+            <a:r>
+              <a:rPr lang="en-US" i="1" dirty="0"/>
+              <a:t>Helianthus </a:t>
+            </a:r>
+            <a:r>
+              <a:rPr lang="en-US" i="1" dirty="0" err="1"/>
+              <a:t>annuus</a:t>
+            </a:r>
+            <a:endParaRPr lang="en-US" i="1" dirty="0"/>
+          </a:p>
+          <a:p>
+            <a:r>
+              <a:rPr lang="en-US" dirty="0"/>
+              <a:t>F) Least Square Mean lesion size on Solanum</a:t>
+            </a:r>
+          </a:p>
+          <a:p>
+            <a:r>
+              <a:rPr lang="en-US" dirty="0"/>
+              <a:t>G) Least Square Mean lesion size on Tomato</a:t>
             </a:r>
           </a:p>
           <a:p>
@@ -3601,7 +3810,7 @@
     </p:spTree>
     <p:extLst>
       <p:ext uri="{BB962C8B-B14F-4D97-AF65-F5344CB8AC3E}">
-        <p14:creationId xmlns:p14="http://schemas.microsoft.com/office/powerpoint/2010/main" val="2222312369"/>
+        <p14:creationId xmlns:p14="http://schemas.microsoft.com/office/powerpoint/2010/main" val="3663658674"/>
       </p:ext>
     </p:extLst>
   </p:cSld>
@@ -3633,7 +3842,7 @@
           <p:cNvPr id="4" name="Picture 3">
             <a:extLst>
               <a:ext uri="{FF2B5EF4-FFF2-40B4-BE49-F238E27FC236}">
-                <a16:creationId xmlns:a16="http://schemas.microsoft.com/office/drawing/2014/main" id="{96D836BE-EE17-4E5A-AF5A-F5280910B240}"/>
+                <a16:creationId xmlns:a16="http://schemas.microsoft.com/office/drawing/2014/main" xmlns="" id="{AD35E458-039B-4600-9C30-83F1B4F1FE07}"/>
               </a:ext>
             </a:extLst>
           </p:cNvPr>
@@ -3650,8 +3859,8 @@
         </p:blipFill>
         <p:spPr>
           <a:xfrm>
-            <a:off x="117446" y="1469530"/>
-            <a:ext cx="9605479" cy="5057106"/>
+            <a:off x="221356" y="921147"/>
+            <a:ext cx="10171470" cy="5367685"/>
           </a:xfrm>
           <a:prstGeom prst="rect">
             <a:avLst/>
@@ -3663,7 +3872,7 @@
           <p:cNvPr id="5" name="TextBox 4">
             <a:extLst>
               <a:ext uri="{FF2B5EF4-FFF2-40B4-BE49-F238E27FC236}">
-                <a16:creationId xmlns:a16="http://schemas.microsoft.com/office/drawing/2014/main" id="{E7F5E934-14F2-4CD1-8B4F-6F9B7F34B346}"/>
+                <a16:creationId xmlns:a16="http://schemas.microsoft.com/office/drawing/2014/main" xmlns="" id="{CAB32E96-9BBE-4C19-83A2-B652A5B89F03}"/>
               </a:ext>
             </a:extLst>
           </p:cNvPr>
@@ -3694,7 +3903,15 @@
           <a:p>
             <a:r>
               <a:rPr lang="en-US" dirty="0"/>
-              <a:t>Mean Eccentricity measured against Average Hyphal Waviness</a:t>
+              <a:t>Mean Eccentricity measured against </a:t>
+            </a:r>
+            <a:r>
+              <a:rPr lang="en-US" dirty="0" err="1"/>
+              <a:t>LsMeans</a:t>
+            </a:r>
+            <a:r>
+              <a:rPr lang="en-US" dirty="0"/>
+              <a:t> Hyphal Waviness</a:t>
             </a:r>
           </a:p>
           <a:p>
@@ -3765,7 +3982,7 @@
     </p:spTree>
     <p:extLst>
       <p:ext uri="{BB962C8B-B14F-4D97-AF65-F5344CB8AC3E}">
-        <p14:creationId xmlns:p14="http://schemas.microsoft.com/office/powerpoint/2010/main" val="3487976611"/>
+        <p14:creationId xmlns:p14="http://schemas.microsoft.com/office/powerpoint/2010/main" val="2222312369"/>
       </p:ext>
     </p:extLst>
   </p:cSld>
@@ -3797,7 +4014,7 @@
           <p:cNvPr id="4" name="Picture 3">
             <a:extLst>
               <a:ext uri="{FF2B5EF4-FFF2-40B4-BE49-F238E27FC236}">
-                <a16:creationId xmlns:a16="http://schemas.microsoft.com/office/drawing/2014/main" id="{A5A3DE45-2C20-4329-B332-5AB1FB98625D}"/>
+                <a16:creationId xmlns:a16="http://schemas.microsoft.com/office/drawing/2014/main" xmlns="" id="{96D836BE-EE17-4E5A-AF5A-F5280910B240}"/>
               </a:ext>
             </a:extLst>
           </p:cNvPr>
@@ -3814,8 +4031,8 @@
         </p:blipFill>
         <p:spPr>
           <a:xfrm>
-            <a:off x="614862" y="0"/>
-            <a:ext cx="10907504" cy="5614587"/>
+            <a:off x="117446" y="1469530"/>
+            <a:ext cx="9605479" cy="5057106"/>
           </a:xfrm>
           <a:prstGeom prst="rect">
             <a:avLst/>
@@ -3827,7 +4044,7 @@
           <p:cNvPr id="5" name="TextBox 4">
             <a:extLst>
               <a:ext uri="{FF2B5EF4-FFF2-40B4-BE49-F238E27FC236}">
-                <a16:creationId xmlns:a16="http://schemas.microsoft.com/office/drawing/2014/main" id="{1AE750E3-E617-4F3B-BC74-CD750B123654}"/>
+                <a16:creationId xmlns:a16="http://schemas.microsoft.com/office/drawing/2014/main" xmlns="" id="{E7F5E934-14F2-4CD1-8B4F-6F9B7F34B346}"/>
               </a:ext>
             </a:extLst>
           </p:cNvPr>
@@ -3836,8 +4053,8 @@
         </p:nvSpPr>
         <p:spPr>
           <a:xfrm>
-            <a:off x="1751731" y="5528915"/>
-            <a:ext cx="11367082" cy="1477328"/>
+            <a:off x="9470146" y="486561"/>
+            <a:ext cx="3181739" cy="7017306"/>
           </a:xfrm>
           <a:prstGeom prst="rect">
             <a:avLst/>
@@ -3852,22 +4069,68 @@
           <a:p>
             <a:r>
               <a:rPr lang="en-US" dirty="0"/>
-              <a:t>Figure#:</a:t>
+              <a:t>Figure #</a:t>
             </a:r>
           </a:p>
           <a:p>
             <a:r>
               <a:rPr lang="en-US" dirty="0"/>
-              <a:t>Lesion Eccentricity on Multiple Hosts against </a:t>
-            </a:r>
-            <a:r>
-              <a:rPr lang="en-US" dirty="0" err="1"/>
-              <a:t>LsMeans</a:t>
-            </a:r>
-            <a:r>
-              <a:rPr lang="en-US" dirty="0"/>
-              <a:t> Hyphal Waviness</a:t>
-            </a:r>
+              <a:t>Mean Eccentricity measured against Average Hyphal Waviness</a:t>
+            </a:r>
+          </a:p>
+          <a:p>
+            <a:endParaRPr lang="en-US" dirty="0"/>
+          </a:p>
+          <a:p>
+            <a:endParaRPr lang="en-US" dirty="0"/>
+          </a:p>
+          <a:p>
+            <a:endParaRPr lang="en-US" dirty="0"/>
+          </a:p>
+          <a:p>
+            <a:endParaRPr lang="en-US" dirty="0"/>
+          </a:p>
+          <a:p>
+            <a:endParaRPr lang="en-US" dirty="0"/>
+          </a:p>
+          <a:p>
+            <a:endParaRPr lang="en-US" dirty="0"/>
+          </a:p>
+          <a:p>
+            <a:endParaRPr lang="en-US" dirty="0"/>
+          </a:p>
+          <a:p>
+            <a:endParaRPr lang="en-US" dirty="0"/>
+          </a:p>
+          <a:p>
+            <a:endParaRPr lang="en-US" dirty="0"/>
+          </a:p>
+          <a:p>
+            <a:endParaRPr lang="en-US" dirty="0"/>
+          </a:p>
+          <a:p>
+            <a:endParaRPr lang="en-US" dirty="0"/>
+          </a:p>
+          <a:p>
+            <a:endParaRPr lang="en-US" dirty="0"/>
+          </a:p>
+          <a:p>
+            <a:endParaRPr lang="en-US" dirty="0"/>
+          </a:p>
+          <a:p>
+            <a:endParaRPr lang="en-US" dirty="0"/>
+          </a:p>
+          <a:p>
+            <a:endParaRPr lang="en-US" dirty="0"/>
+          </a:p>
+          <a:p>
+            <a:endParaRPr lang="en-US" dirty="0"/>
+          </a:p>
+          <a:p>
+            <a:endParaRPr lang="en-US" dirty="0"/>
+          </a:p>
+          <a:p>
+            <a:endParaRPr lang="en-US" dirty="0"/>
           </a:p>
           <a:p>
             <a:endParaRPr lang="en-US" dirty="0"/>
@@ -3883,7 +4146,7 @@
     </p:spTree>
     <p:extLst>
       <p:ext uri="{BB962C8B-B14F-4D97-AF65-F5344CB8AC3E}">
-        <p14:creationId xmlns:p14="http://schemas.microsoft.com/office/powerpoint/2010/main" val="3428673227"/>
+        <p14:creationId xmlns:p14="http://schemas.microsoft.com/office/powerpoint/2010/main" val="3487976611"/>
       </p:ext>
     </p:extLst>
   </p:cSld>
@@ -3915,7 +4178,7 @@
           <p:cNvPr id="4" name="Picture 3">
             <a:extLst>
               <a:ext uri="{FF2B5EF4-FFF2-40B4-BE49-F238E27FC236}">
-                <a16:creationId xmlns:a16="http://schemas.microsoft.com/office/drawing/2014/main" id="{E8F14CF8-CC50-43E1-A7F7-633BBC9CC06D}"/>
+                <a16:creationId xmlns:a16="http://schemas.microsoft.com/office/drawing/2014/main" xmlns="" id="{A5A3DE45-2C20-4329-B332-5AB1FB98625D}"/>
               </a:ext>
             </a:extLst>
           </p:cNvPr>
@@ -3932,8 +4195,8 @@
         </p:blipFill>
         <p:spPr>
           <a:xfrm>
-            <a:off x="0" y="0"/>
-            <a:ext cx="10916129" cy="5592184"/>
+            <a:off x="614862" y="0"/>
+            <a:ext cx="10907504" cy="5614587"/>
           </a:xfrm>
           <a:prstGeom prst="rect">
             <a:avLst/>
@@ -3942,35 +4205,53 @@
       </p:pic>
       <p:sp>
         <p:nvSpPr>
-          <p:cNvPr id="5" name="Rectangle 4">
-            <a:extLst>
-              <a:ext uri="{FF2B5EF4-FFF2-40B4-BE49-F238E27FC236}">
-                <a16:creationId xmlns:a16="http://schemas.microsoft.com/office/drawing/2014/main" id="{0039E68E-C138-47F5-A776-F5EED5BD3999}"/>
-              </a:ext>
-            </a:extLst>
-          </p:cNvPr>
-          <p:cNvSpPr/>
+          <p:cNvPr id="5" name="TextBox 4">
+            <a:extLst>
+              <a:ext uri="{FF2B5EF4-FFF2-40B4-BE49-F238E27FC236}">
+                <a16:creationId xmlns:a16="http://schemas.microsoft.com/office/drawing/2014/main" xmlns="" id="{1AE750E3-E617-4F3B-BC74-CD750B123654}"/>
+              </a:ext>
+            </a:extLst>
+          </p:cNvPr>
+          <p:cNvSpPr txBox="1"/>
           <p:nvPr/>
         </p:nvSpPr>
         <p:spPr>
           <a:xfrm>
-            <a:off x="1140607" y="5724882"/>
-            <a:ext cx="10047215" cy="923330"/>
+            <a:off x="1751731" y="5528915"/>
+            <a:ext cx="11367082" cy="1477328"/>
           </a:xfrm>
           <a:prstGeom prst="rect">
             <a:avLst/>
           </a:prstGeom>
+          <a:noFill/>
         </p:spPr>
         <p:txBody>
-          <a:bodyPr wrap="square">
+          <a:bodyPr wrap="square" rtlCol="0">
             <a:spAutoFit/>
           </a:bodyPr>
           <a:lstStyle/>
           <a:p>
             <a:r>
               <a:rPr lang="en-US" dirty="0"/>
-              <a:t>Figure#. B. cinerea Lesion Eccentricity on Multiple Hosts against Average Hyphal Waviness</a:t>
-            </a:r>
+              <a:t>Figure#:</a:t>
+            </a:r>
+          </a:p>
+          <a:p>
+            <a:r>
+              <a:rPr lang="en-US" dirty="0"/>
+              <a:t>Lesion Eccentricity on Multiple Hosts against </a:t>
+            </a:r>
+            <a:r>
+              <a:rPr lang="en-US" dirty="0" err="1"/>
+              <a:t>LsMeans</a:t>
+            </a:r>
+            <a:r>
+              <a:rPr lang="en-US" dirty="0"/>
+              <a:t> Hyphal Waviness</a:t>
+            </a:r>
+          </a:p>
+          <a:p>
+            <a:endParaRPr lang="en-US" dirty="0"/>
           </a:p>
           <a:p>
             <a:endParaRPr lang="en-US" dirty="0"/>
@@ -3983,7 +4264,7 @@
     </p:spTree>
     <p:extLst>
       <p:ext uri="{BB962C8B-B14F-4D97-AF65-F5344CB8AC3E}">
-        <p14:creationId xmlns:p14="http://schemas.microsoft.com/office/powerpoint/2010/main" val="217600402"/>
+        <p14:creationId xmlns:p14="http://schemas.microsoft.com/office/powerpoint/2010/main" val="3428673227"/>
       </p:ext>
     </p:extLst>
   </p:cSld>
@@ -4010,63 +4291,80 @@
           <a:chExt cx="0" cy="0"/>
         </a:xfrm>
       </p:grpSpPr>
-      <p:sp>
-        <p:nvSpPr>
-          <p:cNvPr id="2" name="Title 1">
-            <a:extLst>
-              <a:ext uri="{FF2B5EF4-FFF2-40B4-BE49-F238E27FC236}">
-                <a16:creationId xmlns:a16="http://schemas.microsoft.com/office/drawing/2014/main" id="{5FCDA60D-EB0B-429A-88FA-68663306C63D}"/>
-              </a:ext>
-            </a:extLst>
-          </p:cNvPr>
-          <p:cNvSpPr>
-            <a:spLocks noGrp="1"/>
-          </p:cNvSpPr>
-          <p:nvPr>
-            <p:ph type="title"/>
-          </p:nvPr>
-        </p:nvSpPr>
-        <p:spPr/>
-        <p:txBody>
-          <a:bodyPr/>
+      <p:pic>
+        <p:nvPicPr>
+          <p:cNvPr id="4" name="Picture 3">
+            <a:extLst>
+              <a:ext uri="{FF2B5EF4-FFF2-40B4-BE49-F238E27FC236}">
+                <a16:creationId xmlns:a16="http://schemas.microsoft.com/office/drawing/2014/main" xmlns="" id="{E8F14CF8-CC50-43E1-A7F7-633BBC9CC06D}"/>
+              </a:ext>
+            </a:extLst>
+          </p:cNvPr>
+          <p:cNvPicPr>
+            <a:picLocks noChangeAspect="1"/>
+          </p:cNvPicPr>
+          <p:nvPr/>
+        </p:nvPicPr>
+        <p:blipFill>
+          <a:blip r:embed="rId2"/>
+          <a:stretch>
+            <a:fillRect/>
+          </a:stretch>
+        </p:blipFill>
+        <p:spPr>
+          <a:xfrm>
+            <a:off x="0" y="0"/>
+            <a:ext cx="10916129" cy="5592184"/>
+          </a:xfrm>
+          <a:prstGeom prst="rect">
+            <a:avLst/>
+          </a:prstGeom>
+        </p:spPr>
+      </p:pic>
+      <p:sp>
+        <p:nvSpPr>
+          <p:cNvPr id="5" name="Rectangle 4">
+            <a:extLst>
+              <a:ext uri="{FF2B5EF4-FFF2-40B4-BE49-F238E27FC236}">
+                <a16:creationId xmlns:a16="http://schemas.microsoft.com/office/drawing/2014/main" xmlns="" id="{0039E68E-C138-47F5-A776-F5EED5BD3999}"/>
+              </a:ext>
+            </a:extLst>
+          </p:cNvPr>
+          <p:cNvSpPr/>
+          <p:nvPr/>
+        </p:nvSpPr>
+        <p:spPr>
+          <a:xfrm>
+            <a:off x="1140607" y="5724882"/>
+            <a:ext cx="10047215" cy="923330"/>
+          </a:xfrm>
+          <a:prstGeom prst="rect">
+            <a:avLst/>
+          </a:prstGeom>
+        </p:spPr>
+        <p:txBody>
+          <a:bodyPr wrap="square">
+            <a:spAutoFit/>
+          </a:bodyPr>
           <a:lstStyle/>
           <a:p>
             <a:r>
               <a:rPr lang="en-US" dirty="0"/>
-              <a:t>GWA analysis graphs</a:t>
-            </a:r>
-          </a:p>
-        </p:txBody>
-      </p:sp>
-      <p:sp>
-        <p:nvSpPr>
-          <p:cNvPr id="3" name="Content Placeholder 2">
-            <a:extLst>
-              <a:ext uri="{FF2B5EF4-FFF2-40B4-BE49-F238E27FC236}">
-                <a16:creationId xmlns:a16="http://schemas.microsoft.com/office/drawing/2014/main" id="{D22D06AB-9AD5-4840-9F1F-DFF5366B615F}"/>
-              </a:ext>
-            </a:extLst>
-          </p:cNvPr>
-          <p:cNvSpPr>
-            <a:spLocks noGrp="1"/>
-          </p:cNvSpPr>
-          <p:nvPr>
-            <p:ph idx="1"/>
-          </p:nvPr>
-        </p:nvSpPr>
-        <p:spPr/>
-        <p:txBody>
-          <a:bodyPr/>
-          <a:lstStyle/>
-          <a:p>
-            <a:endParaRPr lang="en-US"/>
+              <a:t>Figure#. B. cinerea Lesion Eccentricity on Multiple Hosts against Average Hyphal Waviness</a:t>
+            </a:r>
+          </a:p>
+          <a:p>
+            <a:endParaRPr lang="en-US" dirty="0"/>
+          </a:p>
+          <a:p>
+            <a:endParaRPr lang="en-US" dirty="0"/>
           </a:p>
         </p:txBody>
       </p:sp>
     </p:spTree>
     <p:extLst>
       <p:ext uri="{BB962C8B-B14F-4D97-AF65-F5344CB8AC3E}">
-        <p14:creationId xmlns:p14="http://schemas.microsoft.com/office/powerpoint/2010/main" val="65335568"/>
+        <p14:creationId xmlns:p14="http://schemas.microsoft.com/office/powerpoint/2010/main" val="217600402"/>
       </p:ext>
     </p:extLst>
   </p:cSld>
@@ -4098,7 +4396,7 @@
           <p:cNvPr id="2" name="Title 1">
             <a:extLst>
               <a:ext uri="{FF2B5EF4-FFF2-40B4-BE49-F238E27FC236}">
-                <a16:creationId xmlns:a16="http://schemas.microsoft.com/office/drawing/2014/main" id="{7A78E11E-35C5-4897-B086-0DD71FC53DF2}"/>
+                <a16:creationId xmlns:a16="http://schemas.microsoft.com/office/drawing/2014/main" xmlns="" id="{5FCDA60D-EB0B-429A-88FA-68663306C63D}"/>
               </a:ext>
             </a:extLst>
           </p:cNvPr>
@@ -4111,22 +4409,45 @@
         </p:nvSpPr>
         <p:spPr/>
         <p:txBody>
-          <a:bodyPr>
-            <a:normAutofit/>
-          </a:bodyPr>
+          <a:bodyPr/>
           <a:lstStyle/>
           <a:p>
             <a:r>
-              <a:rPr lang="en-US" sz="2800" dirty="0"/>
-              <a:t>Hand drawn image of hyphal waviness (use reference images) </a:t>
-            </a:r>
+              <a:rPr lang="en-US" dirty="0"/>
+              <a:t>GWA analysis graphs</a:t>
+            </a:r>
+          </a:p>
+        </p:txBody>
+      </p:sp>
+      <p:sp>
+        <p:nvSpPr>
+          <p:cNvPr id="3" name="Content Placeholder 2">
+            <a:extLst>
+              <a:ext uri="{FF2B5EF4-FFF2-40B4-BE49-F238E27FC236}">
+                <a16:creationId xmlns:a16="http://schemas.microsoft.com/office/drawing/2014/main" xmlns="" id="{D22D06AB-9AD5-4840-9F1F-DFF5366B615F}"/>
+              </a:ext>
+            </a:extLst>
+          </p:cNvPr>
+          <p:cNvSpPr>
+            <a:spLocks noGrp="1"/>
+          </p:cNvSpPr>
+          <p:nvPr>
+            <p:ph idx="1"/>
+          </p:nvPr>
+        </p:nvSpPr>
+        <p:spPr/>
+        <p:txBody>
+          <a:bodyPr/>
+          <a:lstStyle/>
+          <a:p>
+            <a:endParaRPr lang="en-US"/>
           </a:p>
         </p:txBody>
       </p:sp>
     </p:spTree>
     <p:extLst>
       <p:ext uri="{BB962C8B-B14F-4D97-AF65-F5344CB8AC3E}">
-        <p14:creationId xmlns:p14="http://schemas.microsoft.com/office/powerpoint/2010/main" val="799110219"/>
+        <p14:creationId xmlns:p14="http://schemas.microsoft.com/office/powerpoint/2010/main" val="65335568"/>
       </p:ext>
     </p:extLst>
   </p:cSld>
@@ -4158,7 +4479,7 @@
           <p:cNvPr id="2" name="Title 1">
             <a:extLst>
               <a:ext uri="{FF2B5EF4-FFF2-40B4-BE49-F238E27FC236}">
-                <a16:creationId xmlns:a16="http://schemas.microsoft.com/office/drawing/2014/main" id="{86ADCD51-5F53-4FD0-A210-85F16BBA6615}"/>
+                <a16:creationId xmlns:a16="http://schemas.microsoft.com/office/drawing/2014/main" xmlns="" id="{7A78E11E-35C5-4897-B086-0DD71FC53DF2}"/>
               </a:ext>
             </a:extLst>
           </p:cNvPr>
@@ -4177,6 +4498,66 @@
           <a:lstStyle/>
           <a:p>
             <a:r>
+              <a:rPr lang="en-US" sz="2800" dirty="0"/>
+              <a:t>Hand drawn image of hyphal waviness (use reference images) </a:t>
+            </a:r>
+          </a:p>
+        </p:txBody>
+      </p:sp>
+    </p:spTree>
+    <p:extLst>
+      <p:ext uri="{BB962C8B-B14F-4D97-AF65-F5344CB8AC3E}">
+        <p14:creationId xmlns:p14="http://schemas.microsoft.com/office/powerpoint/2010/main" val="799110219"/>
+      </p:ext>
+    </p:extLst>
+  </p:cSld>
+  <p:clrMapOvr>
+    <a:masterClrMapping/>
+  </p:clrMapOvr>
+</p:sld>
+</file>
+
+<file path=ppt/slides/slide3.xml><?xml version="1.0" encoding="utf-8"?>
+<p:sld xmlns:a="http://schemas.openxmlformats.org/drawingml/2006/main" xmlns:r="http://schemas.openxmlformats.org/officeDocument/2006/relationships" xmlns:p="http://schemas.openxmlformats.org/presentationml/2006/main">
+  <p:cSld>
+    <p:spTree>
+      <p:nvGrpSpPr>
+        <p:cNvPr id="1" name=""/>
+        <p:cNvGrpSpPr/>
+        <p:nvPr/>
+      </p:nvGrpSpPr>
+      <p:grpSpPr>
+        <a:xfrm>
+          <a:off x="0" y="0"/>
+          <a:ext cx="0" cy="0"/>
+          <a:chOff x="0" y="0"/>
+          <a:chExt cx="0" cy="0"/>
+        </a:xfrm>
+      </p:grpSpPr>
+      <p:sp>
+        <p:nvSpPr>
+          <p:cNvPr id="2" name="Title 1">
+            <a:extLst>
+              <a:ext uri="{FF2B5EF4-FFF2-40B4-BE49-F238E27FC236}">
+                <a16:creationId xmlns:a16="http://schemas.microsoft.com/office/drawing/2014/main" xmlns="" id="{86ADCD51-5F53-4FD0-A210-85F16BBA6615}"/>
+              </a:ext>
+            </a:extLst>
+          </p:cNvPr>
+          <p:cNvSpPr>
+            <a:spLocks noGrp="1"/>
+          </p:cNvSpPr>
+          <p:nvPr>
+            <p:ph type="title"/>
+          </p:nvPr>
+        </p:nvSpPr>
+        <p:spPr/>
+        <p:txBody>
+          <a:bodyPr>
+            <a:normAutofit/>
+          </a:bodyPr>
+          <a:lstStyle/>
+          <a:p>
+            <a:r>
               <a:rPr lang="en-US" dirty="0"/>
               <a:t>ANOVA Table</a:t>
             </a:r>
@@ -4224,7 +4605,7 @@
           <p:cNvPr id="7" name="TextBox 6">
             <a:extLst>
               <a:ext uri="{FF2B5EF4-FFF2-40B4-BE49-F238E27FC236}">
-                <a16:creationId xmlns:a16="http://schemas.microsoft.com/office/drawing/2014/main" id="{13D6E8DB-7304-4FF3-843D-C054851B434C}"/>
+                <a16:creationId xmlns:a16="http://schemas.microsoft.com/office/drawing/2014/main" xmlns="" id="{13D6E8DB-7304-4FF3-843D-C054851B434C}"/>
               </a:ext>
             </a:extLst>
           </p:cNvPr>
@@ -4271,7 +4652,23 @@
             </a:r>
             <a:r>
               <a:rPr lang="en-US" dirty="0"/>
-              <a:t>isolates. Not all isolates were done on each listed date so the isolate date interaction was dropped. The terms are as followed: Isolate is the 97 </a:t>
+              <a:t>isolates. </a:t>
+            </a:r>
+            <a:r>
+              <a:rPr lang="en-US" dirty="0" smtClean="0"/>
+              <a:t>Not all isolates were done on each listed date so the isolate date interaction was dropped. The </a:t>
+            </a:r>
+            <a:r>
+              <a:rPr lang="en-US" dirty="0"/>
+              <a:t>terms are as </a:t>
+            </a:r>
+            <a:r>
+              <a:rPr lang="en-US" dirty="0" smtClean="0"/>
+              <a:t>follows: </a:t>
+            </a:r>
+            <a:r>
+              <a:rPr lang="en-US" dirty="0"/>
+              <a:t>Isolate is the 97 </a:t>
             </a:r>
             <a:r>
               <a:rPr lang="en-US" i="1" dirty="0"/>
@@ -4289,7 +4686,7 @@
           <p:cNvPr id="5" name="Content Placeholder 4">
             <a:extLst>
               <a:ext uri="{FF2B5EF4-FFF2-40B4-BE49-F238E27FC236}">
-                <a16:creationId xmlns:a16="http://schemas.microsoft.com/office/drawing/2014/main" id="{5C877F92-B12B-44B4-B5E9-E41886AC4D97}"/>
+                <a16:creationId xmlns:a16="http://schemas.microsoft.com/office/drawing/2014/main" xmlns="" id="{5C877F92-B12B-44B4-B5E9-E41886AC4D97}"/>
               </a:ext>
             </a:extLst>
           </p:cNvPr>
@@ -4300,7 +4697,7 @@
             <p:ph idx="1"/>
             <p:extLst>
               <p:ext uri="{D42A27DB-BD31-4B8C-83A1-F6EECF244321}">
-                <p14:modId xmlns:p14="http://schemas.microsoft.com/office/powerpoint/2010/main" val="1078601286"/>
+                <p14:modId xmlns:p14="http://schemas.microsoft.com/office/powerpoint/2010/main" val="1771035588"/>
               </p:ext>
             </p:extLst>
           </p:nvPr>
@@ -4319,49 +4716,49 @@
                 <a:gridCol w="1157165">
                   <a:extLst>
                     <a:ext uri="{9D8B030D-6E8A-4147-A177-3AD203B41FA5}">
-                      <a16:colId xmlns:a16="http://schemas.microsoft.com/office/drawing/2014/main" val="762839395"/>
+                      <a16:colId xmlns:a16="http://schemas.microsoft.com/office/drawing/2014/main" xmlns="" val="762839395"/>
                     </a:ext>
                   </a:extLst>
                 </a:gridCol>
                 <a:gridCol w="845995">
                   <a:extLst>
                     <a:ext uri="{9D8B030D-6E8A-4147-A177-3AD203B41FA5}">
-                      <a16:colId xmlns:a16="http://schemas.microsoft.com/office/drawing/2014/main" val="4046476885"/>
+                      <a16:colId xmlns:a16="http://schemas.microsoft.com/office/drawing/2014/main" xmlns="" val="4046476885"/>
                     </a:ext>
                   </a:extLst>
                 </a:gridCol>
                 <a:gridCol w="340342">
                   <a:extLst>
                     <a:ext uri="{9D8B030D-6E8A-4147-A177-3AD203B41FA5}">
-                      <a16:colId xmlns:a16="http://schemas.microsoft.com/office/drawing/2014/main" val="622091712"/>
+                      <a16:colId xmlns:a16="http://schemas.microsoft.com/office/drawing/2014/main" xmlns="" val="622091712"/>
                     </a:ext>
                   </a:extLst>
                 </a:gridCol>
                 <a:gridCol w="505653">
                   <a:extLst>
                     <a:ext uri="{9D8B030D-6E8A-4147-A177-3AD203B41FA5}">
-                      <a16:colId xmlns:a16="http://schemas.microsoft.com/office/drawing/2014/main" val="3531720946"/>
+                      <a16:colId xmlns:a16="http://schemas.microsoft.com/office/drawing/2014/main" xmlns="" val="3531720946"/>
                     </a:ext>
                   </a:extLst>
                 </a:gridCol>
                 <a:gridCol w="583445">
                   <a:extLst>
                     <a:ext uri="{9D8B030D-6E8A-4147-A177-3AD203B41FA5}">
-                      <a16:colId xmlns:a16="http://schemas.microsoft.com/office/drawing/2014/main" val="1896003395"/>
+                      <a16:colId xmlns:a16="http://schemas.microsoft.com/office/drawing/2014/main" xmlns="" val="1896003395"/>
                     </a:ext>
                   </a:extLst>
                 </a:gridCol>
                 <a:gridCol w="495929">
                   <a:extLst>
                     <a:ext uri="{9D8B030D-6E8A-4147-A177-3AD203B41FA5}">
-                      <a16:colId xmlns:a16="http://schemas.microsoft.com/office/drawing/2014/main" val="3456362452"/>
+                      <a16:colId xmlns:a16="http://schemas.microsoft.com/office/drawing/2014/main" xmlns="" val="3456362452"/>
                     </a:ext>
                   </a:extLst>
                 </a:gridCol>
                 <a:gridCol w="622341">
                   <a:extLst>
                     <a:ext uri="{9D8B030D-6E8A-4147-A177-3AD203B41FA5}">
-                      <a16:colId xmlns:a16="http://schemas.microsoft.com/office/drawing/2014/main" val="2659481591"/>
+                      <a16:colId xmlns:a16="http://schemas.microsoft.com/office/drawing/2014/main" xmlns="" val="2659481591"/>
                     </a:ext>
                   </a:extLst>
                 </a:gridCol>
@@ -4373,7 +4770,7 @@
                     <a:lstStyle/>
                     <a:p>
                       <a:pPr algn="l" fontAlgn="b"/>
-                      <a:endParaRPr lang="en-US" sz="1100" b="0" i="0" u="none" strike="noStrike">
+                      <a:endParaRPr lang="en-US" sz="1100" b="0" i="0" u="none" strike="noStrike" dirty="0">
                         <a:solidFill>
                           <a:srgbClr val="000000"/>
                         </a:solidFill>
@@ -4391,12 +4788,18 @@
                     <a:p>
                       <a:pPr algn="l" fontAlgn="b"/>
                       <a:r>
-                        <a:rPr lang="en-US" sz="1100" u="none" strike="noStrike">
+                        <a:rPr lang="en-US" sz="1100" u="none" strike="noStrike" dirty="0">
                           <a:effectLst/>
                         </a:rPr>
-                        <a:t>% Heritability</a:t>
+                        <a:t>% </a:t>
                       </a:r>
-                      <a:endParaRPr lang="en-US" sz="1100" b="0" i="0" u="none" strike="noStrike">
+                      <a:r>
+                        <a:rPr lang="en-US" sz="1100" u="none" strike="noStrike" dirty="0" smtClean="0">
+                          <a:effectLst/>
+                        </a:rPr>
+                        <a:t>Variation</a:t>
+                      </a:r>
+                      <a:endParaRPr lang="en-US" sz="1100" b="0" i="0" u="none" strike="noStrike" dirty="0">
                         <a:solidFill>
                           <a:srgbClr val="000000"/>
                         </a:solidFill>
@@ -4524,7 +4927,7 @@
                 </a:tc>
                 <a:extLst>
                   <a:ext uri="{0D108BD9-81ED-4DB2-BD59-A6C34878D82A}">
-                    <a16:rowId xmlns:a16="http://schemas.microsoft.com/office/drawing/2014/main" val="1775589854"/>
+                    <a16:rowId xmlns:a16="http://schemas.microsoft.com/office/drawing/2014/main" xmlns="" val="1775589854"/>
                   </a:ext>
                 </a:extLst>
               </a:tr>
@@ -4559,12 +4962,12 @@
                     <a:p>
                       <a:pPr algn="r" fontAlgn="b"/>
                       <a:r>
-                        <a:rPr lang="en-US" sz="1100" u="none" strike="noStrike">
+                        <a:rPr lang="en-US" sz="1100" u="none" strike="noStrike" dirty="0">
                           <a:effectLst/>
                         </a:rPr>
                         <a:t>38.626</a:t>
                       </a:r>
-                      <a:endParaRPr lang="en-US" sz="1100" b="0" i="0" u="none" strike="noStrike">
+                      <a:endParaRPr lang="en-US" sz="1100" b="0" i="0" u="none" strike="noStrike" dirty="0">
                         <a:solidFill>
                           <a:srgbClr val="000000"/>
                         </a:solidFill>
@@ -4692,7 +5095,7 @@
                 </a:tc>
                 <a:extLst>
                   <a:ext uri="{0D108BD9-81ED-4DB2-BD59-A6C34878D82A}">
-                    <a16:rowId xmlns:a16="http://schemas.microsoft.com/office/drawing/2014/main" val="3747950335"/>
+                    <a16:rowId xmlns:a16="http://schemas.microsoft.com/office/drawing/2014/main" xmlns="" val="3747950335"/>
                   </a:ext>
                 </a:extLst>
               </a:tr>
@@ -4860,7 +5263,7 @@
                 </a:tc>
                 <a:extLst>
                   <a:ext uri="{0D108BD9-81ED-4DB2-BD59-A6C34878D82A}">
-                    <a16:rowId xmlns:a16="http://schemas.microsoft.com/office/drawing/2014/main" val="1015426064"/>
+                    <a16:rowId xmlns:a16="http://schemas.microsoft.com/office/drawing/2014/main" xmlns="" val="1015426064"/>
                   </a:ext>
                 </a:extLst>
               </a:tr>
@@ -5028,7 +5431,7 @@
                 </a:tc>
                 <a:extLst>
                   <a:ext uri="{0D108BD9-81ED-4DB2-BD59-A6C34878D82A}">
-                    <a16:rowId xmlns:a16="http://schemas.microsoft.com/office/drawing/2014/main" val="3990960279"/>
+                    <a16:rowId xmlns:a16="http://schemas.microsoft.com/office/drawing/2014/main" xmlns="" val="3990960279"/>
                   </a:ext>
                 </a:extLst>
               </a:tr>
@@ -5196,7 +5599,7 @@
                 </a:tc>
                 <a:extLst>
                   <a:ext uri="{0D108BD9-81ED-4DB2-BD59-A6C34878D82A}">
-                    <a16:rowId xmlns:a16="http://schemas.microsoft.com/office/drawing/2014/main" val="1124409632"/>
+                    <a16:rowId xmlns:a16="http://schemas.microsoft.com/office/drawing/2014/main" xmlns="" val="1124409632"/>
                   </a:ext>
                 </a:extLst>
               </a:tr>
@@ -5231,12 +5634,12 @@
                     <a:p>
                       <a:pPr algn="r" fontAlgn="b"/>
                       <a:r>
-                        <a:rPr lang="en-US" sz="1100" u="none" strike="noStrike">
+                        <a:rPr lang="en-US" sz="1100" u="none" strike="noStrike" dirty="0">
                           <a:effectLst/>
                         </a:rPr>
                         <a:t>46.084</a:t>
                       </a:r>
-                      <a:endParaRPr lang="en-US" sz="1100" b="0" i="0" u="none" strike="noStrike">
+                      <a:endParaRPr lang="en-US" sz="1100" b="0" i="0" u="none" strike="noStrike" dirty="0">
                         <a:solidFill>
                           <a:srgbClr val="000000"/>
                         </a:solidFill>
@@ -5352,7 +5755,7 @@
                 </a:tc>
                 <a:extLst>
                   <a:ext uri="{0D108BD9-81ED-4DB2-BD59-A6C34878D82A}">
-                    <a16:rowId xmlns:a16="http://schemas.microsoft.com/office/drawing/2014/main" val="1811276016"/>
+                    <a16:rowId xmlns:a16="http://schemas.microsoft.com/office/drawing/2014/main" xmlns="" val="1811276016"/>
                   </a:ext>
                 </a:extLst>
               </a:tr>
@@ -5484,7 +5887,7 @@
                 </a:tc>
                 <a:extLst>
                   <a:ext uri="{0D108BD9-81ED-4DB2-BD59-A6C34878D82A}">
-                    <a16:rowId xmlns:a16="http://schemas.microsoft.com/office/drawing/2014/main" val="1678109040"/>
+                    <a16:rowId xmlns:a16="http://schemas.microsoft.com/office/drawing/2014/main" xmlns="" val="1678109040"/>
                   </a:ext>
                 </a:extLst>
               </a:tr>
@@ -5496,145 +5899,6 @@
     <p:extLst>
       <p:ext uri="{BB962C8B-B14F-4D97-AF65-F5344CB8AC3E}">
         <p14:creationId xmlns:p14="http://schemas.microsoft.com/office/powerpoint/2010/main" val="358639959"/>
-      </p:ext>
-    </p:extLst>
-  </p:cSld>
-  <p:clrMapOvr>
-    <a:masterClrMapping/>
-  </p:clrMapOvr>
-</p:sld>
-</file>
-
-<file path=ppt/slides/slide3.xml><?xml version="1.0" encoding="utf-8"?>
-<p:sld xmlns:a="http://schemas.openxmlformats.org/drawingml/2006/main" xmlns:r="http://schemas.openxmlformats.org/officeDocument/2006/relationships" xmlns:p="http://schemas.openxmlformats.org/presentationml/2006/main">
-  <p:cSld>
-    <p:spTree>
-      <p:nvGrpSpPr>
-        <p:cNvPr id="1" name=""/>
-        <p:cNvGrpSpPr/>
-        <p:nvPr/>
-      </p:nvGrpSpPr>
-      <p:grpSpPr>
-        <a:xfrm>
-          <a:off x="0" y="0"/>
-          <a:ext cx="0" cy="0"/>
-          <a:chOff x="0" y="0"/>
-          <a:chExt cx="0" cy="0"/>
-        </a:xfrm>
-      </p:grpSpPr>
-      <p:sp>
-        <p:nvSpPr>
-          <p:cNvPr id="9" name="TextBox 8">
-            <a:extLst>
-              <a:ext uri="{FF2B5EF4-FFF2-40B4-BE49-F238E27FC236}">
-                <a16:creationId xmlns:a16="http://schemas.microsoft.com/office/drawing/2014/main" id="{ED45B5BA-AF5B-4C7C-B062-91A28ADEDBFF}"/>
-              </a:ext>
-            </a:extLst>
-          </p:cNvPr>
-          <p:cNvSpPr txBox="1"/>
-          <p:nvPr/>
-        </p:nvSpPr>
-        <p:spPr>
-          <a:xfrm>
-            <a:off x="9538568" y="810960"/>
-            <a:ext cx="2653432" cy="4247317"/>
-          </a:xfrm>
-          <a:prstGeom prst="rect">
-            <a:avLst/>
-          </a:prstGeom>
-          <a:noFill/>
-        </p:spPr>
-        <p:txBody>
-          <a:bodyPr wrap="square" rtlCol="0">
-            <a:spAutoFit/>
-          </a:bodyPr>
-          <a:lstStyle/>
-          <a:p>
-            <a:r>
-              <a:rPr lang="en-US" b="1" dirty="0"/>
-              <a:t>Figure #. GWA of </a:t>
-            </a:r>
-            <a:r>
-              <a:rPr lang="en-US" b="1" i="1" dirty="0"/>
-              <a:t>B. cinerea</a:t>
-            </a:r>
-            <a:r>
-              <a:rPr lang="en-US" b="1" dirty="0"/>
-              <a:t> hyphal waviness on potato dextrose agar.</a:t>
-            </a:r>
-          </a:p>
-          <a:p>
-            <a:r>
-              <a:rPr lang="en-US" dirty="0"/>
-              <a:t>A </a:t>
-            </a:r>
-            <a:r>
-              <a:rPr lang="en-US" dirty="0" err="1"/>
-              <a:t>manhattan</a:t>
-            </a:r>
-            <a:r>
-              <a:rPr lang="en-US" dirty="0"/>
-              <a:t> plot of estimated SNP effect size for </a:t>
-            </a:r>
-            <a:r>
-              <a:rPr lang="en-US" i="1" dirty="0"/>
-              <a:t>Botrytis cinerea</a:t>
-            </a:r>
-            <a:r>
-              <a:rPr lang="en-US" dirty="0"/>
-              <a:t> hyphal waviness with </a:t>
-            </a:r>
-            <a:r>
-              <a:rPr lang="en-US" i="1" dirty="0"/>
-              <a:t>B. cinerea </a:t>
-            </a:r>
-            <a:r>
-              <a:rPr lang="en-US" dirty="0"/>
-              <a:t>chromosomes as alternating black and white regions. Thresholds of effect estimate are displayed as horizontal dashed lines. </a:t>
-            </a:r>
-          </a:p>
-          <a:p>
-            <a:endParaRPr lang="en-US" dirty="0"/>
-          </a:p>
-          <a:p>
-            <a:endParaRPr lang="en-US" dirty="0"/>
-          </a:p>
-        </p:txBody>
-      </p:sp>
-      <p:pic>
-        <p:nvPicPr>
-          <p:cNvPr id="3" name="Picture 2">
-            <a:extLst>
-              <a:ext uri="{FF2B5EF4-FFF2-40B4-BE49-F238E27FC236}">
-                <a16:creationId xmlns:a16="http://schemas.microsoft.com/office/drawing/2014/main" id="{ABC17D68-A00F-4B53-8FCC-6C2E31D8050C}"/>
-              </a:ext>
-            </a:extLst>
-          </p:cNvPr>
-          <p:cNvPicPr>
-            <a:picLocks noChangeAspect="1"/>
-          </p:cNvPicPr>
-          <p:nvPr/>
-        </p:nvPicPr>
-        <p:blipFill>
-          <a:blip r:embed="rId2"/>
-          <a:stretch>
-            <a:fillRect/>
-          </a:stretch>
-        </p:blipFill>
-        <p:spPr>
-          <a:xfrm>
-            <a:off x="95075" y="287255"/>
-            <a:ext cx="9348418" cy="6460943"/>
-          </a:xfrm>
-          <a:prstGeom prst="rect">
-            <a:avLst/>
-          </a:prstGeom>
-        </p:spPr>
-      </p:pic>
-    </p:spTree>
-    <p:extLst>
-      <p:ext uri="{BB962C8B-B14F-4D97-AF65-F5344CB8AC3E}">
-        <p14:creationId xmlns:p14="http://schemas.microsoft.com/office/powerpoint/2010/main" val="4185766863"/>
       </p:ext>
     </p:extLst>
   </p:cSld>
@@ -5666,7 +5930,7 @@
           <p:cNvPr id="2" name="Title 1">
             <a:extLst>
               <a:ext uri="{FF2B5EF4-FFF2-40B4-BE49-F238E27FC236}">
-                <a16:creationId xmlns:a16="http://schemas.microsoft.com/office/drawing/2014/main" id="{02797949-2612-470F-8BC1-C369B77CA3F2}"/>
+                <a16:creationId xmlns:a16="http://schemas.microsoft.com/office/drawing/2014/main" xmlns="" id="{02797949-2612-470F-8BC1-C369B77CA3F2}"/>
               </a:ext>
             </a:extLst>
           </p:cNvPr>
@@ -5701,7 +5965,7 @@
           <p:cNvPr id="9" name="TextBox 8">
             <a:extLst>
               <a:ext uri="{FF2B5EF4-FFF2-40B4-BE49-F238E27FC236}">
-                <a16:creationId xmlns:a16="http://schemas.microsoft.com/office/drawing/2014/main" id="{ED45B5BA-AF5B-4C7C-B062-91A28ADEDBFF}"/>
+                <a16:creationId xmlns:a16="http://schemas.microsoft.com/office/drawing/2014/main" xmlns="" id="{ED45B5BA-AF5B-4C7C-B062-91A28ADEDBFF}"/>
               </a:ext>
             </a:extLst>
           </p:cNvPr>
@@ -5711,7 +5975,7 @@
         <p:spPr>
           <a:xfrm>
             <a:off x="930828" y="4846535"/>
-            <a:ext cx="10943120" cy="2308324"/>
+            <a:ext cx="10943120" cy="2031325"/>
           </a:xfrm>
           <a:prstGeom prst="rect">
             <a:avLst/>
@@ -5740,10 +6004,20 @@
             </a:r>
             <a:r>
               <a:rPr lang="en-US" dirty="0"/>
-              <a:t> percentile distribution are shown in each box and are organized in an increasing mean hyphal waviness trend.</a:t>
-            </a:r>
-          </a:p>
-          <a:p>
+              <a:t> percentile distribution are shown in each box and are </a:t>
+            </a:r>
+            <a:r>
+              <a:rPr lang="en-US" dirty="0" smtClean="0"/>
+              <a:t>ordered by increasing </a:t>
+            </a:r>
+            <a:r>
+              <a:rPr lang="en-US" dirty="0"/>
+              <a:t>mean hyphal </a:t>
+            </a:r>
+            <a:r>
+              <a:rPr lang="en-US" dirty="0" smtClean="0"/>
+              <a:t>waviness.</a:t>
+            </a:r>
             <a:endParaRPr lang="en-US" dirty="0"/>
           </a:p>
           <a:p>
@@ -5765,7 +6039,7 @@
           <p:cNvPr id="3" name="Picture 2">
             <a:extLst>
               <a:ext uri="{FF2B5EF4-FFF2-40B4-BE49-F238E27FC236}">
-                <a16:creationId xmlns:a16="http://schemas.microsoft.com/office/drawing/2014/main" id="{C408E4DF-F455-4918-86D7-EF57BD4B1A30}"/>
+                <a16:creationId xmlns:a16="http://schemas.microsoft.com/office/drawing/2014/main" xmlns="" id="{C408E4DF-F455-4918-86D7-EF57BD4B1A30}"/>
               </a:ext>
             </a:extLst>
           </p:cNvPr>
@@ -5825,7 +6099,7 @@
           <p:cNvPr id="2" name="Title 1">
             <a:extLst>
               <a:ext uri="{FF2B5EF4-FFF2-40B4-BE49-F238E27FC236}">
-                <a16:creationId xmlns:a16="http://schemas.microsoft.com/office/drawing/2014/main" id="{02797949-2612-470F-8BC1-C369B77CA3F2}"/>
+                <a16:creationId xmlns:a16="http://schemas.microsoft.com/office/drawing/2014/main" xmlns="" id="{02797949-2612-470F-8BC1-C369B77CA3F2}"/>
               </a:ext>
             </a:extLst>
           </p:cNvPr>
@@ -5860,7 +6134,7 @@
           <p:cNvPr id="8" name="Content Placeholder 7">
             <a:extLst>
               <a:ext uri="{FF2B5EF4-FFF2-40B4-BE49-F238E27FC236}">
-                <a16:creationId xmlns:a16="http://schemas.microsoft.com/office/drawing/2014/main" id="{A1A178D7-6F47-4D56-A1D2-0B03F1BD8AB1}"/>
+                <a16:creationId xmlns:a16="http://schemas.microsoft.com/office/drawing/2014/main" xmlns="" id="{A1A178D7-6F47-4D56-A1D2-0B03F1BD8AB1}"/>
               </a:ext>
             </a:extLst>
           </p:cNvPr>
@@ -5892,7 +6166,7 @@
           <p:cNvPr id="9" name="TextBox 8">
             <a:extLst>
               <a:ext uri="{FF2B5EF4-FFF2-40B4-BE49-F238E27FC236}">
-                <a16:creationId xmlns:a16="http://schemas.microsoft.com/office/drawing/2014/main" id="{ED45B5BA-AF5B-4C7C-B062-91A28ADEDBFF}"/>
+                <a16:creationId xmlns:a16="http://schemas.microsoft.com/office/drawing/2014/main" xmlns="" id="{ED45B5BA-AF5B-4C7C-B062-91A28ADEDBFF}"/>
               </a:ext>
             </a:extLst>
           </p:cNvPr>
@@ -5970,21 +6244,98 @@
           <a:chExt cx="0" cy="0"/>
         </a:xfrm>
       </p:grpSpPr>
+      <p:sp>
+        <p:nvSpPr>
+          <p:cNvPr id="9" name="TextBox 8">
+            <a:extLst>
+              <a:ext uri="{FF2B5EF4-FFF2-40B4-BE49-F238E27FC236}">
+                <a16:creationId xmlns:a16="http://schemas.microsoft.com/office/drawing/2014/main" xmlns="" id="{ED45B5BA-AF5B-4C7C-B062-91A28ADEDBFF}"/>
+              </a:ext>
+            </a:extLst>
+          </p:cNvPr>
+          <p:cNvSpPr txBox="1"/>
+          <p:nvPr/>
+        </p:nvSpPr>
+        <p:spPr>
+          <a:xfrm>
+            <a:off x="9538568" y="810960"/>
+            <a:ext cx="2653432" cy="4247317"/>
+          </a:xfrm>
+          <a:prstGeom prst="rect">
+            <a:avLst/>
+          </a:prstGeom>
+          <a:noFill/>
+        </p:spPr>
+        <p:txBody>
+          <a:bodyPr wrap="square" rtlCol="0">
+            <a:spAutoFit/>
+          </a:bodyPr>
+          <a:lstStyle/>
+          <a:p>
+            <a:r>
+              <a:rPr lang="en-US" b="1" dirty="0"/>
+              <a:t>Figure #. GWA of </a:t>
+            </a:r>
+            <a:r>
+              <a:rPr lang="en-US" b="1" i="1" dirty="0"/>
+              <a:t>B. cinerea</a:t>
+            </a:r>
+            <a:r>
+              <a:rPr lang="en-US" b="1" dirty="0"/>
+              <a:t> hyphal waviness on potato dextrose agar.</a:t>
+            </a:r>
+          </a:p>
+          <a:p>
+            <a:r>
+              <a:rPr lang="en-US" dirty="0"/>
+              <a:t>A </a:t>
+            </a:r>
+            <a:r>
+              <a:rPr lang="en-US" dirty="0" err="1"/>
+              <a:t>manhattan</a:t>
+            </a:r>
+            <a:r>
+              <a:rPr lang="en-US" dirty="0"/>
+              <a:t> plot of estimated SNP effect size for </a:t>
+            </a:r>
+            <a:r>
+              <a:rPr lang="en-US" i="1" dirty="0"/>
+              <a:t>Botrytis cinerea</a:t>
+            </a:r>
+            <a:r>
+              <a:rPr lang="en-US" dirty="0"/>
+              <a:t> hyphal waviness with </a:t>
+            </a:r>
+            <a:r>
+              <a:rPr lang="en-US" i="1" dirty="0"/>
+              <a:t>B. cinerea </a:t>
+            </a:r>
+            <a:r>
+              <a:rPr lang="en-US" dirty="0"/>
+              <a:t>chromosomes as alternating black and white regions. Thresholds of effect estimate are displayed as horizontal dashed lines. </a:t>
+            </a:r>
+          </a:p>
+          <a:p>
+            <a:endParaRPr lang="en-US" dirty="0"/>
+          </a:p>
+          <a:p>
+            <a:endParaRPr lang="en-US" dirty="0"/>
+          </a:p>
+        </p:txBody>
+      </p:sp>
       <p:pic>
         <p:nvPicPr>
-          <p:cNvPr id="4" name="Content Placeholder 3">
-            <a:extLst>
-              <a:ext uri="{FF2B5EF4-FFF2-40B4-BE49-F238E27FC236}">
-                <a16:creationId xmlns:a16="http://schemas.microsoft.com/office/drawing/2014/main" id="{5CF1D73C-CDAF-4C5E-870D-8BA455DA916C}"/>
+          <p:cNvPr id="3" name="Picture 2">
+            <a:extLst>
+              <a:ext uri="{FF2B5EF4-FFF2-40B4-BE49-F238E27FC236}">
+                <a16:creationId xmlns:a16="http://schemas.microsoft.com/office/drawing/2014/main" xmlns="" id="{ABC17D68-A00F-4B53-8FCC-6C2E31D8050C}"/>
               </a:ext>
             </a:extLst>
           </p:cNvPr>
           <p:cNvPicPr>
-            <a:picLocks noGrp="1" noChangeAspect="1"/>
+            <a:picLocks noChangeAspect="1"/>
           </p:cNvPicPr>
-          <p:nvPr>
-            <p:ph idx="1"/>
-          </p:nvPr>
+          <p:nvPr/>
         </p:nvPicPr>
         <p:blipFill>
           <a:blip r:embed="rId2"/>
@@ -5994,95 +6345,18 @@
         </p:blipFill>
         <p:spPr>
           <a:xfrm>
-            <a:off x="119742" y="365125"/>
-            <a:ext cx="7685837" cy="5830402"/>
+            <a:off x="95075" y="287255"/>
+            <a:ext cx="9348418" cy="6460943"/>
           </a:xfrm>
           <a:prstGeom prst="rect">
             <a:avLst/>
           </a:prstGeom>
         </p:spPr>
       </p:pic>
-      <p:sp>
-        <p:nvSpPr>
-          <p:cNvPr id="5" name="TextBox 4">
-            <a:extLst>
-              <a:ext uri="{FF2B5EF4-FFF2-40B4-BE49-F238E27FC236}">
-                <a16:creationId xmlns:a16="http://schemas.microsoft.com/office/drawing/2014/main" id="{8790B5DB-5369-4BEC-9097-5F6FDC915BE0}"/>
-              </a:ext>
-            </a:extLst>
-          </p:cNvPr>
-          <p:cNvSpPr txBox="1"/>
-          <p:nvPr/>
-        </p:nvSpPr>
-        <p:spPr>
-          <a:xfrm>
-            <a:off x="8854751" y="2099388"/>
-            <a:ext cx="2304661" cy="4801314"/>
-          </a:xfrm>
-          <a:prstGeom prst="rect">
-            <a:avLst/>
-          </a:prstGeom>
-          <a:noFill/>
-        </p:spPr>
-        <p:txBody>
-          <a:bodyPr wrap="square" rtlCol="0">
-            <a:spAutoFit/>
-          </a:bodyPr>
-          <a:lstStyle/>
-          <a:p>
-            <a:r>
-              <a:rPr lang="en-US" dirty="0"/>
-              <a:t>Figure # - </a:t>
-            </a:r>
-          </a:p>
-          <a:p>
-            <a:r>
-              <a:rPr lang="en-US" dirty="0"/>
-              <a:t>Average Hyphal Waviness plotted against Growth on Sugar/Pectin </a:t>
-            </a:r>
-          </a:p>
-          <a:p>
-            <a:endParaRPr lang="en-US" dirty="0"/>
-          </a:p>
-          <a:p>
-            <a:endParaRPr lang="en-US" dirty="0"/>
-          </a:p>
-          <a:p>
-            <a:endParaRPr lang="en-US" dirty="0"/>
-          </a:p>
-          <a:p>
-            <a:endParaRPr lang="en-US" dirty="0"/>
-          </a:p>
-          <a:p>
-            <a:endParaRPr lang="en-US" dirty="0"/>
-          </a:p>
-          <a:p>
-            <a:endParaRPr lang="en-US" dirty="0"/>
-          </a:p>
-          <a:p>
-            <a:endParaRPr lang="en-US" dirty="0"/>
-          </a:p>
-          <a:p>
-            <a:endParaRPr lang="en-US" dirty="0"/>
-          </a:p>
-          <a:p>
-            <a:endParaRPr lang="en-US" dirty="0"/>
-          </a:p>
-          <a:p>
-            <a:endParaRPr lang="en-US" dirty="0"/>
-          </a:p>
-          <a:p>
-            <a:endParaRPr lang="en-US" dirty="0"/>
-          </a:p>
-          <a:p>
-            <a:endParaRPr lang="en-US" dirty="0"/>
-          </a:p>
-        </p:txBody>
-      </p:sp>
     </p:spTree>
     <p:extLst>
       <p:ext uri="{BB962C8B-B14F-4D97-AF65-F5344CB8AC3E}">
-        <p14:creationId xmlns:p14="http://schemas.microsoft.com/office/powerpoint/2010/main" val="2927980237"/>
+        <p14:creationId xmlns:p14="http://schemas.microsoft.com/office/powerpoint/2010/main" val="4185766863"/>
       </p:ext>
     </p:extLst>
   </p:cSld>
@@ -6111,17 +6385,19 @@
       </p:grpSpPr>
       <p:pic>
         <p:nvPicPr>
-          <p:cNvPr id="4" name="Picture 3">
-            <a:extLst>
-              <a:ext uri="{FF2B5EF4-FFF2-40B4-BE49-F238E27FC236}">
-                <a16:creationId xmlns:a16="http://schemas.microsoft.com/office/drawing/2014/main" id="{8605A398-FB34-451A-9C81-408789C9CE59}"/>
+          <p:cNvPr id="4" name="Content Placeholder 3">
+            <a:extLst>
+              <a:ext uri="{FF2B5EF4-FFF2-40B4-BE49-F238E27FC236}">
+                <a16:creationId xmlns:a16="http://schemas.microsoft.com/office/drawing/2014/main" xmlns="" id="{5CF1D73C-CDAF-4C5E-870D-8BA455DA916C}"/>
               </a:ext>
             </a:extLst>
           </p:cNvPr>
           <p:cNvPicPr>
-            <a:picLocks noChangeAspect="1"/>
+            <a:picLocks noGrp="1" noChangeAspect="1"/>
           </p:cNvPicPr>
-          <p:nvPr/>
+          <p:nvPr>
+            <p:ph idx="1"/>
+          </p:nvPr>
         </p:nvPicPr>
         <p:blipFill>
           <a:blip r:embed="rId2"/>
@@ -6131,8 +6407,8 @@
         </p:blipFill>
         <p:spPr>
           <a:xfrm>
-            <a:off x="269032" y="287358"/>
-            <a:ext cx="8476601" cy="5611480"/>
+            <a:off x="119742" y="365125"/>
+            <a:ext cx="7685837" cy="5830402"/>
           </a:xfrm>
           <a:prstGeom prst="rect">
             <a:avLst/>
@@ -6144,7 +6420,7 @@
           <p:cNvPr id="5" name="TextBox 4">
             <a:extLst>
               <a:ext uri="{FF2B5EF4-FFF2-40B4-BE49-F238E27FC236}">
-                <a16:creationId xmlns:a16="http://schemas.microsoft.com/office/drawing/2014/main" id="{C05AC16E-131F-4276-8267-1539454128F8}"/>
+                <a16:creationId xmlns:a16="http://schemas.microsoft.com/office/drawing/2014/main" xmlns="" id="{8790B5DB-5369-4BEC-9097-5F6FDC915BE0}"/>
               </a:ext>
             </a:extLst>
           </p:cNvPr>
@@ -6153,7 +6429,7 @@
         </p:nvSpPr>
         <p:spPr>
           <a:xfrm>
-            <a:off x="8879918" y="941707"/>
+            <a:off x="8854751" y="2099388"/>
             <a:ext cx="2304661" cy="4801314"/>
           </a:xfrm>
           <a:prstGeom prst="rect">
@@ -6174,12 +6450,8 @@
           </a:p>
           <a:p>
             <a:r>
-              <a:rPr lang="en-US" dirty="0" err="1"/>
-              <a:t>LsMeans</a:t>
-            </a:r>
-            <a:r>
               <a:rPr lang="en-US" dirty="0"/>
-              <a:t> Hyphal Waviness plotted against Growth on Sugar/Pectin </a:t>
+              <a:t>Average Hyphal Waviness plotted against Growth on Sugar/Pectin </a:t>
             </a:r>
           </a:p>
           <a:p>
@@ -6223,7 +6495,7 @@
     </p:spTree>
     <p:extLst>
       <p:ext uri="{BB962C8B-B14F-4D97-AF65-F5344CB8AC3E}">
-        <p14:creationId xmlns:p14="http://schemas.microsoft.com/office/powerpoint/2010/main" val="2123462057"/>
+        <p14:creationId xmlns:p14="http://schemas.microsoft.com/office/powerpoint/2010/main" val="2927980237"/>
       </p:ext>
     </p:extLst>
   </p:cSld>
@@ -6252,19 +6524,17 @@
       </p:grpSpPr>
       <p:pic>
         <p:nvPicPr>
-          <p:cNvPr id="4" name="Content Placeholder 3">
-            <a:extLst>
-              <a:ext uri="{FF2B5EF4-FFF2-40B4-BE49-F238E27FC236}">
-                <a16:creationId xmlns:a16="http://schemas.microsoft.com/office/drawing/2014/main" id="{5EDED94B-5794-43B3-A714-99204A4C3FE7}"/>
+          <p:cNvPr id="4" name="Picture 3">
+            <a:extLst>
+              <a:ext uri="{FF2B5EF4-FFF2-40B4-BE49-F238E27FC236}">
+                <a16:creationId xmlns:a16="http://schemas.microsoft.com/office/drawing/2014/main" xmlns="" id="{8605A398-FB34-451A-9C81-408789C9CE59}"/>
               </a:ext>
             </a:extLst>
           </p:cNvPr>
           <p:cNvPicPr>
-            <a:picLocks noGrp="1" noChangeAspect="1"/>
+            <a:picLocks noChangeAspect="1"/>
           </p:cNvPicPr>
-          <p:nvPr>
-            <p:ph idx="1"/>
-          </p:nvPr>
+          <p:nvPr/>
         </p:nvPicPr>
         <p:blipFill>
           <a:blip r:embed="rId2"/>
@@ -6274,8 +6544,8 @@
         </p:blipFill>
         <p:spPr>
           <a:xfrm>
-            <a:off x="141532" y="131047"/>
-            <a:ext cx="8335204" cy="6361827"/>
+            <a:off x="269032" y="287358"/>
+            <a:ext cx="8476601" cy="5611480"/>
           </a:xfrm>
           <a:prstGeom prst="rect">
             <a:avLst/>
@@ -6287,7 +6557,7 @@
           <p:cNvPr id="5" name="TextBox 4">
             <a:extLst>
               <a:ext uri="{FF2B5EF4-FFF2-40B4-BE49-F238E27FC236}">
-                <a16:creationId xmlns:a16="http://schemas.microsoft.com/office/drawing/2014/main" id="{8239F836-2BB4-41CA-A95A-303CF279E575}"/>
+                <a16:creationId xmlns:a16="http://schemas.microsoft.com/office/drawing/2014/main" xmlns="" id="{C05AC16E-131F-4276-8267-1539454128F8}"/>
               </a:ext>
             </a:extLst>
           </p:cNvPr>
@@ -6296,8 +6566,8 @@
         </p:nvSpPr>
         <p:spPr>
           <a:xfrm>
-            <a:off x="8714792" y="261257"/>
-            <a:ext cx="3181739" cy="6740307"/>
+            <a:off x="8879918" y="941707"/>
+            <a:ext cx="2304661" cy="4801314"/>
           </a:xfrm>
           <a:prstGeom prst="rect">
             <a:avLst/>
@@ -6312,41 +6582,18 @@
           <a:p>
             <a:r>
               <a:rPr lang="en-US" dirty="0"/>
-              <a:t>Figure #</a:t>
-            </a:r>
-          </a:p>
-          <a:p>
+              <a:t>Figure # - </a:t>
+            </a:r>
+          </a:p>
+          <a:p>
+            <a:r>
+              <a:rPr lang="en-US" dirty="0" err="1"/>
+              <a:t>LsMeans</a:t>
+            </a:r>
             <a:r>
               <a:rPr lang="en-US" dirty="0"/>
-              <a:t>See other slide and adopt accordingly</a:t>
-            </a:r>
-          </a:p>
-          <a:p>
-            <a:endParaRPr lang="en-US" dirty="0"/>
-          </a:p>
-          <a:p>
-            <a:endParaRPr lang="en-US" dirty="0"/>
-          </a:p>
-          <a:p>
-            <a:endParaRPr lang="en-US" dirty="0"/>
-          </a:p>
-          <a:p>
-            <a:endParaRPr lang="en-US" dirty="0"/>
-          </a:p>
-          <a:p>
-            <a:endParaRPr lang="en-US" dirty="0"/>
-          </a:p>
-          <a:p>
-            <a:endParaRPr lang="en-US" dirty="0"/>
-          </a:p>
-          <a:p>
-            <a:endParaRPr lang="en-US" dirty="0"/>
-          </a:p>
-          <a:p>
-            <a:endParaRPr lang="en-US" dirty="0"/>
-          </a:p>
-          <a:p>
-            <a:endParaRPr lang="en-US" dirty="0"/>
+              <a:t> Hyphal Waviness plotted against Growth on Sugar/Pectin </a:t>
+            </a:r>
           </a:p>
           <a:p>
             <a:endParaRPr lang="en-US" dirty="0"/>
@@ -6389,7 +6636,7 @@
     </p:spTree>
     <p:extLst>
       <p:ext uri="{BB962C8B-B14F-4D97-AF65-F5344CB8AC3E}">
-        <p14:creationId xmlns:p14="http://schemas.microsoft.com/office/powerpoint/2010/main" val="3913836524"/>
+        <p14:creationId xmlns:p14="http://schemas.microsoft.com/office/powerpoint/2010/main" val="2123462057"/>
       </p:ext>
     </p:extLst>
   </p:cSld>
@@ -6418,17 +6665,19 @@
       </p:grpSpPr>
       <p:pic>
         <p:nvPicPr>
-          <p:cNvPr id="4" name="Picture 3">
-            <a:extLst>
-              <a:ext uri="{FF2B5EF4-FFF2-40B4-BE49-F238E27FC236}">
-                <a16:creationId xmlns:a16="http://schemas.microsoft.com/office/drawing/2014/main" id="{5CFA029F-5C37-4A3D-A83E-D8C65C6BDE0C}"/>
+          <p:cNvPr id="4" name="Content Placeholder 3">
+            <a:extLst>
+              <a:ext uri="{FF2B5EF4-FFF2-40B4-BE49-F238E27FC236}">
+                <a16:creationId xmlns:a16="http://schemas.microsoft.com/office/drawing/2014/main" xmlns="" id="{5EDED94B-5794-43B3-A714-99204A4C3FE7}"/>
               </a:ext>
             </a:extLst>
           </p:cNvPr>
           <p:cNvPicPr>
-            <a:picLocks noChangeAspect="1"/>
+            <a:picLocks noGrp="1" noChangeAspect="1"/>
           </p:cNvPicPr>
-          <p:nvPr/>
+          <p:nvPr>
+            <p:ph idx="1"/>
+          </p:nvPr>
         </p:nvPicPr>
         <p:blipFill>
           <a:blip r:embed="rId2"/>
@@ -6438,8 +6687,8 @@
         </p:blipFill>
         <p:spPr>
           <a:xfrm>
-            <a:off x="0" y="0"/>
-            <a:ext cx="8448234" cy="4479235"/>
+            <a:off x="141532" y="131047"/>
+            <a:ext cx="8335204" cy="6361827"/>
           </a:xfrm>
           <a:prstGeom prst="rect">
             <a:avLst/>
@@ -6451,7 +6700,7 @@
           <p:cNvPr id="5" name="TextBox 4">
             <a:extLst>
               <a:ext uri="{FF2B5EF4-FFF2-40B4-BE49-F238E27FC236}">
-                <a16:creationId xmlns:a16="http://schemas.microsoft.com/office/drawing/2014/main" id="{C05F688A-3013-44AE-9657-1536DAD1E3B7}"/>
+                <a16:creationId xmlns:a16="http://schemas.microsoft.com/office/drawing/2014/main" xmlns="" id="{8239F836-2BB4-41CA-A95A-303CF279E575}"/>
               </a:ext>
             </a:extLst>
           </p:cNvPr>
@@ -6460,8 +6709,8 @@
         </p:nvSpPr>
         <p:spPr>
           <a:xfrm>
-            <a:off x="8448235" y="0"/>
-            <a:ext cx="3743766" cy="12834283"/>
+            <a:off x="8714792" y="261257"/>
+            <a:ext cx="3181739" cy="6740307"/>
           </a:xfrm>
           <a:prstGeom prst="rect">
             <a:avLst/>
@@ -6475,108 +6724,14 @@
           <a:lstStyle/>
           <a:p>
             <a:r>
-              <a:rPr lang="en-US" b="1" dirty="0"/>
-              <a:t>Figure #. Various interactions of B. cinerea lesions sizes on Eudicots with hyphal waviness of B. cinerea. </a:t>
-            </a:r>
-          </a:p>
-          <a:p>
-            <a:r>
               <a:rPr lang="en-US" dirty="0"/>
-              <a:t>Scatter plots of various eudicot lesion sizes due to B. cinerea isolates compared against B. cinerea hyphal waviness based on 97 individual isolates. Each point is an isolate interaction of the marginal means of lesion size with marginal means of hyphal waviness. </a:t>
+              <a:t>Figure #</a:t>
             </a:r>
           </a:p>
           <a:p>
             <a:r>
               <a:rPr lang="en-US" dirty="0"/>
-              <a:t>A) Least Square Mean lesion size on </a:t>
-            </a:r>
-            <a:r>
-              <a:rPr lang="en-US" i="1" dirty="0" err="1"/>
-              <a:t>Cichorium</a:t>
-            </a:r>
-            <a:r>
-              <a:rPr lang="en-US" i="1" dirty="0"/>
-              <a:t> </a:t>
-            </a:r>
-            <a:r>
-              <a:rPr lang="en-US" i="1" dirty="0" err="1"/>
-              <a:t>endivia</a:t>
-            </a:r>
-            <a:endParaRPr lang="en-US" i="1" dirty="0"/>
-          </a:p>
-          <a:p>
-            <a:r>
-              <a:rPr lang="en-US" dirty="0"/>
-              <a:t>B) Least Square Mean lesion size on </a:t>
-            </a:r>
-            <a:r>
-              <a:rPr lang="en-US" i="1" dirty="0"/>
-              <a:t>Brassica </a:t>
-            </a:r>
-            <a:r>
-              <a:rPr lang="en-US" i="1" dirty="0" err="1"/>
-              <a:t>rapa</a:t>
-            </a:r>
-            <a:endParaRPr lang="en-US" i="1" dirty="0"/>
-          </a:p>
-          <a:p>
-            <a:r>
-              <a:rPr lang="en-US" dirty="0"/>
-              <a:t>C) Least Square Mean lesion size on </a:t>
-            </a:r>
-            <a:r>
-              <a:rPr lang="en-US" i="1" dirty="0" err="1"/>
-              <a:t>Cichorium</a:t>
-            </a:r>
-            <a:r>
-              <a:rPr lang="en-US" i="1" dirty="0"/>
-              <a:t> </a:t>
-            </a:r>
-            <a:r>
-              <a:rPr lang="en-US" i="1" dirty="0" err="1"/>
-              <a:t>intybus</a:t>
-            </a:r>
-            <a:endParaRPr lang="en-US" b="1" i="1" dirty="0"/>
-          </a:p>
-          <a:p>
-            <a:r>
-              <a:rPr lang="en-US" dirty="0"/>
-              <a:t>D) Least Square Mean lesion size on </a:t>
-            </a:r>
-            <a:r>
-              <a:rPr lang="en-US" i="1" dirty="0"/>
-              <a:t>Glycine max</a:t>
-            </a:r>
-            <a:r>
-              <a:rPr lang="en-US" dirty="0"/>
-              <a:t> (soy bean)</a:t>
-            </a:r>
-          </a:p>
-          <a:p>
-            <a:r>
-              <a:rPr lang="en-US" dirty="0"/>
-              <a:t>E) Least Square Mean lesion size on </a:t>
-            </a:r>
-            <a:r>
-              <a:rPr lang="en-US" i="1" dirty="0"/>
-              <a:t>Helianthus </a:t>
-            </a:r>
-            <a:r>
-              <a:rPr lang="en-US" i="1" dirty="0" err="1"/>
-              <a:t>annuus</a:t>
-            </a:r>
-            <a:endParaRPr lang="en-US" i="1" dirty="0"/>
-          </a:p>
-          <a:p>
-            <a:r>
-              <a:rPr lang="en-US" dirty="0"/>
-              <a:t>F) Least Square Mean lesion size on Solanum</a:t>
-            </a:r>
-          </a:p>
-          <a:p>
-            <a:r>
-              <a:rPr lang="en-US" dirty="0"/>
-              <a:t>G) Least Square Mean lesion size on Tomato</a:t>
+              <a:t>See other slide and adopt accordingly</a:t>
             </a:r>
           </a:p>
           <a:p>
@@ -6647,7 +6802,7 @@
     </p:spTree>
     <p:extLst>
       <p:ext uri="{BB962C8B-B14F-4D97-AF65-F5344CB8AC3E}">
-        <p14:creationId xmlns:p14="http://schemas.microsoft.com/office/powerpoint/2010/main" val="3663658674"/>
+        <p14:creationId xmlns:p14="http://schemas.microsoft.com/office/powerpoint/2010/main" val="3913836524"/>
       </p:ext>
     </p:extLst>
   </p:cSld>
@@ -6946,7 +7101,7 @@
   <a:extraClrSchemeLst/>
   <a:extLst>
     <a:ext uri="{05A4C25C-085E-4340-85A3-A5531E510DB2}">
-      <thm15:themeFamily xmlns:thm15="http://schemas.microsoft.com/office/thememl/2012/main" name="Office Theme" id="{62F939B6-93AF-4DB8-9C6B-D6C7DFDC589F}" vid="{4A3C46E8-61CC-4603-A589-7422A47A8E4A}"/>
+      <thm15:themeFamily xmlns:thm15="http://schemas.microsoft.com/office/thememl/2012/main" xmlns="" name="Office Theme" id="{62F939B6-93AF-4DB8-9C6B-D6C7DFDC589F}" vid="{4A3C46E8-61CC-4603-A589-7422A47A8E4A}"/>
     </a:ext>
   </a:extLst>
 </a:theme>

</xml_diff>

<commit_message>
Uploaded the source data I have used for the Visuals and original script udner notes in a JV_ReferData Folder. README to be added at a later time.
</commit_message>
<xml_diff>
--- a/paper/HWavinessGraphs_Figs_Capt.pptx
+++ b/paper/HWavinessGraphs_Figs_Capt.pptx
@@ -120,7 +120,18 @@
   </p:defaultTextStyle>
   <p:extLst>
     <p:ext uri="{EFAFB233-063F-42B5-8137-9DF3F51BA10A}">
-      <p15:sldGuideLst xmlns:p15="http://schemas.microsoft.com/office/powerpoint/2012/main" xmlns=""/>
+      <p15:sldGuideLst xmlns:p15="http://schemas.microsoft.com/office/powerpoint/2012/main">
+        <p15:guide id="1" orient="horz" pos="2160">
+          <p15:clr>
+            <a:srgbClr val="A4A3A4"/>
+          </p15:clr>
+        </p15:guide>
+        <p15:guide id="2" pos="3840">
+          <p15:clr>
+            <a:srgbClr val="A4A3A4"/>
+          </p15:clr>
+        </p15:guide>
+      </p15:sldGuideLst>
     </p:ext>
   </p:extLst>
 </p:presentation>
@@ -141,54 +152,6 @@
 
 <file path=ppt/comments/comment1.xml><?xml version="1.0" encoding="utf-8"?>
 <p:cmLst xmlns:a="http://schemas.openxmlformats.org/drawingml/2006/main" xmlns:r="http://schemas.openxmlformats.org/officeDocument/2006/relationships" xmlns:p="http://schemas.openxmlformats.org/presentationml/2006/main">
-  <p:cm authorId="2" dt="2018-01-19T11:16:40.127" idx="1">
-    <p:pos x="3404" y="2356"/>
-    <p:text>keep in methods, not in table caption</p:text>
-  </p:cm>
-  <p:cm authorId="2" dt="2018-01-19T11:17:00.273" idx="2">
-    <p:pos x="3258" y="3052"/>
-    <p:text>this is confusing, rephrase</p:text>
-  </p:cm>
-  <p:cm authorId="2" dt="2018-01-19T11:17:18.222" idx="3">
-    <p:pos x="3172" y="3224"/>
-    <p:text>date of phenotyping</p:text>
-  </p:cm>
-</p:cmLst>
-</file>
-
-<file path=ppt/comments/comment10.xml><?xml version="1.0" encoding="utf-8"?>
-<p:cmLst xmlns:a="http://schemas.openxmlformats.org/drawingml/2006/main" xmlns:r="http://schemas.openxmlformats.org/officeDocument/2006/relationships" xmlns:p="http://schemas.openxmlformats.org/presentationml/2006/main">
-  <p:cm authorId="2" dt="2018-01-19T11:24:33.911" idx="15">
-    <p:pos x="6517" y="335"/>
-    <p:text>continue table from previous slide</p:text>
-  </p:cm>
-</p:cmLst>
-</file>
-
-<file path=ppt/comments/comment11.xml><?xml version="1.0" encoding="utf-8"?>
-<p:cmLst xmlns:a="http://schemas.openxmlformats.org/drawingml/2006/main" xmlns:r="http://schemas.openxmlformats.org/officeDocument/2006/relationships" xmlns:p="http://schemas.openxmlformats.org/presentationml/2006/main">
-  <p:cm authorId="2" dt="2018-01-19T11:24:39.583" idx="16">
-    <p:pos x="2270" y="3508"/>
-    <p:text>continue table from previous slide</p:text>
-  </p:cm>
-</p:cmLst>
-</file>
-
-<file path=ppt/comments/comment12.xml><?xml version="1.0" encoding="utf-8"?>
-<p:cmLst xmlns:a="http://schemas.openxmlformats.org/drawingml/2006/main" xmlns:r="http://schemas.openxmlformats.org/officeDocument/2006/relationships" xmlns:p="http://schemas.openxmlformats.org/presentationml/2006/main">
-  <p:cm authorId="2" dt="2018-01-19T11:24:43.798" idx="17">
-    <p:pos x="2295" y="3628"/>
-    <p:text>continue table from previous slide</p:text>
-  </p:cm>
-</p:cmLst>
-</file>
-
-<file path=ppt/comments/comment2.xml><?xml version="1.0" encoding="utf-8"?>
-<p:cmLst xmlns:a="http://schemas.openxmlformats.org/drawingml/2006/main" xmlns:r="http://schemas.openxmlformats.org/officeDocument/2006/relationships" xmlns:p="http://schemas.openxmlformats.org/presentationml/2006/main">
-  <p:cm authorId="2" dt="2018-01-19T11:20:06.776" idx="5">
-    <p:pos x="2871" y="361"/>
-    <p:text>only need title in figure caption</p:text>
-  </p:cm>
   <p:cm authorId="2" dt="2018-01-19T11:20:30.944" idx="6">
     <p:pos x="5665" y="3078"/>
     <p:text>print higher resolution so fonts are clear. Increase y axis font and label size</p:text>
@@ -200,7 +163,25 @@
 </p:cmLst>
 </file>
 
-<file path=ppt/comments/comment3.xml><?xml version="1.0" encoding="utf-8"?>
+<file path=ppt/comments/comment10.xml><?xml version="1.0" encoding="utf-8"?>
+<p:cmLst xmlns:a="http://schemas.openxmlformats.org/drawingml/2006/main" xmlns:r="http://schemas.openxmlformats.org/officeDocument/2006/relationships" xmlns:p="http://schemas.openxmlformats.org/presentationml/2006/main">
+  <p:cm authorId="2" dt="2018-01-19T11:24:39.583" idx="16">
+    <p:pos x="2270" y="3508"/>
+    <p:text>continue table from previous slide</p:text>
+  </p:cm>
+</p:cmLst>
+</file>
+
+<file path=ppt/comments/comment11.xml><?xml version="1.0" encoding="utf-8"?>
+<p:cmLst xmlns:a="http://schemas.openxmlformats.org/drawingml/2006/main" xmlns:r="http://schemas.openxmlformats.org/officeDocument/2006/relationships" xmlns:p="http://schemas.openxmlformats.org/presentationml/2006/main">
+  <p:cm authorId="2" dt="2018-01-19T11:24:43.798" idx="17">
+    <p:pos x="2295" y="3628"/>
+    <p:text>continue table from previous slide</p:text>
+  </p:cm>
+</p:cmLst>
+</file>
+
+<file path=ppt/comments/comment2.xml><?xml version="1.0" encoding="utf-8"?>
 <p:cmLst xmlns:a="http://schemas.openxmlformats.org/drawingml/2006/main" xmlns:r="http://schemas.openxmlformats.org/officeDocument/2006/relationships" xmlns:p="http://schemas.openxmlformats.org/presentationml/2006/main">
   <p:cm authorId="2" dt="2018-01-19T11:22:06.271" idx="9">
     <p:pos x="1178" y="3078"/>
@@ -209,29 +190,16 @@
 </p:cmLst>
 </file>
 
-<file path=ppt/comments/comment4.xml><?xml version="1.0" encoding="utf-8"?>
+<file path=ppt/comments/comment3.xml><?xml version="1.0" encoding="utf-8"?>
 <p:cmLst xmlns:a="http://schemas.openxmlformats.org/drawingml/2006/main" xmlns:r="http://schemas.openxmlformats.org/officeDocument/2006/relationships" xmlns:p="http://schemas.openxmlformats.org/presentationml/2006/main">
-  <p:cm authorId="1" dt="2018-01-19T08:38:24.816" idx="1">
-    <p:pos x="7638" y="2630"/>
-    <p:text>Need to differentiate more from BCSIGWAS Figure 6</p:text>
-    <p:extLst>
-      <p:ext uri="{C676402C-5697-4E1C-873F-D02D1690AC5C}">
-        <p15:threadingInfo xmlns:p15="http://schemas.microsoft.com/office/powerpoint/2012/main" timeZoneBias="480"/>
-      </p:ext>
-    </p:extLst>
-  </p:cm>
   <p:cm authorId="2" dt="2018-01-19T11:19:19.844" idx="4">
     <p:pos x="7548" y="533"/>
     <p:text>this figure is low resolution, print a higher resolution copy for final version. Also increase font size on axis labels and axis titles. You can drop the figure title (the caption will serve as the title)</p:text>
   </p:cm>
-  <p:cm authorId="2" dt="2018-01-19T11:21:36.259" idx="8">
-    <p:pos x="7127" y="2261"/>
-    <p:text>from permutation analysis</p:text>
-  </p:cm>
 </p:cmLst>
 </file>
 
-<file path=ppt/comments/comment5.xml><?xml version="1.0" encoding="utf-8"?>
+<file path=ppt/comments/comment4.xml><?xml version="1.0" encoding="utf-8"?>
 <p:cmLst xmlns:a="http://schemas.openxmlformats.org/drawingml/2006/main" xmlns:r="http://schemas.openxmlformats.org/officeDocument/2006/relationships" xmlns:p="http://schemas.openxmlformats.org/presentationml/2006/main">
   <p:cm authorId="2" dt="2018-01-19T11:23:55.828" idx="10">
     <p:pos x="6241" y="1350"/>
@@ -243,7 +211,7 @@
 </p:cmLst>
 </file>
 
-<file path=ppt/comments/comment6.xml><?xml version="1.0" encoding="utf-8"?>
+<file path=ppt/comments/comment5.xml><?xml version="1.0" encoding="utf-8"?>
 <p:cmLst xmlns:a="http://schemas.openxmlformats.org/drawingml/2006/main" xmlns:r="http://schemas.openxmlformats.org/officeDocument/2006/relationships" xmlns:p="http://schemas.openxmlformats.org/presentationml/2006/main">
   <p:cm authorId="2" dt="2018-01-19T11:24:11.978" idx="11">
     <p:pos x="6259" y="619"/>
@@ -252,7 +220,7 @@
 </p:cmLst>
 </file>
 
-<file path=ppt/comments/comment7.xml><?xml version="1.0" encoding="utf-8"?>
+<file path=ppt/comments/comment6.xml><?xml version="1.0" encoding="utf-8"?>
 <p:cmLst xmlns:a="http://schemas.openxmlformats.org/drawingml/2006/main" xmlns:r="http://schemas.openxmlformats.org/officeDocument/2006/relationships" xmlns:p="http://schemas.openxmlformats.org/presentationml/2006/main">
   <p:cm authorId="2" dt="2018-01-19T11:24:16.211" idx="12">
     <p:pos x="6044" y="189"/>
@@ -261,7 +229,7 @@
 </p:cmLst>
 </file>
 
-<file path=ppt/comments/comment8.xml><?xml version="1.0" encoding="utf-8"?>
+<file path=ppt/comments/comment7.xml><?xml version="1.0" encoding="utf-8"?>
 <p:cmLst xmlns:a="http://schemas.openxmlformats.org/drawingml/2006/main" xmlns:r="http://schemas.openxmlformats.org/officeDocument/2006/relationships" xmlns:p="http://schemas.openxmlformats.org/presentationml/2006/main">
   <p:cm authorId="2" dt="2018-01-19T11:24:24.068" idx="13">
     <p:pos x="7617" y="26"/>
@@ -270,10 +238,19 @@
 </p:cmLst>
 </file>
 
-<file path=ppt/comments/comment9.xml><?xml version="1.0" encoding="utf-8"?>
+<file path=ppt/comments/comment8.xml><?xml version="1.0" encoding="utf-8"?>
 <p:cmLst xmlns:a="http://schemas.openxmlformats.org/drawingml/2006/main" xmlns:r="http://schemas.openxmlformats.org/officeDocument/2006/relationships" xmlns:p="http://schemas.openxmlformats.org/presentationml/2006/main">
   <p:cm authorId="2" dt="2018-01-19T11:24:29.735" idx="14">
     <p:pos x="7101" y="507"/>
+    <p:text>continue table from previous slide</p:text>
+  </p:cm>
+</p:cmLst>
+</file>
+
+<file path=ppt/comments/comment9.xml><?xml version="1.0" encoding="utf-8"?>
+<p:cmLst xmlns:a="http://schemas.openxmlformats.org/drawingml/2006/main" xmlns:r="http://schemas.openxmlformats.org/officeDocument/2006/relationships" xmlns:p="http://schemas.openxmlformats.org/presentationml/2006/main">
+  <p:cm authorId="2" dt="2018-01-19T11:24:33.911" idx="15">
+    <p:pos x="6517" y="335"/>
     <p:text>continue table from previous slide</p:text>
   </p:cm>
 </p:cmLst>
@@ -301,7 +278,7 @@
           <p:cNvPr id="2" name="Title 1">
             <a:extLst>
               <a:ext uri="{FF2B5EF4-FFF2-40B4-BE49-F238E27FC236}">
-                <a16:creationId xmlns:a16="http://schemas.microsoft.com/office/drawing/2014/main" xmlns="" id="{37516F1D-07F5-4715-B8F8-9DA7F4C5836C}"/>
+                <a16:creationId xmlns:a16="http://schemas.microsoft.com/office/drawing/2014/main" id="{37516F1D-07F5-4715-B8F8-9DA7F4C5836C}"/>
               </a:ext>
             </a:extLst>
           </p:cNvPr>
@@ -338,7 +315,7 @@
           <p:cNvPr id="3" name="Subtitle 2">
             <a:extLst>
               <a:ext uri="{FF2B5EF4-FFF2-40B4-BE49-F238E27FC236}">
-                <a16:creationId xmlns:a16="http://schemas.microsoft.com/office/drawing/2014/main" xmlns="" id="{86557B65-FA8D-4C7A-958D-0CE15E6C9EDB}"/>
+                <a16:creationId xmlns:a16="http://schemas.microsoft.com/office/drawing/2014/main" id="{86557B65-FA8D-4C7A-958D-0CE15E6C9EDB}"/>
               </a:ext>
             </a:extLst>
           </p:cNvPr>
@@ -408,7 +385,7 @@
           <p:cNvPr id="4" name="Date Placeholder 3">
             <a:extLst>
               <a:ext uri="{FF2B5EF4-FFF2-40B4-BE49-F238E27FC236}">
-                <a16:creationId xmlns:a16="http://schemas.microsoft.com/office/drawing/2014/main" xmlns="" id="{DE8B427A-86E4-4A98-8705-840C64396E8A}"/>
+                <a16:creationId xmlns:a16="http://schemas.microsoft.com/office/drawing/2014/main" id="{DE8B427A-86E4-4A98-8705-840C64396E8A}"/>
               </a:ext>
             </a:extLst>
           </p:cNvPr>
@@ -437,7 +414,7 @@
           <p:cNvPr id="5" name="Footer Placeholder 4">
             <a:extLst>
               <a:ext uri="{FF2B5EF4-FFF2-40B4-BE49-F238E27FC236}">
-                <a16:creationId xmlns:a16="http://schemas.microsoft.com/office/drawing/2014/main" xmlns="" id="{FBE5A878-C29A-41C5-9320-4E1020FB8FE7}"/>
+                <a16:creationId xmlns:a16="http://schemas.microsoft.com/office/drawing/2014/main" id="{FBE5A878-C29A-41C5-9320-4E1020FB8FE7}"/>
               </a:ext>
             </a:extLst>
           </p:cNvPr>
@@ -462,7 +439,7 @@
           <p:cNvPr id="6" name="Slide Number Placeholder 5">
             <a:extLst>
               <a:ext uri="{FF2B5EF4-FFF2-40B4-BE49-F238E27FC236}">
-                <a16:creationId xmlns:a16="http://schemas.microsoft.com/office/drawing/2014/main" xmlns="" id="{063B40FB-29EE-4C47-8132-CFF9C0F3C3E8}"/>
+                <a16:creationId xmlns:a16="http://schemas.microsoft.com/office/drawing/2014/main" id="{063B40FB-29EE-4C47-8132-CFF9C0F3C3E8}"/>
               </a:ext>
             </a:extLst>
           </p:cNvPr>
@@ -521,7 +498,7 @@
           <p:cNvPr id="2" name="Title 1">
             <a:extLst>
               <a:ext uri="{FF2B5EF4-FFF2-40B4-BE49-F238E27FC236}">
-                <a16:creationId xmlns:a16="http://schemas.microsoft.com/office/drawing/2014/main" xmlns="" id="{62FE7D1D-CD84-4162-918B-FAC0C718E2F8}"/>
+                <a16:creationId xmlns:a16="http://schemas.microsoft.com/office/drawing/2014/main" id="{62FE7D1D-CD84-4162-918B-FAC0C718E2F8}"/>
               </a:ext>
             </a:extLst>
           </p:cNvPr>
@@ -549,7 +526,7 @@
           <p:cNvPr id="3" name="Vertical Text Placeholder 2">
             <a:extLst>
               <a:ext uri="{FF2B5EF4-FFF2-40B4-BE49-F238E27FC236}">
-                <a16:creationId xmlns:a16="http://schemas.microsoft.com/office/drawing/2014/main" xmlns="" id="{70073AE0-0E1C-41DA-9F6C-335D1C4343D0}"/>
+                <a16:creationId xmlns:a16="http://schemas.microsoft.com/office/drawing/2014/main" id="{70073AE0-0E1C-41DA-9F6C-335D1C4343D0}"/>
               </a:ext>
             </a:extLst>
           </p:cNvPr>
@@ -606,7 +583,7 @@
           <p:cNvPr id="4" name="Date Placeholder 3">
             <a:extLst>
               <a:ext uri="{FF2B5EF4-FFF2-40B4-BE49-F238E27FC236}">
-                <a16:creationId xmlns:a16="http://schemas.microsoft.com/office/drawing/2014/main" xmlns="" id="{64DD606A-0EED-4C63-A37E-917131BA4D42}"/>
+                <a16:creationId xmlns:a16="http://schemas.microsoft.com/office/drawing/2014/main" id="{64DD606A-0EED-4C63-A37E-917131BA4D42}"/>
               </a:ext>
             </a:extLst>
           </p:cNvPr>
@@ -635,7 +612,7 @@
           <p:cNvPr id="5" name="Footer Placeholder 4">
             <a:extLst>
               <a:ext uri="{FF2B5EF4-FFF2-40B4-BE49-F238E27FC236}">
-                <a16:creationId xmlns:a16="http://schemas.microsoft.com/office/drawing/2014/main" xmlns="" id="{F87991EB-4BFA-4A7B-86E9-DF64A8C848CF}"/>
+                <a16:creationId xmlns:a16="http://schemas.microsoft.com/office/drawing/2014/main" id="{F87991EB-4BFA-4A7B-86E9-DF64A8C848CF}"/>
               </a:ext>
             </a:extLst>
           </p:cNvPr>
@@ -660,7 +637,7 @@
           <p:cNvPr id="6" name="Slide Number Placeholder 5">
             <a:extLst>
               <a:ext uri="{FF2B5EF4-FFF2-40B4-BE49-F238E27FC236}">
-                <a16:creationId xmlns:a16="http://schemas.microsoft.com/office/drawing/2014/main" xmlns="" id="{576B7152-5A02-47AD-8E30-72E6285715FF}"/>
+                <a16:creationId xmlns:a16="http://schemas.microsoft.com/office/drawing/2014/main" id="{576B7152-5A02-47AD-8E30-72E6285715FF}"/>
               </a:ext>
             </a:extLst>
           </p:cNvPr>
@@ -719,7 +696,7 @@
           <p:cNvPr id="2" name="Vertical Title 1">
             <a:extLst>
               <a:ext uri="{FF2B5EF4-FFF2-40B4-BE49-F238E27FC236}">
-                <a16:creationId xmlns:a16="http://schemas.microsoft.com/office/drawing/2014/main" xmlns="" id="{521773DF-9141-4E04-85F2-A272311EAEA5}"/>
+                <a16:creationId xmlns:a16="http://schemas.microsoft.com/office/drawing/2014/main" id="{521773DF-9141-4E04-85F2-A272311EAEA5}"/>
               </a:ext>
             </a:extLst>
           </p:cNvPr>
@@ -752,7 +729,7 @@
           <p:cNvPr id="3" name="Vertical Text Placeholder 2">
             <a:extLst>
               <a:ext uri="{FF2B5EF4-FFF2-40B4-BE49-F238E27FC236}">
-                <a16:creationId xmlns:a16="http://schemas.microsoft.com/office/drawing/2014/main" xmlns="" id="{1D4A4CEA-9243-456B-8089-0E7C50DFD737}"/>
+                <a16:creationId xmlns:a16="http://schemas.microsoft.com/office/drawing/2014/main" id="{1D4A4CEA-9243-456B-8089-0E7C50DFD737}"/>
               </a:ext>
             </a:extLst>
           </p:cNvPr>
@@ -814,7 +791,7 @@
           <p:cNvPr id="4" name="Date Placeholder 3">
             <a:extLst>
               <a:ext uri="{FF2B5EF4-FFF2-40B4-BE49-F238E27FC236}">
-                <a16:creationId xmlns:a16="http://schemas.microsoft.com/office/drawing/2014/main" xmlns="" id="{1C727C38-F536-40DC-8B3E-E04ECE9E4676}"/>
+                <a16:creationId xmlns:a16="http://schemas.microsoft.com/office/drawing/2014/main" id="{1C727C38-F536-40DC-8B3E-E04ECE9E4676}"/>
               </a:ext>
             </a:extLst>
           </p:cNvPr>
@@ -843,7 +820,7 @@
           <p:cNvPr id="5" name="Footer Placeholder 4">
             <a:extLst>
               <a:ext uri="{FF2B5EF4-FFF2-40B4-BE49-F238E27FC236}">
-                <a16:creationId xmlns:a16="http://schemas.microsoft.com/office/drawing/2014/main" xmlns="" id="{2A9E49DA-8B57-4556-B5F7-8CAAB37804AB}"/>
+                <a16:creationId xmlns:a16="http://schemas.microsoft.com/office/drawing/2014/main" id="{2A9E49DA-8B57-4556-B5F7-8CAAB37804AB}"/>
               </a:ext>
             </a:extLst>
           </p:cNvPr>
@@ -868,7 +845,7 @@
           <p:cNvPr id="6" name="Slide Number Placeholder 5">
             <a:extLst>
               <a:ext uri="{FF2B5EF4-FFF2-40B4-BE49-F238E27FC236}">
-                <a16:creationId xmlns:a16="http://schemas.microsoft.com/office/drawing/2014/main" xmlns="" id="{6B13E5BC-C5FE-470D-BD1D-CDC5D518D643}"/>
+                <a16:creationId xmlns:a16="http://schemas.microsoft.com/office/drawing/2014/main" id="{6B13E5BC-C5FE-470D-BD1D-CDC5D518D643}"/>
               </a:ext>
             </a:extLst>
           </p:cNvPr>
@@ -927,7 +904,7 @@
           <p:cNvPr id="2" name="Title 1">
             <a:extLst>
               <a:ext uri="{FF2B5EF4-FFF2-40B4-BE49-F238E27FC236}">
-                <a16:creationId xmlns:a16="http://schemas.microsoft.com/office/drawing/2014/main" xmlns="" id="{2810C811-37E4-47DC-9EDC-10C408BB8F96}"/>
+                <a16:creationId xmlns:a16="http://schemas.microsoft.com/office/drawing/2014/main" id="{2810C811-37E4-47DC-9EDC-10C408BB8F96}"/>
               </a:ext>
             </a:extLst>
           </p:cNvPr>
@@ -955,7 +932,7 @@
           <p:cNvPr id="3" name="Content Placeholder 2">
             <a:extLst>
               <a:ext uri="{FF2B5EF4-FFF2-40B4-BE49-F238E27FC236}">
-                <a16:creationId xmlns:a16="http://schemas.microsoft.com/office/drawing/2014/main" xmlns="" id="{5349F720-B4DA-483A-B119-D2731EA1E188}"/>
+                <a16:creationId xmlns:a16="http://schemas.microsoft.com/office/drawing/2014/main" id="{5349F720-B4DA-483A-B119-D2731EA1E188}"/>
               </a:ext>
             </a:extLst>
           </p:cNvPr>
@@ -1012,7 +989,7 @@
           <p:cNvPr id="4" name="Date Placeholder 3">
             <a:extLst>
               <a:ext uri="{FF2B5EF4-FFF2-40B4-BE49-F238E27FC236}">
-                <a16:creationId xmlns:a16="http://schemas.microsoft.com/office/drawing/2014/main" xmlns="" id="{B37E8B1B-2A03-4AEA-8EE3-CFC3FE6D30ED}"/>
+                <a16:creationId xmlns:a16="http://schemas.microsoft.com/office/drawing/2014/main" id="{B37E8B1B-2A03-4AEA-8EE3-CFC3FE6D30ED}"/>
               </a:ext>
             </a:extLst>
           </p:cNvPr>
@@ -1041,7 +1018,7 @@
           <p:cNvPr id="5" name="Footer Placeholder 4">
             <a:extLst>
               <a:ext uri="{FF2B5EF4-FFF2-40B4-BE49-F238E27FC236}">
-                <a16:creationId xmlns:a16="http://schemas.microsoft.com/office/drawing/2014/main" xmlns="" id="{90E70C86-ECC5-4784-B9D5-29C6EAEDE8F4}"/>
+                <a16:creationId xmlns:a16="http://schemas.microsoft.com/office/drawing/2014/main" id="{90E70C86-ECC5-4784-B9D5-29C6EAEDE8F4}"/>
               </a:ext>
             </a:extLst>
           </p:cNvPr>
@@ -1066,7 +1043,7 @@
           <p:cNvPr id="6" name="Slide Number Placeholder 5">
             <a:extLst>
               <a:ext uri="{FF2B5EF4-FFF2-40B4-BE49-F238E27FC236}">
-                <a16:creationId xmlns:a16="http://schemas.microsoft.com/office/drawing/2014/main" xmlns="" id="{2B7A94FF-BDE1-449A-A890-731A111B3194}"/>
+                <a16:creationId xmlns:a16="http://schemas.microsoft.com/office/drawing/2014/main" id="{2B7A94FF-BDE1-449A-A890-731A111B3194}"/>
               </a:ext>
             </a:extLst>
           </p:cNvPr>
@@ -1125,7 +1102,7 @@
           <p:cNvPr id="2" name="Title 1">
             <a:extLst>
               <a:ext uri="{FF2B5EF4-FFF2-40B4-BE49-F238E27FC236}">
-                <a16:creationId xmlns:a16="http://schemas.microsoft.com/office/drawing/2014/main" xmlns="" id="{C39D395F-6E0E-4E37-A13B-BBF0F27C6974}"/>
+                <a16:creationId xmlns:a16="http://schemas.microsoft.com/office/drawing/2014/main" id="{C39D395F-6E0E-4E37-A13B-BBF0F27C6974}"/>
               </a:ext>
             </a:extLst>
           </p:cNvPr>
@@ -1162,7 +1139,7 @@
           <p:cNvPr id="3" name="Text Placeholder 2">
             <a:extLst>
               <a:ext uri="{FF2B5EF4-FFF2-40B4-BE49-F238E27FC236}">
-                <a16:creationId xmlns:a16="http://schemas.microsoft.com/office/drawing/2014/main" xmlns="" id="{5DFB2D5A-4DF8-48C0-B9C0-2366DDA4817E}"/>
+                <a16:creationId xmlns:a16="http://schemas.microsoft.com/office/drawing/2014/main" id="{5DFB2D5A-4DF8-48C0-B9C0-2366DDA4817E}"/>
               </a:ext>
             </a:extLst>
           </p:cNvPr>
@@ -1287,7 +1264,7 @@
           <p:cNvPr id="4" name="Date Placeholder 3">
             <a:extLst>
               <a:ext uri="{FF2B5EF4-FFF2-40B4-BE49-F238E27FC236}">
-                <a16:creationId xmlns:a16="http://schemas.microsoft.com/office/drawing/2014/main" xmlns="" id="{9635F9B5-76E7-4D6A-8E6A-43D4A4ABAFDD}"/>
+                <a16:creationId xmlns:a16="http://schemas.microsoft.com/office/drawing/2014/main" id="{9635F9B5-76E7-4D6A-8E6A-43D4A4ABAFDD}"/>
               </a:ext>
             </a:extLst>
           </p:cNvPr>
@@ -1316,7 +1293,7 @@
           <p:cNvPr id="5" name="Footer Placeholder 4">
             <a:extLst>
               <a:ext uri="{FF2B5EF4-FFF2-40B4-BE49-F238E27FC236}">
-                <a16:creationId xmlns:a16="http://schemas.microsoft.com/office/drawing/2014/main" xmlns="" id="{B9DD2247-C97B-4DFA-B0F6-4263E45BCA30}"/>
+                <a16:creationId xmlns:a16="http://schemas.microsoft.com/office/drawing/2014/main" id="{B9DD2247-C97B-4DFA-B0F6-4263E45BCA30}"/>
               </a:ext>
             </a:extLst>
           </p:cNvPr>
@@ -1341,7 +1318,7 @@
           <p:cNvPr id="6" name="Slide Number Placeholder 5">
             <a:extLst>
               <a:ext uri="{FF2B5EF4-FFF2-40B4-BE49-F238E27FC236}">
-                <a16:creationId xmlns:a16="http://schemas.microsoft.com/office/drawing/2014/main" xmlns="" id="{4D804E18-3D01-4711-B76C-DC2DA8D59C9A}"/>
+                <a16:creationId xmlns:a16="http://schemas.microsoft.com/office/drawing/2014/main" id="{4D804E18-3D01-4711-B76C-DC2DA8D59C9A}"/>
               </a:ext>
             </a:extLst>
           </p:cNvPr>
@@ -1400,7 +1377,7 @@
           <p:cNvPr id="2" name="Title 1">
             <a:extLst>
               <a:ext uri="{FF2B5EF4-FFF2-40B4-BE49-F238E27FC236}">
-                <a16:creationId xmlns:a16="http://schemas.microsoft.com/office/drawing/2014/main" xmlns="" id="{46A82387-E25D-49B3-A0BB-B677DF1E02E6}"/>
+                <a16:creationId xmlns:a16="http://schemas.microsoft.com/office/drawing/2014/main" id="{46A82387-E25D-49B3-A0BB-B677DF1E02E6}"/>
               </a:ext>
             </a:extLst>
           </p:cNvPr>
@@ -1428,7 +1405,7 @@
           <p:cNvPr id="3" name="Content Placeholder 2">
             <a:extLst>
               <a:ext uri="{FF2B5EF4-FFF2-40B4-BE49-F238E27FC236}">
-                <a16:creationId xmlns:a16="http://schemas.microsoft.com/office/drawing/2014/main" xmlns="" id="{652009B8-9FD7-4E15-BF02-59301433F0F8}"/>
+                <a16:creationId xmlns:a16="http://schemas.microsoft.com/office/drawing/2014/main" id="{652009B8-9FD7-4E15-BF02-59301433F0F8}"/>
               </a:ext>
             </a:extLst>
           </p:cNvPr>
@@ -1490,7 +1467,7 @@
           <p:cNvPr id="4" name="Content Placeholder 3">
             <a:extLst>
               <a:ext uri="{FF2B5EF4-FFF2-40B4-BE49-F238E27FC236}">
-                <a16:creationId xmlns:a16="http://schemas.microsoft.com/office/drawing/2014/main" xmlns="" id="{4ACF3570-33C6-4E10-988A-BD11B0BDF96A}"/>
+                <a16:creationId xmlns:a16="http://schemas.microsoft.com/office/drawing/2014/main" id="{4ACF3570-33C6-4E10-988A-BD11B0BDF96A}"/>
               </a:ext>
             </a:extLst>
           </p:cNvPr>
@@ -1552,7 +1529,7 @@
           <p:cNvPr id="5" name="Date Placeholder 4">
             <a:extLst>
               <a:ext uri="{FF2B5EF4-FFF2-40B4-BE49-F238E27FC236}">
-                <a16:creationId xmlns:a16="http://schemas.microsoft.com/office/drawing/2014/main" xmlns="" id="{44FE14E5-203D-4AEB-BBD4-777191AB4C7E}"/>
+                <a16:creationId xmlns:a16="http://schemas.microsoft.com/office/drawing/2014/main" id="{44FE14E5-203D-4AEB-BBD4-777191AB4C7E}"/>
               </a:ext>
             </a:extLst>
           </p:cNvPr>
@@ -1581,7 +1558,7 @@
           <p:cNvPr id="6" name="Footer Placeholder 5">
             <a:extLst>
               <a:ext uri="{FF2B5EF4-FFF2-40B4-BE49-F238E27FC236}">
-                <a16:creationId xmlns:a16="http://schemas.microsoft.com/office/drawing/2014/main" xmlns="" id="{453E0A67-887B-4397-9449-47F763A44A5A}"/>
+                <a16:creationId xmlns:a16="http://schemas.microsoft.com/office/drawing/2014/main" id="{453E0A67-887B-4397-9449-47F763A44A5A}"/>
               </a:ext>
             </a:extLst>
           </p:cNvPr>
@@ -1606,7 +1583,7 @@
           <p:cNvPr id="7" name="Slide Number Placeholder 6">
             <a:extLst>
               <a:ext uri="{FF2B5EF4-FFF2-40B4-BE49-F238E27FC236}">
-                <a16:creationId xmlns:a16="http://schemas.microsoft.com/office/drawing/2014/main" xmlns="" id="{7741BFB4-A257-41C4-A0AF-EBD41AA6BEF3}"/>
+                <a16:creationId xmlns:a16="http://schemas.microsoft.com/office/drawing/2014/main" id="{7741BFB4-A257-41C4-A0AF-EBD41AA6BEF3}"/>
               </a:ext>
             </a:extLst>
           </p:cNvPr>
@@ -1665,7 +1642,7 @@
           <p:cNvPr id="2" name="Title 1">
             <a:extLst>
               <a:ext uri="{FF2B5EF4-FFF2-40B4-BE49-F238E27FC236}">
-                <a16:creationId xmlns:a16="http://schemas.microsoft.com/office/drawing/2014/main" xmlns="" id="{EC5E4052-1871-48F4-88FC-9DD38C78C35A}"/>
+                <a16:creationId xmlns:a16="http://schemas.microsoft.com/office/drawing/2014/main" id="{EC5E4052-1871-48F4-88FC-9DD38C78C35A}"/>
               </a:ext>
             </a:extLst>
           </p:cNvPr>
@@ -1698,7 +1675,7 @@
           <p:cNvPr id="3" name="Text Placeholder 2">
             <a:extLst>
               <a:ext uri="{FF2B5EF4-FFF2-40B4-BE49-F238E27FC236}">
-                <a16:creationId xmlns:a16="http://schemas.microsoft.com/office/drawing/2014/main" xmlns="" id="{09E675D1-6BAE-4D3F-B4BB-A8D7749E9A77}"/>
+                <a16:creationId xmlns:a16="http://schemas.microsoft.com/office/drawing/2014/main" id="{09E675D1-6BAE-4D3F-B4BB-A8D7749E9A77}"/>
               </a:ext>
             </a:extLst>
           </p:cNvPr>
@@ -1769,7 +1746,7 @@
           <p:cNvPr id="4" name="Content Placeholder 3">
             <a:extLst>
               <a:ext uri="{FF2B5EF4-FFF2-40B4-BE49-F238E27FC236}">
-                <a16:creationId xmlns:a16="http://schemas.microsoft.com/office/drawing/2014/main" xmlns="" id="{A3A25EDC-E7DC-4093-A101-53C4140B8EC9}"/>
+                <a16:creationId xmlns:a16="http://schemas.microsoft.com/office/drawing/2014/main" id="{A3A25EDC-E7DC-4093-A101-53C4140B8EC9}"/>
               </a:ext>
             </a:extLst>
           </p:cNvPr>
@@ -1831,7 +1808,7 @@
           <p:cNvPr id="5" name="Text Placeholder 4">
             <a:extLst>
               <a:ext uri="{FF2B5EF4-FFF2-40B4-BE49-F238E27FC236}">
-                <a16:creationId xmlns:a16="http://schemas.microsoft.com/office/drawing/2014/main" xmlns="" id="{E63163FF-9FAB-46A2-A5BE-643E5D352D01}"/>
+                <a16:creationId xmlns:a16="http://schemas.microsoft.com/office/drawing/2014/main" id="{E63163FF-9FAB-46A2-A5BE-643E5D352D01}"/>
               </a:ext>
             </a:extLst>
           </p:cNvPr>
@@ -1902,7 +1879,7 @@
           <p:cNvPr id="6" name="Content Placeholder 5">
             <a:extLst>
               <a:ext uri="{FF2B5EF4-FFF2-40B4-BE49-F238E27FC236}">
-                <a16:creationId xmlns:a16="http://schemas.microsoft.com/office/drawing/2014/main" xmlns="" id="{C00606A8-282F-4CC0-9014-FE74E524910F}"/>
+                <a16:creationId xmlns:a16="http://schemas.microsoft.com/office/drawing/2014/main" id="{C00606A8-282F-4CC0-9014-FE74E524910F}"/>
               </a:ext>
             </a:extLst>
           </p:cNvPr>
@@ -1964,7 +1941,7 @@
           <p:cNvPr id="7" name="Date Placeholder 6">
             <a:extLst>
               <a:ext uri="{FF2B5EF4-FFF2-40B4-BE49-F238E27FC236}">
-                <a16:creationId xmlns:a16="http://schemas.microsoft.com/office/drawing/2014/main" xmlns="" id="{39A0A262-F4B9-46E5-AC3B-92FEC0A9B4B7}"/>
+                <a16:creationId xmlns:a16="http://schemas.microsoft.com/office/drawing/2014/main" id="{39A0A262-F4B9-46E5-AC3B-92FEC0A9B4B7}"/>
               </a:ext>
             </a:extLst>
           </p:cNvPr>
@@ -1993,7 +1970,7 @@
           <p:cNvPr id="8" name="Footer Placeholder 7">
             <a:extLst>
               <a:ext uri="{FF2B5EF4-FFF2-40B4-BE49-F238E27FC236}">
-                <a16:creationId xmlns:a16="http://schemas.microsoft.com/office/drawing/2014/main" xmlns="" id="{435018FF-C15E-43DB-9A59-FDBE56BF2D55}"/>
+                <a16:creationId xmlns:a16="http://schemas.microsoft.com/office/drawing/2014/main" id="{435018FF-C15E-43DB-9A59-FDBE56BF2D55}"/>
               </a:ext>
             </a:extLst>
           </p:cNvPr>
@@ -2018,7 +1995,7 @@
           <p:cNvPr id="9" name="Slide Number Placeholder 8">
             <a:extLst>
               <a:ext uri="{FF2B5EF4-FFF2-40B4-BE49-F238E27FC236}">
-                <a16:creationId xmlns:a16="http://schemas.microsoft.com/office/drawing/2014/main" xmlns="" id="{971B4EF0-2D2A-4B0F-8C6F-5D253BC1E3DB}"/>
+                <a16:creationId xmlns:a16="http://schemas.microsoft.com/office/drawing/2014/main" id="{971B4EF0-2D2A-4B0F-8C6F-5D253BC1E3DB}"/>
               </a:ext>
             </a:extLst>
           </p:cNvPr>
@@ -2077,7 +2054,7 @@
           <p:cNvPr id="2" name="Title 1">
             <a:extLst>
               <a:ext uri="{FF2B5EF4-FFF2-40B4-BE49-F238E27FC236}">
-                <a16:creationId xmlns:a16="http://schemas.microsoft.com/office/drawing/2014/main" xmlns="" id="{B884BB06-3EE7-44B5-8E74-4FBC81AC2D61}"/>
+                <a16:creationId xmlns:a16="http://schemas.microsoft.com/office/drawing/2014/main" id="{B884BB06-3EE7-44B5-8E74-4FBC81AC2D61}"/>
               </a:ext>
             </a:extLst>
           </p:cNvPr>
@@ -2105,7 +2082,7 @@
           <p:cNvPr id="3" name="Date Placeholder 2">
             <a:extLst>
               <a:ext uri="{FF2B5EF4-FFF2-40B4-BE49-F238E27FC236}">
-                <a16:creationId xmlns:a16="http://schemas.microsoft.com/office/drawing/2014/main" xmlns="" id="{87D6008D-DF81-475F-9BEE-C6060A95C75C}"/>
+                <a16:creationId xmlns:a16="http://schemas.microsoft.com/office/drawing/2014/main" id="{87D6008D-DF81-475F-9BEE-C6060A95C75C}"/>
               </a:ext>
             </a:extLst>
           </p:cNvPr>
@@ -2134,7 +2111,7 @@
           <p:cNvPr id="4" name="Footer Placeholder 3">
             <a:extLst>
               <a:ext uri="{FF2B5EF4-FFF2-40B4-BE49-F238E27FC236}">
-                <a16:creationId xmlns:a16="http://schemas.microsoft.com/office/drawing/2014/main" xmlns="" id="{1F121838-DC41-4835-B2DC-EBC4807A84B7}"/>
+                <a16:creationId xmlns:a16="http://schemas.microsoft.com/office/drawing/2014/main" id="{1F121838-DC41-4835-B2DC-EBC4807A84B7}"/>
               </a:ext>
             </a:extLst>
           </p:cNvPr>
@@ -2159,7 +2136,7 @@
           <p:cNvPr id="5" name="Slide Number Placeholder 4">
             <a:extLst>
               <a:ext uri="{FF2B5EF4-FFF2-40B4-BE49-F238E27FC236}">
-                <a16:creationId xmlns:a16="http://schemas.microsoft.com/office/drawing/2014/main" xmlns="" id="{A7B93D33-D202-4925-871A-2632259264C8}"/>
+                <a16:creationId xmlns:a16="http://schemas.microsoft.com/office/drawing/2014/main" id="{A7B93D33-D202-4925-871A-2632259264C8}"/>
               </a:ext>
             </a:extLst>
           </p:cNvPr>
@@ -2218,7 +2195,7 @@
           <p:cNvPr id="2" name="Date Placeholder 1">
             <a:extLst>
               <a:ext uri="{FF2B5EF4-FFF2-40B4-BE49-F238E27FC236}">
-                <a16:creationId xmlns:a16="http://schemas.microsoft.com/office/drawing/2014/main" xmlns="" id="{15127FB3-3608-406C-ADA5-7D5AF3E22B4B}"/>
+                <a16:creationId xmlns:a16="http://schemas.microsoft.com/office/drawing/2014/main" id="{15127FB3-3608-406C-ADA5-7D5AF3E22B4B}"/>
               </a:ext>
             </a:extLst>
           </p:cNvPr>
@@ -2247,7 +2224,7 @@
           <p:cNvPr id="3" name="Footer Placeholder 2">
             <a:extLst>
               <a:ext uri="{FF2B5EF4-FFF2-40B4-BE49-F238E27FC236}">
-                <a16:creationId xmlns:a16="http://schemas.microsoft.com/office/drawing/2014/main" xmlns="" id="{05A6DEF6-20A4-47B5-A4E7-7B6769899115}"/>
+                <a16:creationId xmlns:a16="http://schemas.microsoft.com/office/drawing/2014/main" id="{05A6DEF6-20A4-47B5-A4E7-7B6769899115}"/>
               </a:ext>
             </a:extLst>
           </p:cNvPr>
@@ -2272,7 +2249,7 @@
           <p:cNvPr id="4" name="Slide Number Placeholder 3">
             <a:extLst>
               <a:ext uri="{FF2B5EF4-FFF2-40B4-BE49-F238E27FC236}">
-                <a16:creationId xmlns:a16="http://schemas.microsoft.com/office/drawing/2014/main" xmlns="" id="{A5BBC24C-3A01-4860-8727-E143AD4F57A8}"/>
+                <a16:creationId xmlns:a16="http://schemas.microsoft.com/office/drawing/2014/main" id="{A5BBC24C-3A01-4860-8727-E143AD4F57A8}"/>
               </a:ext>
             </a:extLst>
           </p:cNvPr>
@@ -2331,7 +2308,7 @@
           <p:cNvPr id="2" name="Title 1">
             <a:extLst>
               <a:ext uri="{FF2B5EF4-FFF2-40B4-BE49-F238E27FC236}">
-                <a16:creationId xmlns:a16="http://schemas.microsoft.com/office/drawing/2014/main" xmlns="" id="{3F7F76A6-A3A4-40B7-B615-94C6B6D93D55}"/>
+                <a16:creationId xmlns:a16="http://schemas.microsoft.com/office/drawing/2014/main" id="{3F7F76A6-A3A4-40B7-B615-94C6B6D93D55}"/>
               </a:ext>
             </a:extLst>
           </p:cNvPr>
@@ -2368,7 +2345,7 @@
           <p:cNvPr id="3" name="Content Placeholder 2">
             <a:extLst>
               <a:ext uri="{FF2B5EF4-FFF2-40B4-BE49-F238E27FC236}">
-                <a16:creationId xmlns:a16="http://schemas.microsoft.com/office/drawing/2014/main" xmlns="" id="{EA5391E4-069B-4935-AE1B-4A2DFDAA25D2}"/>
+                <a16:creationId xmlns:a16="http://schemas.microsoft.com/office/drawing/2014/main" id="{EA5391E4-069B-4935-AE1B-4A2DFDAA25D2}"/>
               </a:ext>
             </a:extLst>
           </p:cNvPr>
@@ -2458,7 +2435,7 @@
           <p:cNvPr id="4" name="Text Placeholder 3">
             <a:extLst>
               <a:ext uri="{FF2B5EF4-FFF2-40B4-BE49-F238E27FC236}">
-                <a16:creationId xmlns:a16="http://schemas.microsoft.com/office/drawing/2014/main" xmlns="" id="{D082484A-A7B8-492D-AF70-976C8F15462F}"/>
+                <a16:creationId xmlns:a16="http://schemas.microsoft.com/office/drawing/2014/main" id="{D082484A-A7B8-492D-AF70-976C8F15462F}"/>
               </a:ext>
             </a:extLst>
           </p:cNvPr>
@@ -2529,7 +2506,7 @@
           <p:cNvPr id="5" name="Date Placeholder 4">
             <a:extLst>
               <a:ext uri="{FF2B5EF4-FFF2-40B4-BE49-F238E27FC236}">
-                <a16:creationId xmlns:a16="http://schemas.microsoft.com/office/drawing/2014/main" xmlns="" id="{6D23E5CE-DA5B-4DFC-BADD-842D292122D5}"/>
+                <a16:creationId xmlns:a16="http://schemas.microsoft.com/office/drawing/2014/main" id="{6D23E5CE-DA5B-4DFC-BADD-842D292122D5}"/>
               </a:ext>
             </a:extLst>
           </p:cNvPr>
@@ -2558,7 +2535,7 @@
           <p:cNvPr id="6" name="Footer Placeholder 5">
             <a:extLst>
               <a:ext uri="{FF2B5EF4-FFF2-40B4-BE49-F238E27FC236}">
-                <a16:creationId xmlns:a16="http://schemas.microsoft.com/office/drawing/2014/main" xmlns="" id="{4ACC3EB7-B340-4AF4-970D-829429BB5D37}"/>
+                <a16:creationId xmlns:a16="http://schemas.microsoft.com/office/drawing/2014/main" id="{4ACC3EB7-B340-4AF4-970D-829429BB5D37}"/>
               </a:ext>
             </a:extLst>
           </p:cNvPr>
@@ -2583,7 +2560,7 @@
           <p:cNvPr id="7" name="Slide Number Placeholder 6">
             <a:extLst>
               <a:ext uri="{FF2B5EF4-FFF2-40B4-BE49-F238E27FC236}">
-                <a16:creationId xmlns:a16="http://schemas.microsoft.com/office/drawing/2014/main" xmlns="" id="{DD4E94A0-96D0-48A8-BADA-7C1E21FDE566}"/>
+                <a16:creationId xmlns:a16="http://schemas.microsoft.com/office/drawing/2014/main" id="{DD4E94A0-96D0-48A8-BADA-7C1E21FDE566}"/>
               </a:ext>
             </a:extLst>
           </p:cNvPr>
@@ -2642,7 +2619,7 @@
           <p:cNvPr id="2" name="Title 1">
             <a:extLst>
               <a:ext uri="{FF2B5EF4-FFF2-40B4-BE49-F238E27FC236}">
-                <a16:creationId xmlns:a16="http://schemas.microsoft.com/office/drawing/2014/main" xmlns="" id="{31008755-3E94-4E32-9FB6-56E5CD146CE2}"/>
+                <a16:creationId xmlns:a16="http://schemas.microsoft.com/office/drawing/2014/main" id="{31008755-3E94-4E32-9FB6-56E5CD146CE2}"/>
               </a:ext>
             </a:extLst>
           </p:cNvPr>
@@ -2679,7 +2656,7 @@
           <p:cNvPr id="3" name="Picture Placeholder 2">
             <a:extLst>
               <a:ext uri="{FF2B5EF4-FFF2-40B4-BE49-F238E27FC236}">
-                <a16:creationId xmlns:a16="http://schemas.microsoft.com/office/drawing/2014/main" xmlns="" id="{C87F6ABB-F838-4C1C-990D-4BA44D1E7D61}"/>
+                <a16:creationId xmlns:a16="http://schemas.microsoft.com/office/drawing/2014/main" id="{C87F6ABB-F838-4C1C-990D-4BA44D1E7D61}"/>
               </a:ext>
             </a:extLst>
           </p:cNvPr>
@@ -2746,7 +2723,7 @@
           <p:cNvPr id="4" name="Text Placeholder 3">
             <a:extLst>
               <a:ext uri="{FF2B5EF4-FFF2-40B4-BE49-F238E27FC236}">
-                <a16:creationId xmlns:a16="http://schemas.microsoft.com/office/drawing/2014/main" xmlns="" id="{C69A499D-333B-48B3-BD22-4AC53CF2BDBA}"/>
+                <a16:creationId xmlns:a16="http://schemas.microsoft.com/office/drawing/2014/main" id="{C69A499D-333B-48B3-BD22-4AC53CF2BDBA}"/>
               </a:ext>
             </a:extLst>
           </p:cNvPr>
@@ -2817,7 +2794,7 @@
           <p:cNvPr id="5" name="Date Placeholder 4">
             <a:extLst>
               <a:ext uri="{FF2B5EF4-FFF2-40B4-BE49-F238E27FC236}">
-                <a16:creationId xmlns:a16="http://schemas.microsoft.com/office/drawing/2014/main" xmlns="" id="{0599CA9A-023C-4978-BAC5-DED00483021B}"/>
+                <a16:creationId xmlns:a16="http://schemas.microsoft.com/office/drawing/2014/main" id="{0599CA9A-023C-4978-BAC5-DED00483021B}"/>
               </a:ext>
             </a:extLst>
           </p:cNvPr>
@@ -2846,7 +2823,7 @@
           <p:cNvPr id="6" name="Footer Placeholder 5">
             <a:extLst>
               <a:ext uri="{FF2B5EF4-FFF2-40B4-BE49-F238E27FC236}">
-                <a16:creationId xmlns:a16="http://schemas.microsoft.com/office/drawing/2014/main" xmlns="" id="{26DCDC1D-35EB-4E09-A15A-3AA6DD9B2807}"/>
+                <a16:creationId xmlns:a16="http://schemas.microsoft.com/office/drawing/2014/main" id="{26DCDC1D-35EB-4E09-A15A-3AA6DD9B2807}"/>
               </a:ext>
             </a:extLst>
           </p:cNvPr>
@@ -2871,7 +2848,7 @@
           <p:cNvPr id="7" name="Slide Number Placeholder 6">
             <a:extLst>
               <a:ext uri="{FF2B5EF4-FFF2-40B4-BE49-F238E27FC236}">
-                <a16:creationId xmlns:a16="http://schemas.microsoft.com/office/drawing/2014/main" xmlns="" id="{DC616D05-EC2A-48A7-9932-7D888E771911}"/>
+                <a16:creationId xmlns:a16="http://schemas.microsoft.com/office/drawing/2014/main" id="{DC616D05-EC2A-48A7-9932-7D888E771911}"/>
               </a:ext>
             </a:extLst>
           </p:cNvPr>
@@ -2935,7 +2912,7 @@
           <p:cNvPr id="2" name="Title Placeholder 1">
             <a:extLst>
               <a:ext uri="{FF2B5EF4-FFF2-40B4-BE49-F238E27FC236}">
-                <a16:creationId xmlns:a16="http://schemas.microsoft.com/office/drawing/2014/main" xmlns="" id="{982F4BDC-07BB-49CD-9A98-D7311782EEAC}"/>
+                <a16:creationId xmlns:a16="http://schemas.microsoft.com/office/drawing/2014/main" id="{982F4BDC-07BB-49CD-9A98-D7311782EEAC}"/>
               </a:ext>
             </a:extLst>
           </p:cNvPr>
@@ -2973,7 +2950,7 @@
           <p:cNvPr id="3" name="Text Placeholder 2">
             <a:extLst>
               <a:ext uri="{FF2B5EF4-FFF2-40B4-BE49-F238E27FC236}">
-                <a16:creationId xmlns:a16="http://schemas.microsoft.com/office/drawing/2014/main" xmlns="" id="{C2AA1F42-42C9-43C3-96C0-4152A9E72766}"/>
+                <a16:creationId xmlns:a16="http://schemas.microsoft.com/office/drawing/2014/main" id="{C2AA1F42-42C9-43C3-96C0-4152A9E72766}"/>
               </a:ext>
             </a:extLst>
           </p:cNvPr>
@@ -3040,7 +3017,7 @@
           <p:cNvPr id="4" name="Date Placeholder 3">
             <a:extLst>
               <a:ext uri="{FF2B5EF4-FFF2-40B4-BE49-F238E27FC236}">
-                <a16:creationId xmlns:a16="http://schemas.microsoft.com/office/drawing/2014/main" xmlns="" id="{B3CCE42C-87E4-4E5C-B24C-E59098FDEF3C}"/>
+                <a16:creationId xmlns:a16="http://schemas.microsoft.com/office/drawing/2014/main" id="{B3CCE42C-87E4-4E5C-B24C-E59098FDEF3C}"/>
               </a:ext>
             </a:extLst>
           </p:cNvPr>
@@ -3087,7 +3064,7 @@
           <p:cNvPr id="5" name="Footer Placeholder 4">
             <a:extLst>
               <a:ext uri="{FF2B5EF4-FFF2-40B4-BE49-F238E27FC236}">
-                <a16:creationId xmlns:a16="http://schemas.microsoft.com/office/drawing/2014/main" xmlns="" id="{62E909A9-1ED3-468E-980B-AFEEF25F5F22}"/>
+                <a16:creationId xmlns:a16="http://schemas.microsoft.com/office/drawing/2014/main" id="{62E909A9-1ED3-468E-980B-AFEEF25F5F22}"/>
               </a:ext>
             </a:extLst>
           </p:cNvPr>
@@ -3130,7 +3107,7 @@
           <p:cNvPr id="6" name="Slide Number Placeholder 5">
             <a:extLst>
               <a:ext uri="{FF2B5EF4-FFF2-40B4-BE49-F238E27FC236}">
-                <a16:creationId xmlns:a16="http://schemas.microsoft.com/office/drawing/2014/main" xmlns="" id="{4816C08F-5AA6-4FA5-B14A-93D008846248}"/>
+                <a16:creationId xmlns:a16="http://schemas.microsoft.com/office/drawing/2014/main" id="{4816C08F-5AA6-4FA5-B14A-93D008846248}"/>
               </a:ext>
             </a:extLst>
           </p:cNvPr>
@@ -3498,7 +3475,7 @@
           <p:cNvPr id="2" name="Title 1">
             <a:extLst>
               <a:ext uri="{FF2B5EF4-FFF2-40B4-BE49-F238E27FC236}">
-                <a16:creationId xmlns:a16="http://schemas.microsoft.com/office/drawing/2014/main" xmlns="" id="{9640AB11-77EF-479A-8B03-20E6EE1DEF78}"/>
+                <a16:creationId xmlns:a16="http://schemas.microsoft.com/office/drawing/2014/main" id="{9640AB11-77EF-479A-8B03-20E6EE1DEF78}"/>
               </a:ext>
             </a:extLst>
           </p:cNvPr>
@@ -3526,7 +3503,7 @@
           <p:cNvPr id="3" name="Subtitle 2">
             <a:extLst>
               <a:ext uri="{FF2B5EF4-FFF2-40B4-BE49-F238E27FC236}">
-                <a16:creationId xmlns:a16="http://schemas.microsoft.com/office/drawing/2014/main" xmlns="" id="{85EBDFF8-8957-4F1A-BA7C-D1532410C204}"/>
+                <a16:creationId xmlns:a16="http://schemas.microsoft.com/office/drawing/2014/main" id="{85EBDFF8-8957-4F1A-BA7C-D1532410C204}"/>
               </a:ext>
             </a:extLst>
           </p:cNvPr>
@@ -3584,7 +3561,7 @@
           <p:cNvPr id="4" name="Picture 3">
             <a:extLst>
               <a:ext uri="{FF2B5EF4-FFF2-40B4-BE49-F238E27FC236}">
-                <a16:creationId xmlns:a16="http://schemas.microsoft.com/office/drawing/2014/main" xmlns="" id="{5CFA029F-5C37-4A3D-A83E-D8C65C6BDE0C}"/>
+                <a16:creationId xmlns:a16="http://schemas.microsoft.com/office/drawing/2014/main" id="{5CFA029F-5C37-4A3D-A83E-D8C65C6BDE0C}"/>
               </a:ext>
             </a:extLst>
           </p:cNvPr>
@@ -3614,7 +3591,7 @@
           <p:cNvPr id="5" name="TextBox 4">
             <a:extLst>
               <a:ext uri="{FF2B5EF4-FFF2-40B4-BE49-F238E27FC236}">
-                <a16:creationId xmlns:a16="http://schemas.microsoft.com/office/drawing/2014/main" xmlns="" id="{C05F688A-3013-44AE-9657-1536DAD1E3B7}"/>
+                <a16:creationId xmlns:a16="http://schemas.microsoft.com/office/drawing/2014/main" id="{C05F688A-3013-44AE-9657-1536DAD1E3B7}"/>
               </a:ext>
             </a:extLst>
           </p:cNvPr>
@@ -3842,7 +3819,7 @@
           <p:cNvPr id="4" name="Picture 3">
             <a:extLst>
               <a:ext uri="{FF2B5EF4-FFF2-40B4-BE49-F238E27FC236}">
-                <a16:creationId xmlns:a16="http://schemas.microsoft.com/office/drawing/2014/main" xmlns="" id="{AD35E458-039B-4600-9C30-83F1B4F1FE07}"/>
+                <a16:creationId xmlns:a16="http://schemas.microsoft.com/office/drawing/2014/main" id="{AD35E458-039B-4600-9C30-83F1B4F1FE07}"/>
               </a:ext>
             </a:extLst>
           </p:cNvPr>
@@ -3872,7 +3849,7 @@
           <p:cNvPr id="5" name="TextBox 4">
             <a:extLst>
               <a:ext uri="{FF2B5EF4-FFF2-40B4-BE49-F238E27FC236}">
-                <a16:creationId xmlns:a16="http://schemas.microsoft.com/office/drawing/2014/main" xmlns="" id="{CAB32E96-9BBE-4C19-83A2-B652A5B89F03}"/>
+                <a16:creationId xmlns:a16="http://schemas.microsoft.com/office/drawing/2014/main" id="{CAB32E96-9BBE-4C19-83A2-B652A5B89F03}"/>
               </a:ext>
             </a:extLst>
           </p:cNvPr>
@@ -4014,7 +3991,7 @@
           <p:cNvPr id="4" name="Picture 3">
             <a:extLst>
               <a:ext uri="{FF2B5EF4-FFF2-40B4-BE49-F238E27FC236}">
-                <a16:creationId xmlns:a16="http://schemas.microsoft.com/office/drawing/2014/main" xmlns="" id="{96D836BE-EE17-4E5A-AF5A-F5280910B240}"/>
+                <a16:creationId xmlns:a16="http://schemas.microsoft.com/office/drawing/2014/main" id="{96D836BE-EE17-4E5A-AF5A-F5280910B240}"/>
               </a:ext>
             </a:extLst>
           </p:cNvPr>
@@ -4044,7 +4021,7 @@
           <p:cNvPr id="5" name="TextBox 4">
             <a:extLst>
               <a:ext uri="{FF2B5EF4-FFF2-40B4-BE49-F238E27FC236}">
-                <a16:creationId xmlns:a16="http://schemas.microsoft.com/office/drawing/2014/main" xmlns="" id="{E7F5E934-14F2-4CD1-8B4F-6F9B7F34B346}"/>
+                <a16:creationId xmlns:a16="http://schemas.microsoft.com/office/drawing/2014/main" id="{E7F5E934-14F2-4CD1-8B4F-6F9B7F34B346}"/>
               </a:ext>
             </a:extLst>
           </p:cNvPr>
@@ -4178,7 +4155,7 @@
           <p:cNvPr id="4" name="Picture 3">
             <a:extLst>
               <a:ext uri="{FF2B5EF4-FFF2-40B4-BE49-F238E27FC236}">
-                <a16:creationId xmlns:a16="http://schemas.microsoft.com/office/drawing/2014/main" xmlns="" id="{A5A3DE45-2C20-4329-B332-5AB1FB98625D}"/>
+                <a16:creationId xmlns:a16="http://schemas.microsoft.com/office/drawing/2014/main" id="{A5A3DE45-2C20-4329-B332-5AB1FB98625D}"/>
               </a:ext>
             </a:extLst>
           </p:cNvPr>
@@ -4208,7 +4185,7 @@
           <p:cNvPr id="5" name="TextBox 4">
             <a:extLst>
               <a:ext uri="{FF2B5EF4-FFF2-40B4-BE49-F238E27FC236}">
-                <a16:creationId xmlns:a16="http://schemas.microsoft.com/office/drawing/2014/main" xmlns="" id="{1AE750E3-E617-4F3B-BC74-CD750B123654}"/>
+                <a16:creationId xmlns:a16="http://schemas.microsoft.com/office/drawing/2014/main" id="{1AE750E3-E617-4F3B-BC74-CD750B123654}"/>
               </a:ext>
             </a:extLst>
           </p:cNvPr>
@@ -4296,7 +4273,7 @@
           <p:cNvPr id="4" name="Picture 3">
             <a:extLst>
               <a:ext uri="{FF2B5EF4-FFF2-40B4-BE49-F238E27FC236}">
-                <a16:creationId xmlns:a16="http://schemas.microsoft.com/office/drawing/2014/main" xmlns="" id="{E8F14CF8-CC50-43E1-A7F7-633BBC9CC06D}"/>
+                <a16:creationId xmlns:a16="http://schemas.microsoft.com/office/drawing/2014/main" id="{E8F14CF8-CC50-43E1-A7F7-633BBC9CC06D}"/>
               </a:ext>
             </a:extLst>
           </p:cNvPr>
@@ -4326,7 +4303,7 @@
           <p:cNvPr id="5" name="Rectangle 4">
             <a:extLst>
               <a:ext uri="{FF2B5EF4-FFF2-40B4-BE49-F238E27FC236}">
-                <a16:creationId xmlns:a16="http://schemas.microsoft.com/office/drawing/2014/main" xmlns="" id="{0039E68E-C138-47F5-A776-F5EED5BD3999}"/>
+                <a16:creationId xmlns:a16="http://schemas.microsoft.com/office/drawing/2014/main" id="{0039E68E-C138-47F5-A776-F5EED5BD3999}"/>
               </a:ext>
             </a:extLst>
           </p:cNvPr>
@@ -4396,7 +4373,7 @@
           <p:cNvPr id="2" name="Title 1">
             <a:extLst>
               <a:ext uri="{FF2B5EF4-FFF2-40B4-BE49-F238E27FC236}">
-                <a16:creationId xmlns:a16="http://schemas.microsoft.com/office/drawing/2014/main" xmlns="" id="{5FCDA60D-EB0B-429A-88FA-68663306C63D}"/>
+                <a16:creationId xmlns:a16="http://schemas.microsoft.com/office/drawing/2014/main" id="{5FCDA60D-EB0B-429A-88FA-68663306C63D}"/>
               </a:ext>
             </a:extLst>
           </p:cNvPr>
@@ -4424,7 +4401,7 @@
           <p:cNvPr id="3" name="Content Placeholder 2">
             <a:extLst>
               <a:ext uri="{FF2B5EF4-FFF2-40B4-BE49-F238E27FC236}">
-                <a16:creationId xmlns:a16="http://schemas.microsoft.com/office/drawing/2014/main" xmlns="" id="{D22D06AB-9AD5-4840-9F1F-DFF5366B615F}"/>
+                <a16:creationId xmlns:a16="http://schemas.microsoft.com/office/drawing/2014/main" id="{D22D06AB-9AD5-4840-9F1F-DFF5366B615F}"/>
               </a:ext>
             </a:extLst>
           </p:cNvPr>
@@ -4479,7 +4456,7 @@
           <p:cNvPr id="2" name="Title 1">
             <a:extLst>
               <a:ext uri="{FF2B5EF4-FFF2-40B4-BE49-F238E27FC236}">
-                <a16:creationId xmlns:a16="http://schemas.microsoft.com/office/drawing/2014/main" xmlns="" id="{7A78E11E-35C5-4897-B086-0DD71FC53DF2}"/>
+                <a16:creationId xmlns:a16="http://schemas.microsoft.com/office/drawing/2014/main" id="{7A78E11E-35C5-4897-B086-0DD71FC53DF2}"/>
               </a:ext>
             </a:extLst>
           </p:cNvPr>
@@ -4504,6 +4481,41 @@
           </a:p>
         </p:txBody>
       </p:sp>
+      <p:pic>
+        <p:nvPicPr>
+          <p:cNvPr id="4" name="Picture 3" descr="A picture containing object, clock&#10;&#10;Description generated with high confidence">
+            <a:extLst>
+              <a:ext uri="{FF2B5EF4-FFF2-40B4-BE49-F238E27FC236}">
+                <a16:creationId xmlns:a16="http://schemas.microsoft.com/office/drawing/2014/main" id="{491A6B13-70C8-4F24-AC0F-5ACD2004B0EC}"/>
+              </a:ext>
+            </a:extLst>
+          </p:cNvPr>
+          <p:cNvPicPr>
+            <a:picLocks noChangeAspect="1"/>
+          </p:cNvPicPr>
+          <p:nvPr/>
+        </p:nvPicPr>
+        <p:blipFill rotWithShape="1">
+          <a:blip r:embed="rId2">
+            <a:extLst>
+              <a:ext uri="{28A0092B-C50C-407E-A947-70E740481C1C}">
+                <a14:useLocalDpi xmlns:a14="http://schemas.microsoft.com/office/drawing/2010/main" val="0"/>
+              </a:ext>
+            </a:extLst>
+          </a:blip>
+          <a:srcRect l="40000" t="42801" r="14868" b="13879"/>
+          <a:stretch/>
+        </p:blipFill>
+        <p:spPr>
+          <a:xfrm>
+            <a:off x="4437742" y="2314915"/>
+            <a:ext cx="3095171" cy="2228169"/>
+          </a:xfrm>
+          <a:prstGeom prst="rect">
+            <a:avLst/>
+          </a:prstGeom>
+        </p:spPr>
+      </p:pic>
     </p:spTree>
     <p:extLst>
       <p:ext uri="{BB962C8B-B14F-4D97-AF65-F5344CB8AC3E}">
@@ -4539,7 +4551,7 @@
           <p:cNvPr id="2" name="Title 1">
             <a:extLst>
               <a:ext uri="{FF2B5EF4-FFF2-40B4-BE49-F238E27FC236}">
-                <a16:creationId xmlns:a16="http://schemas.microsoft.com/office/drawing/2014/main" xmlns="" id="{86ADCD51-5F53-4FD0-A210-85F16BBA6615}"/>
+                <a16:creationId xmlns:a16="http://schemas.microsoft.com/office/drawing/2014/main" id="{86ADCD51-5F53-4FD0-A210-85F16BBA6615}"/>
               </a:ext>
             </a:extLst>
           </p:cNvPr>
@@ -4605,7 +4617,7 @@
           <p:cNvPr id="7" name="TextBox 6">
             <a:extLst>
               <a:ext uri="{FF2B5EF4-FFF2-40B4-BE49-F238E27FC236}">
-                <a16:creationId xmlns:a16="http://schemas.microsoft.com/office/drawing/2014/main" xmlns="" id="{13D6E8DB-7304-4FF3-843D-C054851B434C}"/>
+                <a16:creationId xmlns:a16="http://schemas.microsoft.com/office/drawing/2014/main" id="{13D6E8DB-7304-4FF3-843D-C054851B434C}"/>
               </a:ext>
             </a:extLst>
           </p:cNvPr>
@@ -4615,7 +4627,7 @@
         <p:spPr>
           <a:xfrm>
             <a:off x="1226130" y="2058370"/>
-            <a:ext cx="4278385" cy="4247317"/>
+            <a:ext cx="4278385" cy="3416320"/>
           </a:xfrm>
           <a:prstGeom prst="rect">
             <a:avLst/>
@@ -4652,23 +4664,7 @@
             </a:r>
             <a:r>
               <a:rPr lang="en-US" dirty="0"/>
-              <a:t>isolates. </a:t>
-            </a:r>
-            <a:r>
-              <a:rPr lang="en-US" dirty="0" smtClean="0"/>
-              <a:t>Not all isolates were done on each listed date so the isolate date interaction was dropped. The </a:t>
-            </a:r>
-            <a:r>
-              <a:rPr lang="en-US" dirty="0"/>
-              <a:t>terms are as </a:t>
-            </a:r>
-            <a:r>
-              <a:rPr lang="en-US" dirty="0" smtClean="0"/>
-              <a:t>follows: </a:t>
-            </a:r>
-            <a:r>
-              <a:rPr lang="en-US" dirty="0"/>
-              <a:t>Isolate is the 97 </a:t>
+              <a:t>isolates. The terms are as follows: Isolate is the 97 </a:t>
             </a:r>
             <a:r>
               <a:rPr lang="en-US" i="1" dirty="0"/>
@@ -4676,7 +4672,7 @@
             </a:r>
             <a:r>
               <a:rPr lang="en-US" dirty="0"/>
-              <a:t> isolates, PlateBlock tests the independence of the growth per media, Date is the period of time in which the recording was done. Interactions of these factors were also tested (:). </a:t>
+              <a:t> isolates, PlateBlock is the randomization factor of the isolates per media, Date is the recorded date of phenotyping. Interactions of these factors were also tested (:). </a:t>
             </a:r>
           </a:p>
         </p:txBody>
@@ -4686,7 +4682,7 @@
           <p:cNvPr id="5" name="Content Placeholder 4">
             <a:extLst>
               <a:ext uri="{FF2B5EF4-FFF2-40B4-BE49-F238E27FC236}">
-                <a16:creationId xmlns:a16="http://schemas.microsoft.com/office/drawing/2014/main" xmlns="" id="{5C877F92-B12B-44B4-B5E9-E41886AC4D97}"/>
+                <a16:creationId xmlns:a16="http://schemas.microsoft.com/office/drawing/2014/main" id="{5C877F92-B12B-44B4-B5E9-E41886AC4D97}"/>
               </a:ext>
             </a:extLst>
           </p:cNvPr>
@@ -4716,49 +4712,49 @@
                 <a:gridCol w="1157165">
                   <a:extLst>
                     <a:ext uri="{9D8B030D-6E8A-4147-A177-3AD203B41FA5}">
-                      <a16:colId xmlns:a16="http://schemas.microsoft.com/office/drawing/2014/main" xmlns="" val="762839395"/>
+                      <a16:colId xmlns:a16="http://schemas.microsoft.com/office/drawing/2014/main" val="762839395"/>
                     </a:ext>
                   </a:extLst>
                 </a:gridCol>
                 <a:gridCol w="845995">
                   <a:extLst>
                     <a:ext uri="{9D8B030D-6E8A-4147-A177-3AD203B41FA5}">
-                      <a16:colId xmlns:a16="http://schemas.microsoft.com/office/drawing/2014/main" xmlns="" val="4046476885"/>
+                      <a16:colId xmlns:a16="http://schemas.microsoft.com/office/drawing/2014/main" val="4046476885"/>
                     </a:ext>
                   </a:extLst>
                 </a:gridCol>
                 <a:gridCol w="340342">
                   <a:extLst>
                     <a:ext uri="{9D8B030D-6E8A-4147-A177-3AD203B41FA5}">
-                      <a16:colId xmlns:a16="http://schemas.microsoft.com/office/drawing/2014/main" xmlns="" val="622091712"/>
+                      <a16:colId xmlns:a16="http://schemas.microsoft.com/office/drawing/2014/main" val="622091712"/>
                     </a:ext>
                   </a:extLst>
                 </a:gridCol>
                 <a:gridCol w="505653">
                   <a:extLst>
                     <a:ext uri="{9D8B030D-6E8A-4147-A177-3AD203B41FA5}">
-                      <a16:colId xmlns:a16="http://schemas.microsoft.com/office/drawing/2014/main" xmlns="" val="3531720946"/>
+                      <a16:colId xmlns:a16="http://schemas.microsoft.com/office/drawing/2014/main" val="3531720946"/>
                     </a:ext>
                   </a:extLst>
                 </a:gridCol>
                 <a:gridCol w="583445">
                   <a:extLst>
                     <a:ext uri="{9D8B030D-6E8A-4147-A177-3AD203B41FA5}">
-                      <a16:colId xmlns:a16="http://schemas.microsoft.com/office/drawing/2014/main" xmlns="" val="1896003395"/>
+                      <a16:colId xmlns:a16="http://schemas.microsoft.com/office/drawing/2014/main" val="1896003395"/>
                     </a:ext>
                   </a:extLst>
                 </a:gridCol>
                 <a:gridCol w="495929">
                   <a:extLst>
                     <a:ext uri="{9D8B030D-6E8A-4147-A177-3AD203B41FA5}">
-                      <a16:colId xmlns:a16="http://schemas.microsoft.com/office/drawing/2014/main" xmlns="" val="3456362452"/>
+                      <a16:colId xmlns:a16="http://schemas.microsoft.com/office/drawing/2014/main" val="3456362452"/>
                     </a:ext>
                   </a:extLst>
                 </a:gridCol>
                 <a:gridCol w="622341">
                   <a:extLst>
                     <a:ext uri="{9D8B030D-6E8A-4147-A177-3AD203B41FA5}">
-                      <a16:colId xmlns:a16="http://schemas.microsoft.com/office/drawing/2014/main" xmlns="" val="2659481591"/>
+                      <a16:colId xmlns:a16="http://schemas.microsoft.com/office/drawing/2014/main" val="2659481591"/>
                     </a:ext>
                   </a:extLst>
                 </a:gridCol>
@@ -4791,13 +4787,7 @@
                         <a:rPr lang="en-US" sz="1100" u="none" strike="noStrike" dirty="0">
                           <a:effectLst/>
                         </a:rPr>
-                        <a:t>% </a:t>
-                      </a:r>
-                      <a:r>
-                        <a:rPr lang="en-US" sz="1100" u="none" strike="noStrike" dirty="0" smtClean="0">
-                          <a:effectLst/>
-                        </a:rPr>
-                        <a:t>Variation</a:t>
+                        <a:t>% Variation</a:t>
                       </a:r>
                       <a:endParaRPr lang="en-US" sz="1100" b="0" i="0" u="none" strike="noStrike" dirty="0">
                         <a:solidFill>
@@ -4927,7 +4917,7 @@
                 </a:tc>
                 <a:extLst>
                   <a:ext uri="{0D108BD9-81ED-4DB2-BD59-A6C34878D82A}">
-                    <a16:rowId xmlns:a16="http://schemas.microsoft.com/office/drawing/2014/main" xmlns="" val="1775589854"/>
+                    <a16:rowId xmlns:a16="http://schemas.microsoft.com/office/drawing/2014/main" val="1775589854"/>
                   </a:ext>
                 </a:extLst>
               </a:tr>
@@ -5095,7 +5085,7 @@
                 </a:tc>
                 <a:extLst>
                   <a:ext uri="{0D108BD9-81ED-4DB2-BD59-A6C34878D82A}">
-                    <a16:rowId xmlns:a16="http://schemas.microsoft.com/office/drawing/2014/main" xmlns="" val="3747950335"/>
+                    <a16:rowId xmlns:a16="http://schemas.microsoft.com/office/drawing/2014/main" val="3747950335"/>
                   </a:ext>
                 </a:extLst>
               </a:tr>
@@ -5263,7 +5253,7 @@
                 </a:tc>
                 <a:extLst>
                   <a:ext uri="{0D108BD9-81ED-4DB2-BD59-A6C34878D82A}">
-                    <a16:rowId xmlns:a16="http://schemas.microsoft.com/office/drawing/2014/main" xmlns="" val="1015426064"/>
+                    <a16:rowId xmlns:a16="http://schemas.microsoft.com/office/drawing/2014/main" val="1015426064"/>
                   </a:ext>
                 </a:extLst>
               </a:tr>
@@ -5431,7 +5421,7 @@
                 </a:tc>
                 <a:extLst>
                   <a:ext uri="{0D108BD9-81ED-4DB2-BD59-A6C34878D82A}">
-                    <a16:rowId xmlns:a16="http://schemas.microsoft.com/office/drawing/2014/main" xmlns="" val="3990960279"/>
+                    <a16:rowId xmlns:a16="http://schemas.microsoft.com/office/drawing/2014/main" val="3990960279"/>
                   </a:ext>
                 </a:extLst>
               </a:tr>
@@ -5599,7 +5589,7 @@
                 </a:tc>
                 <a:extLst>
                   <a:ext uri="{0D108BD9-81ED-4DB2-BD59-A6C34878D82A}">
-                    <a16:rowId xmlns:a16="http://schemas.microsoft.com/office/drawing/2014/main" xmlns="" val="1124409632"/>
+                    <a16:rowId xmlns:a16="http://schemas.microsoft.com/office/drawing/2014/main" val="1124409632"/>
                   </a:ext>
                 </a:extLst>
               </a:tr>
@@ -5755,7 +5745,7 @@
                 </a:tc>
                 <a:extLst>
                   <a:ext uri="{0D108BD9-81ED-4DB2-BD59-A6C34878D82A}">
-                    <a16:rowId xmlns:a16="http://schemas.microsoft.com/office/drawing/2014/main" xmlns="" val="1811276016"/>
+                    <a16:rowId xmlns:a16="http://schemas.microsoft.com/office/drawing/2014/main" val="1811276016"/>
                   </a:ext>
                 </a:extLst>
               </a:tr>
@@ -5887,7 +5877,7 @@
                 </a:tc>
                 <a:extLst>
                   <a:ext uri="{0D108BD9-81ED-4DB2-BD59-A6C34878D82A}">
-                    <a16:rowId xmlns:a16="http://schemas.microsoft.com/office/drawing/2014/main" xmlns="" val="1678109040"/>
+                    <a16:rowId xmlns:a16="http://schemas.microsoft.com/office/drawing/2014/main" val="1678109040"/>
                   </a:ext>
                 </a:extLst>
               </a:tr>
@@ -5927,54 +5917,19 @@
       </p:grpSpPr>
       <p:sp>
         <p:nvSpPr>
-          <p:cNvPr id="2" name="Title 1">
-            <a:extLst>
-              <a:ext uri="{FF2B5EF4-FFF2-40B4-BE49-F238E27FC236}">
-                <a16:creationId xmlns:a16="http://schemas.microsoft.com/office/drawing/2014/main" xmlns="" id="{02797949-2612-470F-8BC1-C369B77CA3F2}"/>
-              </a:ext>
-            </a:extLst>
-          </p:cNvPr>
-          <p:cNvSpPr>
-            <a:spLocks noGrp="1"/>
-          </p:cNvSpPr>
-          <p:nvPr>
-            <p:ph type="title"/>
-          </p:nvPr>
+          <p:cNvPr id="9" name="TextBox 8">
+            <a:extLst>
+              <a:ext uri="{FF2B5EF4-FFF2-40B4-BE49-F238E27FC236}">
+                <a16:creationId xmlns:a16="http://schemas.microsoft.com/office/drawing/2014/main" id="{ED45B5BA-AF5B-4C7C-B062-91A28ADEDBFF}"/>
+              </a:ext>
+            </a:extLst>
+          </p:cNvPr>
+          <p:cNvSpPr txBox="1"/>
+          <p:nvPr/>
         </p:nvSpPr>
         <p:spPr>
           <a:xfrm>
-            <a:off x="838200" y="360727"/>
-            <a:ext cx="10129007" cy="793066"/>
-          </a:xfrm>
-        </p:spPr>
-        <p:txBody>
-          <a:bodyPr>
-            <a:normAutofit/>
-          </a:bodyPr>
-          <a:lstStyle/>
-          <a:p>
-            <a:r>
-              <a:rPr lang="en-US" sz="2400" dirty="0"/>
-              <a:t>Hyphal Waviness Distribution based on Isolate</a:t>
-            </a:r>
-          </a:p>
-        </p:txBody>
-      </p:sp>
-      <p:sp>
-        <p:nvSpPr>
-          <p:cNvPr id="9" name="TextBox 8">
-            <a:extLst>
-              <a:ext uri="{FF2B5EF4-FFF2-40B4-BE49-F238E27FC236}">
-                <a16:creationId xmlns:a16="http://schemas.microsoft.com/office/drawing/2014/main" xmlns="" id="{ED45B5BA-AF5B-4C7C-B062-91A28ADEDBFF}"/>
-              </a:ext>
-            </a:extLst>
-          </p:cNvPr>
-          <p:cNvSpPr txBox="1"/>
-          <p:nvPr/>
-        </p:nvSpPr>
-        <p:spPr>
-          <a:xfrm>
-            <a:off x="930828" y="4846535"/>
+            <a:off x="1932314" y="5842337"/>
             <a:ext cx="10943120" cy="2031325"/>
           </a:xfrm>
           <a:prstGeom prst="rect">
@@ -6004,21 +5959,8 @@
             </a:r>
             <a:r>
               <a:rPr lang="en-US" dirty="0"/>
-              <a:t> percentile distribution are shown in each box and are </a:t>
-            </a:r>
-            <a:r>
-              <a:rPr lang="en-US" dirty="0" smtClean="0"/>
-              <a:t>ordered by increasing </a:t>
-            </a:r>
-            <a:r>
-              <a:rPr lang="en-US" dirty="0"/>
-              <a:t>mean hyphal </a:t>
-            </a:r>
-            <a:r>
-              <a:rPr lang="en-US" dirty="0" smtClean="0"/>
-              <a:t>waviness.</a:t>
-            </a:r>
-            <a:endParaRPr lang="en-US" dirty="0"/>
+              <a:t> percentile distribution are shown in each box and are ordered by increasing mean hyphal waviness.</a:t>
+            </a:r>
           </a:p>
           <a:p>
             <a:endParaRPr lang="en-US" dirty="0"/>
@@ -6036,10 +5978,10 @@
       </p:sp>
       <p:pic>
         <p:nvPicPr>
-          <p:cNvPr id="3" name="Picture 2">
-            <a:extLst>
-              <a:ext uri="{FF2B5EF4-FFF2-40B4-BE49-F238E27FC236}">
-                <a16:creationId xmlns:a16="http://schemas.microsoft.com/office/drawing/2014/main" xmlns="" id="{C408E4DF-F455-4918-86D7-EF57BD4B1A30}"/>
+          <p:cNvPr id="4" name="Picture 3">
+            <a:extLst>
+              <a:ext uri="{FF2B5EF4-FFF2-40B4-BE49-F238E27FC236}">
+                <a16:creationId xmlns:a16="http://schemas.microsoft.com/office/drawing/2014/main" id="{1B935316-C6D2-4D94-AE54-F1AE6F2A4B33}"/>
               </a:ext>
             </a:extLst>
           </p:cNvPr>
@@ -6056,8 +5998,8 @@
         </p:blipFill>
         <p:spPr>
           <a:xfrm>
-            <a:off x="930828" y="1153793"/>
-            <a:ext cx="10330343" cy="3359341"/>
+            <a:off x="0" y="0"/>
+            <a:ext cx="12192000" cy="5902325"/>
           </a:xfrm>
           <a:prstGeom prst="rect">
             <a:avLst/>
@@ -6099,7 +6041,7 @@
           <p:cNvPr id="2" name="Title 1">
             <a:extLst>
               <a:ext uri="{FF2B5EF4-FFF2-40B4-BE49-F238E27FC236}">
-                <a16:creationId xmlns:a16="http://schemas.microsoft.com/office/drawing/2014/main" xmlns="" id="{02797949-2612-470F-8BC1-C369B77CA3F2}"/>
+                <a16:creationId xmlns:a16="http://schemas.microsoft.com/office/drawing/2014/main" id="{02797949-2612-470F-8BC1-C369B77CA3F2}"/>
               </a:ext>
             </a:extLst>
           </p:cNvPr>
@@ -6134,7 +6076,7 @@
           <p:cNvPr id="8" name="Content Placeholder 7">
             <a:extLst>
               <a:ext uri="{FF2B5EF4-FFF2-40B4-BE49-F238E27FC236}">
-                <a16:creationId xmlns:a16="http://schemas.microsoft.com/office/drawing/2014/main" xmlns="" id="{A1A178D7-6F47-4D56-A1D2-0B03F1BD8AB1}"/>
+                <a16:creationId xmlns:a16="http://schemas.microsoft.com/office/drawing/2014/main" id="{A1A178D7-6F47-4D56-A1D2-0B03F1BD8AB1}"/>
               </a:ext>
             </a:extLst>
           </p:cNvPr>
@@ -6166,7 +6108,7 @@
           <p:cNvPr id="9" name="TextBox 8">
             <a:extLst>
               <a:ext uri="{FF2B5EF4-FFF2-40B4-BE49-F238E27FC236}">
-                <a16:creationId xmlns:a16="http://schemas.microsoft.com/office/drawing/2014/main" xmlns="" id="{ED45B5BA-AF5B-4C7C-B062-91A28ADEDBFF}"/>
+                <a16:creationId xmlns:a16="http://schemas.microsoft.com/office/drawing/2014/main" id="{ED45B5BA-AF5B-4C7C-B062-91A28ADEDBFF}"/>
               </a:ext>
             </a:extLst>
           </p:cNvPr>
@@ -6249,7 +6191,7 @@
           <p:cNvPr id="9" name="TextBox 8">
             <a:extLst>
               <a:ext uri="{FF2B5EF4-FFF2-40B4-BE49-F238E27FC236}">
-                <a16:creationId xmlns:a16="http://schemas.microsoft.com/office/drawing/2014/main" xmlns="" id="{ED45B5BA-AF5B-4C7C-B062-91A28ADEDBFF}"/>
+                <a16:creationId xmlns:a16="http://schemas.microsoft.com/office/drawing/2014/main" id="{ED45B5BA-AF5B-4C7C-B062-91A28ADEDBFF}"/>
               </a:ext>
             </a:extLst>
           </p:cNvPr>
@@ -6259,7 +6201,7 @@
         <p:spPr>
           <a:xfrm>
             <a:off x="9538568" y="810960"/>
-            <a:ext cx="2653432" cy="4247317"/>
+            <a:ext cx="2653432" cy="4524315"/>
           </a:xfrm>
           <a:prstGeom prst="rect">
             <a:avLst/>
@@ -6312,7 +6254,7 @@
             </a:r>
             <a:r>
               <a:rPr lang="en-US" dirty="0"/>
-              <a:t>chromosomes as alternating black and white regions. Thresholds of effect estimate are displayed as horizontal dashed lines. </a:t>
+              <a:t>chromosomes as alternating black and white regions. Thresholds of effect estimate from permutation analysis are displayed as horizontal dashed lines. </a:t>
             </a:r>
           </a:p>
           <a:p>
@@ -6328,7 +6270,7 @@
           <p:cNvPr id="3" name="Picture 2">
             <a:extLst>
               <a:ext uri="{FF2B5EF4-FFF2-40B4-BE49-F238E27FC236}">
-                <a16:creationId xmlns:a16="http://schemas.microsoft.com/office/drawing/2014/main" xmlns="" id="{ABC17D68-A00F-4B53-8FCC-6C2E31D8050C}"/>
+                <a16:creationId xmlns:a16="http://schemas.microsoft.com/office/drawing/2014/main" id="{ABC17D68-A00F-4B53-8FCC-6C2E31D8050C}"/>
               </a:ext>
             </a:extLst>
           </p:cNvPr>
@@ -6388,7 +6330,7 @@
           <p:cNvPr id="4" name="Content Placeholder 3">
             <a:extLst>
               <a:ext uri="{FF2B5EF4-FFF2-40B4-BE49-F238E27FC236}">
-                <a16:creationId xmlns:a16="http://schemas.microsoft.com/office/drawing/2014/main" xmlns="" id="{5CF1D73C-CDAF-4C5E-870D-8BA455DA916C}"/>
+                <a16:creationId xmlns:a16="http://schemas.microsoft.com/office/drawing/2014/main" id="{5CF1D73C-CDAF-4C5E-870D-8BA455DA916C}"/>
               </a:ext>
             </a:extLst>
           </p:cNvPr>
@@ -6420,7 +6362,7 @@
           <p:cNvPr id="5" name="TextBox 4">
             <a:extLst>
               <a:ext uri="{FF2B5EF4-FFF2-40B4-BE49-F238E27FC236}">
-                <a16:creationId xmlns:a16="http://schemas.microsoft.com/office/drawing/2014/main" xmlns="" id="{8790B5DB-5369-4BEC-9097-5F6FDC915BE0}"/>
+                <a16:creationId xmlns:a16="http://schemas.microsoft.com/office/drawing/2014/main" id="{8790B5DB-5369-4BEC-9097-5F6FDC915BE0}"/>
               </a:ext>
             </a:extLst>
           </p:cNvPr>
@@ -6527,7 +6469,7 @@
           <p:cNvPr id="4" name="Picture 3">
             <a:extLst>
               <a:ext uri="{FF2B5EF4-FFF2-40B4-BE49-F238E27FC236}">
-                <a16:creationId xmlns:a16="http://schemas.microsoft.com/office/drawing/2014/main" xmlns="" id="{8605A398-FB34-451A-9C81-408789C9CE59}"/>
+                <a16:creationId xmlns:a16="http://schemas.microsoft.com/office/drawing/2014/main" id="{8605A398-FB34-451A-9C81-408789C9CE59}"/>
               </a:ext>
             </a:extLst>
           </p:cNvPr>
@@ -6557,7 +6499,7 @@
           <p:cNvPr id="5" name="TextBox 4">
             <a:extLst>
               <a:ext uri="{FF2B5EF4-FFF2-40B4-BE49-F238E27FC236}">
-                <a16:creationId xmlns:a16="http://schemas.microsoft.com/office/drawing/2014/main" xmlns="" id="{C05AC16E-131F-4276-8267-1539454128F8}"/>
+                <a16:creationId xmlns:a16="http://schemas.microsoft.com/office/drawing/2014/main" id="{C05AC16E-131F-4276-8267-1539454128F8}"/>
               </a:ext>
             </a:extLst>
           </p:cNvPr>
@@ -6668,7 +6610,7 @@
           <p:cNvPr id="4" name="Content Placeholder 3">
             <a:extLst>
               <a:ext uri="{FF2B5EF4-FFF2-40B4-BE49-F238E27FC236}">
-                <a16:creationId xmlns:a16="http://schemas.microsoft.com/office/drawing/2014/main" xmlns="" id="{5EDED94B-5794-43B3-A714-99204A4C3FE7}"/>
+                <a16:creationId xmlns:a16="http://schemas.microsoft.com/office/drawing/2014/main" id="{5EDED94B-5794-43B3-A714-99204A4C3FE7}"/>
               </a:ext>
             </a:extLst>
           </p:cNvPr>
@@ -6700,7 +6642,7 @@
           <p:cNvPr id="5" name="TextBox 4">
             <a:extLst>
               <a:ext uri="{FF2B5EF4-FFF2-40B4-BE49-F238E27FC236}">
-                <a16:creationId xmlns:a16="http://schemas.microsoft.com/office/drawing/2014/main" xmlns="" id="{8239F836-2BB4-41CA-A95A-303CF279E575}"/>
+                <a16:creationId xmlns:a16="http://schemas.microsoft.com/office/drawing/2014/main" id="{8239F836-2BB4-41CA-A95A-303CF279E575}"/>
               </a:ext>
             </a:extLst>
           </p:cNvPr>
@@ -7101,7 +7043,7 @@
   <a:extraClrSchemeLst/>
   <a:extLst>
     <a:ext uri="{05A4C25C-085E-4340-85A3-A5531E510DB2}">
-      <thm15:themeFamily xmlns:thm15="http://schemas.microsoft.com/office/thememl/2012/main" xmlns="" name="Office Theme" id="{62F939B6-93AF-4DB8-9C6B-D6C7DFDC589F}" vid="{4A3C46E8-61CC-4603-A589-7422A47A8E4A}"/>
+      <thm15:themeFamily xmlns:thm15="http://schemas.microsoft.com/office/thememl/2012/main" name="Office Theme" id="{62F939B6-93AF-4DB8-9C6B-D6C7DFDC589F}" vid="{4A3C46E8-61CC-4603-A589-7422A47A8E4A}"/>
     </a:ext>
   </a:extLst>
 </a:theme>

</xml_diff>

<commit_message>
Both updated for sending to Dan. Also added readme file
</commit_message>
<xml_diff>
--- a/paper/HWavinessGraphs_Figs_Capt.pptx
+++ b/paper/HWavinessGraphs_Figs_Capt.pptx
@@ -139,7 +139,7 @@
 
 <file path=ppt/commentAuthors.xml><?xml version="1.0" encoding="utf-8"?>
 <p:cmAuthorLst xmlns:a="http://schemas.openxmlformats.org/drawingml/2006/main" xmlns:r="http://schemas.openxmlformats.org/officeDocument/2006/relationships" xmlns:p="http://schemas.openxmlformats.org/presentationml/2006/main">
-  <p:cmAuthor id="1" name="Josue Vega" initials="JV" lastIdx="1" clrIdx="0">
+  <p:cmAuthor id="1" name="Josue Vega" initials="JV" lastIdx="2" clrIdx="0">
     <p:extLst/>
   </p:cmAuthor>
   <p:cmAuthor id="2" name="Nicole Soltis" initials="NS" lastIdx="17" clrIdx="1"/>
@@ -152,6 +152,47 @@
 
 <file path=ppt/comments/comment1.xml><?xml version="1.0" encoding="utf-8"?>
 <p:cmLst xmlns:a="http://schemas.openxmlformats.org/drawingml/2006/main" xmlns:r="http://schemas.openxmlformats.org/officeDocument/2006/relationships" xmlns:p="http://schemas.openxmlformats.org/presentationml/2006/main">
+  <p:cm authorId="1" dt="2018-01-19T15:01:55.232" idx="2">
+    <p:pos x="2903" y="1458"/>
+    <p:text>Indicate scale system as well? (1-10 scale)</p:text>
+    <p:extLst>
+      <p:ext uri="{C676402C-5697-4E1C-873F-D02D1690AC5C}">
+        <p15:threadingInfo xmlns:p15="http://schemas.microsoft.com/office/powerpoint/2012/main" timeZoneBias="480"/>
+      </p:ext>
+    </p:extLst>
+  </p:cm>
+</p:cmLst>
+</file>
+
+<file path=ppt/comments/comment10.xml><?xml version="1.0" encoding="utf-8"?>
+<p:cmLst xmlns:a="http://schemas.openxmlformats.org/drawingml/2006/main" xmlns:r="http://schemas.openxmlformats.org/officeDocument/2006/relationships" xmlns:p="http://schemas.openxmlformats.org/presentationml/2006/main">
+  <p:cm authorId="2" dt="2018-01-19T11:24:33.911" idx="15">
+    <p:pos x="6517" y="335"/>
+    <p:text>continue table from previous slide</p:text>
+  </p:cm>
+</p:cmLst>
+</file>
+
+<file path=ppt/comments/comment11.xml><?xml version="1.0" encoding="utf-8"?>
+<p:cmLst xmlns:a="http://schemas.openxmlformats.org/drawingml/2006/main" xmlns:r="http://schemas.openxmlformats.org/officeDocument/2006/relationships" xmlns:p="http://schemas.openxmlformats.org/presentationml/2006/main">
+  <p:cm authorId="2" dt="2018-01-19T11:24:39.583" idx="16">
+    <p:pos x="2270" y="3508"/>
+    <p:text>continue table from previous slide</p:text>
+  </p:cm>
+</p:cmLst>
+</file>
+
+<file path=ppt/comments/comment12.xml><?xml version="1.0" encoding="utf-8"?>
+<p:cmLst xmlns:a="http://schemas.openxmlformats.org/drawingml/2006/main" xmlns:r="http://schemas.openxmlformats.org/officeDocument/2006/relationships" xmlns:p="http://schemas.openxmlformats.org/presentationml/2006/main">
+  <p:cm authorId="2" dt="2018-01-19T11:24:43.798" idx="17">
+    <p:pos x="2295" y="3628"/>
+    <p:text>continue table from previous slide</p:text>
+  </p:cm>
+</p:cmLst>
+</file>
+
+<file path=ppt/comments/comment2.xml><?xml version="1.0" encoding="utf-8"?>
+<p:cmLst xmlns:a="http://schemas.openxmlformats.org/drawingml/2006/main" xmlns:r="http://schemas.openxmlformats.org/officeDocument/2006/relationships" xmlns:p="http://schemas.openxmlformats.org/presentationml/2006/main">
   <p:cm authorId="2" dt="2018-01-19T11:20:30.944" idx="6">
     <p:pos x="5665" y="3078"/>
     <p:text>print higher resolution so fonts are clear. Increase y axis font and label size</p:text>
@@ -163,25 +204,7 @@
 </p:cmLst>
 </file>
 
-<file path=ppt/comments/comment10.xml><?xml version="1.0" encoding="utf-8"?>
-<p:cmLst xmlns:a="http://schemas.openxmlformats.org/drawingml/2006/main" xmlns:r="http://schemas.openxmlformats.org/officeDocument/2006/relationships" xmlns:p="http://schemas.openxmlformats.org/presentationml/2006/main">
-  <p:cm authorId="2" dt="2018-01-19T11:24:39.583" idx="16">
-    <p:pos x="2270" y="3508"/>
-    <p:text>continue table from previous slide</p:text>
-  </p:cm>
-</p:cmLst>
-</file>
-
-<file path=ppt/comments/comment11.xml><?xml version="1.0" encoding="utf-8"?>
-<p:cmLst xmlns:a="http://schemas.openxmlformats.org/drawingml/2006/main" xmlns:r="http://schemas.openxmlformats.org/officeDocument/2006/relationships" xmlns:p="http://schemas.openxmlformats.org/presentationml/2006/main">
-  <p:cm authorId="2" dt="2018-01-19T11:24:43.798" idx="17">
-    <p:pos x="2295" y="3628"/>
-    <p:text>continue table from previous slide</p:text>
-  </p:cm>
-</p:cmLst>
-</file>
-
-<file path=ppt/comments/comment2.xml><?xml version="1.0" encoding="utf-8"?>
+<file path=ppt/comments/comment3.xml><?xml version="1.0" encoding="utf-8"?>
 <p:cmLst xmlns:a="http://schemas.openxmlformats.org/drawingml/2006/main" xmlns:r="http://schemas.openxmlformats.org/officeDocument/2006/relationships" xmlns:p="http://schemas.openxmlformats.org/presentationml/2006/main">
   <p:cm authorId="2" dt="2018-01-19T11:22:06.271" idx="9">
     <p:pos x="1178" y="3078"/>
@@ -190,7 +213,7 @@
 </p:cmLst>
 </file>
 
-<file path=ppt/comments/comment3.xml><?xml version="1.0" encoding="utf-8"?>
+<file path=ppt/comments/comment4.xml><?xml version="1.0" encoding="utf-8"?>
 <p:cmLst xmlns:a="http://schemas.openxmlformats.org/drawingml/2006/main" xmlns:r="http://schemas.openxmlformats.org/officeDocument/2006/relationships" xmlns:p="http://schemas.openxmlformats.org/presentationml/2006/main">
   <p:cm authorId="2" dt="2018-01-19T11:19:19.844" idx="4">
     <p:pos x="7548" y="533"/>
@@ -199,7 +222,7 @@
 </p:cmLst>
 </file>
 
-<file path=ppt/comments/comment4.xml><?xml version="1.0" encoding="utf-8"?>
+<file path=ppt/comments/comment5.xml><?xml version="1.0" encoding="utf-8"?>
 <p:cmLst xmlns:a="http://schemas.openxmlformats.org/drawingml/2006/main" xmlns:r="http://schemas.openxmlformats.org/officeDocument/2006/relationships" xmlns:p="http://schemas.openxmlformats.org/presentationml/2006/main">
   <p:cm authorId="2" dt="2018-01-19T11:23:55.828" idx="10">
     <p:pos x="6241" y="1350"/>
@@ -211,7 +234,7 @@
 </p:cmLst>
 </file>
 
-<file path=ppt/comments/comment5.xml><?xml version="1.0" encoding="utf-8"?>
+<file path=ppt/comments/comment6.xml><?xml version="1.0" encoding="utf-8"?>
 <p:cmLst xmlns:a="http://schemas.openxmlformats.org/drawingml/2006/main" xmlns:r="http://schemas.openxmlformats.org/officeDocument/2006/relationships" xmlns:p="http://schemas.openxmlformats.org/presentationml/2006/main">
   <p:cm authorId="2" dt="2018-01-19T11:24:11.978" idx="11">
     <p:pos x="6259" y="619"/>
@@ -220,7 +243,7 @@
 </p:cmLst>
 </file>
 
-<file path=ppt/comments/comment6.xml><?xml version="1.0" encoding="utf-8"?>
+<file path=ppt/comments/comment7.xml><?xml version="1.0" encoding="utf-8"?>
 <p:cmLst xmlns:a="http://schemas.openxmlformats.org/drawingml/2006/main" xmlns:r="http://schemas.openxmlformats.org/officeDocument/2006/relationships" xmlns:p="http://schemas.openxmlformats.org/presentationml/2006/main">
   <p:cm authorId="2" dt="2018-01-19T11:24:16.211" idx="12">
     <p:pos x="6044" y="189"/>
@@ -229,7 +252,7 @@
 </p:cmLst>
 </file>
 
-<file path=ppt/comments/comment7.xml><?xml version="1.0" encoding="utf-8"?>
+<file path=ppt/comments/comment8.xml><?xml version="1.0" encoding="utf-8"?>
 <p:cmLst xmlns:a="http://schemas.openxmlformats.org/drawingml/2006/main" xmlns:r="http://schemas.openxmlformats.org/officeDocument/2006/relationships" xmlns:p="http://schemas.openxmlformats.org/presentationml/2006/main">
   <p:cm authorId="2" dt="2018-01-19T11:24:24.068" idx="13">
     <p:pos x="7617" y="26"/>
@@ -238,19 +261,10 @@
 </p:cmLst>
 </file>
 
-<file path=ppt/comments/comment8.xml><?xml version="1.0" encoding="utf-8"?>
+<file path=ppt/comments/comment9.xml><?xml version="1.0" encoding="utf-8"?>
 <p:cmLst xmlns:a="http://schemas.openxmlformats.org/drawingml/2006/main" xmlns:r="http://schemas.openxmlformats.org/officeDocument/2006/relationships" xmlns:p="http://schemas.openxmlformats.org/presentationml/2006/main">
   <p:cm authorId="2" dt="2018-01-19T11:24:29.735" idx="14">
     <p:pos x="7101" y="507"/>
-    <p:text>continue table from previous slide</p:text>
-  </p:cm>
-</p:cmLst>
-</file>
-
-<file path=ppt/comments/comment9.xml><?xml version="1.0" encoding="utf-8"?>
-<p:cmLst xmlns:a="http://schemas.openxmlformats.org/drawingml/2006/main" xmlns:r="http://schemas.openxmlformats.org/officeDocument/2006/relationships" xmlns:p="http://schemas.openxmlformats.org/presentationml/2006/main">
-  <p:cm authorId="2" dt="2018-01-19T11:24:33.911" idx="15">
-    <p:pos x="6517" y="335"/>
     <p:text>continue table from previous slide</p:text>
   </p:cm>
 </p:cmLst>
@@ -4508,7 +4522,7 @@
         </p:blipFill>
         <p:spPr>
           <a:xfrm>
-            <a:off x="4437742" y="2314915"/>
+            <a:off x="1514069" y="2314915"/>
             <a:ext cx="3095171" cy="2228169"/>
           </a:xfrm>
           <a:prstGeom prst="rect">
@@ -4562,7 +4576,12 @@
             <p:ph type="title"/>
           </p:nvPr>
         </p:nvSpPr>
-        <p:spPr/>
+        <p:spPr>
+          <a:xfrm>
+            <a:off x="0" y="0"/>
+            <a:ext cx="9829800" cy="1383310"/>
+          </a:xfrm>
+        </p:spPr>
         <p:txBody>
           <a:bodyPr>
             <a:normAutofit/>
@@ -4570,45 +4589,45 @@
           <a:lstStyle/>
           <a:p>
             <a:r>
-              <a:rPr lang="en-US" dirty="0"/>
+              <a:rPr lang="en-US" sz="2000" dirty="0"/>
               <a:t>ANOVA Table</a:t>
             </a:r>
             <a:br>
-              <a:rPr lang="en-US" dirty="0"/>
+              <a:rPr lang="en-US" sz="2000" dirty="0"/>
             </a:br>
             <a:r>
-              <a:rPr lang="fr-FR" sz="3600" dirty="0" err="1"/>
+              <a:rPr lang="fr-FR" sz="1600" dirty="0" err="1"/>
               <a:t>Phenotype</a:t>
             </a:r>
             <a:r>
-              <a:rPr lang="fr-FR" sz="3600" dirty="0"/>
+              <a:rPr lang="fr-FR" sz="1600" dirty="0"/>
               <a:t> ~ </a:t>
             </a:r>
             <a:r>
-              <a:rPr lang="fr-FR" sz="3600" dirty="0" err="1"/>
+              <a:rPr lang="fr-FR" sz="1600" dirty="0" err="1"/>
               <a:t>Isolate</a:t>
             </a:r>
             <a:r>
-              <a:rPr lang="fr-FR" sz="3600" dirty="0"/>
+              <a:rPr lang="fr-FR" sz="1600" dirty="0"/>
               <a:t> + (</a:t>
             </a:r>
             <a:r>
-              <a:rPr lang="fr-FR" sz="3600" dirty="0" err="1"/>
+              <a:rPr lang="fr-FR" sz="1600" dirty="0" err="1"/>
               <a:t>Isolate</a:t>
             </a:r>
             <a:r>
-              <a:rPr lang="fr-FR" sz="3600" dirty="0"/>
+              <a:rPr lang="fr-FR" sz="1600" dirty="0"/>
               <a:t>*</a:t>
             </a:r>
             <a:r>
-              <a:rPr lang="fr-FR" sz="3600" dirty="0" err="1"/>
+              <a:rPr lang="fr-FR" sz="1600" dirty="0" err="1"/>
               <a:t>PlateBlock</a:t>
             </a:r>
             <a:r>
-              <a:rPr lang="fr-FR" sz="3600" dirty="0"/>
+              <a:rPr lang="fr-FR" sz="1600" dirty="0"/>
               <a:t>) + Date</a:t>
             </a:r>
-            <a:endParaRPr lang="en-US" dirty="0"/>
+            <a:endParaRPr lang="en-US" sz="2000" dirty="0"/>
           </a:p>
         </p:txBody>
       </p:sp>

</xml_diff>

<commit_message>
Tried spearman correlation instead of pearson. Made new variables that are easy to change. Also made a new document to try and organize the graphs. Work in progress.
</commit_message>
<xml_diff>
--- a/paper/HWavinessGraphs_Figs_Capt.pptx
+++ b/paper/HWavinessGraphs_Figs_Capt.pptx
@@ -11,15 +11,15 @@
     <p:sldId id="260" r:id="rId5"/>
     <p:sldId id="257" r:id="rId6"/>
     <p:sldId id="259" r:id="rId7"/>
-    <p:sldId id="262" r:id="rId8"/>
-    <p:sldId id="264" r:id="rId9"/>
-    <p:sldId id="263" r:id="rId10"/>
-    <p:sldId id="265" r:id="rId11"/>
-    <p:sldId id="266" r:id="rId12"/>
-    <p:sldId id="267" r:id="rId13"/>
-    <p:sldId id="268" r:id="rId14"/>
-    <p:sldId id="269" r:id="rId15"/>
-    <p:sldId id="271" r:id="rId16"/>
+    <p:sldId id="271" r:id="rId8"/>
+    <p:sldId id="262" r:id="rId9"/>
+    <p:sldId id="264" r:id="rId10"/>
+    <p:sldId id="263" r:id="rId11"/>
+    <p:sldId id="265" r:id="rId12"/>
+    <p:sldId id="266" r:id="rId13"/>
+    <p:sldId id="267" r:id="rId14"/>
+    <p:sldId id="268" r:id="rId15"/>
+    <p:sldId id="269" r:id="rId16"/>
   </p:sldIdLst>
   <p:sldSz cx="12192000" cy="6858000"/>
   <p:notesSz cx="6858000" cy="9144000"/>
@@ -417,7 +417,7 @@
           <a:p>
             <a:fld id="{F0953935-3A72-4AE4-BBF3-F653F2BDF975}" type="datetimeFigureOut">
               <a:rPr lang="en-US" smtClean="0"/>
-              <a:t>1/19/2018</a:t>
+              <a:t>1/22/2018</a:t>
             </a:fld>
             <a:endParaRPr lang="en-US"/>
           </a:p>
@@ -615,7 +615,7 @@
           <a:p>
             <a:fld id="{F0953935-3A72-4AE4-BBF3-F653F2BDF975}" type="datetimeFigureOut">
               <a:rPr lang="en-US" smtClean="0"/>
-              <a:t>1/19/2018</a:t>
+              <a:t>1/22/2018</a:t>
             </a:fld>
             <a:endParaRPr lang="en-US"/>
           </a:p>
@@ -823,7 +823,7 @@
           <a:p>
             <a:fld id="{F0953935-3A72-4AE4-BBF3-F653F2BDF975}" type="datetimeFigureOut">
               <a:rPr lang="en-US" smtClean="0"/>
-              <a:t>1/19/2018</a:t>
+              <a:t>1/22/2018</a:t>
             </a:fld>
             <a:endParaRPr lang="en-US"/>
           </a:p>
@@ -1021,7 +1021,7 @@
           <a:p>
             <a:fld id="{F0953935-3A72-4AE4-BBF3-F653F2BDF975}" type="datetimeFigureOut">
               <a:rPr lang="en-US" smtClean="0"/>
-              <a:t>1/19/2018</a:t>
+              <a:t>1/22/2018</a:t>
             </a:fld>
             <a:endParaRPr lang="en-US"/>
           </a:p>
@@ -1296,7 +1296,7 @@
           <a:p>
             <a:fld id="{F0953935-3A72-4AE4-BBF3-F653F2BDF975}" type="datetimeFigureOut">
               <a:rPr lang="en-US" smtClean="0"/>
-              <a:t>1/19/2018</a:t>
+              <a:t>1/22/2018</a:t>
             </a:fld>
             <a:endParaRPr lang="en-US"/>
           </a:p>
@@ -1561,7 +1561,7 @@
           <a:p>
             <a:fld id="{F0953935-3A72-4AE4-BBF3-F653F2BDF975}" type="datetimeFigureOut">
               <a:rPr lang="en-US" smtClean="0"/>
-              <a:t>1/19/2018</a:t>
+              <a:t>1/22/2018</a:t>
             </a:fld>
             <a:endParaRPr lang="en-US"/>
           </a:p>
@@ -1973,7 +1973,7 @@
           <a:p>
             <a:fld id="{F0953935-3A72-4AE4-BBF3-F653F2BDF975}" type="datetimeFigureOut">
               <a:rPr lang="en-US" smtClean="0"/>
-              <a:t>1/19/2018</a:t>
+              <a:t>1/22/2018</a:t>
             </a:fld>
             <a:endParaRPr lang="en-US"/>
           </a:p>
@@ -2114,7 +2114,7 @@
           <a:p>
             <a:fld id="{F0953935-3A72-4AE4-BBF3-F653F2BDF975}" type="datetimeFigureOut">
               <a:rPr lang="en-US" smtClean="0"/>
-              <a:t>1/19/2018</a:t>
+              <a:t>1/22/2018</a:t>
             </a:fld>
             <a:endParaRPr lang="en-US"/>
           </a:p>
@@ -2227,7 +2227,7 @@
           <a:p>
             <a:fld id="{F0953935-3A72-4AE4-BBF3-F653F2BDF975}" type="datetimeFigureOut">
               <a:rPr lang="en-US" smtClean="0"/>
-              <a:t>1/19/2018</a:t>
+              <a:t>1/22/2018</a:t>
             </a:fld>
             <a:endParaRPr lang="en-US"/>
           </a:p>
@@ -2538,7 +2538,7 @@
           <a:p>
             <a:fld id="{F0953935-3A72-4AE4-BBF3-F653F2BDF975}" type="datetimeFigureOut">
               <a:rPr lang="en-US" smtClean="0"/>
-              <a:t>1/19/2018</a:t>
+              <a:t>1/22/2018</a:t>
             </a:fld>
             <a:endParaRPr lang="en-US"/>
           </a:p>
@@ -2826,7 +2826,7 @@
           <a:p>
             <a:fld id="{F0953935-3A72-4AE4-BBF3-F653F2BDF975}" type="datetimeFigureOut">
               <a:rPr lang="en-US" smtClean="0"/>
-              <a:t>1/19/2018</a:t>
+              <a:t>1/22/2018</a:t>
             </a:fld>
             <a:endParaRPr lang="en-US"/>
           </a:p>
@@ -3067,7 +3067,7 @@
           <a:p>
             <a:fld id="{F0953935-3A72-4AE4-BBF3-F653F2BDF975}" type="datetimeFigureOut">
               <a:rPr lang="en-US" smtClean="0"/>
-              <a:t>1/19/2018</a:t>
+              <a:t>1/22/2018</a:t>
             </a:fld>
             <a:endParaRPr lang="en-US"/>
           </a:p>
@@ -3572,17 +3572,19 @@
       </p:grpSpPr>
       <p:pic>
         <p:nvPicPr>
-          <p:cNvPr id="4" name="Picture 3">
-            <a:extLst>
-              <a:ext uri="{FF2B5EF4-FFF2-40B4-BE49-F238E27FC236}">
-                <a16:creationId xmlns:a16="http://schemas.microsoft.com/office/drawing/2014/main" id="{5CFA029F-5C37-4A3D-A83E-D8C65C6BDE0C}"/>
+          <p:cNvPr id="4" name="Content Placeholder 3">
+            <a:extLst>
+              <a:ext uri="{FF2B5EF4-FFF2-40B4-BE49-F238E27FC236}">
+                <a16:creationId xmlns:a16="http://schemas.microsoft.com/office/drawing/2014/main" id="{5EDED94B-5794-43B3-A714-99204A4C3FE7}"/>
               </a:ext>
             </a:extLst>
           </p:cNvPr>
           <p:cNvPicPr>
-            <a:picLocks noChangeAspect="1"/>
+            <a:picLocks noGrp="1" noChangeAspect="1"/>
           </p:cNvPicPr>
-          <p:nvPr/>
+          <p:nvPr>
+            <p:ph idx="1"/>
+          </p:nvPr>
         </p:nvPicPr>
         <p:blipFill>
           <a:blip r:embed="rId2"/>
@@ -3592,8 +3594,8 @@
         </p:blipFill>
         <p:spPr>
           <a:xfrm>
-            <a:off x="0" y="0"/>
-            <a:ext cx="8448234" cy="4479235"/>
+            <a:off x="141532" y="131047"/>
+            <a:ext cx="8335204" cy="6361827"/>
           </a:xfrm>
           <a:prstGeom prst="rect">
             <a:avLst/>
@@ -3605,7 +3607,7 @@
           <p:cNvPr id="5" name="TextBox 4">
             <a:extLst>
               <a:ext uri="{FF2B5EF4-FFF2-40B4-BE49-F238E27FC236}">
-                <a16:creationId xmlns:a16="http://schemas.microsoft.com/office/drawing/2014/main" id="{C05F688A-3013-44AE-9657-1536DAD1E3B7}"/>
+                <a16:creationId xmlns:a16="http://schemas.microsoft.com/office/drawing/2014/main" id="{8239F836-2BB4-41CA-A95A-303CF279E575}"/>
               </a:ext>
             </a:extLst>
           </p:cNvPr>
@@ -3614,8 +3616,8 @@
         </p:nvSpPr>
         <p:spPr>
           <a:xfrm>
-            <a:off x="8448235" y="0"/>
-            <a:ext cx="3743766" cy="12834283"/>
+            <a:off x="8714792" y="261257"/>
+            <a:ext cx="3181739" cy="6740307"/>
           </a:xfrm>
           <a:prstGeom prst="rect">
             <a:avLst/>
@@ -3629,108 +3631,14 @@
           <a:lstStyle/>
           <a:p>
             <a:r>
-              <a:rPr lang="en-US" b="1" dirty="0"/>
-              <a:t>Figure #. Various interactions of B. cinerea lesions sizes on Eudicots with hyphal waviness of B. cinerea. </a:t>
-            </a:r>
-          </a:p>
-          <a:p>
-            <a:r>
               <a:rPr lang="en-US" dirty="0"/>
-              <a:t>Scatter plots of various eudicot lesion sizes due to B. cinerea isolates compared against B. cinerea hyphal waviness based on 97 individual isolates. Each point is an isolate interaction of the marginal means of lesion size with marginal means of hyphal waviness. </a:t>
+              <a:t>Figure #</a:t>
             </a:r>
           </a:p>
           <a:p>
             <a:r>
               <a:rPr lang="en-US" dirty="0"/>
-              <a:t>A) Least Square Mean lesion size on </a:t>
-            </a:r>
-            <a:r>
-              <a:rPr lang="en-US" i="1" dirty="0" err="1"/>
-              <a:t>Cichorium</a:t>
-            </a:r>
-            <a:r>
-              <a:rPr lang="en-US" i="1" dirty="0"/>
-              <a:t> </a:t>
-            </a:r>
-            <a:r>
-              <a:rPr lang="en-US" i="1" dirty="0" err="1"/>
-              <a:t>endivia</a:t>
-            </a:r>
-            <a:endParaRPr lang="en-US" i="1" dirty="0"/>
-          </a:p>
-          <a:p>
-            <a:r>
-              <a:rPr lang="en-US" dirty="0"/>
-              <a:t>B) Least Square Mean lesion size on </a:t>
-            </a:r>
-            <a:r>
-              <a:rPr lang="en-US" i="1" dirty="0"/>
-              <a:t>Brassica </a:t>
-            </a:r>
-            <a:r>
-              <a:rPr lang="en-US" i="1" dirty="0" err="1"/>
-              <a:t>rapa</a:t>
-            </a:r>
-            <a:endParaRPr lang="en-US" i="1" dirty="0"/>
-          </a:p>
-          <a:p>
-            <a:r>
-              <a:rPr lang="en-US" dirty="0"/>
-              <a:t>C) Least Square Mean lesion size on </a:t>
-            </a:r>
-            <a:r>
-              <a:rPr lang="en-US" i="1" dirty="0" err="1"/>
-              <a:t>Cichorium</a:t>
-            </a:r>
-            <a:r>
-              <a:rPr lang="en-US" i="1" dirty="0"/>
-              <a:t> </a:t>
-            </a:r>
-            <a:r>
-              <a:rPr lang="en-US" i="1" dirty="0" err="1"/>
-              <a:t>intybus</a:t>
-            </a:r>
-            <a:endParaRPr lang="en-US" b="1" i="1" dirty="0"/>
-          </a:p>
-          <a:p>
-            <a:r>
-              <a:rPr lang="en-US" dirty="0"/>
-              <a:t>D) Least Square Mean lesion size on </a:t>
-            </a:r>
-            <a:r>
-              <a:rPr lang="en-US" i="1" dirty="0"/>
-              <a:t>Glycine max</a:t>
-            </a:r>
-            <a:r>
-              <a:rPr lang="en-US" dirty="0"/>
-              <a:t> (soy bean)</a:t>
-            </a:r>
-          </a:p>
-          <a:p>
-            <a:r>
-              <a:rPr lang="en-US" dirty="0"/>
-              <a:t>E) Least Square Mean lesion size on </a:t>
-            </a:r>
-            <a:r>
-              <a:rPr lang="en-US" i="1" dirty="0"/>
-              <a:t>Helianthus </a:t>
-            </a:r>
-            <a:r>
-              <a:rPr lang="en-US" i="1" dirty="0" err="1"/>
-              <a:t>annuus</a:t>
-            </a:r>
-            <a:endParaRPr lang="en-US" i="1" dirty="0"/>
-          </a:p>
-          <a:p>
-            <a:r>
-              <a:rPr lang="en-US" dirty="0"/>
-              <a:t>F) Least Square Mean lesion size on Solanum</a:t>
-            </a:r>
-          </a:p>
-          <a:p>
-            <a:r>
-              <a:rPr lang="en-US" dirty="0"/>
-              <a:t>G) Least Square Mean lesion size on Tomato</a:t>
+              <a:t>See other slide and adopt accordingly</a:t>
             </a:r>
           </a:p>
           <a:p>
@@ -3801,7 +3709,7 @@
     </p:spTree>
     <p:extLst>
       <p:ext uri="{BB962C8B-B14F-4D97-AF65-F5344CB8AC3E}">
-        <p14:creationId xmlns:p14="http://schemas.microsoft.com/office/powerpoint/2010/main" val="3663658674"/>
+        <p14:creationId xmlns:p14="http://schemas.microsoft.com/office/powerpoint/2010/main" val="3913836524"/>
       </p:ext>
     </p:extLst>
   </p:cSld>
@@ -3833,7 +3741,7 @@
           <p:cNvPr id="4" name="Picture 3">
             <a:extLst>
               <a:ext uri="{FF2B5EF4-FFF2-40B4-BE49-F238E27FC236}">
-                <a16:creationId xmlns:a16="http://schemas.microsoft.com/office/drawing/2014/main" id="{AD35E458-039B-4600-9C30-83F1B4F1FE07}"/>
+                <a16:creationId xmlns:a16="http://schemas.microsoft.com/office/drawing/2014/main" id="{5CFA029F-5C37-4A3D-A83E-D8C65C6BDE0C}"/>
               </a:ext>
             </a:extLst>
           </p:cNvPr>
@@ -3850,8 +3758,8 @@
         </p:blipFill>
         <p:spPr>
           <a:xfrm>
-            <a:off x="221356" y="921147"/>
-            <a:ext cx="10171470" cy="5367685"/>
+            <a:off x="0" y="0"/>
+            <a:ext cx="8448234" cy="4479235"/>
           </a:xfrm>
           <a:prstGeom prst="rect">
             <a:avLst/>
@@ -3863,7 +3771,7 @@
           <p:cNvPr id="5" name="TextBox 4">
             <a:extLst>
               <a:ext uri="{FF2B5EF4-FFF2-40B4-BE49-F238E27FC236}">
-                <a16:creationId xmlns:a16="http://schemas.microsoft.com/office/drawing/2014/main" id="{CAB32E96-9BBE-4C19-83A2-B652A5B89F03}"/>
+                <a16:creationId xmlns:a16="http://schemas.microsoft.com/office/drawing/2014/main" id="{C05F688A-3013-44AE-9657-1536DAD1E3B7}"/>
               </a:ext>
             </a:extLst>
           </p:cNvPr>
@@ -3872,8 +3780,8 @@
         </p:nvSpPr>
         <p:spPr>
           <a:xfrm>
-            <a:off x="9470146" y="486561"/>
-            <a:ext cx="3181739" cy="7017306"/>
+            <a:off x="8448235" y="0"/>
+            <a:ext cx="3743766" cy="12834283"/>
           </a:xfrm>
           <a:prstGeom prst="rect">
             <a:avLst/>
@@ -3887,22 +3795,108 @@
           <a:lstStyle/>
           <a:p>
             <a:r>
+              <a:rPr lang="en-US" b="1" dirty="0"/>
+              <a:t>Figure #. Various interactions of B. cinerea lesions sizes on Eudicots with hyphal waviness of B. cinerea. </a:t>
+            </a:r>
+          </a:p>
+          <a:p>
+            <a:r>
               <a:rPr lang="en-US" dirty="0"/>
-              <a:t>Figure #</a:t>
+              <a:t>Scatter plots of various eudicot lesion sizes due to B. cinerea isolates compared against B. cinerea hyphal waviness based on 97 individual isolates. Each point is an isolate interaction of the marginal means of lesion size with marginal means of hyphal waviness. </a:t>
             </a:r>
           </a:p>
           <a:p>
             <a:r>
               <a:rPr lang="en-US" dirty="0"/>
-              <a:t>Mean Eccentricity measured against </a:t>
-            </a:r>
-            <a:r>
-              <a:rPr lang="en-US" dirty="0" err="1"/>
-              <a:t>LsMeans</a:t>
-            </a:r>
+              <a:t>A) Least Square Mean lesion size on </a:t>
+            </a:r>
+            <a:r>
+              <a:rPr lang="en-US" i="1" dirty="0" err="1"/>
+              <a:t>Cichorium</a:t>
+            </a:r>
+            <a:r>
+              <a:rPr lang="en-US" i="1" dirty="0"/>
+              <a:t> </a:t>
+            </a:r>
+            <a:r>
+              <a:rPr lang="en-US" i="1" dirty="0" err="1"/>
+              <a:t>endivia</a:t>
+            </a:r>
+            <a:endParaRPr lang="en-US" i="1" dirty="0"/>
+          </a:p>
+          <a:p>
             <a:r>
               <a:rPr lang="en-US" dirty="0"/>
-              <a:t> Hyphal Waviness</a:t>
+              <a:t>B) Least Square Mean lesion size on </a:t>
+            </a:r>
+            <a:r>
+              <a:rPr lang="en-US" i="1" dirty="0"/>
+              <a:t>Brassica </a:t>
+            </a:r>
+            <a:r>
+              <a:rPr lang="en-US" i="1" dirty="0" err="1"/>
+              <a:t>rapa</a:t>
+            </a:r>
+            <a:endParaRPr lang="en-US" i="1" dirty="0"/>
+          </a:p>
+          <a:p>
+            <a:r>
+              <a:rPr lang="en-US" dirty="0"/>
+              <a:t>C) Least Square Mean lesion size on </a:t>
+            </a:r>
+            <a:r>
+              <a:rPr lang="en-US" i="1" dirty="0" err="1"/>
+              <a:t>Cichorium</a:t>
+            </a:r>
+            <a:r>
+              <a:rPr lang="en-US" i="1" dirty="0"/>
+              <a:t> </a:t>
+            </a:r>
+            <a:r>
+              <a:rPr lang="en-US" i="1" dirty="0" err="1"/>
+              <a:t>intybus</a:t>
+            </a:r>
+            <a:endParaRPr lang="en-US" b="1" i="1" dirty="0"/>
+          </a:p>
+          <a:p>
+            <a:r>
+              <a:rPr lang="en-US" dirty="0"/>
+              <a:t>D) Least Square Mean lesion size on </a:t>
+            </a:r>
+            <a:r>
+              <a:rPr lang="en-US" i="1" dirty="0"/>
+              <a:t>Glycine max</a:t>
+            </a:r>
+            <a:r>
+              <a:rPr lang="en-US" dirty="0"/>
+              <a:t> (soy bean)</a:t>
+            </a:r>
+          </a:p>
+          <a:p>
+            <a:r>
+              <a:rPr lang="en-US" dirty="0"/>
+              <a:t>E) Least Square Mean lesion size on </a:t>
+            </a:r>
+            <a:r>
+              <a:rPr lang="en-US" i="1" dirty="0"/>
+              <a:t>Helianthus </a:t>
+            </a:r>
+            <a:r>
+              <a:rPr lang="en-US" i="1" dirty="0" err="1"/>
+              <a:t>annuus</a:t>
+            </a:r>
+            <a:endParaRPr lang="en-US" i="1" dirty="0"/>
+          </a:p>
+          <a:p>
+            <a:r>
+              <a:rPr lang="en-US" dirty="0"/>
+              <a:t>F) Least Square Mean lesion size on Solanum</a:t>
+            </a:r>
+          </a:p>
+          <a:p>
+            <a:r>
+              <a:rPr lang="en-US" dirty="0"/>
+              <a:t>G) Least Square Mean lesion size on Tomato</a:t>
             </a:r>
           </a:p>
           <a:p>
@@ -3973,7 +3967,7 @@
     </p:spTree>
     <p:extLst>
       <p:ext uri="{BB962C8B-B14F-4D97-AF65-F5344CB8AC3E}">
-        <p14:creationId xmlns:p14="http://schemas.microsoft.com/office/powerpoint/2010/main" val="2222312369"/>
+        <p14:creationId xmlns:p14="http://schemas.microsoft.com/office/powerpoint/2010/main" val="3663658674"/>
       </p:ext>
     </p:extLst>
   </p:cSld>
@@ -4005,7 +3999,7 @@
           <p:cNvPr id="4" name="Picture 3">
             <a:extLst>
               <a:ext uri="{FF2B5EF4-FFF2-40B4-BE49-F238E27FC236}">
-                <a16:creationId xmlns:a16="http://schemas.microsoft.com/office/drawing/2014/main" id="{96D836BE-EE17-4E5A-AF5A-F5280910B240}"/>
+                <a16:creationId xmlns:a16="http://schemas.microsoft.com/office/drawing/2014/main" id="{AD35E458-039B-4600-9C30-83F1B4F1FE07}"/>
               </a:ext>
             </a:extLst>
           </p:cNvPr>
@@ -4022,8 +4016,8 @@
         </p:blipFill>
         <p:spPr>
           <a:xfrm>
-            <a:off x="117446" y="1469530"/>
-            <a:ext cx="9605479" cy="5057106"/>
+            <a:off x="221356" y="921147"/>
+            <a:ext cx="10171470" cy="5367685"/>
           </a:xfrm>
           <a:prstGeom prst="rect">
             <a:avLst/>
@@ -4035,7 +4029,7 @@
           <p:cNvPr id="5" name="TextBox 4">
             <a:extLst>
               <a:ext uri="{FF2B5EF4-FFF2-40B4-BE49-F238E27FC236}">
-                <a16:creationId xmlns:a16="http://schemas.microsoft.com/office/drawing/2014/main" id="{E7F5E934-14F2-4CD1-8B4F-6F9B7F34B346}"/>
+                <a16:creationId xmlns:a16="http://schemas.microsoft.com/office/drawing/2014/main" id="{CAB32E96-9BBE-4C19-83A2-B652A5B89F03}"/>
               </a:ext>
             </a:extLst>
           </p:cNvPr>
@@ -4066,7 +4060,15 @@
           <a:p>
             <a:r>
               <a:rPr lang="en-US" dirty="0"/>
-              <a:t>Mean Eccentricity measured against Average Hyphal Waviness</a:t>
+              <a:t>Mean Eccentricity measured against </a:t>
+            </a:r>
+            <a:r>
+              <a:rPr lang="en-US" dirty="0" err="1"/>
+              <a:t>LsMeans</a:t>
+            </a:r>
+            <a:r>
+              <a:rPr lang="en-US" dirty="0"/>
+              <a:t> Hyphal Waviness</a:t>
             </a:r>
           </a:p>
           <a:p>
@@ -4137,7 +4139,7 @@
     </p:spTree>
     <p:extLst>
       <p:ext uri="{BB962C8B-B14F-4D97-AF65-F5344CB8AC3E}">
-        <p14:creationId xmlns:p14="http://schemas.microsoft.com/office/powerpoint/2010/main" val="3487976611"/>
+        <p14:creationId xmlns:p14="http://schemas.microsoft.com/office/powerpoint/2010/main" val="2222312369"/>
       </p:ext>
     </p:extLst>
   </p:cSld>
@@ -4169,7 +4171,7 @@
           <p:cNvPr id="4" name="Picture 3">
             <a:extLst>
               <a:ext uri="{FF2B5EF4-FFF2-40B4-BE49-F238E27FC236}">
-                <a16:creationId xmlns:a16="http://schemas.microsoft.com/office/drawing/2014/main" id="{A5A3DE45-2C20-4329-B332-5AB1FB98625D}"/>
+                <a16:creationId xmlns:a16="http://schemas.microsoft.com/office/drawing/2014/main" id="{96D836BE-EE17-4E5A-AF5A-F5280910B240}"/>
               </a:ext>
             </a:extLst>
           </p:cNvPr>
@@ -4186,8 +4188,8 @@
         </p:blipFill>
         <p:spPr>
           <a:xfrm>
-            <a:off x="614862" y="0"/>
-            <a:ext cx="10907504" cy="5614587"/>
+            <a:off x="117446" y="1469530"/>
+            <a:ext cx="9605479" cy="5057106"/>
           </a:xfrm>
           <a:prstGeom prst="rect">
             <a:avLst/>
@@ -4199,7 +4201,7 @@
           <p:cNvPr id="5" name="TextBox 4">
             <a:extLst>
               <a:ext uri="{FF2B5EF4-FFF2-40B4-BE49-F238E27FC236}">
-                <a16:creationId xmlns:a16="http://schemas.microsoft.com/office/drawing/2014/main" id="{1AE750E3-E617-4F3B-BC74-CD750B123654}"/>
+                <a16:creationId xmlns:a16="http://schemas.microsoft.com/office/drawing/2014/main" id="{E7F5E934-14F2-4CD1-8B4F-6F9B7F34B346}"/>
               </a:ext>
             </a:extLst>
           </p:cNvPr>
@@ -4208,8 +4210,8 @@
         </p:nvSpPr>
         <p:spPr>
           <a:xfrm>
-            <a:off x="1751731" y="5528915"/>
-            <a:ext cx="11367082" cy="1477328"/>
+            <a:off x="9470146" y="486561"/>
+            <a:ext cx="3181739" cy="7017306"/>
           </a:xfrm>
           <a:prstGeom prst="rect">
             <a:avLst/>
@@ -4224,22 +4226,68 @@
           <a:p>
             <a:r>
               <a:rPr lang="en-US" dirty="0"/>
-              <a:t>Figure#:</a:t>
+              <a:t>Figure #</a:t>
             </a:r>
           </a:p>
           <a:p>
             <a:r>
               <a:rPr lang="en-US" dirty="0"/>
-              <a:t>Lesion Eccentricity on Multiple Hosts against </a:t>
-            </a:r>
-            <a:r>
-              <a:rPr lang="en-US" dirty="0" err="1"/>
-              <a:t>LsMeans</a:t>
-            </a:r>
-            <a:r>
-              <a:rPr lang="en-US" dirty="0"/>
-              <a:t> Hyphal Waviness</a:t>
-            </a:r>
+              <a:t>Mean Eccentricity measured against Average Hyphal Waviness</a:t>
+            </a:r>
+          </a:p>
+          <a:p>
+            <a:endParaRPr lang="en-US" dirty="0"/>
+          </a:p>
+          <a:p>
+            <a:endParaRPr lang="en-US" dirty="0"/>
+          </a:p>
+          <a:p>
+            <a:endParaRPr lang="en-US" dirty="0"/>
+          </a:p>
+          <a:p>
+            <a:endParaRPr lang="en-US" dirty="0"/>
+          </a:p>
+          <a:p>
+            <a:endParaRPr lang="en-US" dirty="0"/>
+          </a:p>
+          <a:p>
+            <a:endParaRPr lang="en-US" dirty="0"/>
+          </a:p>
+          <a:p>
+            <a:endParaRPr lang="en-US" dirty="0"/>
+          </a:p>
+          <a:p>
+            <a:endParaRPr lang="en-US" dirty="0"/>
+          </a:p>
+          <a:p>
+            <a:endParaRPr lang="en-US" dirty="0"/>
+          </a:p>
+          <a:p>
+            <a:endParaRPr lang="en-US" dirty="0"/>
+          </a:p>
+          <a:p>
+            <a:endParaRPr lang="en-US" dirty="0"/>
+          </a:p>
+          <a:p>
+            <a:endParaRPr lang="en-US" dirty="0"/>
+          </a:p>
+          <a:p>
+            <a:endParaRPr lang="en-US" dirty="0"/>
+          </a:p>
+          <a:p>
+            <a:endParaRPr lang="en-US" dirty="0"/>
+          </a:p>
+          <a:p>
+            <a:endParaRPr lang="en-US" dirty="0"/>
+          </a:p>
+          <a:p>
+            <a:endParaRPr lang="en-US" dirty="0"/>
+          </a:p>
+          <a:p>
+            <a:endParaRPr lang="en-US" dirty="0"/>
+          </a:p>
+          <a:p>
+            <a:endParaRPr lang="en-US" dirty="0"/>
           </a:p>
           <a:p>
             <a:endParaRPr lang="en-US" dirty="0"/>
@@ -4255,7 +4303,7 @@
     </p:spTree>
     <p:extLst>
       <p:ext uri="{BB962C8B-B14F-4D97-AF65-F5344CB8AC3E}">
-        <p14:creationId xmlns:p14="http://schemas.microsoft.com/office/powerpoint/2010/main" val="3428673227"/>
+        <p14:creationId xmlns:p14="http://schemas.microsoft.com/office/powerpoint/2010/main" val="3487976611"/>
       </p:ext>
     </p:extLst>
   </p:cSld>
@@ -4287,7 +4335,7 @@
           <p:cNvPr id="4" name="Picture 3">
             <a:extLst>
               <a:ext uri="{FF2B5EF4-FFF2-40B4-BE49-F238E27FC236}">
-                <a16:creationId xmlns:a16="http://schemas.microsoft.com/office/drawing/2014/main" id="{E8F14CF8-CC50-43E1-A7F7-633BBC9CC06D}"/>
+                <a16:creationId xmlns:a16="http://schemas.microsoft.com/office/drawing/2014/main" id="{A5A3DE45-2C20-4329-B332-5AB1FB98625D}"/>
               </a:ext>
             </a:extLst>
           </p:cNvPr>
@@ -4304,8 +4352,8 @@
         </p:blipFill>
         <p:spPr>
           <a:xfrm>
-            <a:off x="0" y="0"/>
-            <a:ext cx="10916129" cy="5592184"/>
+            <a:off x="614862" y="0"/>
+            <a:ext cx="10907504" cy="5614587"/>
           </a:xfrm>
           <a:prstGeom prst="rect">
             <a:avLst/>
@@ -4314,35 +4362,53 @@
       </p:pic>
       <p:sp>
         <p:nvSpPr>
-          <p:cNvPr id="5" name="Rectangle 4">
-            <a:extLst>
-              <a:ext uri="{FF2B5EF4-FFF2-40B4-BE49-F238E27FC236}">
-                <a16:creationId xmlns:a16="http://schemas.microsoft.com/office/drawing/2014/main" id="{0039E68E-C138-47F5-A776-F5EED5BD3999}"/>
-              </a:ext>
-            </a:extLst>
-          </p:cNvPr>
-          <p:cNvSpPr/>
+          <p:cNvPr id="5" name="TextBox 4">
+            <a:extLst>
+              <a:ext uri="{FF2B5EF4-FFF2-40B4-BE49-F238E27FC236}">
+                <a16:creationId xmlns:a16="http://schemas.microsoft.com/office/drawing/2014/main" id="{1AE750E3-E617-4F3B-BC74-CD750B123654}"/>
+              </a:ext>
+            </a:extLst>
+          </p:cNvPr>
+          <p:cNvSpPr txBox="1"/>
           <p:nvPr/>
         </p:nvSpPr>
         <p:spPr>
           <a:xfrm>
-            <a:off x="1140607" y="5724882"/>
-            <a:ext cx="10047215" cy="923330"/>
+            <a:off x="1751731" y="5528915"/>
+            <a:ext cx="11367082" cy="1477328"/>
           </a:xfrm>
           <a:prstGeom prst="rect">
             <a:avLst/>
           </a:prstGeom>
+          <a:noFill/>
         </p:spPr>
         <p:txBody>
-          <a:bodyPr wrap="square">
+          <a:bodyPr wrap="square" rtlCol="0">
             <a:spAutoFit/>
           </a:bodyPr>
           <a:lstStyle/>
           <a:p>
             <a:r>
               <a:rPr lang="en-US" dirty="0"/>
-              <a:t>Figure#. B. cinerea Lesion Eccentricity on Multiple Hosts against Average Hyphal Waviness</a:t>
-            </a:r>
+              <a:t>Figure#:</a:t>
+            </a:r>
+          </a:p>
+          <a:p>
+            <a:r>
+              <a:rPr lang="en-US" dirty="0"/>
+              <a:t>Lesion Eccentricity on Multiple Hosts against </a:t>
+            </a:r>
+            <a:r>
+              <a:rPr lang="en-US" dirty="0" err="1"/>
+              <a:t>LsMeans</a:t>
+            </a:r>
+            <a:r>
+              <a:rPr lang="en-US" dirty="0"/>
+              <a:t> Hyphal Waviness</a:t>
+            </a:r>
+          </a:p>
+          <a:p>
+            <a:endParaRPr lang="en-US" dirty="0"/>
           </a:p>
           <a:p>
             <a:endParaRPr lang="en-US" dirty="0"/>
@@ -4355,7 +4421,7 @@
     </p:spTree>
     <p:extLst>
       <p:ext uri="{BB962C8B-B14F-4D97-AF65-F5344CB8AC3E}">
-        <p14:creationId xmlns:p14="http://schemas.microsoft.com/office/powerpoint/2010/main" val="217600402"/>
+        <p14:creationId xmlns:p14="http://schemas.microsoft.com/office/powerpoint/2010/main" val="3428673227"/>
       </p:ext>
     </p:extLst>
   </p:cSld>
@@ -4382,63 +4448,80 @@
           <a:chExt cx="0" cy="0"/>
         </a:xfrm>
       </p:grpSpPr>
-      <p:sp>
-        <p:nvSpPr>
-          <p:cNvPr id="2" name="Title 1">
-            <a:extLst>
-              <a:ext uri="{FF2B5EF4-FFF2-40B4-BE49-F238E27FC236}">
-                <a16:creationId xmlns:a16="http://schemas.microsoft.com/office/drawing/2014/main" id="{5FCDA60D-EB0B-429A-88FA-68663306C63D}"/>
-              </a:ext>
-            </a:extLst>
-          </p:cNvPr>
-          <p:cNvSpPr>
-            <a:spLocks noGrp="1"/>
-          </p:cNvSpPr>
-          <p:nvPr>
-            <p:ph type="title"/>
-          </p:nvPr>
-        </p:nvSpPr>
-        <p:spPr/>
-        <p:txBody>
-          <a:bodyPr/>
+      <p:pic>
+        <p:nvPicPr>
+          <p:cNvPr id="4" name="Picture 3">
+            <a:extLst>
+              <a:ext uri="{FF2B5EF4-FFF2-40B4-BE49-F238E27FC236}">
+                <a16:creationId xmlns:a16="http://schemas.microsoft.com/office/drawing/2014/main" id="{E8F14CF8-CC50-43E1-A7F7-633BBC9CC06D}"/>
+              </a:ext>
+            </a:extLst>
+          </p:cNvPr>
+          <p:cNvPicPr>
+            <a:picLocks noChangeAspect="1"/>
+          </p:cNvPicPr>
+          <p:nvPr/>
+        </p:nvPicPr>
+        <p:blipFill>
+          <a:blip r:embed="rId2"/>
+          <a:stretch>
+            <a:fillRect/>
+          </a:stretch>
+        </p:blipFill>
+        <p:spPr>
+          <a:xfrm>
+            <a:off x="0" y="0"/>
+            <a:ext cx="10916129" cy="5592184"/>
+          </a:xfrm>
+          <a:prstGeom prst="rect">
+            <a:avLst/>
+          </a:prstGeom>
+        </p:spPr>
+      </p:pic>
+      <p:sp>
+        <p:nvSpPr>
+          <p:cNvPr id="5" name="Rectangle 4">
+            <a:extLst>
+              <a:ext uri="{FF2B5EF4-FFF2-40B4-BE49-F238E27FC236}">
+                <a16:creationId xmlns:a16="http://schemas.microsoft.com/office/drawing/2014/main" id="{0039E68E-C138-47F5-A776-F5EED5BD3999}"/>
+              </a:ext>
+            </a:extLst>
+          </p:cNvPr>
+          <p:cNvSpPr/>
+          <p:nvPr/>
+        </p:nvSpPr>
+        <p:spPr>
+          <a:xfrm>
+            <a:off x="1140607" y="5724882"/>
+            <a:ext cx="10047215" cy="923330"/>
+          </a:xfrm>
+          <a:prstGeom prst="rect">
+            <a:avLst/>
+          </a:prstGeom>
+        </p:spPr>
+        <p:txBody>
+          <a:bodyPr wrap="square">
+            <a:spAutoFit/>
+          </a:bodyPr>
           <a:lstStyle/>
           <a:p>
             <a:r>
               <a:rPr lang="en-US" dirty="0"/>
-              <a:t>GWA analysis graphs</a:t>
-            </a:r>
-          </a:p>
-        </p:txBody>
-      </p:sp>
-      <p:sp>
-        <p:nvSpPr>
-          <p:cNvPr id="3" name="Content Placeholder 2">
-            <a:extLst>
-              <a:ext uri="{FF2B5EF4-FFF2-40B4-BE49-F238E27FC236}">
-                <a16:creationId xmlns:a16="http://schemas.microsoft.com/office/drawing/2014/main" id="{D22D06AB-9AD5-4840-9F1F-DFF5366B615F}"/>
-              </a:ext>
-            </a:extLst>
-          </p:cNvPr>
-          <p:cNvSpPr>
-            <a:spLocks noGrp="1"/>
-          </p:cNvSpPr>
-          <p:nvPr>
-            <p:ph idx="1"/>
-          </p:nvPr>
-        </p:nvSpPr>
-        <p:spPr/>
-        <p:txBody>
-          <a:bodyPr/>
-          <a:lstStyle/>
-          <a:p>
-            <a:endParaRPr lang="en-US"/>
+              <a:t>Figure#. B. cinerea Lesion Eccentricity on Multiple Hosts against Average Hyphal Waviness</a:t>
+            </a:r>
+          </a:p>
+          <a:p>
+            <a:endParaRPr lang="en-US" dirty="0"/>
+          </a:p>
+          <a:p>
+            <a:endParaRPr lang="en-US" dirty="0"/>
           </a:p>
         </p:txBody>
       </p:sp>
     </p:spTree>
     <p:extLst>
       <p:ext uri="{BB962C8B-B14F-4D97-AF65-F5344CB8AC3E}">
-        <p14:creationId xmlns:p14="http://schemas.microsoft.com/office/powerpoint/2010/main" val="65335568"/>
+        <p14:creationId xmlns:p14="http://schemas.microsoft.com/office/powerpoint/2010/main" val="217600402"/>
       </p:ext>
     </p:extLst>
   </p:cSld>
@@ -6344,119 +6427,63 @@
           <a:chExt cx="0" cy="0"/>
         </a:xfrm>
       </p:grpSpPr>
-      <p:pic>
-        <p:nvPicPr>
-          <p:cNvPr id="4" name="Content Placeholder 3">
-            <a:extLst>
-              <a:ext uri="{FF2B5EF4-FFF2-40B4-BE49-F238E27FC236}">
-                <a16:creationId xmlns:a16="http://schemas.microsoft.com/office/drawing/2014/main" id="{5CF1D73C-CDAF-4C5E-870D-8BA455DA916C}"/>
-              </a:ext>
-            </a:extLst>
-          </p:cNvPr>
-          <p:cNvPicPr>
-            <a:picLocks noGrp="1" noChangeAspect="1"/>
-          </p:cNvPicPr>
+      <p:sp>
+        <p:nvSpPr>
+          <p:cNvPr id="2" name="Title 1">
+            <a:extLst>
+              <a:ext uri="{FF2B5EF4-FFF2-40B4-BE49-F238E27FC236}">
+                <a16:creationId xmlns:a16="http://schemas.microsoft.com/office/drawing/2014/main" id="{5FCDA60D-EB0B-429A-88FA-68663306C63D}"/>
+              </a:ext>
+            </a:extLst>
+          </p:cNvPr>
+          <p:cNvSpPr>
+            <a:spLocks noGrp="1"/>
+          </p:cNvSpPr>
+          <p:nvPr>
+            <p:ph type="title"/>
+          </p:nvPr>
+        </p:nvSpPr>
+        <p:spPr/>
+        <p:txBody>
+          <a:bodyPr/>
+          <a:lstStyle/>
+          <a:p>
+            <a:r>
+              <a:rPr lang="en-US" dirty="0"/>
+              <a:t>GWA analysis graphs</a:t>
+            </a:r>
+          </a:p>
+        </p:txBody>
+      </p:sp>
+      <p:sp>
+        <p:nvSpPr>
+          <p:cNvPr id="3" name="Content Placeholder 2">
+            <a:extLst>
+              <a:ext uri="{FF2B5EF4-FFF2-40B4-BE49-F238E27FC236}">
+                <a16:creationId xmlns:a16="http://schemas.microsoft.com/office/drawing/2014/main" id="{D22D06AB-9AD5-4840-9F1F-DFF5366B615F}"/>
+              </a:ext>
+            </a:extLst>
+          </p:cNvPr>
+          <p:cNvSpPr>
+            <a:spLocks noGrp="1"/>
+          </p:cNvSpPr>
           <p:nvPr>
             <p:ph idx="1"/>
           </p:nvPr>
-        </p:nvPicPr>
-        <p:blipFill>
-          <a:blip r:embed="rId2"/>
-          <a:stretch>
-            <a:fillRect/>
-          </a:stretch>
-        </p:blipFill>
-        <p:spPr>
-          <a:xfrm>
-            <a:off x="119742" y="365125"/>
-            <a:ext cx="7685837" cy="5830402"/>
-          </a:xfrm>
-          <a:prstGeom prst="rect">
-            <a:avLst/>
-          </a:prstGeom>
-        </p:spPr>
-      </p:pic>
-      <p:sp>
-        <p:nvSpPr>
-          <p:cNvPr id="5" name="TextBox 4">
-            <a:extLst>
-              <a:ext uri="{FF2B5EF4-FFF2-40B4-BE49-F238E27FC236}">
-                <a16:creationId xmlns:a16="http://schemas.microsoft.com/office/drawing/2014/main" id="{8790B5DB-5369-4BEC-9097-5F6FDC915BE0}"/>
-              </a:ext>
-            </a:extLst>
-          </p:cNvPr>
-          <p:cNvSpPr txBox="1"/>
-          <p:nvPr/>
-        </p:nvSpPr>
-        <p:spPr>
-          <a:xfrm>
-            <a:off x="8854751" y="2099388"/>
-            <a:ext cx="2304661" cy="4801314"/>
-          </a:xfrm>
-          <a:prstGeom prst="rect">
-            <a:avLst/>
-          </a:prstGeom>
-          <a:noFill/>
-        </p:spPr>
-        <p:txBody>
-          <a:bodyPr wrap="square" rtlCol="0">
-            <a:spAutoFit/>
-          </a:bodyPr>
+        </p:nvSpPr>
+        <p:spPr/>
+        <p:txBody>
+          <a:bodyPr/>
           <a:lstStyle/>
           <a:p>
-            <a:r>
-              <a:rPr lang="en-US" dirty="0"/>
-              <a:t>Figure # - </a:t>
-            </a:r>
-          </a:p>
-          <a:p>
-            <a:r>
-              <a:rPr lang="en-US" dirty="0"/>
-              <a:t>Average Hyphal Waviness plotted against Growth on Sugar/Pectin </a:t>
-            </a:r>
-          </a:p>
-          <a:p>
-            <a:endParaRPr lang="en-US" dirty="0"/>
-          </a:p>
-          <a:p>
-            <a:endParaRPr lang="en-US" dirty="0"/>
-          </a:p>
-          <a:p>
-            <a:endParaRPr lang="en-US" dirty="0"/>
-          </a:p>
-          <a:p>
-            <a:endParaRPr lang="en-US" dirty="0"/>
-          </a:p>
-          <a:p>
-            <a:endParaRPr lang="en-US" dirty="0"/>
-          </a:p>
-          <a:p>
-            <a:endParaRPr lang="en-US" dirty="0"/>
-          </a:p>
-          <a:p>
-            <a:endParaRPr lang="en-US" dirty="0"/>
-          </a:p>
-          <a:p>
-            <a:endParaRPr lang="en-US" dirty="0"/>
-          </a:p>
-          <a:p>
-            <a:endParaRPr lang="en-US" dirty="0"/>
-          </a:p>
-          <a:p>
-            <a:endParaRPr lang="en-US" dirty="0"/>
-          </a:p>
-          <a:p>
-            <a:endParaRPr lang="en-US" dirty="0"/>
-          </a:p>
-          <a:p>
-            <a:endParaRPr lang="en-US" dirty="0"/>
+            <a:endParaRPr lang="en-US"/>
           </a:p>
         </p:txBody>
       </p:sp>
     </p:spTree>
     <p:extLst>
       <p:ext uri="{BB962C8B-B14F-4D97-AF65-F5344CB8AC3E}">
-        <p14:creationId xmlns:p14="http://schemas.microsoft.com/office/powerpoint/2010/main" val="2927980237"/>
+        <p14:creationId xmlns:p14="http://schemas.microsoft.com/office/powerpoint/2010/main" val="65335568"/>
       </p:ext>
     </p:extLst>
   </p:cSld>
@@ -6485,17 +6512,19 @@
       </p:grpSpPr>
       <p:pic>
         <p:nvPicPr>
-          <p:cNvPr id="4" name="Picture 3">
-            <a:extLst>
-              <a:ext uri="{FF2B5EF4-FFF2-40B4-BE49-F238E27FC236}">
-                <a16:creationId xmlns:a16="http://schemas.microsoft.com/office/drawing/2014/main" id="{8605A398-FB34-451A-9C81-408789C9CE59}"/>
+          <p:cNvPr id="4" name="Content Placeholder 3">
+            <a:extLst>
+              <a:ext uri="{FF2B5EF4-FFF2-40B4-BE49-F238E27FC236}">
+                <a16:creationId xmlns:a16="http://schemas.microsoft.com/office/drawing/2014/main" id="{5CF1D73C-CDAF-4C5E-870D-8BA455DA916C}"/>
               </a:ext>
             </a:extLst>
           </p:cNvPr>
           <p:cNvPicPr>
-            <a:picLocks noChangeAspect="1"/>
+            <a:picLocks noGrp="1" noChangeAspect="1"/>
           </p:cNvPicPr>
-          <p:nvPr/>
+          <p:nvPr>
+            <p:ph idx="1"/>
+          </p:nvPr>
         </p:nvPicPr>
         <p:blipFill>
           <a:blip r:embed="rId2"/>
@@ -6505,8 +6534,8 @@
         </p:blipFill>
         <p:spPr>
           <a:xfrm>
-            <a:off x="269032" y="287358"/>
-            <a:ext cx="8476601" cy="5611480"/>
+            <a:off x="119742" y="365125"/>
+            <a:ext cx="7685837" cy="5830402"/>
           </a:xfrm>
           <a:prstGeom prst="rect">
             <a:avLst/>
@@ -6518,7 +6547,7 @@
           <p:cNvPr id="5" name="TextBox 4">
             <a:extLst>
               <a:ext uri="{FF2B5EF4-FFF2-40B4-BE49-F238E27FC236}">
-                <a16:creationId xmlns:a16="http://schemas.microsoft.com/office/drawing/2014/main" id="{C05AC16E-131F-4276-8267-1539454128F8}"/>
+                <a16:creationId xmlns:a16="http://schemas.microsoft.com/office/drawing/2014/main" id="{8790B5DB-5369-4BEC-9097-5F6FDC915BE0}"/>
               </a:ext>
             </a:extLst>
           </p:cNvPr>
@@ -6527,7 +6556,7 @@
         </p:nvSpPr>
         <p:spPr>
           <a:xfrm>
-            <a:off x="8879918" y="941707"/>
+            <a:off x="8854751" y="2099388"/>
             <a:ext cx="2304661" cy="4801314"/>
           </a:xfrm>
           <a:prstGeom prst="rect">
@@ -6548,12 +6577,8 @@
           </a:p>
           <a:p>
             <a:r>
-              <a:rPr lang="en-US" dirty="0" err="1"/>
-              <a:t>LsMeans</a:t>
-            </a:r>
-            <a:r>
               <a:rPr lang="en-US" dirty="0"/>
-              <a:t> Hyphal Waviness plotted against Growth on Sugar/Pectin </a:t>
+              <a:t>Average Hyphal Waviness plotted against Growth on Sugar/Pectin </a:t>
             </a:r>
           </a:p>
           <a:p>
@@ -6597,7 +6622,7 @@
     </p:spTree>
     <p:extLst>
       <p:ext uri="{BB962C8B-B14F-4D97-AF65-F5344CB8AC3E}">
-        <p14:creationId xmlns:p14="http://schemas.microsoft.com/office/powerpoint/2010/main" val="2123462057"/>
+        <p14:creationId xmlns:p14="http://schemas.microsoft.com/office/powerpoint/2010/main" val="2927980237"/>
       </p:ext>
     </p:extLst>
   </p:cSld>
@@ -6626,19 +6651,17 @@
       </p:grpSpPr>
       <p:pic>
         <p:nvPicPr>
-          <p:cNvPr id="4" name="Content Placeholder 3">
-            <a:extLst>
-              <a:ext uri="{FF2B5EF4-FFF2-40B4-BE49-F238E27FC236}">
-                <a16:creationId xmlns:a16="http://schemas.microsoft.com/office/drawing/2014/main" id="{5EDED94B-5794-43B3-A714-99204A4C3FE7}"/>
+          <p:cNvPr id="4" name="Picture 3">
+            <a:extLst>
+              <a:ext uri="{FF2B5EF4-FFF2-40B4-BE49-F238E27FC236}">
+                <a16:creationId xmlns:a16="http://schemas.microsoft.com/office/drawing/2014/main" id="{8605A398-FB34-451A-9C81-408789C9CE59}"/>
               </a:ext>
             </a:extLst>
           </p:cNvPr>
           <p:cNvPicPr>
-            <a:picLocks noGrp="1" noChangeAspect="1"/>
+            <a:picLocks noChangeAspect="1"/>
           </p:cNvPicPr>
-          <p:nvPr>
-            <p:ph idx="1"/>
-          </p:nvPr>
+          <p:nvPr/>
         </p:nvPicPr>
         <p:blipFill>
           <a:blip r:embed="rId2"/>
@@ -6648,8 +6671,8 @@
         </p:blipFill>
         <p:spPr>
           <a:xfrm>
-            <a:off x="141532" y="131047"/>
-            <a:ext cx="8335204" cy="6361827"/>
+            <a:off x="269032" y="287358"/>
+            <a:ext cx="8476601" cy="5611480"/>
           </a:xfrm>
           <a:prstGeom prst="rect">
             <a:avLst/>
@@ -6661,7 +6684,7 @@
           <p:cNvPr id="5" name="TextBox 4">
             <a:extLst>
               <a:ext uri="{FF2B5EF4-FFF2-40B4-BE49-F238E27FC236}">
-                <a16:creationId xmlns:a16="http://schemas.microsoft.com/office/drawing/2014/main" id="{8239F836-2BB4-41CA-A95A-303CF279E575}"/>
+                <a16:creationId xmlns:a16="http://schemas.microsoft.com/office/drawing/2014/main" id="{C05AC16E-131F-4276-8267-1539454128F8}"/>
               </a:ext>
             </a:extLst>
           </p:cNvPr>
@@ -6670,8 +6693,8 @@
         </p:nvSpPr>
         <p:spPr>
           <a:xfrm>
-            <a:off x="8714792" y="261257"/>
-            <a:ext cx="3181739" cy="6740307"/>
+            <a:off x="8879918" y="941707"/>
+            <a:ext cx="2304661" cy="4801314"/>
           </a:xfrm>
           <a:prstGeom prst="rect">
             <a:avLst/>
@@ -6686,41 +6709,18 @@
           <a:p>
             <a:r>
               <a:rPr lang="en-US" dirty="0"/>
-              <a:t>Figure #</a:t>
-            </a:r>
-          </a:p>
-          <a:p>
+              <a:t>Figure # - </a:t>
+            </a:r>
+          </a:p>
+          <a:p>
+            <a:r>
+              <a:rPr lang="en-US" dirty="0" err="1"/>
+              <a:t>LsMeans</a:t>
+            </a:r>
             <a:r>
               <a:rPr lang="en-US" dirty="0"/>
-              <a:t>See other slide and adopt accordingly</a:t>
-            </a:r>
-          </a:p>
-          <a:p>
-            <a:endParaRPr lang="en-US" dirty="0"/>
-          </a:p>
-          <a:p>
-            <a:endParaRPr lang="en-US" dirty="0"/>
-          </a:p>
-          <a:p>
-            <a:endParaRPr lang="en-US" dirty="0"/>
-          </a:p>
-          <a:p>
-            <a:endParaRPr lang="en-US" dirty="0"/>
-          </a:p>
-          <a:p>
-            <a:endParaRPr lang="en-US" dirty="0"/>
-          </a:p>
-          <a:p>
-            <a:endParaRPr lang="en-US" dirty="0"/>
-          </a:p>
-          <a:p>
-            <a:endParaRPr lang="en-US" dirty="0"/>
-          </a:p>
-          <a:p>
-            <a:endParaRPr lang="en-US" dirty="0"/>
-          </a:p>
-          <a:p>
-            <a:endParaRPr lang="en-US" dirty="0"/>
+              <a:t> Hyphal Waviness plotted against Growth on Sugar/Pectin </a:t>
+            </a:r>
           </a:p>
           <a:p>
             <a:endParaRPr lang="en-US" dirty="0"/>
@@ -6763,7 +6763,7 @@
     </p:spTree>
     <p:extLst>
       <p:ext uri="{BB962C8B-B14F-4D97-AF65-F5344CB8AC3E}">
-        <p14:creationId xmlns:p14="http://schemas.microsoft.com/office/powerpoint/2010/main" val="3913836524"/>
+        <p14:creationId xmlns:p14="http://schemas.microsoft.com/office/powerpoint/2010/main" val="2123462057"/>
       </p:ext>
     </p:extLst>
   </p:cSld>

</xml_diff>

<commit_message>
Updating previous scripts and including current paper progress
</commit_message>
<xml_diff>
--- a/paper/HWavinessGraphs_Figs_Capt.pptx
+++ b/paper/HWavinessGraphs_Figs_Capt.pptx
@@ -11,15 +11,14 @@
     <p:sldId id="260" r:id="rId5"/>
     <p:sldId id="257" r:id="rId6"/>
     <p:sldId id="259" r:id="rId7"/>
-    <p:sldId id="271" r:id="rId8"/>
-    <p:sldId id="262" r:id="rId9"/>
-    <p:sldId id="264" r:id="rId10"/>
-    <p:sldId id="263" r:id="rId11"/>
-    <p:sldId id="265" r:id="rId12"/>
-    <p:sldId id="266" r:id="rId13"/>
-    <p:sldId id="267" r:id="rId14"/>
-    <p:sldId id="268" r:id="rId15"/>
-    <p:sldId id="269" r:id="rId16"/>
+    <p:sldId id="273" r:id="rId8"/>
+    <p:sldId id="271" r:id="rId9"/>
+    <p:sldId id="262" r:id="rId10"/>
+    <p:sldId id="264" r:id="rId11"/>
+    <p:sldId id="272" r:id="rId12"/>
+    <p:sldId id="263" r:id="rId13"/>
+    <p:sldId id="265" r:id="rId14"/>
+    <p:sldId id="269" r:id="rId15"/>
   </p:sldIdLst>
   <p:sldSz cx="12192000" cy="6858000"/>
   <p:notesSz cx="6858000" cy="9144000"/>
@@ -166,24 +165,6 @@
 
 <file path=ppt/comments/comment10.xml><?xml version="1.0" encoding="utf-8"?>
 <p:cmLst xmlns:a="http://schemas.openxmlformats.org/drawingml/2006/main" xmlns:r="http://schemas.openxmlformats.org/officeDocument/2006/relationships" xmlns:p="http://schemas.openxmlformats.org/presentationml/2006/main">
-  <p:cm authorId="2" dt="2018-01-19T11:24:33.911" idx="15">
-    <p:pos x="6517" y="335"/>
-    <p:text>continue table from previous slide</p:text>
-  </p:cm>
-</p:cmLst>
-</file>
-
-<file path=ppt/comments/comment11.xml><?xml version="1.0" encoding="utf-8"?>
-<p:cmLst xmlns:a="http://schemas.openxmlformats.org/drawingml/2006/main" xmlns:r="http://schemas.openxmlformats.org/officeDocument/2006/relationships" xmlns:p="http://schemas.openxmlformats.org/presentationml/2006/main">
-  <p:cm authorId="2" dt="2018-01-19T11:24:39.583" idx="16">
-    <p:pos x="2270" y="3508"/>
-    <p:text>continue table from previous slide</p:text>
-  </p:cm>
-</p:cmLst>
-</file>
-
-<file path=ppt/comments/comment12.xml><?xml version="1.0" encoding="utf-8"?>
-<p:cmLst xmlns:a="http://schemas.openxmlformats.org/drawingml/2006/main" xmlns:r="http://schemas.openxmlformats.org/officeDocument/2006/relationships" xmlns:p="http://schemas.openxmlformats.org/presentationml/2006/main">
   <p:cm authorId="2" dt="2018-01-19T11:24:43.798" idx="17">
     <p:pos x="2295" y="3628"/>
     <p:text>continue table from previous slide</p:text>
@@ -225,7 +206,7 @@
 <file path=ppt/comments/comment5.xml><?xml version="1.0" encoding="utf-8"?>
 <p:cmLst xmlns:a="http://schemas.openxmlformats.org/drawingml/2006/main" xmlns:r="http://schemas.openxmlformats.org/officeDocument/2006/relationships" xmlns:p="http://schemas.openxmlformats.org/presentationml/2006/main">
   <p:cm authorId="2" dt="2018-01-19T11:23:55.828" idx="10">
-    <p:pos x="6241" y="1350"/>
+    <p:pos x="4361" y="4646"/>
     <p:text>probably going to omit these figures since the correlation is so weak. Make a new table instead:
 column 1 = trait you are correlating to hyphal waviness
 column 2 = slope of trend line 
@@ -237,7 +218,7 @@
 <file path=ppt/comments/comment6.xml><?xml version="1.0" encoding="utf-8"?>
 <p:cmLst xmlns:a="http://schemas.openxmlformats.org/drawingml/2006/main" xmlns:r="http://schemas.openxmlformats.org/officeDocument/2006/relationships" xmlns:p="http://schemas.openxmlformats.org/presentationml/2006/main">
   <p:cm authorId="2" dt="2018-01-19T11:24:11.978" idx="11">
-    <p:pos x="6259" y="619"/>
+    <p:pos x="1139" y="4579"/>
     <p:text>continue table from previous slide</p:text>
   </p:cm>
 </p:cmLst>
@@ -245,8 +226,8 @@
 
 <file path=ppt/comments/comment7.xml><?xml version="1.0" encoding="utf-8"?>
 <p:cmLst xmlns:a="http://schemas.openxmlformats.org/drawingml/2006/main" xmlns:r="http://schemas.openxmlformats.org/officeDocument/2006/relationships" xmlns:p="http://schemas.openxmlformats.org/presentationml/2006/main">
-  <p:cm authorId="2" dt="2018-01-19T11:24:16.211" idx="12">
-    <p:pos x="6044" y="189"/>
+  <p:cm authorId="2" dt="2018-01-19T11:24:11.978" idx="11">
+    <p:pos x="1139" y="4579"/>
     <p:text>continue table from previous slide</p:text>
   </p:cm>
 </p:cmLst>
@@ -254,8 +235,8 @@
 
 <file path=ppt/comments/comment8.xml><?xml version="1.0" encoding="utf-8"?>
 <p:cmLst xmlns:a="http://schemas.openxmlformats.org/drawingml/2006/main" xmlns:r="http://schemas.openxmlformats.org/officeDocument/2006/relationships" xmlns:p="http://schemas.openxmlformats.org/presentationml/2006/main">
-  <p:cm authorId="2" dt="2018-01-19T11:24:24.068" idx="13">
-    <p:pos x="7617" y="26"/>
+  <p:cm authorId="2" dt="2018-01-19T11:24:16.211" idx="12">
+    <p:pos x="652" y="4317"/>
     <p:text>continue table from previous slide</p:text>
   </p:cm>
 </p:cmLst>
@@ -263,8 +244,8 @@
 
 <file path=ppt/comments/comment9.xml><?xml version="1.0" encoding="utf-8"?>
 <p:cmLst xmlns:a="http://schemas.openxmlformats.org/drawingml/2006/main" xmlns:r="http://schemas.openxmlformats.org/officeDocument/2006/relationships" xmlns:p="http://schemas.openxmlformats.org/presentationml/2006/main">
-  <p:cm authorId="2" dt="2018-01-19T11:24:29.735" idx="14">
-    <p:pos x="7101" y="507"/>
+  <p:cm authorId="2" dt="2018-01-19T11:24:24.068" idx="13">
+    <p:pos x="7617" y="26"/>
     <p:text>continue table from previous slide</p:text>
   </p:cm>
 </p:cmLst>
@@ -417,7 +398,7 @@
           <a:p>
             <a:fld id="{F0953935-3A72-4AE4-BBF3-F653F2BDF975}" type="datetimeFigureOut">
               <a:rPr lang="en-US" smtClean="0"/>
-              <a:t>1/22/2018</a:t>
+              <a:t>1/25/2018</a:t>
             </a:fld>
             <a:endParaRPr lang="en-US"/>
           </a:p>
@@ -615,7 +596,7 @@
           <a:p>
             <a:fld id="{F0953935-3A72-4AE4-BBF3-F653F2BDF975}" type="datetimeFigureOut">
               <a:rPr lang="en-US" smtClean="0"/>
-              <a:t>1/22/2018</a:t>
+              <a:t>1/25/2018</a:t>
             </a:fld>
             <a:endParaRPr lang="en-US"/>
           </a:p>
@@ -823,7 +804,7 @@
           <a:p>
             <a:fld id="{F0953935-3A72-4AE4-BBF3-F653F2BDF975}" type="datetimeFigureOut">
               <a:rPr lang="en-US" smtClean="0"/>
-              <a:t>1/22/2018</a:t>
+              <a:t>1/25/2018</a:t>
             </a:fld>
             <a:endParaRPr lang="en-US"/>
           </a:p>
@@ -1021,7 +1002,7 @@
           <a:p>
             <a:fld id="{F0953935-3A72-4AE4-BBF3-F653F2BDF975}" type="datetimeFigureOut">
               <a:rPr lang="en-US" smtClean="0"/>
-              <a:t>1/22/2018</a:t>
+              <a:t>1/25/2018</a:t>
             </a:fld>
             <a:endParaRPr lang="en-US"/>
           </a:p>
@@ -1296,7 +1277,7 @@
           <a:p>
             <a:fld id="{F0953935-3A72-4AE4-BBF3-F653F2BDF975}" type="datetimeFigureOut">
               <a:rPr lang="en-US" smtClean="0"/>
-              <a:t>1/22/2018</a:t>
+              <a:t>1/25/2018</a:t>
             </a:fld>
             <a:endParaRPr lang="en-US"/>
           </a:p>
@@ -1561,7 +1542,7 @@
           <a:p>
             <a:fld id="{F0953935-3A72-4AE4-BBF3-F653F2BDF975}" type="datetimeFigureOut">
               <a:rPr lang="en-US" smtClean="0"/>
-              <a:t>1/22/2018</a:t>
+              <a:t>1/25/2018</a:t>
             </a:fld>
             <a:endParaRPr lang="en-US"/>
           </a:p>
@@ -1973,7 +1954,7 @@
           <a:p>
             <a:fld id="{F0953935-3A72-4AE4-BBF3-F653F2BDF975}" type="datetimeFigureOut">
               <a:rPr lang="en-US" smtClean="0"/>
-              <a:t>1/22/2018</a:t>
+              <a:t>1/25/2018</a:t>
             </a:fld>
             <a:endParaRPr lang="en-US"/>
           </a:p>
@@ -2114,7 +2095,7 @@
           <a:p>
             <a:fld id="{F0953935-3A72-4AE4-BBF3-F653F2BDF975}" type="datetimeFigureOut">
               <a:rPr lang="en-US" smtClean="0"/>
-              <a:t>1/22/2018</a:t>
+              <a:t>1/25/2018</a:t>
             </a:fld>
             <a:endParaRPr lang="en-US"/>
           </a:p>
@@ -2227,7 +2208,7 @@
           <a:p>
             <a:fld id="{F0953935-3A72-4AE4-BBF3-F653F2BDF975}" type="datetimeFigureOut">
               <a:rPr lang="en-US" smtClean="0"/>
-              <a:t>1/22/2018</a:t>
+              <a:t>1/25/2018</a:t>
             </a:fld>
             <a:endParaRPr lang="en-US"/>
           </a:p>
@@ -2538,7 +2519,7 @@
           <a:p>
             <a:fld id="{F0953935-3A72-4AE4-BBF3-F653F2BDF975}" type="datetimeFigureOut">
               <a:rPr lang="en-US" smtClean="0"/>
-              <a:t>1/22/2018</a:t>
+              <a:t>1/25/2018</a:t>
             </a:fld>
             <a:endParaRPr lang="en-US"/>
           </a:p>
@@ -2826,7 +2807,7 @@
           <a:p>
             <a:fld id="{F0953935-3A72-4AE4-BBF3-F653F2BDF975}" type="datetimeFigureOut">
               <a:rPr lang="en-US" smtClean="0"/>
-              <a:t>1/22/2018</a:t>
+              <a:t>1/25/2018</a:t>
             </a:fld>
             <a:endParaRPr lang="en-US"/>
           </a:p>
@@ -3067,7 +3048,7 @@
           <a:p>
             <a:fld id="{F0953935-3A72-4AE4-BBF3-F653F2BDF975}" type="datetimeFigureOut">
               <a:rPr lang="en-US" smtClean="0"/>
-              <a:t>1/22/2018</a:t>
+              <a:t>1/25/2018</a:t>
             </a:fld>
             <a:endParaRPr lang="en-US"/>
           </a:p>
@@ -3570,21 +3551,108 @@
           <a:chExt cx="0" cy="0"/>
         </a:xfrm>
       </p:grpSpPr>
+      <p:sp>
+        <p:nvSpPr>
+          <p:cNvPr id="5" name="TextBox 4">
+            <a:extLst>
+              <a:ext uri="{FF2B5EF4-FFF2-40B4-BE49-F238E27FC236}">
+                <a16:creationId xmlns:a16="http://schemas.microsoft.com/office/drawing/2014/main" id="{C05AC16E-131F-4276-8267-1539454128F8}"/>
+              </a:ext>
+            </a:extLst>
+          </p:cNvPr>
+          <p:cNvSpPr txBox="1"/>
+          <p:nvPr/>
+        </p:nvSpPr>
+        <p:spPr>
+          <a:xfrm>
+            <a:off x="0" y="6858000"/>
+            <a:ext cx="8686800" cy="3970318"/>
+          </a:xfrm>
+          <a:prstGeom prst="rect">
+            <a:avLst/>
+          </a:prstGeom>
+          <a:noFill/>
+        </p:spPr>
+        <p:txBody>
+          <a:bodyPr wrap="square" rtlCol="0">
+            <a:spAutoFit/>
+          </a:bodyPr>
+          <a:lstStyle/>
+          <a:p>
+            <a:r>
+              <a:rPr lang="en-US" dirty="0"/>
+              <a:t>Figure # - </a:t>
+            </a:r>
+          </a:p>
+          <a:p>
+            <a:r>
+              <a:rPr lang="en-US" dirty="0" err="1"/>
+              <a:t>LsMeans</a:t>
+            </a:r>
+            <a:r>
+              <a:rPr lang="en-US" dirty="0"/>
+              <a:t> Hyphal Waviness plotted against Growth on Sugar/Pectin - </a:t>
+            </a:r>
+            <a:r>
+              <a:rPr lang="en-US" dirty="0" err="1"/>
+              <a:t>pearson</a:t>
+            </a:r>
+            <a:r>
+              <a:rPr lang="en-US" dirty="0"/>
+              <a:t> </a:t>
+            </a:r>
+          </a:p>
+          <a:p>
+            <a:endParaRPr lang="en-US" dirty="0"/>
+          </a:p>
+          <a:p>
+            <a:endParaRPr lang="en-US" dirty="0"/>
+          </a:p>
+          <a:p>
+            <a:endParaRPr lang="en-US" dirty="0"/>
+          </a:p>
+          <a:p>
+            <a:endParaRPr lang="en-US" dirty="0"/>
+          </a:p>
+          <a:p>
+            <a:endParaRPr lang="en-US" dirty="0"/>
+          </a:p>
+          <a:p>
+            <a:endParaRPr lang="en-US" dirty="0"/>
+          </a:p>
+          <a:p>
+            <a:endParaRPr lang="en-US" dirty="0"/>
+          </a:p>
+          <a:p>
+            <a:endParaRPr lang="en-US" dirty="0"/>
+          </a:p>
+          <a:p>
+            <a:endParaRPr lang="en-US" dirty="0"/>
+          </a:p>
+          <a:p>
+            <a:endParaRPr lang="en-US" dirty="0"/>
+          </a:p>
+          <a:p>
+            <a:endParaRPr lang="en-US" dirty="0"/>
+          </a:p>
+          <a:p>
+            <a:endParaRPr lang="en-US" dirty="0"/>
+          </a:p>
+        </p:txBody>
+      </p:sp>
       <p:pic>
         <p:nvPicPr>
-          <p:cNvPr id="4" name="Content Placeholder 3">
-            <a:extLst>
-              <a:ext uri="{FF2B5EF4-FFF2-40B4-BE49-F238E27FC236}">
-                <a16:creationId xmlns:a16="http://schemas.microsoft.com/office/drawing/2014/main" id="{5EDED94B-5794-43B3-A714-99204A4C3FE7}"/>
+          <p:cNvPr id="2" name="Picture 1">
+            <a:extLst>
+              <a:ext uri="{FF2B5EF4-FFF2-40B4-BE49-F238E27FC236}">
+                <a16:creationId xmlns:a16="http://schemas.microsoft.com/office/drawing/2014/main" id="{CA708F47-A198-476C-9870-6B5DA7C8F835}"/>
               </a:ext>
             </a:extLst>
           </p:cNvPr>
           <p:cNvPicPr>
-            <a:picLocks noGrp="1" noChangeAspect="1"/>
+            <a:picLocks noChangeAspect="1"/>
           </p:cNvPicPr>
-          <p:nvPr>
-            <p:ph idx="1"/>
-          </p:nvPr>
+          <p:nvPr/>
         </p:nvPicPr>
         <p:blipFill>
           <a:blip r:embed="rId2"/>
@@ -3594,122 +3662,18 @@
         </p:blipFill>
         <p:spPr>
           <a:xfrm>
-            <a:off x="141532" y="131047"/>
-            <a:ext cx="8335204" cy="6361827"/>
+            <a:off x="0" y="0"/>
+            <a:ext cx="12192000" cy="6858000"/>
           </a:xfrm>
           <a:prstGeom prst="rect">
             <a:avLst/>
           </a:prstGeom>
         </p:spPr>
       </p:pic>
-      <p:sp>
-        <p:nvSpPr>
-          <p:cNvPr id="5" name="TextBox 4">
-            <a:extLst>
-              <a:ext uri="{FF2B5EF4-FFF2-40B4-BE49-F238E27FC236}">
-                <a16:creationId xmlns:a16="http://schemas.microsoft.com/office/drawing/2014/main" id="{8239F836-2BB4-41CA-A95A-303CF279E575}"/>
-              </a:ext>
-            </a:extLst>
-          </p:cNvPr>
-          <p:cNvSpPr txBox="1"/>
-          <p:nvPr/>
-        </p:nvSpPr>
-        <p:spPr>
-          <a:xfrm>
-            <a:off x="8714792" y="261257"/>
-            <a:ext cx="3181739" cy="6740307"/>
-          </a:xfrm>
-          <a:prstGeom prst="rect">
-            <a:avLst/>
-          </a:prstGeom>
-          <a:noFill/>
-        </p:spPr>
-        <p:txBody>
-          <a:bodyPr wrap="square" rtlCol="0">
-            <a:spAutoFit/>
-          </a:bodyPr>
-          <a:lstStyle/>
-          <a:p>
-            <a:r>
-              <a:rPr lang="en-US" dirty="0"/>
-              <a:t>Figure #</a:t>
-            </a:r>
-          </a:p>
-          <a:p>
-            <a:r>
-              <a:rPr lang="en-US" dirty="0"/>
-              <a:t>See other slide and adopt accordingly</a:t>
-            </a:r>
-          </a:p>
-          <a:p>
-            <a:endParaRPr lang="en-US" dirty="0"/>
-          </a:p>
-          <a:p>
-            <a:endParaRPr lang="en-US" dirty="0"/>
-          </a:p>
-          <a:p>
-            <a:endParaRPr lang="en-US" dirty="0"/>
-          </a:p>
-          <a:p>
-            <a:endParaRPr lang="en-US" dirty="0"/>
-          </a:p>
-          <a:p>
-            <a:endParaRPr lang="en-US" dirty="0"/>
-          </a:p>
-          <a:p>
-            <a:endParaRPr lang="en-US" dirty="0"/>
-          </a:p>
-          <a:p>
-            <a:endParaRPr lang="en-US" dirty="0"/>
-          </a:p>
-          <a:p>
-            <a:endParaRPr lang="en-US" dirty="0"/>
-          </a:p>
-          <a:p>
-            <a:endParaRPr lang="en-US" dirty="0"/>
-          </a:p>
-          <a:p>
-            <a:endParaRPr lang="en-US" dirty="0"/>
-          </a:p>
-          <a:p>
-            <a:endParaRPr lang="en-US" dirty="0"/>
-          </a:p>
-          <a:p>
-            <a:endParaRPr lang="en-US" dirty="0"/>
-          </a:p>
-          <a:p>
-            <a:endParaRPr lang="en-US" dirty="0"/>
-          </a:p>
-          <a:p>
-            <a:endParaRPr lang="en-US" dirty="0"/>
-          </a:p>
-          <a:p>
-            <a:endParaRPr lang="en-US" dirty="0"/>
-          </a:p>
-          <a:p>
-            <a:endParaRPr lang="en-US" dirty="0"/>
-          </a:p>
-          <a:p>
-            <a:endParaRPr lang="en-US" dirty="0"/>
-          </a:p>
-          <a:p>
-            <a:endParaRPr lang="en-US" dirty="0"/>
-          </a:p>
-          <a:p>
-            <a:endParaRPr lang="en-US" dirty="0"/>
-          </a:p>
-          <a:p>
-            <a:endParaRPr lang="en-US" dirty="0"/>
-          </a:p>
-          <a:p>
-            <a:endParaRPr lang="en-US" dirty="0"/>
-          </a:p>
-        </p:txBody>
-      </p:sp>
     </p:spTree>
     <p:extLst>
       <p:ext uri="{BB962C8B-B14F-4D97-AF65-F5344CB8AC3E}">
-        <p14:creationId xmlns:p14="http://schemas.microsoft.com/office/powerpoint/2010/main" val="3913836524"/>
+        <p14:creationId xmlns:p14="http://schemas.microsoft.com/office/powerpoint/2010/main" val="2123462057"/>
       </p:ext>
     </p:extLst>
   </p:cSld>
@@ -3736,12 +3700,97 @@
           <a:chExt cx="0" cy="0"/>
         </a:xfrm>
       </p:grpSpPr>
+      <p:sp>
+        <p:nvSpPr>
+          <p:cNvPr id="5" name="TextBox 4">
+            <a:extLst>
+              <a:ext uri="{FF2B5EF4-FFF2-40B4-BE49-F238E27FC236}">
+                <a16:creationId xmlns:a16="http://schemas.microsoft.com/office/drawing/2014/main" id="{C05AC16E-131F-4276-8267-1539454128F8}"/>
+              </a:ext>
+            </a:extLst>
+          </p:cNvPr>
+          <p:cNvSpPr txBox="1"/>
+          <p:nvPr/>
+        </p:nvSpPr>
+        <p:spPr>
+          <a:xfrm>
+            <a:off x="0" y="6858000"/>
+            <a:ext cx="8686800" cy="3970318"/>
+          </a:xfrm>
+          <a:prstGeom prst="rect">
+            <a:avLst/>
+          </a:prstGeom>
+          <a:noFill/>
+        </p:spPr>
+        <p:txBody>
+          <a:bodyPr wrap="square" rtlCol="0">
+            <a:spAutoFit/>
+          </a:bodyPr>
+          <a:lstStyle/>
+          <a:p>
+            <a:r>
+              <a:rPr lang="en-US" dirty="0"/>
+              <a:t>Figure # - </a:t>
+            </a:r>
+          </a:p>
+          <a:p>
+            <a:r>
+              <a:rPr lang="en-US" dirty="0"/>
+              <a:t>Average Hyphal Waviness plotted against Growth on Sugar/Pectin - </a:t>
+            </a:r>
+            <a:r>
+              <a:rPr lang="en-US" dirty="0" err="1"/>
+              <a:t>pearson</a:t>
+            </a:r>
+            <a:r>
+              <a:rPr lang="en-US" dirty="0"/>
+              <a:t> </a:t>
+            </a:r>
+          </a:p>
+          <a:p>
+            <a:endParaRPr lang="en-US" dirty="0"/>
+          </a:p>
+          <a:p>
+            <a:endParaRPr lang="en-US" dirty="0"/>
+          </a:p>
+          <a:p>
+            <a:endParaRPr lang="en-US" dirty="0"/>
+          </a:p>
+          <a:p>
+            <a:endParaRPr lang="en-US" dirty="0"/>
+          </a:p>
+          <a:p>
+            <a:endParaRPr lang="en-US" dirty="0"/>
+          </a:p>
+          <a:p>
+            <a:endParaRPr lang="en-US" dirty="0"/>
+          </a:p>
+          <a:p>
+            <a:endParaRPr lang="en-US" dirty="0"/>
+          </a:p>
+          <a:p>
+            <a:endParaRPr lang="en-US" dirty="0"/>
+          </a:p>
+          <a:p>
+            <a:endParaRPr lang="en-US" dirty="0"/>
+          </a:p>
+          <a:p>
+            <a:endParaRPr lang="en-US" dirty="0"/>
+          </a:p>
+          <a:p>
+            <a:endParaRPr lang="en-US" dirty="0"/>
+          </a:p>
+          <a:p>
+            <a:endParaRPr lang="en-US" dirty="0"/>
+          </a:p>
+        </p:txBody>
+      </p:sp>
       <p:pic>
         <p:nvPicPr>
-          <p:cNvPr id="4" name="Picture 3">
-            <a:extLst>
-              <a:ext uri="{FF2B5EF4-FFF2-40B4-BE49-F238E27FC236}">
-                <a16:creationId xmlns:a16="http://schemas.microsoft.com/office/drawing/2014/main" id="{5CFA029F-5C37-4A3D-A83E-D8C65C6BDE0C}"/>
+          <p:cNvPr id="3" name="Picture 2">
+            <a:extLst>
+              <a:ext uri="{FF2B5EF4-FFF2-40B4-BE49-F238E27FC236}">
+                <a16:creationId xmlns:a16="http://schemas.microsoft.com/office/drawing/2014/main" id="{3C201257-CB97-45EB-A248-01A499122CB2}"/>
               </a:ext>
             </a:extLst>
           </p:cNvPr>
@@ -3759,215 +3808,17 @@
         <p:spPr>
           <a:xfrm>
             <a:off x="0" y="0"/>
-            <a:ext cx="8448234" cy="4479235"/>
+            <a:ext cx="12192000" cy="6858000"/>
           </a:xfrm>
           <a:prstGeom prst="rect">
             <a:avLst/>
           </a:prstGeom>
         </p:spPr>
       </p:pic>
-      <p:sp>
-        <p:nvSpPr>
-          <p:cNvPr id="5" name="TextBox 4">
-            <a:extLst>
-              <a:ext uri="{FF2B5EF4-FFF2-40B4-BE49-F238E27FC236}">
-                <a16:creationId xmlns:a16="http://schemas.microsoft.com/office/drawing/2014/main" id="{C05F688A-3013-44AE-9657-1536DAD1E3B7}"/>
-              </a:ext>
-            </a:extLst>
-          </p:cNvPr>
-          <p:cNvSpPr txBox="1"/>
-          <p:nvPr/>
-        </p:nvSpPr>
-        <p:spPr>
-          <a:xfrm>
-            <a:off x="8448235" y="0"/>
-            <a:ext cx="3743766" cy="12834283"/>
-          </a:xfrm>
-          <a:prstGeom prst="rect">
-            <a:avLst/>
-          </a:prstGeom>
-          <a:noFill/>
-        </p:spPr>
-        <p:txBody>
-          <a:bodyPr wrap="square" rtlCol="0">
-            <a:spAutoFit/>
-          </a:bodyPr>
-          <a:lstStyle/>
-          <a:p>
-            <a:r>
-              <a:rPr lang="en-US" b="1" dirty="0"/>
-              <a:t>Figure #. Various interactions of B. cinerea lesions sizes on Eudicots with hyphal waviness of B. cinerea. </a:t>
-            </a:r>
-          </a:p>
-          <a:p>
-            <a:r>
-              <a:rPr lang="en-US" dirty="0"/>
-              <a:t>Scatter plots of various eudicot lesion sizes due to B. cinerea isolates compared against B. cinerea hyphal waviness based on 97 individual isolates. Each point is an isolate interaction of the marginal means of lesion size with marginal means of hyphal waviness. </a:t>
-            </a:r>
-          </a:p>
-          <a:p>
-            <a:r>
-              <a:rPr lang="en-US" dirty="0"/>
-              <a:t>A) Least Square Mean lesion size on </a:t>
-            </a:r>
-            <a:r>
-              <a:rPr lang="en-US" i="1" dirty="0" err="1"/>
-              <a:t>Cichorium</a:t>
-            </a:r>
-            <a:r>
-              <a:rPr lang="en-US" i="1" dirty="0"/>
-              <a:t> </a:t>
-            </a:r>
-            <a:r>
-              <a:rPr lang="en-US" i="1" dirty="0" err="1"/>
-              <a:t>endivia</a:t>
-            </a:r>
-            <a:endParaRPr lang="en-US" i="1" dirty="0"/>
-          </a:p>
-          <a:p>
-            <a:r>
-              <a:rPr lang="en-US" dirty="0"/>
-              <a:t>B) Least Square Mean lesion size on </a:t>
-            </a:r>
-            <a:r>
-              <a:rPr lang="en-US" i="1" dirty="0"/>
-              <a:t>Brassica </a:t>
-            </a:r>
-            <a:r>
-              <a:rPr lang="en-US" i="1" dirty="0" err="1"/>
-              <a:t>rapa</a:t>
-            </a:r>
-            <a:endParaRPr lang="en-US" i="1" dirty="0"/>
-          </a:p>
-          <a:p>
-            <a:r>
-              <a:rPr lang="en-US" dirty="0"/>
-              <a:t>C) Least Square Mean lesion size on </a:t>
-            </a:r>
-            <a:r>
-              <a:rPr lang="en-US" i="1" dirty="0" err="1"/>
-              <a:t>Cichorium</a:t>
-            </a:r>
-            <a:r>
-              <a:rPr lang="en-US" i="1" dirty="0"/>
-              <a:t> </a:t>
-            </a:r>
-            <a:r>
-              <a:rPr lang="en-US" i="1" dirty="0" err="1"/>
-              <a:t>intybus</a:t>
-            </a:r>
-            <a:endParaRPr lang="en-US" b="1" i="1" dirty="0"/>
-          </a:p>
-          <a:p>
-            <a:r>
-              <a:rPr lang="en-US" dirty="0"/>
-              <a:t>D) Least Square Mean lesion size on </a:t>
-            </a:r>
-            <a:r>
-              <a:rPr lang="en-US" i="1" dirty="0"/>
-              <a:t>Glycine max</a:t>
-            </a:r>
-            <a:r>
-              <a:rPr lang="en-US" dirty="0"/>
-              <a:t> (soy bean)</a:t>
-            </a:r>
-          </a:p>
-          <a:p>
-            <a:r>
-              <a:rPr lang="en-US" dirty="0"/>
-              <a:t>E) Least Square Mean lesion size on </a:t>
-            </a:r>
-            <a:r>
-              <a:rPr lang="en-US" i="1" dirty="0"/>
-              <a:t>Helianthus </a:t>
-            </a:r>
-            <a:r>
-              <a:rPr lang="en-US" i="1" dirty="0" err="1"/>
-              <a:t>annuus</a:t>
-            </a:r>
-            <a:endParaRPr lang="en-US" i="1" dirty="0"/>
-          </a:p>
-          <a:p>
-            <a:r>
-              <a:rPr lang="en-US" dirty="0"/>
-              <a:t>F) Least Square Mean lesion size on Solanum</a:t>
-            </a:r>
-          </a:p>
-          <a:p>
-            <a:r>
-              <a:rPr lang="en-US" dirty="0"/>
-              <a:t>G) Least Square Mean lesion size on Tomato</a:t>
-            </a:r>
-          </a:p>
-          <a:p>
-            <a:endParaRPr lang="en-US" dirty="0"/>
-          </a:p>
-          <a:p>
-            <a:endParaRPr lang="en-US" dirty="0"/>
-          </a:p>
-          <a:p>
-            <a:endParaRPr lang="en-US" dirty="0"/>
-          </a:p>
-          <a:p>
-            <a:endParaRPr lang="en-US" dirty="0"/>
-          </a:p>
-          <a:p>
-            <a:endParaRPr lang="en-US" dirty="0"/>
-          </a:p>
-          <a:p>
-            <a:endParaRPr lang="en-US" dirty="0"/>
-          </a:p>
-          <a:p>
-            <a:endParaRPr lang="en-US" dirty="0"/>
-          </a:p>
-          <a:p>
-            <a:endParaRPr lang="en-US" dirty="0"/>
-          </a:p>
-          <a:p>
-            <a:endParaRPr lang="en-US" dirty="0"/>
-          </a:p>
-          <a:p>
-            <a:endParaRPr lang="en-US" dirty="0"/>
-          </a:p>
-          <a:p>
-            <a:endParaRPr lang="en-US" dirty="0"/>
-          </a:p>
-          <a:p>
-            <a:endParaRPr lang="en-US" dirty="0"/>
-          </a:p>
-          <a:p>
-            <a:endParaRPr lang="en-US" dirty="0"/>
-          </a:p>
-          <a:p>
-            <a:endParaRPr lang="en-US" dirty="0"/>
-          </a:p>
-          <a:p>
-            <a:endParaRPr lang="en-US" dirty="0"/>
-          </a:p>
-          <a:p>
-            <a:endParaRPr lang="en-US" dirty="0"/>
-          </a:p>
-          <a:p>
-            <a:endParaRPr lang="en-US" dirty="0"/>
-          </a:p>
-          <a:p>
-            <a:endParaRPr lang="en-US" dirty="0"/>
-          </a:p>
-          <a:p>
-            <a:endParaRPr lang="en-US" dirty="0"/>
-          </a:p>
-          <a:p>
-            <a:endParaRPr lang="en-US" dirty="0"/>
-          </a:p>
-          <a:p>
-            <a:endParaRPr lang="en-US" dirty="0"/>
-          </a:p>
-        </p:txBody>
-      </p:sp>
     </p:spTree>
     <p:extLst>
       <p:ext uri="{BB962C8B-B14F-4D97-AF65-F5344CB8AC3E}">
-        <p14:creationId xmlns:p14="http://schemas.microsoft.com/office/powerpoint/2010/main" val="3663658674"/>
+        <p14:creationId xmlns:p14="http://schemas.microsoft.com/office/powerpoint/2010/main" val="3582855470"/>
       </p:ext>
     </p:extLst>
   </p:cSld>
@@ -3994,12 +3845,143 @@
           <a:chExt cx="0" cy="0"/>
         </a:xfrm>
       </p:grpSpPr>
+      <p:sp>
+        <p:nvSpPr>
+          <p:cNvPr id="5" name="TextBox 4">
+            <a:extLst>
+              <a:ext uri="{FF2B5EF4-FFF2-40B4-BE49-F238E27FC236}">
+                <a16:creationId xmlns:a16="http://schemas.microsoft.com/office/drawing/2014/main" id="{8239F836-2BB4-41CA-A95A-303CF279E575}"/>
+              </a:ext>
+            </a:extLst>
+          </p:cNvPr>
+          <p:cNvSpPr txBox="1"/>
+          <p:nvPr/>
+        </p:nvSpPr>
+        <p:spPr>
+          <a:xfrm>
+            <a:off x="0" y="6858000"/>
+            <a:ext cx="3181739" cy="6463308"/>
+          </a:xfrm>
+          <a:prstGeom prst="rect">
+            <a:avLst/>
+          </a:prstGeom>
+          <a:noFill/>
+        </p:spPr>
+        <p:txBody>
+          <a:bodyPr wrap="square" rtlCol="0">
+            <a:spAutoFit/>
+          </a:bodyPr>
+          <a:lstStyle/>
+          <a:p>
+            <a:r>
+              <a:rPr lang="en-US" dirty="0"/>
+              <a:t>Figure #</a:t>
+            </a:r>
+          </a:p>
+          <a:p>
+            <a:r>
+              <a:rPr lang="en-US" dirty="0"/>
+              <a:t>See other slide and adopt accordingly - </a:t>
+            </a:r>
+            <a:r>
+              <a:rPr lang="en-US" dirty="0" err="1"/>
+              <a:t>pearson</a:t>
+            </a:r>
+            <a:endParaRPr lang="en-US" dirty="0"/>
+          </a:p>
+          <a:p>
+            <a:endParaRPr lang="en-US" dirty="0"/>
+          </a:p>
+          <a:p>
+            <a:endParaRPr lang="en-US" dirty="0"/>
+          </a:p>
+          <a:p>
+            <a:endParaRPr lang="en-US" dirty="0"/>
+          </a:p>
+          <a:p>
+            <a:endParaRPr lang="en-US" dirty="0"/>
+          </a:p>
+          <a:p>
+            <a:endParaRPr lang="en-US" dirty="0"/>
+          </a:p>
+          <a:p>
+            <a:endParaRPr lang="en-US" dirty="0"/>
+          </a:p>
+          <a:p>
+            <a:endParaRPr lang="en-US" dirty="0"/>
+          </a:p>
+          <a:p>
+            <a:endParaRPr lang="en-US" dirty="0"/>
+          </a:p>
+          <a:p>
+            <a:endParaRPr lang="en-US" dirty="0"/>
+          </a:p>
+          <a:p>
+            <a:endParaRPr lang="en-US" dirty="0"/>
+          </a:p>
+          <a:p>
+            <a:endParaRPr lang="en-US" dirty="0"/>
+          </a:p>
+          <a:p>
+            <a:endParaRPr lang="en-US" dirty="0"/>
+          </a:p>
+          <a:p>
+            <a:endParaRPr lang="en-US" dirty="0"/>
+          </a:p>
+          <a:p>
+            <a:endParaRPr lang="en-US" dirty="0"/>
+          </a:p>
+          <a:p>
+            <a:endParaRPr lang="en-US" dirty="0"/>
+          </a:p>
+          <a:p>
+            <a:endParaRPr lang="en-US" dirty="0"/>
+          </a:p>
+          <a:p>
+            <a:endParaRPr lang="en-US" dirty="0"/>
+          </a:p>
+          <a:p>
+            <a:endParaRPr lang="en-US" dirty="0"/>
+          </a:p>
+          <a:p>
+            <a:endParaRPr lang="en-US" dirty="0"/>
+          </a:p>
+          <a:p>
+            <a:endParaRPr lang="en-US" dirty="0"/>
+          </a:p>
+        </p:txBody>
+      </p:sp>
+      <p:sp>
+        <p:nvSpPr>
+          <p:cNvPr id="3" name="Content Placeholder 2">
+            <a:extLst>
+              <a:ext uri="{FF2B5EF4-FFF2-40B4-BE49-F238E27FC236}">
+                <a16:creationId xmlns:a16="http://schemas.microsoft.com/office/drawing/2014/main" id="{FC8F3D1F-AD7F-42FE-AFE9-A3F65E13DD02}"/>
+              </a:ext>
+            </a:extLst>
+          </p:cNvPr>
+          <p:cNvSpPr>
+            <a:spLocks noGrp="1"/>
+          </p:cNvSpPr>
+          <p:nvPr>
+            <p:ph idx="1"/>
+          </p:nvPr>
+        </p:nvSpPr>
+        <p:spPr/>
+        <p:txBody>
+          <a:bodyPr/>
+          <a:lstStyle/>
+          <a:p>
+            <a:endParaRPr lang="en-US"/>
+          </a:p>
+        </p:txBody>
+      </p:sp>
       <p:pic>
         <p:nvPicPr>
-          <p:cNvPr id="4" name="Picture 3">
-            <a:extLst>
-              <a:ext uri="{FF2B5EF4-FFF2-40B4-BE49-F238E27FC236}">
-                <a16:creationId xmlns:a16="http://schemas.microsoft.com/office/drawing/2014/main" id="{AD35E458-039B-4600-9C30-83F1B4F1FE07}"/>
+          <p:cNvPr id="6" name="Picture 5">
+            <a:extLst>
+              <a:ext uri="{FF2B5EF4-FFF2-40B4-BE49-F238E27FC236}">
+                <a16:creationId xmlns:a16="http://schemas.microsoft.com/office/drawing/2014/main" id="{57137F97-7184-49B4-A919-F2D75072A7C7}"/>
               </a:ext>
             </a:extLst>
           </p:cNvPr>
@@ -4016,130 +3998,18 @@
         </p:blipFill>
         <p:spPr>
           <a:xfrm>
-            <a:off x="221356" y="921147"/>
-            <a:ext cx="10171470" cy="5367685"/>
+            <a:off x="0" y="0"/>
+            <a:ext cx="12192000" cy="6858000"/>
           </a:xfrm>
           <a:prstGeom prst="rect">
             <a:avLst/>
           </a:prstGeom>
         </p:spPr>
       </p:pic>
-      <p:sp>
-        <p:nvSpPr>
-          <p:cNvPr id="5" name="TextBox 4">
-            <a:extLst>
-              <a:ext uri="{FF2B5EF4-FFF2-40B4-BE49-F238E27FC236}">
-                <a16:creationId xmlns:a16="http://schemas.microsoft.com/office/drawing/2014/main" id="{CAB32E96-9BBE-4C19-83A2-B652A5B89F03}"/>
-              </a:ext>
-            </a:extLst>
-          </p:cNvPr>
-          <p:cNvSpPr txBox="1"/>
-          <p:nvPr/>
-        </p:nvSpPr>
-        <p:spPr>
-          <a:xfrm>
-            <a:off x="9470146" y="486561"/>
-            <a:ext cx="3181739" cy="7017306"/>
-          </a:xfrm>
-          <a:prstGeom prst="rect">
-            <a:avLst/>
-          </a:prstGeom>
-          <a:noFill/>
-        </p:spPr>
-        <p:txBody>
-          <a:bodyPr wrap="square" rtlCol="0">
-            <a:spAutoFit/>
-          </a:bodyPr>
-          <a:lstStyle/>
-          <a:p>
-            <a:r>
-              <a:rPr lang="en-US" dirty="0"/>
-              <a:t>Figure #</a:t>
-            </a:r>
-          </a:p>
-          <a:p>
-            <a:r>
-              <a:rPr lang="en-US" dirty="0"/>
-              <a:t>Mean Eccentricity measured against </a:t>
-            </a:r>
-            <a:r>
-              <a:rPr lang="en-US" dirty="0" err="1"/>
-              <a:t>LsMeans</a:t>
-            </a:r>
-            <a:r>
-              <a:rPr lang="en-US" dirty="0"/>
-              <a:t> Hyphal Waviness</a:t>
-            </a:r>
-          </a:p>
-          <a:p>
-            <a:endParaRPr lang="en-US" dirty="0"/>
-          </a:p>
-          <a:p>
-            <a:endParaRPr lang="en-US" dirty="0"/>
-          </a:p>
-          <a:p>
-            <a:endParaRPr lang="en-US" dirty="0"/>
-          </a:p>
-          <a:p>
-            <a:endParaRPr lang="en-US" dirty="0"/>
-          </a:p>
-          <a:p>
-            <a:endParaRPr lang="en-US" dirty="0"/>
-          </a:p>
-          <a:p>
-            <a:endParaRPr lang="en-US" dirty="0"/>
-          </a:p>
-          <a:p>
-            <a:endParaRPr lang="en-US" dirty="0"/>
-          </a:p>
-          <a:p>
-            <a:endParaRPr lang="en-US" dirty="0"/>
-          </a:p>
-          <a:p>
-            <a:endParaRPr lang="en-US" dirty="0"/>
-          </a:p>
-          <a:p>
-            <a:endParaRPr lang="en-US" dirty="0"/>
-          </a:p>
-          <a:p>
-            <a:endParaRPr lang="en-US" dirty="0"/>
-          </a:p>
-          <a:p>
-            <a:endParaRPr lang="en-US" dirty="0"/>
-          </a:p>
-          <a:p>
-            <a:endParaRPr lang="en-US" dirty="0"/>
-          </a:p>
-          <a:p>
-            <a:endParaRPr lang="en-US" dirty="0"/>
-          </a:p>
-          <a:p>
-            <a:endParaRPr lang="en-US" dirty="0"/>
-          </a:p>
-          <a:p>
-            <a:endParaRPr lang="en-US" dirty="0"/>
-          </a:p>
-          <a:p>
-            <a:endParaRPr lang="en-US" dirty="0"/>
-          </a:p>
-          <a:p>
-            <a:endParaRPr lang="en-US" dirty="0"/>
-          </a:p>
-          <a:p>
-            <a:endParaRPr lang="en-US" dirty="0"/>
-          </a:p>
-          <a:p>
-            <a:endParaRPr lang="en-US" dirty="0"/>
-          </a:p>
-          <a:p>
-            <a:endParaRPr lang="en-US" dirty="0"/>
-          </a:p>
-        </p:txBody>
-      </p:sp>
     </p:spTree>
     <p:extLst>
       <p:ext uri="{BB962C8B-B14F-4D97-AF65-F5344CB8AC3E}">
-        <p14:creationId xmlns:p14="http://schemas.microsoft.com/office/powerpoint/2010/main" val="2222312369"/>
+        <p14:creationId xmlns:p14="http://schemas.microsoft.com/office/powerpoint/2010/main" val="3913836524"/>
       </p:ext>
     </p:extLst>
   </p:cSld>
@@ -4166,12 +4036,222 @@
           <a:chExt cx="0" cy="0"/>
         </a:xfrm>
       </p:grpSpPr>
+      <p:sp>
+        <p:nvSpPr>
+          <p:cNvPr id="5" name="TextBox 4">
+            <a:extLst>
+              <a:ext uri="{FF2B5EF4-FFF2-40B4-BE49-F238E27FC236}">
+                <a16:creationId xmlns:a16="http://schemas.microsoft.com/office/drawing/2014/main" id="{C05F688A-3013-44AE-9657-1536DAD1E3B7}"/>
+              </a:ext>
+            </a:extLst>
+          </p:cNvPr>
+          <p:cNvSpPr txBox="1"/>
+          <p:nvPr/>
+        </p:nvSpPr>
+        <p:spPr>
+          <a:xfrm>
+            <a:off x="0" y="6330843"/>
+            <a:ext cx="12192001" cy="8956298"/>
+          </a:xfrm>
+          <a:prstGeom prst="rect">
+            <a:avLst/>
+          </a:prstGeom>
+          <a:noFill/>
+        </p:spPr>
+        <p:txBody>
+          <a:bodyPr wrap="square" rtlCol="0">
+            <a:spAutoFit/>
+          </a:bodyPr>
+          <a:lstStyle/>
+          <a:p>
+            <a:r>
+              <a:rPr lang="en-US" b="1" dirty="0"/>
+              <a:t>Figure #. Various interactions of B. cinerea lesions sizes on Eudicots with hyphal waviness of B. cinerea. </a:t>
+            </a:r>
+            <a:r>
+              <a:rPr lang="en-US" dirty="0"/>
+              <a:t>- </a:t>
+            </a:r>
+            <a:r>
+              <a:rPr lang="en-US" dirty="0" err="1"/>
+              <a:t>pearson</a:t>
+            </a:r>
+            <a:r>
+              <a:rPr lang="en-US" b="1" dirty="0"/>
+              <a:t> </a:t>
+            </a:r>
+          </a:p>
+          <a:p>
+            <a:r>
+              <a:rPr lang="en-US" dirty="0"/>
+              <a:t>Scatter plots of various eudicot lesion sizes due to B. cinerea isolates compared against B. cinerea hyphal waviness based on 97 individual isolates. Each point is an isolate interaction of the marginal means of lesion size with marginal means of hyphal waviness. </a:t>
+            </a:r>
+          </a:p>
+          <a:p>
+            <a:r>
+              <a:rPr lang="en-US" dirty="0"/>
+              <a:t>A) Least Square Mean lesion size on </a:t>
+            </a:r>
+            <a:r>
+              <a:rPr lang="en-US" i="1" dirty="0" err="1"/>
+              <a:t>Cichorium</a:t>
+            </a:r>
+            <a:r>
+              <a:rPr lang="en-US" i="1" dirty="0"/>
+              <a:t> </a:t>
+            </a:r>
+            <a:r>
+              <a:rPr lang="en-US" i="1" dirty="0" err="1"/>
+              <a:t>endivia</a:t>
+            </a:r>
+            <a:endParaRPr lang="en-US" i="1" dirty="0"/>
+          </a:p>
+          <a:p>
+            <a:r>
+              <a:rPr lang="en-US" dirty="0"/>
+              <a:t>B) Least Square Mean lesion size on </a:t>
+            </a:r>
+            <a:r>
+              <a:rPr lang="en-US" i="1" dirty="0"/>
+              <a:t>Brassica </a:t>
+            </a:r>
+            <a:r>
+              <a:rPr lang="en-US" i="1" dirty="0" err="1"/>
+              <a:t>rapa</a:t>
+            </a:r>
+            <a:endParaRPr lang="en-US" i="1" dirty="0"/>
+          </a:p>
+          <a:p>
+            <a:r>
+              <a:rPr lang="en-US" dirty="0"/>
+              <a:t>C) Least Square Mean lesion size on </a:t>
+            </a:r>
+            <a:r>
+              <a:rPr lang="en-US" i="1" dirty="0" err="1"/>
+              <a:t>Cichorium</a:t>
+            </a:r>
+            <a:r>
+              <a:rPr lang="en-US" i="1" dirty="0"/>
+              <a:t> </a:t>
+            </a:r>
+            <a:r>
+              <a:rPr lang="en-US" i="1" dirty="0" err="1"/>
+              <a:t>intybus</a:t>
+            </a:r>
+            <a:endParaRPr lang="en-US" b="1" i="1" dirty="0"/>
+          </a:p>
+          <a:p>
+            <a:r>
+              <a:rPr lang="en-US" dirty="0"/>
+              <a:t>D) Least Square Mean lesion size on </a:t>
+            </a:r>
+            <a:r>
+              <a:rPr lang="en-US" i="1" dirty="0"/>
+              <a:t>Glycine max</a:t>
+            </a:r>
+            <a:r>
+              <a:rPr lang="en-US" dirty="0"/>
+              <a:t> (soy bean)</a:t>
+            </a:r>
+          </a:p>
+          <a:p>
+            <a:r>
+              <a:rPr lang="en-US" dirty="0"/>
+              <a:t>E) Least Square Mean lesion size on </a:t>
+            </a:r>
+            <a:r>
+              <a:rPr lang="en-US" i="1" dirty="0"/>
+              <a:t>Helianthus </a:t>
+            </a:r>
+            <a:r>
+              <a:rPr lang="en-US" i="1" dirty="0" err="1"/>
+              <a:t>annuus</a:t>
+            </a:r>
+            <a:endParaRPr lang="en-US" i="1" dirty="0"/>
+          </a:p>
+          <a:p>
+            <a:r>
+              <a:rPr lang="en-US" dirty="0"/>
+              <a:t>F) Least Square Mean lesion size on Solanum</a:t>
+            </a:r>
+          </a:p>
+          <a:p>
+            <a:r>
+              <a:rPr lang="en-US" dirty="0"/>
+              <a:t>G) Least Square Mean lesion size on Tomato</a:t>
+            </a:r>
+          </a:p>
+          <a:p>
+            <a:endParaRPr lang="en-US" dirty="0"/>
+          </a:p>
+          <a:p>
+            <a:endParaRPr lang="en-US" dirty="0"/>
+          </a:p>
+          <a:p>
+            <a:endParaRPr lang="en-US" dirty="0"/>
+          </a:p>
+          <a:p>
+            <a:endParaRPr lang="en-US" dirty="0"/>
+          </a:p>
+          <a:p>
+            <a:endParaRPr lang="en-US" dirty="0"/>
+          </a:p>
+          <a:p>
+            <a:endParaRPr lang="en-US" dirty="0"/>
+          </a:p>
+          <a:p>
+            <a:endParaRPr lang="en-US" dirty="0"/>
+          </a:p>
+          <a:p>
+            <a:endParaRPr lang="en-US" dirty="0"/>
+          </a:p>
+          <a:p>
+            <a:endParaRPr lang="en-US" dirty="0"/>
+          </a:p>
+          <a:p>
+            <a:endParaRPr lang="en-US" dirty="0"/>
+          </a:p>
+          <a:p>
+            <a:endParaRPr lang="en-US" dirty="0"/>
+          </a:p>
+          <a:p>
+            <a:endParaRPr lang="en-US" dirty="0"/>
+          </a:p>
+          <a:p>
+            <a:endParaRPr lang="en-US" dirty="0"/>
+          </a:p>
+          <a:p>
+            <a:endParaRPr lang="en-US" dirty="0"/>
+          </a:p>
+          <a:p>
+            <a:endParaRPr lang="en-US" dirty="0"/>
+          </a:p>
+          <a:p>
+            <a:endParaRPr lang="en-US" dirty="0"/>
+          </a:p>
+          <a:p>
+            <a:endParaRPr lang="en-US" dirty="0"/>
+          </a:p>
+          <a:p>
+            <a:endParaRPr lang="en-US" dirty="0"/>
+          </a:p>
+          <a:p>
+            <a:endParaRPr lang="en-US" dirty="0"/>
+          </a:p>
+          <a:p>
+            <a:endParaRPr lang="en-US" dirty="0"/>
+          </a:p>
+          <a:p>
+            <a:endParaRPr lang="en-US" dirty="0"/>
+          </a:p>
+        </p:txBody>
+      </p:sp>
       <p:pic>
         <p:nvPicPr>
-          <p:cNvPr id="4" name="Picture 3">
-            <a:extLst>
-              <a:ext uri="{FF2B5EF4-FFF2-40B4-BE49-F238E27FC236}">
-                <a16:creationId xmlns:a16="http://schemas.microsoft.com/office/drawing/2014/main" id="{96D836BE-EE17-4E5A-AF5A-F5280910B240}"/>
+          <p:cNvPr id="2" name="Picture 1">
+            <a:extLst>
+              <a:ext uri="{FF2B5EF4-FFF2-40B4-BE49-F238E27FC236}">
+                <a16:creationId xmlns:a16="http://schemas.microsoft.com/office/drawing/2014/main" id="{5C1B3D3B-E2D9-4F4D-9BE9-437060BF9CF4}"/>
               </a:ext>
             </a:extLst>
           </p:cNvPr>
@@ -4188,122 +4268,18 @@
         </p:blipFill>
         <p:spPr>
           <a:xfrm>
-            <a:off x="117446" y="1469530"/>
-            <a:ext cx="9605479" cy="5057106"/>
+            <a:off x="0" y="0"/>
+            <a:ext cx="12192000" cy="6330843"/>
           </a:xfrm>
           <a:prstGeom prst="rect">
             <a:avLst/>
           </a:prstGeom>
         </p:spPr>
       </p:pic>
-      <p:sp>
-        <p:nvSpPr>
-          <p:cNvPr id="5" name="TextBox 4">
-            <a:extLst>
-              <a:ext uri="{FF2B5EF4-FFF2-40B4-BE49-F238E27FC236}">
-                <a16:creationId xmlns:a16="http://schemas.microsoft.com/office/drawing/2014/main" id="{E7F5E934-14F2-4CD1-8B4F-6F9B7F34B346}"/>
-              </a:ext>
-            </a:extLst>
-          </p:cNvPr>
-          <p:cNvSpPr txBox="1"/>
-          <p:nvPr/>
-        </p:nvSpPr>
-        <p:spPr>
-          <a:xfrm>
-            <a:off x="9470146" y="486561"/>
-            <a:ext cx="3181739" cy="7017306"/>
-          </a:xfrm>
-          <a:prstGeom prst="rect">
-            <a:avLst/>
-          </a:prstGeom>
-          <a:noFill/>
-        </p:spPr>
-        <p:txBody>
-          <a:bodyPr wrap="square" rtlCol="0">
-            <a:spAutoFit/>
-          </a:bodyPr>
-          <a:lstStyle/>
-          <a:p>
-            <a:r>
-              <a:rPr lang="en-US" dirty="0"/>
-              <a:t>Figure #</a:t>
-            </a:r>
-          </a:p>
-          <a:p>
-            <a:r>
-              <a:rPr lang="en-US" dirty="0"/>
-              <a:t>Mean Eccentricity measured against Average Hyphal Waviness</a:t>
-            </a:r>
-          </a:p>
-          <a:p>
-            <a:endParaRPr lang="en-US" dirty="0"/>
-          </a:p>
-          <a:p>
-            <a:endParaRPr lang="en-US" dirty="0"/>
-          </a:p>
-          <a:p>
-            <a:endParaRPr lang="en-US" dirty="0"/>
-          </a:p>
-          <a:p>
-            <a:endParaRPr lang="en-US" dirty="0"/>
-          </a:p>
-          <a:p>
-            <a:endParaRPr lang="en-US" dirty="0"/>
-          </a:p>
-          <a:p>
-            <a:endParaRPr lang="en-US" dirty="0"/>
-          </a:p>
-          <a:p>
-            <a:endParaRPr lang="en-US" dirty="0"/>
-          </a:p>
-          <a:p>
-            <a:endParaRPr lang="en-US" dirty="0"/>
-          </a:p>
-          <a:p>
-            <a:endParaRPr lang="en-US" dirty="0"/>
-          </a:p>
-          <a:p>
-            <a:endParaRPr lang="en-US" dirty="0"/>
-          </a:p>
-          <a:p>
-            <a:endParaRPr lang="en-US" dirty="0"/>
-          </a:p>
-          <a:p>
-            <a:endParaRPr lang="en-US" dirty="0"/>
-          </a:p>
-          <a:p>
-            <a:endParaRPr lang="en-US" dirty="0"/>
-          </a:p>
-          <a:p>
-            <a:endParaRPr lang="en-US" dirty="0"/>
-          </a:p>
-          <a:p>
-            <a:endParaRPr lang="en-US" dirty="0"/>
-          </a:p>
-          <a:p>
-            <a:endParaRPr lang="en-US" dirty="0"/>
-          </a:p>
-          <a:p>
-            <a:endParaRPr lang="en-US" dirty="0"/>
-          </a:p>
-          <a:p>
-            <a:endParaRPr lang="en-US" dirty="0"/>
-          </a:p>
-          <a:p>
-            <a:endParaRPr lang="en-US" dirty="0"/>
-          </a:p>
-          <a:p>
-            <a:endParaRPr lang="en-US" dirty="0"/>
-          </a:p>
-          <a:p>
-            <a:endParaRPr lang="en-US" dirty="0"/>
-          </a:p>
-        </p:txBody>
-      </p:sp>
     </p:spTree>
     <p:extLst>
       <p:ext uri="{BB962C8B-B14F-4D97-AF65-F5344CB8AC3E}">
-        <p14:creationId xmlns:p14="http://schemas.microsoft.com/office/powerpoint/2010/main" val="3487976611"/>
+        <p14:creationId xmlns:p14="http://schemas.microsoft.com/office/powerpoint/2010/main" val="3663658674"/>
       </p:ext>
     </p:extLst>
   </p:cSld>
@@ -4330,130 +4306,49 @@
           <a:chExt cx="0" cy="0"/>
         </a:xfrm>
       </p:grpSpPr>
-      <p:pic>
-        <p:nvPicPr>
-          <p:cNvPr id="4" name="Picture 3">
-            <a:extLst>
-              <a:ext uri="{FF2B5EF4-FFF2-40B4-BE49-F238E27FC236}">
-                <a16:creationId xmlns:a16="http://schemas.microsoft.com/office/drawing/2014/main" id="{A5A3DE45-2C20-4329-B332-5AB1FB98625D}"/>
-              </a:ext>
-            </a:extLst>
-          </p:cNvPr>
-          <p:cNvPicPr>
-            <a:picLocks noChangeAspect="1"/>
-          </p:cNvPicPr>
+      <p:sp>
+        <p:nvSpPr>
+          <p:cNvPr id="5" name="Rectangle 4">
+            <a:extLst>
+              <a:ext uri="{FF2B5EF4-FFF2-40B4-BE49-F238E27FC236}">
+                <a16:creationId xmlns:a16="http://schemas.microsoft.com/office/drawing/2014/main" id="{0039E68E-C138-47F5-A776-F5EED5BD3999}"/>
+              </a:ext>
+            </a:extLst>
+          </p:cNvPr>
+          <p:cNvSpPr/>
           <p:nvPr/>
-        </p:nvPicPr>
-        <p:blipFill>
-          <a:blip r:embed="rId2"/>
-          <a:stretch>
-            <a:fillRect/>
-          </a:stretch>
-        </p:blipFill>
+        </p:nvSpPr>
         <p:spPr>
           <a:xfrm>
-            <a:off x="614862" y="0"/>
-            <a:ext cx="10907504" cy="5614587"/>
+            <a:off x="0" y="6396335"/>
+            <a:ext cx="12192000" cy="646331"/>
           </a:xfrm>
           <a:prstGeom prst="rect">
             <a:avLst/>
           </a:prstGeom>
         </p:spPr>
-      </p:pic>
-      <p:sp>
-        <p:nvSpPr>
-          <p:cNvPr id="5" name="TextBox 4">
-            <a:extLst>
-              <a:ext uri="{FF2B5EF4-FFF2-40B4-BE49-F238E27FC236}">
-                <a16:creationId xmlns:a16="http://schemas.microsoft.com/office/drawing/2014/main" id="{1AE750E3-E617-4F3B-BC74-CD750B123654}"/>
-              </a:ext>
-            </a:extLst>
-          </p:cNvPr>
-          <p:cNvSpPr txBox="1"/>
-          <p:nvPr/>
-        </p:nvSpPr>
-        <p:spPr>
-          <a:xfrm>
-            <a:off x="1751731" y="5528915"/>
-            <a:ext cx="11367082" cy="1477328"/>
-          </a:xfrm>
-          <a:prstGeom prst="rect">
-            <a:avLst/>
-          </a:prstGeom>
-          <a:noFill/>
-        </p:spPr>
-        <p:txBody>
-          <a:bodyPr wrap="square" rtlCol="0">
+        <p:txBody>
+          <a:bodyPr wrap="square">
             <a:spAutoFit/>
           </a:bodyPr>
           <a:lstStyle/>
           <a:p>
             <a:r>
               <a:rPr lang="en-US" dirty="0"/>
-              <a:t>Figure#:</a:t>
-            </a:r>
-          </a:p>
-          <a:p>
-            <a:r>
-              <a:rPr lang="en-US" dirty="0"/>
-              <a:t>Lesion Eccentricity on Multiple Hosts against </a:t>
-            </a:r>
-            <a:r>
-              <a:rPr lang="en-US" dirty="0" err="1"/>
-              <a:t>LsMeans</a:t>
-            </a:r>
-            <a:r>
-              <a:rPr lang="en-US" dirty="0"/>
-              <a:t> Hyphal Waviness</a:t>
-            </a:r>
-          </a:p>
-          <a:p>
-            <a:endParaRPr lang="en-US" dirty="0"/>
-          </a:p>
-          <a:p>
-            <a:endParaRPr lang="en-US" dirty="0"/>
-          </a:p>
-          <a:p>
-            <a:endParaRPr lang="en-US" dirty="0"/>
-          </a:p>
-        </p:txBody>
-      </p:sp>
-    </p:spTree>
-    <p:extLst>
-      <p:ext uri="{BB962C8B-B14F-4D97-AF65-F5344CB8AC3E}">
-        <p14:creationId xmlns:p14="http://schemas.microsoft.com/office/powerpoint/2010/main" val="3428673227"/>
-      </p:ext>
-    </p:extLst>
-  </p:cSld>
-  <p:clrMapOvr>
-    <a:masterClrMapping/>
-  </p:clrMapOvr>
-</p:sld>
-</file>
-
-<file path=ppt/slides/slide15.xml><?xml version="1.0" encoding="utf-8"?>
-<p:sld xmlns:a="http://schemas.openxmlformats.org/drawingml/2006/main" xmlns:r="http://schemas.openxmlformats.org/officeDocument/2006/relationships" xmlns:p="http://schemas.openxmlformats.org/presentationml/2006/main">
-  <p:cSld>
-    <p:spTree>
-      <p:nvGrpSpPr>
-        <p:cNvPr id="1" name=""/>
-        <p:cNvGrpSpPr/>
-        <p:nvPr/>
-      </p:nvGrpSpPr>
-      <p:grpSpPr>
-        <a:xfrm>
-          <a:off x="0" y="0"/>
-          <a:ext cx="0" cy="0"/>
-          <a:chOff x="0" y="0"/>
-          <a:chExt cx="0" cy="0"/>
-        </a:xfrm>
-      </p:grpSpPr>
+              <a:t>Figure#. B. cinerea Lesion Eccentricity on Multiple Hosts against Average Hyphal Waviness - Pearson</a:t>
+            </a:r>
+          </a:p>
+          <a:p>
+            <a:endParaRPr lang="en-US" dirty="0"/>
+          </a:p>
+        </p:txBody>
+      </p:sp>
       <p:pic>
         <p:nvPicPr>
-          <p:cNvPr id="4" name="Picture 3">
-            <a:extLst>
-              <a:ext uri="{FF2B5EF4-FFF2-40B4-BE49-F238E27FC236}">
-                <a16:creationId xmlns:a16="http://schemas.microsoft.com/office/drawing/2014/main" id="{E8F14CF8-CC50-43E1-A7F7-633BBC9CC06D}"/>
+          <p:cNvPr id="2" name="Picture 1">
+            <a:extLst>
+              <a:ext uri="{FF2B5EF4-FFF2-40B4-BE49-F238E27FC236}">
+                <a16:creationId xmlns:a16="http://schemas.microsoft.com/office/drawing/2014/main" id="{9A523D0A-632A-4C68-97B8-9458235EE914}"/>
               </a:ext>
             </a:extLst>
           </p:cNvPr>
@@ -4471,53 +4366,13 @@
         <p:spPr>
           <a:xfrm>
             <a:off x="0" y="0"/>
-            <a:ext cx="10916129" cy="5592184"/>
+            <a:ext cx="12192000" cy="6329576"/>
           </a:xfrm>
           <a:prstGeom prst="rect">
             <a:avLst/>
           </a:prstGeom>
         </p:spPr>
       </p:pic>
-      <p:sp>
-        <p:nvSpPr>
-          <p:cNvPr id="5" name="Rectangle 4">
-            <a:extLst>
-              <a:ext uri="{FF2B5EF4-FFF2-40B4-BE49-F238E27FC236}">
-                <a16:creationId xmlns:a16="http://schemas.microsoft.com/office/drawing/2014/main" id="{0039E68E-C138-47F5-A776-F5EED5BD3999}"/>
-              </a:ext>
-            </a:extLst>
-          </p:cNvPr>
-          <p:cNvSpPr/>
-          <p:nvPr/>
-        </p:nvSpPr>
-        <p:spPr>
-          <a:xfrm>
-            <a:off x="1140607" y="5724882"/>
-            <a:ext cx="10047215" cy="923330"/>
-          </a:xfrm>
-          <a:prstGeom prst="rect">
-            <a:avLst/>
-          </a:prstGeom>
-        </p:spPr>
-        <p:txBody>
-          <a:bodyPr wrap="square">
-            <a:spAutoFit/>
-          </a:bodyPr>
-          <a:lstStyle/>
-          <a:p>
-            <a:r>
-              <a:rPr lang="en-US" dirty="0"/>
-              <a:t>Figure#. B. cinerea Lesion Eccentricity on Multiple Hosts against Average Hyphal Waviness</a:t>
-            </a:r>
-          </a:p>
-          <a:p>
-            <a:endParaRPr lang="en-US" dirty="0"/>
-          </a:p>
-          <a:p>
-            <a:endParaRPr lang="en-US" dirty="0"/>
-          </a:p>
-        </p:txBody>
-      </p:sp>
     </p:spTree>
     <p:extLst>
       <p:ext uri="{BB962C8B-B14F-4D97-AF65-F5344CB8AC3E}">
@@ -6031,8 +5886,8 @@
         </p:nvSpPr>
         <p:spPr>
           <a:xfrm>
-            <a:off x="1932314" y="5842337"/>
-            <a:ext cx="10943120" cy="2031325"/>
+            <a:off x="0" y="5842337"/>
+            <a:ext cx="12192000" cy="2031325"/>
           </a:xfrm>
           <a:prstGeom prst="rect">
             <a:avLst/>
@@ -6303,7 +6158,7 @@
         <p:spPr>
           <a:xfrm>
             <a:off x="9538568" y="810960"/>
-            <a:ext cx="2653432" cy="4524315"/>
+            <a:ext cx="2653432" cy="4801314"/>
           </a:xfrm>
           <a:prstGeom prst="rect">
             <a:avLst/>
@@ -6356,7 +6211,7 @@
             </a:r>
             <a:r>
               <a:rPr lang="en-US" dirty="0"/>
-              <a:t>chromosomes as alternating black and white regions. Thresholds of effect estimate from permutation analysis are displayed as horizontal dashed lines. </a:t>
+              <a:t>chromosomes as alternating black and white regions. 99.9% thresholds of effect size estimate from permutation analysis are displayed as horizontal dashed lines. </a:t>
             </a:r>
           </a:p>
           <a:p>
@@ -6369,10 +6224,10 @@
       </p:sp>
       <p:pic>
         <p:nvPicPr>
-          <p:cNvPr id="3" name="Picture 2">
-            <a:extLst>
-              <a:ext uri="{FF2B5EF4-FFF2-40B4-BE49-F238E27FC236}">
-                <a16:creationId xmlns:a16="http://schemas.microsoft.com/office/drawing/2014/main" id="{ABC17D68-A00F-4B53-8FCC-6C2E31D8050C}"/>
+          <p:cNvPr id="4" name="Picture 3">
+            <a:extLst>
+              <a:ext uri="{FF2B5EF4-FFF2-40B4-BE49-F238E27FC236}">
+                <a16:creationId xmlns:a16="http://schemas.microsoft.com/office/drawing/2014/main" id="{4CD3EF58-8C13-4E8E-AE8F-5B3D12F21ABB}"/>
               </a:ext>
             </a:extLst>
           </p:cNvPr>
@@ -6389,8 +6244,8 @@
         </p:blipFill>
         <p:spPr>
           <a:xfrm>
-            <a:off x="95075" y="287255"/>
-            <a:ext cx="9348418" cy="6460943"/>
+            <a:off x="0" y="544974"/>
+            <a:ext cx="9570458" cy="5067300"/>
           </a:xfrm>
           <a:prstGeom prst="rect">
             <a:avLst/>
@@ -6432,7 +6287,7 @@
           <p:cNvPr id="2" name="Title 1">
             <a:extLst>
               <a:ext uri="{FF2B5EF4-FFF2-40B4-BE49-F238E27FC236}">
-                <a16:creationId xmlns:a16="http://schemas.microsoft.com/office/drawing/2014/main" id="{5FCDA60D-EB0B-429A-88FA-68663306C63D}"/>
+                <a16:creationId xmlns:a16="http://schemas.microsoft.com/office/drawing/2014/main" id="{DF7C7DA4-AA99-4C2B-B1F0-8AB3A46622BF}"/>
               </a:ext>
             </a:extLst>
           </p:cNvPr>
@@ -6450,40 +6305,53 @@
           <a:p>
             <a:r>
               <a:rPr lang="en-US" dirty="0"/>
-              <a:t>GWA analysis graphs</a:t>
-            </a:r>
-          </a:p>
-        </p:txBody>
-      </p:sp>
-      <p:sp>
-        <p:nvSpPr>
-          <p:cNvPr id="3" name="Content Placeholder 2">
-            <a:extLst>
-              <a:ext uri="{FF2B5EF4-FFF2-40B4-BE49-F238E27FC236}">
-                <a16:creationId xmlns:a16="http://schemas.microsoft.com/office/drawing/2014/main" id="{D22D06AB-9AD5-4840-9F1F-DFF5366B615F}"/>
-              </a:ext>
-            </a:extLst>
-          </p:cNvPr>
-          <p:cNvSpPr>
-            <a:spLocks noGrp="1"/>
-          </p:cNvSpPr>
-          <p:nvPr>
-            <p:ph idx="1"/>
-          </p:nvPr>
-        </p:nvSpPr>
-        <p:spPr/>
-        <p:txBody>
-          <a:bodyPr/>
-          <a:lstStyle/>
-          <a:p>
-            <a:endParaRPr lang="en-US"/>
-          </a:p>
-        </p:txBody>
-      </p:sp>
+              <a:t>Smaller </a:t>
+            </a:r>
+            <a:r>
+              <a:rPr lang="en-US" dirty="0" err="1"/>
+              <a:t>manhattan</a:t>
+            </a:r>
+            <a:r>
+              <a:rPr lang="en-US" dirty="0"/>
+              <a:t> plot with scaled points </a:t>
+            </a:r>
+          </a:p>
+        </p:txBody>
+      </p:sp>
+      <p:pic>
+        <p:nvPicPr>
+          <p:cNvPr id="4" name="Picture 3">
+            <a:extLst>
+              <a:ext uri="{FF2B5EF4-FFF2-40B4-BE49-F238E27FC236}">
+                <a16:creationId xmlns:a16="http://schemas.microsoft.com/office/drawing/2014/main" id="{7463F99F-150B-49BE-AE42-B704EEF87E7B}"/>
+              </a:ext>
+            </a:extLst>
+          </p:cNvPr>
+          <p:cNvPicPr>
+            <a:picLocks noChangeAspect="1"/>
+          </p:cNvPicPr>
+          <p:nvPr/>
+        </p:nvPicPr>
+        <p:blipFill>
+          <a:blip r:embed="rId2"/>
+          <a:stretch>
+            <a:fillRect/>
+          </a:stretch>
+        </p:blipFill>
+        <p:spPr>
+          <a:xfrm>
+            <a:off x="-1" y="1541653"/>
+            <a:ext cx="9795167" cy="4951221"/>
+          </a:xfrm>
+          <a:prstGeom prst="rect">
+            <a:avLst/>
+          </a:prstGeom>
+        </p:spPr>
+      </p:pic>
     </p:spTree>
     <p:extLst>
       <p:ext uri="{BB962C8B-B14F-4D97-AF65-F5344CB8AC3E}">
-        <p14:creationId xmlns:p14="http://schemas.microsoft.com/office/powerpoint/2010/main" val="65335568"/>
+        <p14:creationId xmlns:p14="http://schemas.microsoft.com/office/powerpoint/2010/main" val="1269590424"/>
       </p:ext>
     </p:extLst>
   </p:cSld>
@@ -6510,119 +6378,63 @@
           <a:chExt cx="0" cy="0"/>
         </a:xfrm>
       </p:grpSpPr>
-      <p:pic>
-        <p:nvPicPr>
-          <p:cNvPr id="4" name="Content Placeholder 3">
-            <a:extLst>
-              <a:ext uri="{FF2B5EF4-FFF2-40B4-BE49-F238E27FC236}">
-                <a16:creationId xmlns:a16="http://schemas.microsoft.com/office/drawing/2014/main" id="{5CF1D73C-CDAF-4C5E-870D-8BA455DA916C}"/>
-              </a:ext>
-            </a:extLst>
-          </p:cNvPr>
-          <p:cNvPicPr>
-            <a:picLocks noGrp="1" noChangeAspect="1"/>
-          </p:cNvPicPr>
+      <p:sp>
+        <p:nvSpPr>
+          <p:cNvPr id="2" name="Title 1">
+            <a:extLst>
+              <a:ext uri="{FF2B5EF4-FFF2-40B4-BE49-F238E27FC236}">
+                <a16:creationId xmlns:a16="http://schemas.microsoft.com/office/drawing/2014/main" id="{5FCDA60D-EB0B-429A-88FA-68663306C63D}"/>
+              </a:ext>
+            </a:extLst>
+          </p:cNvPr>
+          <p:cNvSpPr>
+            <a:spLocks noGrp="1"/>
+          </p:cNvSpPr>
+          <p:nvPr>
+            <p:ph type="title"/>
+          </p:nvPr>
+        </p:nvSpPr>
+        <p:spPr/>
+        <p:txBody>
+          <a:bodyPr/>
+          <a:lstStyle/>
+          <a:p>
+            <a:r>
+              <a:rPr lang="en-US" dirty="0"/>
+              <a:t>GWA analysis graphs</a:t>
+            </a:r>
+          </a:p>
+        </p:txBody>
+      </p:sp>
+      <p:sp>
+        <p:nvSpPr>
+          <p:cNvPr id="3" name="Content Placeholder 2">
+            <a:extLst>
+              <a:ext uri="{FF2B5EF4-FFF2-40B4-BE49-F238E27FC236}">
+                <a16:creationId xmlns:a16="http://schemas.microsoft.com/office/drawing/2014/main" id="{D22D06AB-9AD5-4840-9F1F-DFF5366B615F}"/>
+              </a:ext>
+            </a:extLst>
+          </p:cNvPr>
+          <p:cNvSpPr>
+            <a:spLocks noGrp="1"/>
+          </p:cNvSpPr>
           <p:nvPr>
             <p:ph idx="1"/>
           </p:nvPr>
-        </p:nvPicPr>
-        <p:blipFill>
-          <a:blip r:embed="rId2"/>
-          <a:stretch>
-            <a:fillRect/>
-          </a:stretch>
-        </p:blipFill>
-        <p:spPr>
-          <a:xfrm>
-            <a:off x="119742" y="365125"/>
-            <a:ext cx="7685837" cy="5830402"/>
-          </a:xfrm>
-          <a:prstGeom prst="rect">
-            <a:avLst/>
-          </a:prstGeom>
-        </p:spPr>
-      </p:pic>
-      <p:sp>
-        <p:nvSpPr>
-          <p:cNvPr id="5" name="TextBox 4">
-            <a:extLst>
-              <a:ext uri="{FF2B5EF4-FFF2-40B4-BE49-F238E27FC236}">
-                <a16:creationId xmlns:a16="http://schemas.microsoft.com/office/drawing/2014/main" id="{8790B5DB-5369-4BEC-9097-5F6FDC915BE0}"/>
-              </a:ext>
-            </a:extLst>
-          </p:cNvPr>
-          <p:cNvSpPr txBox="1"/>
-          <p:nvPr/>
-        </p:nvSpPr>
-        <p:spPr>
-          <a:xfrm>
-            <a:off x="8854751" y="2099388"/>
-            <a:ext cx="2304661" cy="4801314"/>
-          </a:xfrm>
-          <a:prstGeom prst="rect">
-            <a:avLst/>
-          </a:prstGeom>
-          <a:noFill/>
-        </p:spPr>
-        <p:txBody>
-          <a:bodyPr wrap="square" rtlCol="0">
-            <a:spAutoFit/>
-          </a:bodyPr>
+        </p:nvSpPr>
+        <p:spPr/>
+        <p:txBody>
+          <a:bodyPr/>
           <a:lstStyle/>
           <a:p>
-            <a:r>
-              <a:rPr lang="en-US" dirty="0"/>
-              <a:t>Figure # - </a:t>
-            </a:r>
-          </a:p>
-          <a:p>
-            <a:r>
-              <a:rPr lang="en-US" dirty="0"/>
-              <a:t>Average Hyphal Waviness plotted against Growth on Sugar/Pectin </a:t>
-            </a:r>
-          </a:p>
-          <a:p>
-            <a:endParaRPr lang="en-US" dirty="0"/>
-          </a:p>
-          <a:p>
-            <a:endParaRPr lang="en-US" dirty="0"/>
-          </a:p>
-          <a:p>
-            <a:endParaRPr lang="en-US" dirty="0"/>
-          </a:p>
-          <a:p>
-            <a:endParaRPr lang="en-US" dirty="0"/>
-          </a:p>
-          <a:p>
-            <a:endParaRPr lang="en-US" dirty="0"/>
-          </a:p>
-          <a:p>
-            <a:endParaRPr lang="en-US" dirty="0"/>
-          </a:p>
-          <a:p>
-            <a:endParaRPr lang="en-US" dirty="0"/>
-          </a:p>
-          <a:p>
-            <a:endParaRPr lang="en-US" dirty="0"/>
-          </a:p>
-          <a:p>
-            <a:endParaRPr lang="en-US" dirty="0"/>
-          </a:p>
-          <a:p>
-            <a:endParaRPr lang="en-US" dirty="0"/>
-          </a:p>
-          <a:p>
-            <a:endParaRPr lang="en-US" dirty="0"/>
-          </a:p>
-          <a:p>
-            <a:endParaRPr lang="en-US" dirty="0"/>
+            <a:endParaRPr lang="en-US"/>
           </a:p>
         </p:txBody>
       </p:sp>
     </p:spTree>
     <p:extLst>
       <p:ext uri="{BB962C8B-B14F-4D97-AF65-F5344CB8AC3E}">
-        <p14:creationId xmlns:p14="http://schemas.microsoft.com/office/powerpoint/2010/main" val="2927980237"/>
+        <p14:creationId xmlns:p14="http://schemas.microsoft.com/office/powerpoint/2010/main" val="65335568"/>
       </p:ext>
     </p:extLst>
   </p:cSld>
@@ -6649,12 +6461,94 @@
           <a:chExt cx="0" cy="0"/>
         </a:xfrm>
       </p:grpSpPr>
+      <p:sp>
+        <p:nvSpPr>
+          <p:cNvPr id="5" name="TextBox 4">
+            <a:extLst>
+              <a:ext uri="{FF2B5EF4-FFF2-40B4-BE49-F238E27FC236}">
+                <a16:creationId xmlns:a16="http://schemas.microsoft.com/office/drawing/2014/main" id="{8790B5DB-5369-4BEC-9097-5F6FDC915BE0}"/>
+              </a:ext>
+            </a:extLst>
+          </p:cNvPr>
+          <p:cNvSpPr txBox="1"/>
+          <p:nvPr/>
+        </p:nvSpPr>
+        <p:spPr>
+          <a:xfrm>
+            <a:off x="0" y="6976188"/>
+            <a:ext cx="9207500" cy="3970318"/>
+          </a:xfrm>
+          <a:prstGeom prst="rect">
+            <a:avLst/>
+          </a:prstGeom>
+          <a:noFill/>
+        </p:spPr>
+        <p:txBody>
+          <a:bodyPr wrap="square" rtlCol="0">
+            <a:spAutoFit/>
+          </a:bodyPr>
+          <a:lstStyle/>
+          <a:p>
+            <a:r>
+              <a:rPr lang="en-US" dirty="0"/>
+              <a:t>Figure # - </a:t>
+            </a:r>
+          </a:p>
+          <a:p>
+            <a:r>
+              <a:rPr lang="en-US" dirty="0"/>
+              <a:t>Average Hyphal Waviness plotted against Growth on Sugar/Pectin - </a:t>
+            </a:r>
+            <a:r>
+              <a:rPr lang="en-US" dirty="0" err="1"/>
+              <a:t>pearson</a:t>
+            </a:r>
+            <a:endParaRPr lang="en-US" dirty="0"/>
+          </a:p>
+          <a:p>
+            <a:endParaRPr lang="en-US" dirty="0"/>
+          </a:p>
+          <a:p>
+            <a:endParaRPr lang="en-US" dirty="0"/>
+          </a:p>
+          <a:p>
+            <a:endParaRPr lang="en-US" dirty="0"/>
+          </a:p>
+          <a:p>
+            <a:endParaRPr lang="en-US" dirty="0"/>
+          </a:p>
+          <a:p>
+            <a:endParaRPr lang="en-US" dirty="0"/>
+          </a:p>
+          <a:p>
+            <a:endParaRPr lang="en-US" dirty="0"/>
+          </a:p>
+          <a:p>
+            <a:endParaRPr lang="en-US" dirty="0"/>
+          </a:p>
+          <a:p>
+            <a:endParaRPr lang="en-US" dirty="0"/>
+          </a:p>
+          <a:p>
+            <a:endParaRPr lang="en-US" dirty="0"/>
+          </a:p>
+          <a:p>
+            <a:endParaRPr lang="en-US" dirty="0"/>
+          </a:p>
+          <a:p>
+            <a:endParaRPr lang="en-US" dirty="0"/>
+          </a:p>
+          <a:p>
+            <a:endParaRPr lang="en-US" dirty="0"/>
+          </a:p>
+        </p:txBody>
+      </p:sp>
       <p:pic>
         <p:nvPicPr>
-          <p:cNvPr id="4" name="Picture 3">
-            <a:extLst>
-              <a:ext uri="{FF2B5EF4-FFF2-40B4-BE49-F238E27FC236}">
-                <a16:creationId xmlns:a16="http://schemas.microsoft.com/office/drawing/2014/main" id="{8605A398-FB34-451A-9C81-408789C9CE59}"/>
+          <p:cNvPr id="7" name="Picture 6">
+            <a:extLst>
+              <a:ext uri="{FF2B5EF4-FFF2-40B4-BE49-F238E27FC236}">
+                <a16:creationId xmlns:a16="http://schemas.microsoft.com/office/drawing/2014/main" id="{A23B555E-8C22-4CCF-9532-1E1F9DC9F7D6}"/>
               </a:ext>
             </a:extLst>
           </p:cNvPr>
@@ -6671,99 +6565,18 @@
         </p:blipFill>
         <p:spPr>
           <a:xfrm>
-            <a:off x="269032" y="287358"/>
-            <a:ext cx="8476601" cy="5611480"/>
+            <a:off x="0" y="0"/>
+            <a:ext cx="12192000" cy="6858000"/>
           </a:xfrm>
           <a:prstGeom prst="rect">
             <a:avLst/>
           </a:prstGeom>
         </p:spPr>
       </p:pic>
-      <p:sp>
-        <p:nvSpPr>
-          <p:cNvPr id="5" name="TextBox 4">
-            <a:extLst>
-              <a:ext uri="{FF2B5EF4-FFF2-40B4-BE49-F238E27FC236}">
-                <a16:creationId xmlns:a16="http://schemas.microsoft.com/office/drawing/2014/main" id="{C05AC16E-131F-4276-8267-1539454128F8}"/>
-              </a:ext>
-            </a:extLst>
-          </p:cNvPr>
-          <p:cNvSpPr txBox="1"/>
-          <p:nvPr/>
-        </p:nvSpPr>
-        <p:spPr>
-          <a:xfrm>
-            <a:off x="8879918" y="941707"/>
-            <a:ext cx="2304661" cy="4801314"/>
-          </a:xfrm>
-          <a:prstGeom prst="rect">
-            <a:avLst/>
-          </a:prstGeom>
-          <a:noFill/>
-        </p:spPr>
-        <p:txBody>
-          <a:bodyPr wrap="square" rtlCol="0">
-            <a:spAutoFit/>
-          </a:bodyPr>
-          <a:lstStyle/>
-          <a:p>
-            <a:r>
-              <a:rPr lang="en-US" dirty="0"/>
-              <a:t>Figure # - </a:t>
-            </a:r>
-          </a:p>
-          <a:p>
-            <a:r>
-              <a:rPr lang="en-US" dirty="0" err="1"/>
-              <a:t>LsMeans</a:t>
-            </a:r>
-            <a:r>
-              <a:rPr lang="en-US" dirty="0"/>
-              <a:t> Hyphal Waviness plotted against Growth on Sugar/Pectin </a:t>
-            </a:r>
-          </a:p>
-          <a:p>
-            <a:endParaRPr lang="en-US" dirty="0"/>
-          </a:p>
-          <a:p>
-            <a:endParaRPr lang="en-US" dirty="0"/>
-          </a:p>
-          <a:p>
-            <a:endParaRPr lang="en-US" dirty="0"/>
-          </a:p>
-          <a:p>
-            <a:endParaRPr lang="en-US" dirty="0"/>
-          </a:p>
-          <a:p>
-            <a:endParaRPr lang="en-US" dirty="0"/>
-          </a:p>
-          <a:p>
-            <a:endParaRPr lang="en-US" dirty="0"/>
-          </a:p>
-          <a:p>
-            <a:endParaRPr lang="en-US" dirty="0"/>
-          </a:p>
-          <a:p>
-            <a:endParaRPr lang="en-US" dirty="0"/>
-          </a:p>
-          <a:p>
-            <a:endParaRPr lang="en-US" dirty="0"/>
-          </a:p>
-          <a:p>
-            <a:endParaRPr lang="en-US" dirty="0"/>
-          </a:p>
-          <a:p>
-            <a:endParaRPr lang="en-US" dirty="0"/>
-          </a:p>
-          <a:p>
-            <a:endParaRPr lang="en-US" dirty="0"/>
-          </a:p>
-        </p:txBody>
-      </p:sp>
     </p:spTree>
     <p:extLst>
       <p:ext uri="{BB962C8B-B14F-4D97-AF65-F5344CB8AC3E}">
-        <p14:creationId xmlns:p14="http://schemas.microsoft.com/office/powerpoint/2010/main" val="2123462057"/>
+        <p14:creationId xmlns:p14="http://schemas.microsoft.com/office/powerpoint/2010/main" val="2927980237"/>
       </p:ext>
     </p:extLst>
   </p:cSld>

</xml_diff>

<commit_message>
Added the information I was working on and the made them available on Git. Graphs and Figures Ppt updated with current drafts of the figure captions.
</commit_message>
<xml_diff>
--- a/paper/HWavinessGraphs_Figs_Capt.pptx
+++ b/paper/HWavinessGraphs_Figs_Capt.pptx
@@ -6,19 +6,21 @@
   </p:sldMasterIdLst>
   <p:sldIdLst>
     <p:sldId id="256" r:id="rId2"/>
-    <p:sldId id="270" r:id="rId3"/>
-    <p:sldId id="261" r:id="rId4"/>
-    <p:sldId id="260" r:id="rId5"/>
-    <p:sldId id="257" r:id="rId6"/>
-    <p:sldId id="259" r:id="rId7"/>
-    <p:sldId id="273" r:id="rId8"/>
-    <p:sldId id="271" r:id="rId9"/>
-    <p:sldId id="262" r:id="rId10"/>
-    <p:sldId id="264" r:id="rId11"/>
-    <p:sldId id="272" r:id="rId12"/>
-    <p:sldId id="263" r:id="rId13"/>
-    <p:sldId id="265" r:id="rId14"/>
-    <p:sldId id="269" r:id="rId15"/>
+    <p:sldId id="274" r:id="rId3"/>
+    <p:sldId id="275" r:id="rId4"/>
+    <p:sldId id="270" r:id="rId5"/>
+    <p:sldId id="261" r:id="rId6"/>
+    <p:sldId id="260" r:id="rId7"/>
+    <p:sldId id="257" r:id="rId8"/>
+    <p:sldId id="259" r:id="rId9"/>
+    <p:sldId id="273" r:id="rId10"/>
+    <p:sldId id="271" r:id="rId11"/>
+    <p:sldId id="262" r:id="rId12"/>
+    <p:sldId id="264" r:id="rId13"/>
+    <p:sldId id="272" r:id="rId14"/>
+    <p:sldId id="263" r:id="rId15"/>
+    <p:sldId id="265" r:id="rId16"/>
+    <p:sldId id="269" r:id="rId17"/>
   </p:sldIdLst>
   <p:sldSz cx="12192000" cy="6858000"/>
   <p:notesSz cx="6858000" cy="9144000"/>
@@ -138,18 +140,73 @@
 
 <file path=ppt/commentAuthors.xml><?xml version="1.0" encoding="utf-8"?>
 <p:cmAuthorLst xmlns:a="http://schemas.openxmlformats.org/drawingml/2006/main" xmlns:r="http://schemas.openxmlformats.org/officeDocument/2006/relationships" xmlns:p="http://schemas.openxmlformats.org/presentationml/2006/main">
-  <p:cmAuthor id="1" name="Josue Vega" initials="JV" lastIdx="2" clrIdx="0">
+  <p:cmAuthor id="1" name="Josue Vega" initials="JV" lastIdx="6" clrIdx="0">
     <p:extLst/>
   </p:cmAuthor>
   <p:cmAuthor id="2" name="Nicole Soltis" initials="NS" lastIdx="17" clrIdx="1"/>
 </p:cmAuthorLst>
 </file>
 
-<file path=ppt/revisionInfo.xml><?xml version="1.0" encoding="utf-8"?>
-<p1510:revInfo xmlns:a="http://schemas.openxmlformats.org/drawingml/2006/main" xmlns:r="http://schemas.openxmlformats.org/officeDocument/2006/relationships" xmlns:p1510="http://schemas.microsoft.com/office/powerpoint/2015/10/main"/>
+<file path=ppt/comments/comment1.xml><?xml version="1.0" encoding="utf-8"?>
+<p:cmLst xmlns:a="http://schemas.openxmlformats.org/drawingml/2006/main" xmlns:r="http://schemas.openxmlformats.org/officeDocument/2006/relationships" xmlns:p="http://schemas.openxmlformats.org/presentationml/2006/main">
+  <p:cm authorId="1" dt="2018-02-06T15:58:32.877" idx="3">
+    <p:pos x="3345" y="737"/>
+    <p:text>Should the average hyphal waviness be included? If so, by the isolate names or after all 30 estimates</p:text>
+    <p:extLst>
+      <p:ext uri="{C676402C-5697-4E1C-873F-D02D1690AC5C}">
+        <p15:threadingInfo xmlns:p15="http://schemas.microsoft.com/office/powerpoint/2012/main" timeZoneBias="480"/>
+      </p:ext>
+    </p:extLst>
+  </p:cm>
+  <p:cm authorId="1" dt="2018-02-06T15:59:27.301" idx="4">
+    <p:pos x="3537" y="2319"/>
+    <p:text>Is there a better way to characterize the 0s and 1s?</p:text>
+    <p:extLst>
+      <p:ext uri="{C676402C-5697-4E1C-873F-D02D1690AC5C}">
+        <p15:threadingInfo xmlns:p15="http://schemas.microsoft.com/office/powerpoint/2012/main" timeZoneBias="480"/>
+      </p:ext>
+    </p:extLst>
+  </p:cm>
+  <p:cm authorId="1" dt="2018-02-06T16:31:51.697" idx="5">
+    <p:pos x="7386" y="2100"/>
+    <p:text>I use the word indicate frequently. Need to fix that</p:text>
+    <p:extLst>
+      <p:ext uri="{C676402C-5697-4E1C-873F-D02D1690AC5C}">
+        <p15:threadingInfo xmlns:p15="http://schemas.microsoft.com/office/powerpoint/2012/main" timeZoneBias="480"/>
+      </p:ext>
+    </p:extLst>
+  </p:cm>
+  <p:cm authorId="1" dt="2018-02-06T16:32:16.595" idx="6">
+    <p:pos x="6860" y="2173"/>
+    <p:text>The term relationship does not feel accurate between SNP effect and reference SNP</p:text>
+    <p:extLst>
+      <p:ext uri="{C676402C-5697-4E1C-873F-D02D1690AC5C}">
+        <p15:threadingInfo xmlns:p15="http://schemas.microsoft.com/office/powerpoint/2012/main" timeZoneBias="480"/>
+      </p:ext>
+    </p:extLst>
+  </p:cm>
+</p:cmLst>
 </file>
 
-<file path=ppt/comments/comment1.xml><?xml version="1.0" encoding="utf-8"?>
+<file path=ppt/comments/comment10.xml><?xml version="1.0" encoding="utf-8"?>
+<p:cmLst xmlns:a="http://schemas.openxmlformats.org/drawingml/2006/main" xmlns:r="http://schemas.openxmlformats.org/officeDocument/2006/relationships" xmlns:p="http://schemas.openxmlformats.org/presentationml/2006/main">
+  <p:cm authorId="2" dt="2018-01-19T11:24:24.068" idx="13">
+    <p:pos x="7617" y="26"/>
+    <p:text>continue table from previous slide</p:text>
+  </p:cm>
+</p:cmLst>
+</file>
+
+<file path=ppt/comments/comment11.xml><?xml version="1.0" encoding="utf-8"?>
+<p:cmLst xmlns:a="http://schemas.openxmlformats.org/drawingml/2006/main" xmlns:r="http://schemas.openxmlformats.org/officeDocument/2006/relationships" xmlns:p="http://schemas.openxmlformats.org/presentationml/2006/main">
+  <p:cm authorId="2" dt="2018-01-19T11:24:43.798" idx="17">
+    <p:pos x="2295" y="3628"/>
+    <p:text>continue table from previous slide</p:text>
+  </p:cm>
+</p:cmLst>
+</file>
+
+<file path=ppt/comments/comment2.xml><?xml version="1.0" encoding="utf-8"?>
 <p:cmLst xmlns:a="http://schemas.openxmlformats.org/drawingml/2006/main" xmlns:r="http://schemas.openxmlformats.org/officeDocument/2006/relationships" xmlns:p="http://schemas.openxmlformats.org/presentationml/2006/main">
   <p:cm authorId="1" dt="2018-01-19T15:01:55.232" idx="2">
     <p:pos x="2903" y="1458"/>
@@ -163,16 +220,7 @@
 </p:cmLst>
 </file>
 
-<file path=ppt/comments/comment10.xml><?xml version="1.0" encoding="utf-8"?>
-<p:cmLst xmlns:a="http://schemas.openxmlformats.org/drawingml/2006/main" xmlns:r="http://schemas.openxmlformats.org/officeDocument/2006/relationships" xmlns:p="http://schemas.openxmlformats.org/presentationml/2006/main">
-  <p:cm authorId="2" dt="2018-01-19T11:24:43.798" idx="17">
-    <p:pos x="2295" y="3628"/>
-    <p:text>continue table from previous slide</p:text>
-  </p:cm>
-</p:cmLst>
-</file>
-
-<file path=ppt/comments/comment2.xml><?xml version="1.0" encoding="utf-8"?>
+<file path=ppt/comments/comment3.xml><?xml version="1.0" encoding="utf-8"?>
 <p:cmLst xmlns:a="http://schemas.openxmlformats.org/drawingml/2006/main" xmlns:r="http://schemas.openxmlformats.org/officeDocument/2006/relationships" xmlns:p="http://schemas.openxmlformats.org/presentationml/2006/main">
   <p:cm authorId="2" dt="2018-01-19T11:20:30.944" idx="6">
     <p:pos x="5665" y="3078"/>
@@ -185,7 +233,7 @@
 </p:cmLst>
 </file>
 
-<file path=ppt/comments/comment3.xml><?xml version="1.0" encoding="utf-8"?>
+<file path=ppt/comments/comment4.xml><?xml version="1.0" encoding="utf-8"?>
 <p:cmLst xmlns:a="http://schemas.openxmlformats.org/drawingml/2006/main" xmlns:r="http://schemas.openxmlformats.org/officeDocument/2006/relationships" xmlns:p="http://schemas.openxmlformats.org/presentationml/2006/main">
   <p:cm authorId="2" dt="2018-01-19T11:22:06.271" idx="9">
     <p:pos x="1178" y="3078"/>
@@ -194,7 +242,7 @@
 </p:cmLst>
 </file>
 
-<file path=ppt/comments/comment4.xml><?xml version="1.0" encoding="utf-8"?>
+<file path=ppt/comments/comment5.xml><?xml version="1.0" encoding="utf-8"?>
 <p:cmLst xmlns:a="http://schemas.openxmlformats.org/drawingml/2006/main" xmlns:r="http://schemas.openxmlformats.org/officeDocument/2006/relationships" xmlns:p="http://schemas.openxmlformats.org/presentationml/2006/main">
   <p:cm authorId="2" dt="2018-01-19T11:19:19.844" idx="4">
     <p:pos x="7548" y="533"/>
@@ -203,7 +251,7 @@
 </p:cmLst>
 </file>
 
-<file path=ppt/comments/comment5.xml><?xml version="1.0" encoding="utf-8"?>
+<file path=ppt/comments/comment6.xml><?xml version="1.0" encoding="utf-8"?>
 <p:cmLst xmlns:a="http://schemas.openxmlformats.org/drawingml/2006/main" xmlns:r="http://schemas.openxmlformats.org/officeDocument/2006/relationships" xmlns:p="http://schemas.openxmlformats.org/presentationml/2006/main">
   <p:cm authorId="2" dt="2018-01-19T11:23:55.828" idx="10">
     <p:pos x="4361" y="4646"/>
@@ -211,15 +259,6 @@
 column 1 = trait you are correlating to hyphal waviness
 column 2 = slope of trend line 
 column 3 = R2 value</p:text>
-  </p:cm>
-</p:cmLst>
-</file>
-
-<file path=ppt/comments/comment6.xml><?xml version="1.0" encoding="utf-8"?>
-<p:cmLst xmlns:a="http://schemas.openxmlformats.org/drawingml/2006/main" xmlns:r="http://schemas.openxmlformats.org/officeDocument/2006/relationships" xmlns:p="http://schemas.openxmlformats.org/presentationml/2006/main">
-  <p:cm authorId="2" dt="2018-01-19T11:24:11.978" idx="11">
-    <p:pos x="1139" y="4579"/>
-    <p:text>continue table from previous slide</p:text>
   </p:cm>
 </p:cmLst>
 </file>
@@ -235,8 +274,8 @@
 
 <file path=ppt/comments/comment8.xml><?xml version="1.0" encoding="utf-8"?>
 <p:cmLst xmlns:a="http://schemas.openxmlformats.org/drawingml/2006/main" xmlns:r="http://schemas.openxmlformats.org/officeDocument/2006/relationships" xmlns:p="http://schemas.openxmlformats.org/presentationml/2006/main">
-  <p:cm authorId="2" dt="2018-01-19T11:24:16.211" idx="12">
-    <p:pos x="652" y="4317"/>
+  <p:cm authorId="2" dt="2018-01-19T11:24:11.978" idx="11">
+    <p:pos x="1139" y="4579"/>
     <p:text>continue table from previous slide</p:text>
   </p:cm>
 </p:cmLst>
@@ -244,8 +283,8 @@
 
 <file path=ppt/comments/comment9.xml><?xml version="1.0" encoding="utf-8"?>
 <p:cmLst xmlns:a="http://schemas.openxmlformats.org/drawingml/2006/main" xmlns:r="http://schemas.openxmlformats.org/officeDocument/2006/relationships" xmlns:p="http://schemas.openxmlformats.org/presentationml/2006/main">
-  <p:cm authorId="2" dt="2018-01-19T11:24:24.068" idx="13">
-    <p:pos x="7617" y="26"/>
+  <p:cm authorId="2" dt="2018-01-19T11:24:16.211" idx="12">
+    <p:pos x="652" y="4317"/>
     <p:text>continue table from previous slide</p:text>
   </p:cm>
 </p:cmLst>
@@ -398,7 +437,7 @@
           <a:p>
             <a:fld id="{F0953935-3A72-4AE4-BBF3-F653F2BDF975}" type="datetimeFigureOut">
               <a:rPr lang="en-US" smtClean="0"/>
-              <a:t>1/25/2018</a:t>
+              <a:t>2/7/2018</a:t>
             </a:fld>
             <a:endParaRPr lang="en-US"/>
           </a:p>
@@ -596,7 +635,7 @@
           <a:p>
             <a:fld id="{F0953935-3A72-4AE4-BBF3-F653F2BDF975}" type="datetimeFigureOut">
               <a:rPr lang="en-US" smtClean="0"/>
-              <a:t>1/25/2018</a:t>
+              <a:t>2/7/2018</a:t>
             </a:fld>
             <a:endParaRPr lang="en-US"/>
           </a:p>
@@ -804,7 +843,7 @@
           <a:p>
             <a:fld id="{F0953935-3A72-4AE4-BBF3-F653F2BDF975}" type="datetimeFigureOut">
               <a:rPr lang="en-US" smtClean="0"/>
-              <a:t>1/25/2018</a:t>
+              <a:t>2/7/2018</a:t>
             </a:fld>
             <a:endParaRPr lang="en-US"/>
           </a:p>
@@ -1002,7 +1041,7 @@
           <a:p>
             <a:fld id="{F0953935-3A72-4AE4-BBF3-F653F2BDF975}" type="datetimeFigureOut">
               <a:rPr lang="en-US" smtClean="0"/>
-              <a:t>1/25/2018</a:t>
+              <a:t>2/7/2018</a:t>
             </a:fld>
             <a:endParaRPr lang="en-US"/>
           </a:p>
@@ -1277,7 +1316,7 @@
           <a:p>
             <a:fld id="{F0953935-3A72-4AE4-BBF3-F653F2BDF975}" type="datetimeFigureOut">
               <a:rPr lang="en-US" smtClean="0"/>
-              <a:t>1/25/2018</a:t>
+              <a:t>2/7/2018</a:t>
             </a:fld>
             <a:endParaRPr lang="en-US"/>
           </a:p>
@@ -1542,7 +1581,7 @@
           <a:p>
             <a:fld id="{F0953935-3A72-4AE4-BBF3-F653F2BDF975}" type="datetimeFigureOut">
               <a:rPr lang="en-US" smtClean="0"/>
-              <a:t>1/25/2018</a:t>
+              <a:t>2/7/2018</a:t>
             </a:fld>
             <a:endParaRPr lang="en-US"/>
           </a:p>
@@ -1954,7 +1993,7 @@
           <a:p>
             <a:fld id="{F0953935-3A72-4AE4-BBF3-F653F2BDF975}" type="datetimeFigureOut">
               <a:rPr lang="en-US" smtClean="0"/>
-              <a:t>1/25/2018</a:t>
+              <a:t>2/7/2018</a:t>
             </a:fld>
             <a:endParaRPr lang="en-US"/>
           </a:p>
@@ -2095,7 +2134,7 @@
           <a:p>
             <a:fld id="{F0953935-3A72-4AE4-BBF3-F653F2BDF975}" type="datetimeFigureOut">
               <a:rPr lang="en-US" smtClean="0"/>
-              <a:t>1/25/2018</a:t>
+              <a:t>2/7/2018</a:t>
             </a:fld>
             <a:endParaRPr lang="en-US"/>
           </a:p>
@@ -2208,7 +2247,7 @@
           <a:p>
             <a:fld id="{F0953935-3A72-4AE4-BBF3-F653F2BDF975}" type="datetimeFigureOut">
               <a:rPr lang="en-US" smtClean="0"/>
-              <a:t>1/25/2018</a:t>
+              <a:t>2/7/2018</a:t>
             </a:fld>
             <a:endParaRPr lang="en-US"/>
           </a:p>
@@ -2519,7 +2558,7 @@
           <a:p>
             <a:fld id="{F0953935-3A72-4AE4-BBF3-F653F2BDF975}" type="datetimeFigureOut">
               <a:rPr lang="en-US" smtClean="0"/>
-              <a:t>1/25/2018</a:t>
+              <a:t>2/7/2018</a:t>
             </a:fld>
             <a:endParaRPr lang="en-US"/>
           </a:p>
@@ -2807,7 +2846,7 @@
           <a:p>
             <a:fld id="{F0953935-3A72-4AE4-BBF3-F653F2BDF975}" type="datetimeFigureOut">
               <a:rPr lang="en-US" smtClean="0"/>
-              <a:t>1/25/2018</a:t>
+              <a:t>2/7/2018</a:t>
             </a:fld>
             <a:endParaRPr lang="en-US"/>
           </a:p>
@@ -3048,7 +3087,7 @@
           <a:p>
             <a:fld id="{F0953935-3A72-4AE4-BBF3-F653F2BDF975}" type="datetimeFigureOut">
               <a:rPr lang="en-US" smtClean="0"/>
-              <a:t>1/25/2018</a:t>
+              <a:t>2/7/2018</a:t>
             </a:fld>
             <a:endParaRPr lang="en-US"/>
           </a:p>
@@ -3553,6 +3592,231 @@
       </p:grpSpPr>
       <p:sp>
         <p:nvSpPr>
+          <p:cNvPr id="2" name="Title 1">
+            <a:extLst>
+              <a:ext uri="{FF2B5EF4-FFF2-40B4-BE49-F238E27FC236}">
+                <a16:creationId xmlns:a16="http://schemas.microsoft.com/office/drawing/2014/main" id="{5FCDA60D-EB0B-429A-88FA-68663306C63D}"/>
+              </a:ext>
+            </a:extLst>
+          </p:cNvPr>
+          <p:cNvSpPr>
+            <a:spLocks noGrp="1"/>
+          </p:cNvSpPr>
+          <p:nvPr>
+            <p:ph type="title"/>
+          </p:nvPr>
+        </p:nvSpPr>
+        <p:spPr/>
+        <p:txBody>
+          <a:bodyPr/>
+          <a:lstStyle/>
+          <a:p>
+            <a:r>
+              <a:rPr lang="en-US" dirty="0"/>
+              <a:t>GWA analysis graphs</a:t>
+            </a:r>
+          </a:p>
+        </p:txBody>
+      </p:sp>
+      <p:sp>
+        <p:nvSpPr>
+          <p:cNvPr id="3" name="Content Placeholder 2">
+            <a:extLst>
+              <a:ext uri="{FF2B5EF4-FFF2-40B4-BE49-F238E27FC236}">
+                <a16:creationId xmlns:a16="http://schemas.microsoft.com/office/drawing/2014/main" id="{D22D06AB-9AD5-4840-9F1F-DFF5366B615F}"/>
+              </a:ext>
+            </a:extLst>
+          </p:cNvPr>
+          <p:cNvSpPr>
+            <a:spLocks noGrp="1"/>
+          </p:cNvSpPr>
+          <p:nvPr>
+            <p:ph idx="1"/>
+          </p:nvPr>
+        </p:nvSpPr>
+        <p:spPr/>
+        <p:txBody>
+          <a:bodyPr/>
+          <a:lstStyle/>
+          <a:p>
+            <a:endParaRPr lang="en-US"/>
+          </a:p>
+        </p:txBody>
+      </p:sp>
+    </p:spTree>
+    <p:extLst>
+      <p:ext uri="{BB962C8B-B14F-4D97-AF65-F5344CB8AC3E}">
+        <p14:creationId xmlns:p14="http://schemas.microsoft.com/office/powerpoint/2010/main" val="65335568"/>
+      </p:ext>
+    </p:extLst>
+  </p:cSld>
+  <p:clrMapOvr>
+    <a:masterClrMapping/>
+  </p:clrMapOvr>
+</p:sld>
+</file>
+
+<file path=ppt/slides/slide11.xml><?xml version="1.0" encoding="utf-8"?>
+<p:sld xmlns:a="http://schemas.openxmlformats.org/drawingml/2006/main" xmlns:r="http://schemas.openxmlformats.org/officeDocument/2006/relationships" xmlns:p="http://schemas.openxmlformats.org/presentationml/2006/main">
+  <p:cSld>
+    <p:spTree>
+      <p:nvGrpSpPr>
+        <p:cNvPr id="1" name=""/>
+        <p:cNvGrpSpPr/>
+        <p:nvPr/>
+      </p:nvGrpSpPr>
+      <p:grpSpPr>
+        <a:xfrm>
+          <a:off x="0" y="0"/>
+          <a:ext cx="0" cy="0"/>
+          <a:chOff x="0" y="0"/>
+          <a:chExt cx="0" cy="0"/>
+        </a:xfrm>
+      </p:grpSpPr>
+      <p:sp>
+        <p:nvSpPr>
+          <p:cNvPr id="5" name="TextBox 4">
+            <a:extLst>
+              <a:ext uri="{FF2B5EF4-FFF2-40B4-BE49-F238E27FC236}">
+                <a16:creationId xmlns:a16="http://schemas.microsoft.com/office/drawing/2014/main" id="{8790B5DB-5369-4BEC-9097-5F6FDC915BE0}"/>
+              </a:ext>
+            </a:extLst>
+          </p:cNvPr>
+          <p:cNvSpPr txBox="1"/>
+          <p:nvPr/>
+        </p:nvSpPr>
+        <p:spPr>
+          <a:xfrm>
+            <a:off x="0" y="6976188"/>
+            <a:ext cx="9207500" cy="3970318"/>
+          </a:xfrm>
+          <a:prstGeom prst="rect">
+            <a:avLst/>
+          </a:prstGeom>
+          <a:noFill/>
+        </p:spPr>
+        <p:txBody>
+          <a:bodyPr wrap="square" rtlCol="0">
+            <a:spAutoFit/>
+          </a:bodyPr>
+          <a:lstStyle/>
+          <a:p>
+            <a:r>
+              <a:rPr lang="en-US" dirty="0"/>
+              <a:t>Figure # - </a:t>
+            </a:r>
+          </a:p>
+          <a:p>
+            <a:r>
+              <a:rPr lang="en-US" dirty="0"/>
+              <a:t>Average Hyphal Waviness plotted against Growth on Sugar/Pectin - </a:t>
+            </a:r>
+            <a:r>
+              <a:rPr lang="en-US" dirty="0" err="1"/>
+              <a:t>pearson</a:t>
+            </a:r>
+            <a:endParaRPr lang="en-US" dirty="0"/>
+          </a:p>
+          <a:p>
+            <a:endParaRPr lang="en-US" dirty="0"/>
+          </a:p>
+          <a:p>
+            <a:endParaRPr lang="en-US" dirty="0"/>
+          </a:p>
+          <a:p>
+            <a:endParaRPr lang="en-US" dirty="0"/>
+          </a:p>
+          <a:p>
+            <a:endParaRPr lang="en-US" dirty="0"/>
+          </a:p>
+          <a:p>
+            <a:endParaRPr lang="en-US" dirty="0"/>
+          </a:p>
+          <a:p>
+            <a:endParaRPr lang="en-US" dirty="0"/>
+          </a:p>
+          <a:p>
+            <a:endParaRPr lang="en-US" dirty="0"/>
+          </a:p>
+          <a:p>
+            <a:endParaRPr lang="en-US" dirty="0"/>
+          </a:p>
+          <a:p>
+            <a:endParaRPr lang="en-US" dirty="0"/>
+          </a:p>
+          <a:p>
+            <a:endParaRPr lang="en-US" dirty="0"/>
+          </a:p>
+          <a:p>
+            <a:endParaRPr lang="en-US" dirty="0"/>
+          </a:p>
+          <a:p>
+            <a:endParaRPr lang="en-US" dirty="0"/>
+          </a:p>
+        </p:txBody>
+      </p:sp>
+      <p:pic>
+        <p:nvPicPr>
+          <p:cNvPr id="7" name="Picture 6">
+            <a:extLst>
+              <a:ext uri="{FF2B5EF4-FFF2-40B4-BE49-F238E27FC236}">
+                <a16:creationId xmlns:a16="http://schemas.microsoft.com/office/drawing/2014/main" id="{A23B555E-8C22-4CCF-9532-1E1F9DC9F7D6}"/>
+              </a:ext>
+            </a:extLst>
+          </p:cNvPr>
+          <p:cNvPicPr>
+            <a:picLocks noChangeAspect="1"/>
+          </p:cNvPicPr>
+          <p:nvPr/>
+        </p:nvPicPr>
+        <p:blipFill>
+          <a:blip r:embed="rId2"/>
+          <a:stretch>
+            <a:fillRect/>
+          </a:stretch>
+        </p:blipFill>
+        <p:spPr>
+          <a:xfrm>
+            <a:off x="0" y="0"/>
+            <a:ext cx="12192000" cy="6858000"/>
+          </a:xfrm>
+          <a:prstGeom prst="rect">
+            <a:avLst/>
+          </a:prstGeom>
+        </p:spPr>
+      </p:pic>
+    </p:spTree>
+    <p:extLst>
+      <p:ext uri="{BB962C8B-B14F-4D97-AF65-F5344CB8AC3E}">
+        <p14:creationId xmlns:p14="http://schemas.microsoft.com/office/powerpoint/2010/main" val="2927980237"/>
+      </p:ext>
+    </p:extLst>
+  </p:cSld>
+  <p:clrMapOvr>
+    <a:masterClrMapping/>
+  </p:clrMapOvr>
+</p:sld>
+</file>
+
+<file path=ppt/slides/slide12.xml><?xml version="1.0" encoding="utf-8"?>
+<p:sld xmlns:a="http://schemas.openxmlformats.org/drawingml/2006/main" xmlns:r="http://schemas.openxmlformats.org/officeDocument/2006/relationships" xmlns:p="http://schemas.openxmlformats.org/presentationml/2006/main">
+  <p:cSld>
+    <p:spTree>
+      <p:nvGrpSpPr>
+        <p:cNvPr id="1" name=""/>
+        <p:cNvGrpSpPr/>
+        <p:nvPr/>
+      </p:nvGrpSpPr>
+      <p:grpSpPr>
+        <a:xfrm>
+          <a:off x="0" y="0"/>
+          <a:ext cx="0" cy="0"/>
+          <a:chOff x="0" y="0"/>
+          <a:chExt cx="0" cy="0"/>
+        </a:xfrm>
+      </p:grpSpPr>
+      <p:sp>
+        <p:nvSpPr>
           <p:cNvPr id="5" name="TextBox 4">
             <a:extLst>
               <a:ext uri="{FF2B5EF4-FFF2-40B4-BE49-F238E27FC236}">
@@ -3683,7 +3947,7 @@
 </p:sld>
 </file>
 
-<file path=ppt/slides/slide11.xml><?xml version="1.0" encoding="utf-8"?>
+<file path=ppt/slides/slide13.xml><?xml version="1.0" encoding="utf-8"?>
 <p:sld xmlns:a="http://schemas.openxmlformats.org/drawingml/2006/main" xmlns:r="http://schemas.openxmlformats.org/officeDocument/2006/relationships" xmlns:p="http://schemas.openxmlformats.org/presentationml/2006/main">
   <p:cSld>
     <p:spTree>
@@ -3828,7 +4092,7 @@
 </p:sld>
 </file>
 
-<file path=ppt/slides/slide12.xml><?xml version="1.0" encoding="utf-8"?>
+<file path=ppt/slides/slide14.xml><?xml version="1.0" encoding="utf-8"?>
 <p:sld xmlns:a="http://schemas.openxmlformats.org/drawingml/2006/main" xmlns:r="http://schemas.openxmlformats.org/officeDocument/2006/relationships" xmlns:p="http://schemas.openxmlformats.org/presentationml/2006/main">
   <p:cSld>
     <p:spTree>
@@ -4019,7 +4283,7 @@
 </p:sld>
 </file>
 
-<file path=ppt/slides/slide13.xml><?xml version="1.0" encoding="utf-8"?>
+<file path=ppt/slides/slide15.xml><?xml version="1.0" encoding="utf-8"?>
 <p:sld xmlns:a="http://schemas.openxmlformats.org/drawingml/2006/main" xmlns:r="http://schemas.openxmlformats.org/officeDocument/2006/relationships" xmlns:p="http://schemas.openxmlformats.org/presentationml/2006/main">
   <p:cSld>
     <p:spTree>
@@ -4289,7 +4553,7 @@
 </p:sld>
 </file>
 
-<file path=ppt/slides/slide14.xml><?xml version="1.0" encoding="utf-8"?>
+<file path=ppt/slides/slide16.xml><?xml version="1.0" encoding="utf-8"?>
 <p:sld xmlns:a="http://schemas.openxmlformats.org/drawingml/2006/main" xmlns:r="http://schemas.openxmlformats.org/officeDocument/2006/relationships" xmlns:p="http://schemas.openxmlformats.org/presentationml/2006/main">
   <p:cSld>
     <p:spTree>
@@ -4403,6 +4667,459 @@
           <a:chExt cx="0" cy="0"/>
         </a:xfrm>
       </p:grpSpPr>
+      <p:pic>
+        <p:nvPicPr>
+          <p:cNvPr id="7" name="Picture 6">
+            <a:extLst>
+              <a:ext uri="{FF2B5EF4-FFF2-40B4-BE49-F238E27FC236}">
+                <a16:creationId xmlns:a16="http://schemas.microsoft.com/office/drawing/2014/main" id="{F065BFCA-75A7-4F88-A0EA-0E122AD2C30F}"/>
+              </a:ext>
+            </a:extLst>
+          </p:cNvPr>
+          <p:cNvPicPr>
+            <a:picLocks noChangeAspect="1"/>
+          </p:cNvPicPr>
+          <p:nvPr/>
+        </p:nvPicPr>
+        <p:blipFill>
+          <a:blip r:embed="rId2"/>
+          <a:stretch>
+            <a:fillRect/>
+          </a:stretch>
+        </p:blipFill>
+        <p:spPr>
+          <a:xfrm>
+            <a:off x="0" y="2162175"/>
+            <a:ext cx="8321044" cy="4695825"/>
+          </a:xfrm>
+          <a:prstGeom prst="rect">
+            <a:avLst/>
+          </a:prstGeom>
+        </p:spPr>
+      </p:pic>
+      <p:sp>
+        <p:nvSpPr>
+          <p:cNvPr id="8" name="TextBox 7">
+            <a:extLst>
+              <a:ext uri="{FF2B5EF4-FFF2-40B4-BE49-F238E27FC236}">
+                <a16:creationId xmlns:a16="http://schemas.microsoft.com/office/drawing/2014/main" id="{BC2AD751-D103-4422-A211-13AADE0EA4E5}"/>
+              </a:ext>
+            </a:extLst>
+          </p:cNvPr>
+          <p:cNvSpPr txBox="1"/>
+          <p:nvPr/>
+        </p:nvSpPr>
+        <p:spPr>
+          <a:xfrm>
+            <a:off x="8601794" y="0"/>
+            <a:ext cx="3432889" cy="5632311"/>
+          </a:xfrm>
+          <a:prstGeom prst="rect">
+            <a:avLst/>
+          </a:prstGeom>
+          <a:noFill/>
+        </p:spPr>
+        <p:txBody>
+          <a:bodyPr wrap="square" rtlCol="0">
+            <a:spAutoFit/>
+          </a:bodyPr>
+          <a:lstStyle/>
+          <a:p>
+            <a:r>
+              <a:rPr lang="en-US" b="1" dirty="0"/>
+              <a:t>Table #. Top 30 SNP Effect Estimates for 97 </a:t>
+            </a:r>
+            <a:r>
+              <a:rPr lang="en-US" b="1" i="1" dirty="0"/>
+              <a:t>B. cinerea</a:t>
+            </a:r>
+            <a:r>
+              <a:rPr lang="en-US" b="1" dirty="0"/>
+              <a:t> Isolates affecting Hyphal Waviness.</a:t>
+            </a:r>
+          </a:p>
+          <a:p>
+            <a:r>
+              <a:rPr lang="en-US" dirty="0"/>
+              <a:t>The top 30 SNP effect estimates of hyphal waviness on 91 </a:t>
+            </a:r>
+            <a:r>
+              <a:rPr lang="en-US" i="1" dirty="0"/>
+              <a:t>Botrytis cinerea</a:t>
+            </a:r>
+            <a:r>
+              <a:rPr lang="en-US" dirty="0"/>
+              <a:t> isolates. The isolate column is organized by descending hyphal waviness. Zero is an indication that the SNP was the same as the reference while 1 shows a difference in the SNP from the reference. The blue indicates a low effect relationship between the SNP and the isolate’s reference SNP while red indicates a high effect. The color corresponds to the positive or negative effect per isolate to the hyphal waviness. </a:t>
+            </a:r>
+          </a:p>
+          <a:p>
+            <a:endParaRPr lang="en-US" dirty="0"/>
+          </a:p>
+        </p:txBody>
+      </p:sp>
+      <p:sp>
+        <p:nvSpPr>
+          <p:cNvPr id="9" name="TextBox 8">
+            <a:extLst>
+              <a:ext uri="{FF2B5EF4-FFF2-40B4-BE49-F238E27FC236}">
+                <a16:creationId xmlns:a16="http://schemas.microsoft.com/office/drawing/2014/main" id="{8DA4DAA6-B560-49AA-808F-881B3B8012CB}"/>
+              </a:ext>
+            </a:extLst>
+          </p:cNvPr>
+          <p:cNvSpPr txBox="1"/>
+          <p:nvPr/>
+        </p:nvSpPr>
+        <p:spPr>
+          <a:xfrm>
+            <a:off x="422031" y="307731"/>
+            <a:ext cx="6631912" cy="1384995"/>
+          </a:xfrm>
+          <a:prstGeom prst="rect">
+            <a:avLst/>
+          </a:prstGeom>
+          <a:noFill/>
+        </p:spPr>
+        <p:txBody>
+          <a:bodyPr wrap="square" rtlCol="0">
+            <a:spAutoFit/>
+          </a:bodyPr>
+          <a:lstStyle/>
+          <a:p>
+            <a:r>
+              <a:rPr lang="en-US" sz="1400" dirty="0"/>
+              <a:t>Notes: </a:t>
+            </a:r>
+          </a:p>
+          <a:p>
+            <a:pPr marL="285750" indent="-285750">
+              <a:buFont typeface="Arial" panose="020B0604020202020204" pitchFamily="34" charset="0"/>
+              <a:buChar char="•"/>
+            </a:pPr>
+            <a:r>
+              <a:rPr lang="en-US" sz="1400" dirty="0"/>
+              <a:t>This is just an excerpt of the graph (can be found in </a:t>
+            </a:r>
+            <a:r>
+              <a:rPr lang="en-US" sz="1400" i="1" dirty="0"/>
+              <a:t>paper</a:t>
+            </a:r>
+            <a:r>
+              <a:rPr lang="en-US" sz="1400" dirty="0"/>
+              <a:t> folder)</a:t>
+            </a:r>
+          </a:p>
+          <a:p>
+            <a:pPr marL="742950" lvl="1" indent="-285750">
+              <a:buFont typeface="Arial" panose="020B0604020202020204" pitchFamily="34" charset="0"/>
+              <a:buChar char="•"/>
+            </a:pPr>
+            <a:r>
+              <a:rPr lang="en-US" sz="1400" dirty="0"/>
+              <a:t>Will use entire table for input</a:t>
+            </a:r>
+          </a:p>
+          <a:p>
+            <a:pPr marL="285750" indent="-285750">
+              <a:buFont typeface="Arial" panose="020B0604020202020204" pitchFamily="34" charset="0"/>
+              <a:buChar char="•"/>
+            </a:pPr>
+            <a:r>
+              <a:rPr lang="en-US" sz="1400" dirty="0"/>
+              <a:t>Likely for supplemental information</a:t>
+            </a:r>
+          </a:p>
+          <a:p>
+            <a:pPr marL="285750" indent="-285750">
+              <a:buFont typeface="Arial" panose="020B0604020202020204" pitchFamily="34" charset="0"/>
+              <a:buChar char="•"/>
+            </a:pPr>
+            <a:r>
+              <a:rPr lang="en-US" sz="1400" dirty="0" err="1"/>
+              <a:t>GeneID</a:t>
+            </a:r>
+            <a:r>
+              <a:rPr lang="en-US" sz="1400" dirty="0"/>
+              <a:t> and description can be excluded</a:t>
+            </a:r>
+          </a:p>
+          <a:p>
+            <a:pPr marL="285750" indent="-285750">
+              <a:buFont typeface="Arial" panose="020B0604020202020204" pitchFamily="34" charset="0"/>
+              <a:buChar char="•"/>
+            </a:pPr>
+            <a:r>
+              <a:rPr lang="en-US" sz="1400" dirty="0"/>
+              <a:t>Isolates are ordered by descending hyphal waviness</a:t>
+            </a:r>
+          </a:p>
+        </p:txBody>
+      </p:sp>
+    </p:spTree>
+    <p:extLst>
+      <p:ext uri="{BB962C8B-B14F-4D97-AF65-F5344CB8AC3E}">
+        <p14:creationId xmlns:p14="http://schemas.microsoft.com/office/powerpoint/2010/main" val="1868342518"/>
+      </p:ext>
+    </p:extLst>
+  </p:cSld>
+  <p:clrMapOvr>
+    <a:masterClrMapping/>
+  </p:clrMapOvr>
+</p:sld>
+</file>
+
+<file path=ppt/slides/slide3.xml><?xml version="1.0" encoding="utf-8"?>
+<p:sld xmlns:a="http://schemas.openxmlformats.org/drawingml/2006/main" xmlns:r="http://schemas.openxmlformats.org/officeDocument/2006/relationships" xmlns:p="http://schemas.openxmlformats.org/presentationml/2006/main">
+  <p:cSld>
+    <p:spTree>
+      <p:nvGrpSpPr>
+        <p:cNvPr id="1" name=""/>
+        <p:cNvGrpSpPr/>
+        <p:nvPr/>
+      </p:nvGrpSpPr>
+      <p:grpSpPr>
+        <a:xfrm>
+          <a:off x="0" y="0"/>
+          <a:ext cx="0" cy="0"/>
+          <a:chOff x="0" y="0"/>
+          <a:chExt cx="0" cy="0"/>
+        </a:xfrm>
+      </p:grpSpPr>
+      <p:pic>
+        <p:nvPicPr>
+          <p:cNvPr id="4" name="Picture 3">
+            <a:extLst>
+              <a:ext uri="{FF2B5EF4-FFF2-40B4-BE49-F238E27FC236}">
+                <a16:creationId xmlns:a16="http://schemas.microsoft.com/office/drawing/2014/main" id="{3E4DF990-6228-4564-AE02-205E19229367}"/>
+              </a:ext>
+            </a:extLst>
+          </p:cNvPr>
+          <p:cNvPicPr>
+            <a:picLocks noChangeAspect="1"/>
+          </p:cNvPicPr>
+          <p:nvPr/>
+        </p:nvPicPr>
+        <p:blipFill>
+          <a:blip r:embed="rId2"/>
+          <a:stretch>
+            <a:fillRect/>
+          </a:stretch>
+        </p:blipFill>
+        <p:spPr>
+          <a:xfrm>
+            <a:off x="0" y="0"/>
+            <a:ext cx="4043316" cy="6858000"/>
+          </a:xfrm>
+          <a:prstGeom prst="rect">
+            <a:avLst/>
+          </a:prstGeom>
+        </p:spPr>
+      </p:pic>
+      <p:sp>
+        <p:nvSpPr>
+          <p:cNvPr id="5" name="TextBox 4">
+            <a:extLst>
+              <a:ext uri="{FF2B5EF4-FFF2-40B4-BE49-F238E27FC236}">
+                <a16:creationId xmlns:a16="http://schemas.microsoft.com/office/drawing/2014/main" id="{AA278E04-A994-41B2-B17E-7560BF258437}"/>
+              </a:ext>
+            </a:extLst>
+          </p:cNvPr>
+          <p:cNvSpPr txBox="1"/>
+          <p:nvPr/>
+        </p:nvSpPr>
+        <p:spPr>
+          <a:xfrm>
+            <a:off x="3978642" y="0"/>
+            <a:ext cx="6631912" cy="1384995"/>
+          </a:xfrm>
+          <a:prstGeom prst="rect">
+            <a:avLst/>
+          </a:prstGeom>
+          <a:noFill/>
+        </p:spPr>
+        <p:txBody>
+          <a:bodyPr wrap="square" rtlCol="0">
+            <a:spAutoFit/>
+          </a:bodyPr>
+          <a:lstStyle/>
+          <a:p>
+            <a:r>
+              <a:rPr lang="en-US" sz="1400" dirty="0"/>
+              <a:t>Notes: </a:t>
+            </a:r>
+          </a:p>
+          <a:p>
+            <a:pPr marL="285750" indent="-285750">
+              <a:buFont typeface="Arial" panose="020B0604020202020204" pitchFamily="34" charset="0"/>
+              <a:buChar char="•"/>
+            </a:pPr>
+            <a:r>
+              <a:rPr lang="en-US" sz="1400" dirty="0"/>
+              <a:t>This is just an excerpt of the graph (can be found in </a:t>
+            </a:r>
+            <a:r>
+              <a:rPr lang="en-US" sz="1400" i="1" dirty="0"/>
+              <a:t>paper</a:t>
+            </a:r>
+            <a:r>
+              <a:rPr lang="en-US" sz="1400" dirty="0"/>
+              <a:t> folder)</a:t>
+            </a:r>
+          </a:p>
+          <a:p>
+            <a:pPr marL="285750" indent="-285750">
+              <a:buFont typeface="Arial" panose="020B0604020202020204" pitchFamily="34" charset="0"/>
+              <a:buChar char="•"/>
+            </a:pPr>
+            <a:r>
+              <a:rPr lang="en-US" sz="1400" dirty="0"/>
+              <a:t>Likely for supplemental information</a:t>
+            </a:r>
+          </a:p>
+          <a:p>
+            <a:pPr marL="285750" indent="-285750">
+              <a:buFont typeface="Arial" panose="020B0604020202020204" pitchFamily="34" charset="0"/>
+              <a:buChar char="•"/>
+            </a:pPr>
+            <a:r>
+              <a:rPr lang="en-US" sz="1400" dirty="0"/>
+              <a:t>Besides the column being properly renamed, is there any recommendation for how to make the information more interesting? </a:t>
+            </a:r>
+          </a:p>
+          <a:p>
+            <a:pPr marL="742950" lvl="1" indent="-285750">
+              <a:buFont typeface="Arial" panose="020B0604020202020204" pitchFamily="34" charset="0"/>
+              <a:buChar char="•"/>
+            </a:pPr>
+            <a:r>
+              <a:rPr lang="en-US" sz="1400" dirty="0"/>
+              <a:t>Should the average hyphal waviness be included? Or only include the </a:t>
+            </a:r>
+            <a:r>
+              <a:rPr lang="en-US" sz="1400" dirty="0" err="1"/>
+              <a:t>LsMeans</a:t>
+            </a:r>
+            <a:endParaRPr lang="en-US" sz="1400" dirty="0"/>
+          </a:p>
+        </p:txBody>
+      </p:sp>
+      <p:sp>
+        <p:nvSpPr>
+          <p:cNvPr id="6" name="TextBox 5">
+            <a:extLst>
+              <a:ext uri="{FF2B5EF4-FFF2-40B4-BE49-F238E27FC236}">
+                <a16:creationId xmlns:a16="http://schemas.microsoft.com/office/drawing/2014/main" id="{C9B0F4BA-CDF4-4BC6-9648-264B639DAB63}"/>
+              </a:ext>
+            </a:extLst>
+          </p:cNvPr>
+          <p:cNvSpPr txBox="1"/>
+          <p:nvPr/>
+        </p:nvSpPr>
+        <p:spPr>
+          <a:xfrm>
+            <a:off x="4325257" y="2670629"/>
+            <a:ext cx="5938683" cy="3693319"/>
+          </a:xfrm>
+          <a:prstGeom prst="rect">
+            <a:avLst/>
+          </a:prstGeom>
+          <a:noFill/>
+        </p:spPr>
+        <p:txBody>
+          <a:bodyPr wrap="square" rtlCol="0">
+            <a:spAutoFit/>
+          </a:bodyPr>
+          <a:lstStyle/>
+          <a:p>
+            <a:r>
+              <a:rPr lang="en-US" b="1" dirty="0"/>
+              <a:t>Table #. Pearson and Spearman Correlations Values for Multiple B. cinerea Interactions with Hyphal Waviness. </a:t>
+            </a:r>
+          </a:p>
+          <a:p>
+            <a:r>
+              <a:rPr lang="en-US" dirty="0"/>
+              <a:t>Listed are correlation values for multiple </a:t>
+            </a:r>
+            <a:r>
+              <a:rPr lang="en-US" i="1" dirty="0"/>
+              <a:t>Botrytis cinerea </a:t>
+            </a:r>
+            <a:r>
+              <a:rPr lang="en-US" dirty="0"/>
+              <a:t>interactions. Columns listed are of</a:t>
+            </a:r>
+            <a:r>
+              <a:rPr lang="en-US" i="1" dirty="0"/>
+              <a:t> B. cinerea </a:t>
+            </a:r>
+            <a:r>
+              <a:rPr lang="en-US" dirty="0"/>
+              <a:t>interactions with multiple types of media, multiple eudicots and eccentricity of lesions on </a:t>
+            </a:r>
+            <a:r>
+              <a:rPr lang="en-US" i="1" dirty="0"/>
+              <a:t>Arabidopsis thaliana</a:t>
+            </a:r>
+            <a:r>
+              <a:rPr lang="en-US" dirty="0"/>
+              <a:t>. Types of media included Sugar and Pectin growth of B. cinerea with recorded growth at 48 and 72 hours. Measurements for the eudicots were done using B. </a:t>
+            </a:r>
+            <a:r>
+              <a:rPr lang="en-US" dirty="0" err="1"/>
+              <a:t>cinerea’s</a:t>
+            </a:r>
+            <a:r>
+              <a:rPr lang="en-US" dirty="0"/>
+              <a:t> lesion size on each species. Eccentricity was measured computationally (</a:t>
+            </a:r>
+            <a:r>
+              <a:rPr lang="en-US" dirty="0">
+                <a:solidFill>
+                  <a:srgbClr val="FF0000"/>
+                </a:solidFill>
+              </a:rPr>
+              <a:t>not sure how this was measured</a:t>
+            </a:r>
+            <a:r>
+              <a:rPr lang="en-US" dirty="0"/>
+              <a:t>) on growth of B. cinerea infecting multiple strains of Arabidopsis. </a:t>
+            </a:r>
+          </a:p>
+          <a:p>
+            <a:endParaRPr lang="en-US" dirty="0"/>
+          </a:p>
+        </p:txBody>
+      </p:sp>
+    </p:spTree>
+    <p:extLst>
+      <p:ext uri="{BB962C8B-B14F-4D97-AF65-F5344CB8AC3E}">
+        <p14:creationId xmlns:p14="http://schemas.microsoft.com/office/powerpoint/2010/main" val="2678073914"/>
+      </p:ext>
+    </p:extLst>
+  </p:cSld>
+  <p:clrMapOvr>
+    <a:masterClrMapping/>
+  </p:clrMapOvr>
+</p:sld>
+</file>
+
+<file path=ppt/slides/slide4.xml><?xml version="1.0" encoding="utf-8"?>
+<p:sld xmlns:a="http://schemas.openxmlformats.org/drawingml/2006/main" xmlns:r="http://schemas.openxmlformats.org/officeDocument/2006/relationships" xmlns:p="http://schemas.openxmlformats.org/presentationml/2006/main">
+  <p:cSld>
+    <p:spTree>
+      <p:nvGrpSpPr>
+        <p:cNvPr id="1" name=""/>
+        <p:cNvGrpSpPr/>
+        <p:nvPr/>
+      </p:nvGrpSpPr>
+      <p:grpSpPr>
+        <a:xfrm>
+          <a:off x="0" y="0"/>
+          <a:ext cx="0" cy="0"/>
+          <a:chOff x="0" y="0"/>
+          <a:chExt cx="0" cy="0"/>
+        </a:xfrm>
+      </p:grpSpPr>
       <p:sp>
         <p:nvSpPr>
           <p:cNvPr id="2" name="Title 1">
@@ -4481,7 +5198,7 @@
 </p:sld>
 </file>
 
-<file path=ppt/slides/slide3.xml><?xml version="1.0" encoding="utf-8"?>
+<file path=ppt/slides/slide5.xml><?xml version="1.0" encoding="utf-8"?>
 <p:sld xmlns:a="http://schemas.openxmlformats.org/drawingml/2006/main" xmlns:r="http://schemas.openxmlformats.org/officeDocument/2006/relationships" xmlns:p="http://schemas.openxmlformats.org/presentationml/2006/main">
   <p:cSld>
     <p:spTree>
@@ -5855,7 +6572,7 @@
 </p:sld>
 </file>
 
-<file path=ppt/slides/slide4.xml><?xml version="1.0" encoding="utf-8"?>
+<file path=ppt/slides/slide6.xml><?xml version="1.0" encoding="utf-8"?>
 <p:sld xmlns:a="http://schemas.openxmlformats.org/drawingml/2006/main" xmlns:r="http://schemas.openxmlformats.org/officeDocument/2006/relationships" xmlns:p="http://schemas.openxmlformats.org/presentationml/2006/main">
   <p:cSld>
     <p:spTree>
@@ -5976,7 +6693,7 @@
 </p:sld>
 </file>
 
-<file path=ppt/slides/slide5.xml><?xml version="1.0" encoding="utf-8"?>
+<file path=ppt/slides/slide7.xml><?xml version="1.0" encoding="utf-8"?>
 <p:sld xmlns:a="http://schemas.openxmlformats.org/drawingml/2006/main" xmlns:r="http://schemas.openxmlformats.org/officeDocument/2006/relationships" xmlns:p="http://schemas.openxmlformats.org/presentationml/2006/main">
   <p:cSld>
     <p:spTree>
@@ -6126,7 +6843,7 @@
 </p:sld>
 </file>
 
-<file path=ppt/slides/slide6.xml><?xml version="1.0" encoding="utf-8"?>
+<file path=ppt/slides/slide8.xml><?xml version="1.0" encoding="utf-8"?>
 <p:sld xmlns:a="http://schemas.openxmlformats.org/drawingml/2006/main" xmlns:r="http://schemas.openxmlformats.org/officeDocument/2006/relationships" xmlns:p="http://schemas.openxmlformats.org/presentationml/2006/main">
   <p:cSld>
     <p:spTree>
@@ -6265,7 +6982,7 @@
 </p:sld>
 </file>
 
-<file path=ppt/slides/slide7.xml><?xml version="1.0" encoding="utf-8"?>
+<file path=ppt/slides/slide9.xml><?xml version="1.0" encoding="utf-8"?>
 <p:sld xmlns:a="http://schemas.openxmlformats.org/drawingml/2006/main" xmlns:r="http://schemas.openxmlformats.org/officeDocument/2006/relationships" xmlns:p="http://schemas.openxmlformats.org/presentationml/2006/main">
   <p:cSld>
     <p:spTree>
@@ -6352,231 +7069,6 @@
     <p:extLst>
       <p:ext uri="{BB962C8B-B14F-4D97-AF65-F5344CB8AC3E}">
         <p14:creationId xmlns:p14="http://schemas.microsoft.com/office/powerpoint/2010/main" val="1269590424"/>
-      </p:ext>
-    </p:extLst>
-  </p:cSld>
-  <p:clrMapOvr>
-    <a:masterClrMapping/>
-  </p:clrMapOvr>
-</p:sld>
-</file>
-
-<file path=ppt/slides/slide8.xml><?xml version="1.0" encoding="utf-8"?>
-<p:sld xmlns:a="http://schemas.openxmlformats.org/drawingml/2006/main" xmlns:r="http://schemas.openxmlformats.org/officeDocument/2006/relationships" xmlns:p="http://schemas.openxmlformats.org/presentationml/2006/main">
-  <p:cSld>
-    <p:spTree>
-      <p:nvGrpSpPr>
-        <p:cNvPr id="1" name=""/>
-        <p:cNvGrpSpPr/>
-        <p:nvPr/>
-      </p:nvGrpSpPr>
-      <p:grpSpPr>
-        <a:xfrm>
-          <a:off x="0" y="0"/>
-          <a:ext cx="0" cy="0"/>
-          <a:chOff x="0" y="0"/>
-          <a:chExt cx="0" cy="0"/>
-        </a:xfrm>
-      </p:grpSpPr>
-      <p:sp>
-        <p:nvSpPr>
-          <p:cNvPr id="2" name="Title 1">
-            <a:extLst>
-              <a:ext uri="{FF2B5EF4-FFF2-40B4-BE49-F238E27FC236}">
-                <a16:creationId xmlns:a16="http://schemas.microsoft.com/office/drawing/2014/main" id="{5FCDA60D-EB0B-429A-88FA-68663306C63D}"/>
-              </a:ext>
-            </a:extLst>
-          </p:cNvPr>
-          <p:cNvSpPr>
-            <a:spLocks noGrp="1"/>
-          </p:cNvSpPr>
-          <p:nvPr>
-            <p:ph type="title"/>
-          </p:nvPr>
-        </p:nvSpPr>
-        <p:spPr/>
-        <p:txBody>
-          <a:bodyPr/>
-          <a:lstStyle/>
-          <a:p>
-            <a:r>
-              <a:rPr lang="en-US" dirty="0"/>
-              <a:t>GWA analysis graphs</a:t>
-            </a:r>
-          </a:p>
-        </p:txBody>
-      </p:sp>
-      <p:sp>
-        <p:nvSpPr>
-          <p:cNvPr id="3" name="Content Placeholder 2">
-            <a:extLst>
-              <a:ext uri="{FF2B5EF4-FFF2-40B4-BE49-F238E27FC236}">
-                <a16:creationId xmlns:a16="http://schemas.microsoft.com/office/drawing/2014/main" id="{D22D06AB-9AD5-4840-9F1F-DFF5366B615F}"/>
-              </a:ext>
-            </a:extLst>
-          </p:cNvPr>
-          <p:cNvSpPr>
-            <a:spLocks noGrp="1"/>
-          </p:cNvSpPr>
-          <p:nvPr>
-            <p:ph idx="1"/>
-          </p:nvPr>
-        </p:nvSpPr>
-        <p:spPr/>
-        <p:txBody>
-          <a:bodyPr/>
-          <a:lstStyle/>
-          <a:p>
-            <a:endParaRPr lang="en-US"/>
-          </a:p>
-        </p:txBody>
-      </p:sp>
-    </p:spTree>
-    <p:extLst>
-      <p:ext uri="{BB962C8B-B14F-4D97-AF65-F5344CB8AC3E}">
-        <p14:creationId xmlns:p14="http://schemas.microsoft.com/office/powerpoint/2010/main" val="65335568"/>
-      </p:ext>
-    </p:extLst>
-  </p:cSld>
-  <p:clrMapOvr>
-    <a:masterClrMapping/>
-  </p:clrMapOvr>
-</p:sld>
-</file>
-
-<file path=ppt/slides/slide9.xml><?xml version="1.0" encoding="utf-8"?>
-<p:sld xmlns:a="http://schemas.openxmlformats.org/drawingml/2006/main" xmlns:r="http://schemas.openxmlformats.org/officeDocument/2006/relationships" xmlns:p="http://schemas.openxmlformats.org/presentationml/2006/main">
-  <p:cSld>
-    <p:spTree>
-      <p:nvGrpSpPr>
-        <p:cNvPr id="1" name=""/>
-        <p:cNvGrpSpPr/>
-        <p:nvPr/>
-      </p:nvGrpSpPr>
-      <p:grpSpPr>
-        <a:xfrm>
-          <a:off x="0" y="0"/>
-          <a:ext cx="0" cy="0"/>
-          <a:chOff x="0" y="0"/>
-          <a:chExt cx="0" cy="0"/>
-        </a:xfrm>
-      </p:grpSpPr>
-      <p:sp>
-        <p:nvSpPr>
-          <p:cNvPr id="5" name="TextBox 4">
-            <a:extLst>
-              <a:ext uri="{FF2B5EF4-FFF2-40B4-BE49-F238E27FC236}">
-                <a16:creationId xmlns:a16="http://schemas.microsoft.com/office/drawing/2014/main" id="{8790B5DB-5369-4BEC-9097-5F6FDC915BE0}"/>
-              </a:ext>
-            </a:extLst>
-          </p:cNvPr>
-          <p:cNvSpPr txBox="1"/>
-          <p:nvPr/>
-        </p:nvSpPr>
-        <p:spPr>
-          <a:xfrm>
-            <a:off x="0" y="6976188"/>
-            <a:ext cx="9207500" cy="3970318"/>
-          </a:xfrm>
-          <a:prstGeom prst="rect">
-            <a:avLst/>
-          </a:prstGeom>
-          <a:noFill/>
-        </p:spPr>
-        <p:txBody>
-          <a:bodyPr wrap="square" rtlCol="0">
-            <a:spAutoFit/>
-          </a:bodyPr>
-          <a:lstStyle/>
-          <a:p>
-            <a:r>
-              <a:rPr lang="en-US" dirty="0"/>
-              <a:t>Figure # - </a:t>
-            </a:r>
-          </a:p>
-          <a:p>
-            <a:r>
-              <a:rPr lang="en-US" dirty="0"/>
-              <a:t>Average Hyphal Waviness plotted against Growth on Sugar/Pectin - </a:t>
-            </a:r>
-            <a:r>
-              <a:rPr lang="en-US" dirty="0" err="1"/>
-              <a:t>pearson</a:t>
-            </a:r>
-            <a:endParaRPr lang="en-US" dirty="0"/>
-          </a:p>
-          <a:p>
-            <a:endParaRPr lang="en-US" dirty="0"/>
-          </a:p>
-          <a:p>
-            <a:endParaRPr lang="en-US" dirty="0"/>
-          </a:p>
-          <a:p>
-            <a:endParaRPr lang="en-US" dirty="0"/>
-          </a:p>
-          <a:p>
-            <a:endParaRPr lang="en-US" dirty="0"/>
-          </a:p>
-          <a:p>
-            <a:endParaRPr lang="en-US" dirty="0"/>
-          </a:p>
-          <a:p>
-            <a:endParaRPr lang="en-US" dirty="0"/>
-          </a:p>
-          <a:p>
-            <a:endParaRPr lang="en-US" dirty="0"/>
-          </a:p>
-          <a:p>
-            <a:endParaRPr lang="en-US" dirty="0"/>
-          </a:p>
-          <a:p>
-            <a:endParaRPr lang="en-US" dirty="0"/>
-          </a:p>
-          <a:p>
-            <a:endParaRPr lang="en-US" dirty="0"/>
-          </a:p>
-          <a:p>
-            <a:endParaRPr lang="en-US" dirty="0"/>
-          </a:p>
-          <a:p>
-            <a:endParaRPr lang="en-US" dirty="0"/>
-          </a:p>
-        </p:txBody>
-      </p:sp>
-      <p:pic>
-        <p:nvPicPr>
-          <p:cNvPr id="7" name="Picture 6">
-            <a:extLst>
-              <a:ext uri="{FF2B5EF4-FFF2-40B4-BE49-F238E27FC236}">
-                <a16:creationId xmlns:a16="http://schemas.microsoft.com/office/drawing/2014/main" id="{A23B555E-8C22-4CCF-9532-1E1F9DC9F7D6}"/>
-              </a:ext>
-            </a:extLst>
-          </p:cNvPr>
-          <p:cNvPicPr>
-            <a:picLocks noChangeAspect="1"/>
-          </p:cNvPicPr>
-          <p:nvPr/>
-        </p:nvPicPr>
-        <p:blipFill>
-          <a:blip r:embed="rId2"/>
-          <a:stretch>
-            <a:fillRect/>
-          </a:stretch>
-        </p:blipFill>
-        <p:spPr>
-          <a:xfrm>
-            <a:off x="0" y="0"/>
-            <a:ext cx="12192000" cy="6858000"/>
-          </a:xfrm>
-          <a:prstGeom prst="rect">
-            <a:avLst/>
-          </a:prstGeom>
-        </p:spPr>
-      </p:pic>
-    </p:spTree>
-    <p:extLst>
-      <p:ext uri="{BB962C8B-B14F-4D97-AF65-F5344CB8AC3E}">
-        <p14:creationId xmlns:p14="http://schemas.microsoft.com/office/powerpoint/2010/main" val="2927980237"/>
       </p:ext>
     </p:extLst>
   </p:cSld>

</xml_diff>